<commit_message>
Início da documentação da aba "Animation mode"
</commit_message>
<xml_diff>
--- a/[doc]/Using smartSpriteFX.pptx
+++ b/[doc]/Using smartSpriteFX.pptx
@@ -4,22 +4,23 @@
   <p:sldMasterIdLst>
     <p:sldMasterId id="2147483648" r:id="rId2"/>
     <p:sldMasterId id="2147483661" r:id="rId3"/>
+    <p:sldMasterId id="2147483674" r:id="rId4"/>
   </p:sldMasterIdLst>
   <p:sldIdLst>
-    <p:sldId id="256" r:id="rId4"/>
-    <p:sldId id="257" r:id="rId5"/>
-    <p:sldId id="258" r:id="rId6"/>
-    <p:sldId id="259" r:id="rId7"/>
-    <p:sldId id="260" r:id="rId8"/>
-    <p:sldId id="261" r:id="rId9"/>
-    <p:sldId id="262" r:id="rId10"/>
-    <p:sldId id="263" r:id="rId11"/>
-    <p:sldId id="264" r:id="rId12"/>
-    <p:sldId id="265" r:id="rId13"/>
-    <p:sldId id="266" r:id="rId14"/>
-    <p:sldId id="267" r:id="rId15"/>
-    <p:sldId id="268" r:id="rId16"/>
-    <p:sldId id="269" r:id="rId17"/>
+    <p:sldId id="256" r:id="rId5"/>
+    <p:sldId id="257" r:id="rId6"/>
+    <p:sldId id="258" r:id="rId7"/>
+    <p:sldId id="259" r:id="rId8"/>
+    <p:sldId id="260" r:id="rId9"/>
+    <p:sldId id="261" r:id="rId10"/>
+    <p:sldId id="262" r:id="rId11"/>
+    <p:sldId id="263" r:id="rId12"/>
+    <p:sldId id="264" r:id="rId13"/>
+    <p:sldId id="265" r:id="rId14"/>
+    <p:sldId id="266" r:id="rId15"/>
+    <p:sldId id="267" r:id="rId16"/>
+    <p:sldId id="268" r:id="rId17"/>
+    <p:sldId id="269" r:id="rId18"/>
   </p:sldIdLst>
   <p:sldSz cx="9144000" cy="5143500"/>
   <p:notesSz cx="7772400" cy="10058400"/>
@@ -2129,6 +2130,409 @@
 </p:sldLayout>
 </file>
 
+<file path=ppt/slideLayouts/slideLayout25.xml><?xml version="1.0" encoding="utf-8"?>
+<p:sldLayout xmlns:a="http://schemas.openxmlformats.org/drawingml/2006/main" xmlns:p="http://schemas.openxmlformats.org/presentationml/2006/main" xmlns:r="http://schemas.openxmlformats.org/officeDocument/2006/relationships" type="blank" preserve="1">
+  <p:cSld name="Blank Slide">
+    <p:spTree>
+      <p:nvGrpSpPr>
+        <p:cNvPr id="1" name=""/>
+        <p:cNvGrpSpPr/>
+        <p:nvPr/>
+      </p:nvGrpSpPr>
+      <p:grpSpPr>
+        <a:xfrm>
+          <a:off x="0" y="0"/>
+          <a:ext cx="0" cy="0"/>
+          <a:chOff x="0" y="0"/>
+          <a:chExt cx="0" cy="0"/>
+        </a:xfrm>
+      </p:grpSpPr>
+    </p:spTree>
+  </p:cSld>
+</p:sldLayout>
+</file>
+
+<file path=ppt/slideLayouts/slideLayout26.xml><?xml version="1.0" encoding="utf-8"?>
+<p:sldLayout xmlns:a="http://schemas.openxmlformats.org/drawingml/2006/main" xmlns:p="http://schemas.openxmlformats.org/presentationml/2006/main" xmlns:r="http://schemas.openxmlformats.org/officeDocument/2006/relationships" type="tx" preserve="1">
+  <p:cSld name="Title Slide">
+    <p:spTree>
+      <p:nvGrpSpPr>
+        <p:cNvPr id="1" name=""/>
+        <p:cNvGrpSpPr/>
+        <p:nvPr/>
+      </p:nvGrpSpPr>
+      <p:grpSpPr>
+        <a:xfrm>
+          <a:off x="0" y="0"/>
+          <a:ext cx="0" cy="0"/>
+          <a:chOff x="0" y="0"/>
+          <a:chExt cx="0" cy="0"/>
+        </a:xfrm>
+      </p:grpSpPr>
+      <p:sp>
+        <p:nvSpPr>
+          <p:cNvPr id="89" name="PlaceHolder 1"/>
+          <p:cNvSpPr>
+            <a:spLocks noGrp="1"/>
+          </p:cNvSpPr>
+          <p:nvPr>
+            <p:ph type="title"/>
+          </p:nvPr>
+        </p:nvSpPr>
+        <p:spPr>
+          <a:xfrm>
+            <a:off x="457200" y="205200"/>
+            <a:ext cx="8229240" cy="858600"/>
+          </a:xfrm>
+          <a:prstGeom prst="rect">
+            <a:avLst/>
+          </a:prstGeom>
+        </p:spPr>
+        <p:txBody>
+          <a:bodyPr lIns="0" rIns="0" tIns="0" bIns="0" anchor="ctr"/>
+          <a:p>
+            <a:pPr algn="ctr"/>
+            <a:endParaRPr lang="en-US" sz="4400" spc="-1" strike="noStrike">
+              <a:solidFill>
+                <a:srgbClr val="000000"/>
+              </a:solidFill>
+              <a:uFill>
+                <a:solidFill>
+                  <a:srgbClr val="ffffff"/>
+                </a:solidFill>
+              </a:uFill>
+              <a:latin typeface="Arial"/>
+            </a:endParaRPr>
+          </a:p>
+        </p:txBody>
+      </p:sp>
+      <p:sp>
+        <p:nvSpPr>
+          <p:cNvPr id="90" name="PlaceHolder 2"/>
+          <p:cNvSpPr>
+            <a:spLocks noGrp="1"/>
+          </p:cNvSpPr>
+          <p:nvPr>
+            <p:ph type="subTitle"/>
+          </p:nvPr>
+        </p:nvSpPr>
+        <p:spPr>
+          <a:xfrm>
+            <a:off x="457200" y="1203480"/>
+            <a:ext cx="8229240" cy="2982960"/>
+          </a:xfrm>
+          <a:prstGeom prst="rect">
+            <a:avLst/>
+          </a:prstGeom>
+        </p:spPr>
+        <p:txBody>
+          <a:bodyPr lIns="0" rIns="0" tIns="0" bIns="0" anchor="ctr"/>
+          <a:p>
+            <a:pPr algn="ctr"/>
+            <a:endParaRPr lang="en-US" sz="3200" spc="-1" strike="noStrike">
+              <a:solidFill>
+                <a:srgbClr val="000000"/>
+              </a:solidFill>
+              <a:uFill>
+                <a:solidFill>
+                  <a:srgbClr val="ffffff"/>
+                </a:solidFill>
+              </a:uFill>
+              <a:latin typeface="Arial"/>
+            </a:endParaRPr>
+          </a:p>
+        </p:txBody>
+      </p:sp>
+    </p:spTree>
+  </p:cSld>
+</p:sldLayout>
+</file>
+
+<file path=ppt/slideLayouts/slideLayout27.xml><?xml version="1.0" encoding="utf-8"?>
+<p:sldLayout xmlns:a="http://schemas.openxmlformats.org/drawingml/2006/main" xmlns:p="http://schemas.openxmlformats.org/presentationml/2006/main" xmlns:r="http://schemas.openxmlformats.org/officeDocument/2006/relationships" type="obj" preserve="1">
+  <p:cSld name="Title, Content">
+    <p:spTree>
+      <p:nvGrpSpPr>
+        <p:cNvPr id="1" name=""/>
+        <p:cNvGrpSpPr/>
+        <p:nvPr/>
+      </p:nvGrpSpPr>
+      <p:grpSpPr>
+        <a:xfrm>
+          <a:off x="0" y="0"/>
+          <a:ext cx="0" cy="0"/>
+          <a:chOff x="0" y="0"/>
+          <a:chExt cx="0" cy="0"/>
+        </a:xfrm>
+      </p:grpSpPr>
+      <p:sp>
+        <p:nvSpPr>
+          <p:cNvPr id="91" name="PlaceHolder 1"/>
+          <p:cNvSpPr>
+            <a:spLocks noGrp="1"/>
+          </p:cNvSpPr>
+          <p:nvPr>
+            <p:ph type="title"/>
+          </p:nvPr>
+        </p:nvSpPr>
+        <p:spPr>
+          <a:xfrm>
+            <a:off x="457200" y="205200"/>
+            <a:ext cx="8229240" cy="858600"/>
+          </a:xfrm>
+          <a:prstGeom prst="rect">
+            <a:avLst/>
+          </a:prstGeom>
+        </p:spPr>
+        <p:txBody>
+          <a:bodyPr lIns="0" rIns="0" tIns="0" bIns="0" anchor="ctr"/>
+          <a:p>
+            <a:pPr algn="ctr"/>
+            <a:endParaRPr lang="en-US" sz="4400" spc="-1" strike="noStrike">
+              <a:solidFill>
+                <a:srgbClr val="000000"/>
+              </a:solidFill>
+              <a:uFill>
+                <a:solidFill>
+                  <a:srgbClr val="ffffff"/>
+                </a:solidFill>
+              </a:uFill>
+              <a:latin typeface="Arial"/>
+            </a:endParaRPr>
+          </a:p>
+        </p:txBody>
+      </p:sp>
+      <p:sp>
+        <p:nvSpPr>
+          <p:cNvPr id="92" name="PlaceHolder 2"/>
+          <p:cNvSpPr>
+            <a:spLocks noGrp="1"/>
+          </p:cNvSpPr>
+          <p:nvPr>
+            <p:ph type="body"/>
+          </p:nvPr>
+        </p:nvSpPr>
+        <p:spPr>
+          <a:xfrm>
+            <a:off x="457200" y="1203480"/>
+            <a:ext cx="8229240" cy="2982960"/>
+          </a:xfrm>
+          <a:prstGeom prst="rect">
+            <a:avLst/>
+          </a:prstGeom>
+        </p:spPr>
+        <p:txBody>
+          <a:bodyPr lIns="0" rIns="0" tIns="0" bIns="0"/>
+          <a:p>
+            <a:endParaRPr lang="en-US" sz="3200" spc="-1" strike="noStrike">
+              <a:solidFill>
+                <a:srgbClr val="000000"/>
+              </a:solidFill>
+              <a:uFill>
+                <a:solidFill>
+                  <a:srgbClr val="ffffff"/>
+                </a:solidFill>
+              </a:uFill>
+              <a:latin typeface="Arial"/>
+            </a:endParaRPr>
+          </a:p>
+        </p:txBody>
+      </p:sp>
+    </p:spTree>
+  </p:cSld>
+</p:sldLayout>
+</file>
+
+<file path=ppt/slideLayouts/slideLayout28.xml><?xml version="1.0" encoding="utf-8"?>
+<p:sldLayout xmlns:a="http://schemas.openxmlformats.org/drawingml/2006/main" xmlns:p="http://schemas.openxmlformats.org/presentationml/2006/main" xmlns:r="http://schemas.openxmlformats.org/officeDocument/2006/relationships" type="twoObj" preserve="1">
+  <p:cSld name="Title, 2 Content">
+    <p:spTree>
+      <p:nvGrpSpPr>
+        <p:cNvPr id="1" name=""/>
+        <p:cNvGrpSpPr/>
+        <p:nvPr/>
+      </p:nvGrpSpPr>
+      <p:grpSpPr>
+        <a:xfrm>
+          <a:off x="0" y="0"/>
+          <a:ext cx="0" cy="0"/>
+          <a:chOff x="0" y="0"/>
+          <a:chExt cx="0" cy="0"/>
+        </a:xfrm>
+      </p:grpSpPr>
+      <p:sp>
+        <p:nvSpPr>
+          <p:cNvPr id="93" name="PlaceHolder 1"/>
+          <p:cNvSpPr>
+            <a:spLocks noGrp="1"/>
+          </p:cNvSpPr>
+          <p:nvPr>
+            <p:ph type="title"/>
+          </p:nvPr>
+        </p:nvSpPr>
+        <p:spPr>
+          <a:xfrm>
+            <a:off x="457200" y="205200"/>
+            <a:ext cx="8229240" cy="858600"/>
+          </a:xfrm>
+          <a:prstGeom prst="rect">
+            <a:avLst/>
+          </a:prstGeom>
+        </p:spPr>
+        <p:txBody>
+          <a:bodyPr lIns="0" rIns="0" tIns="0" bIns="0" anchor="ctr"/>
+          <a:p>
+            <a:pPr algn="ctr"/>
+            <a:endParaRPr lang="en-US" sz="4400" spc="-1" strike="noStrike">
+              <a:solidFill>
+                <a:srgbClr val="000000"/>
+              </a:solidFill>
+              <a:uFill>
+                <a:solidFill>
+                  <a:srgbClr val="ffffff"/>
+                </a:solidFill>
+              </a:uFill>
+              <a:latin typeface="Arial"/>
+            </a:endParaRPr>
+          </a:p>
+        </p:txBody>
+      </p:sp>
+      <p:sp>
+        <p:nvSpPr>
+          <p:cNvPr id="94" name="PlaceHolder 2"/>
+          <p:cNvSpPr>
+            <a:spLocks noGrp="1"/>
+          </p:cNvSpPr>
+          <p:nvPr>
+            <p:ph type="body"/>
+          </p:nvPr>
+        </p:nvSpPr>
+        <p:spPr>
+          <a:xfrm>
+            <a:off x="457200" y="1203480"/>
+            <a:ext cx="4015800" cy="2982960"/>
+          </a:xfrm>
+          <a:prstGeom prst="rect">
+            <a:avLst/>
+          </a:prstGeom>
+        </p:spPr>
+        <p:txBody>
+          <a:bodyPr lIns="0" rIns="0" tIns="0" bIns="0"/>
+          <a:p>
+            <a:endParaRPr lang="en-US" sz="3200" spc="-1" strike="noStrike">
+              <a:solidFill>
+                <a:srgbClr val="000000"/>
+              </a:solidFill>
+              <a:uFill>
+                <a:solidFill>
+                  <a:srgbClr val="ffffff"/>
+                </a:solidFill>
+              </a:uFill>
+              <a:latin typeface="Arial"/>
+            </a:endParaRPr>
+          </a:p>
+        </p:txBody>
+      </p:sp>
+      <p:sp>
+        <p:nvSpPr>
+          <p:cNvPr id="95" name="PlaceHolder 3"/>
+          <p:cNvSpPr>
+            <a:spLocks noGrp="1"/>
+          </p:cNvSpPr>
+          <p:nvPr>
+            <p:ph type="body"/>
+          </p:nvPr>
+        </p:nvSpPr>
+        <p:spPr>
+          <a:xfrm>
+            <a:off x="4674240" y="1203480"/>
+            <a:ext cx="4015800" cy="2982960"/>
+          </a:xfrm>
+          <a:prstGeom prst="rect">
+            <a:avLst/>
+          </a:prstGeom>
+        </p:spPr>
+        <p:txBody>
+          <a:bodyPr lIns="0" rIns="0" tIns="0" bIns="0"/>
+          <a:p>
+            <a:endParaRPr lang="en-US" sz="3200" spc="-1" strike="noStrike">
+              <a:solidFill>
+                <a:srgbClr val="000000"/>
+              </a:solidFill>
+              <a:uFill>
+                <a:solidFill>
+                  <a:srgbClr val="ffffff"/>
+                </a:solidFill>
+              </a:uFill>
+              <a:latin typeface="Arial"/>
+            </a:endParaRPr>
+          </a:p>
+        </p:txBody>
+      </p:sp>
+    </p:spTree>
+  </p:cSld>
+</p:sldLayout>
+</file>
+
+<file path=ppt/slideLayouts/slideLayout29.xml><?xml version="1.0" encoding="utf-8"?>
+<p:sldLayout xmlns:a="http://schemas.openxmlformats.org/drawingml/2006/main" xmlns:p="http://schemas.openxmlformats.org/presentationml/2006/main" xmlns:r="http://schemas.openxmlformats.org/officeDocument/2006/relationships" type="titleOnly" preserve="1">
+  <p:cSld name="Title Only">
+    <p:spTree>
+      <p:nvGrpSpPr>
+        <p:cNvPr id="1" name=""/>
+        <p:cNvGrpSpPr/>
+        <p:nvPr/>
+      </p:nvGrpSpPr>
+      <p:grpSpPr>
+        <a:xfrm>
+          <a:off x="0" y="0"/>
+          <a:ext cx="0" cy="0"/>
+          <a:chOff x="0" y="0"/>
+          <a:chExt cx="0" cy="0"/>
+        </a:xfrm>
+      </p:grpSpPr>
+      <p:sp>
+        <p:nvSpPr>
+          <p:cNvPr id="96" name="PlaceHolder 1"/>
+          <p:cNvSpPr>
+            <a:spLocks noGrp="1"/>
+          </p:cNvSpPr>
+          <p:nvPr>
+            <p:ph type="title"/>
+          </p:nvPr>
+        </p:nvSpPr>
+        <p:spPr>
+          <a:xfrm>
+            <a:off x="457200" y="205200"/>
+            <a:ext cx="8229240" cy="858600"/>
+          </a:xfrm>
+          <a:prstGeom prst="rect">
+            <a:avLst/>
+          </a:prstGeom>
+        </p:spPr>
+        <p:txBody>
+          <a:bodyPr lIns="0" rIns="0" tIns="0" bIns="0" anchor="ctr"/>
+          <a:p>
+            <a:pPr algn="ctr"/>
+            <a:endParaRPr lang="en-US" sz="4400" spc="-1" strike="noStrike">
+              <a:solidFill>
+                <a:srgbClr val="000000"/>
+              </a:solidFill>
+              <a:uFill>
+                <a:solidFill>
+                  <a:srgbClr val="ffffff"/>
+                </a:solidFill>
+              </a:uFill>
+              <a:latin typeface="Arial"/>
+            </a:endParaRPr>
+          </a:p>
+        </p:txBody>
+      </p:sp>
+    </p:spTree>
+  </p:cSld>
+</p:sldLayout>
+</file>
+
 <file path=ppt/slideLayouts/slideLayout3.xml><?xml version="1.0" encoding="utf-8"?>
 <p:sldLayout xmlns:a="http://schemas.openxmlformats.org/drawingml/2006/main" xmlns:p="http://schemas.openxmlformats.org/presentationml/2006/main" xmlns:r="http://schemas.openxmlformats.org/officeDocument/2006/relationships" type="obj" preserve="1">
   <p:cSld name="Title, Content">
@@ -2219,6 +2623,1077 @@
           </a:p>
         </p:txBody>
       </p:sp>
+    </p:spTree>
+  </p:cSld>
+</p:sldLayout>
+</file>
+
+<file path=ppt/slideLayouts/slideLayout30.xml><?xml version="1.0" encoding="utf-8"?>
+<p:sldLayout xmlns:a="http://schemas.openxmlformats.org/drawingml/2006/main" xmlns:p="http://schemas.openxmlformats.org/presentationml/2006/main" xmlns:r="http://schemas.openxmlformats.org/officeDocument/2006/relationships" type="objOnly" preserve="1">
+  <p:cSld name="Centered Text">
+    <p:spTree>
+      <p:nvGrpSpPr>
+        <p:cNvPr id="1" name=""/>
+        <p:cNvGrpSpPr/>
+        <p:nvPr/>
+      </p:nvGrpSpPr>
+      <p:grpSpPr>
+        <a:xfrm>
+          <a:off x="0" y="0"/>
+          <a:ext cx="0" cy="0"/>
+          <a:chOff x="0" y="0"/>
+          <a:chExt cx="0" cy="0"/>
+        </a:xfrm>
+      </p:grpSpPr>
+      <p:sp>
+        <p:nvSpPr>
+          <p:cNvPr id="97" name="PlaceHolder 1"/>
+          <p:cNvSpPr>
+            <a:spLocks noGrp="1"/>
+          </p:cNvSpPr>
+          <p:nvPr>
+            <p:ph type="subTitle"/>
+          </p:nvPr>
+        </p:nvSpPr>
+        <p:spPr>
+          <a:xfrm>
+            <a:off x="457200" y="205200"/>
+            <a:ext cx="8229240" cy="3981240"/>
+          </a:xfrm>
+          <a:prstGeom prst="rect">
+            <a:avLst/>
+          </a:prstGeom>
+        </p:spPr>
+        <p:txBody>
+          <a:bodyPr lIns="0" rIns="0" tIns="0" bIns="0" anchor="ctr"/>
+          <a:p>
+            <a:pPr algn="ctr"/>
+            <a:endParaRPr lang="en-US" sz="3200" spc="-1" strike="noStrike">
+              <a:solidFill>
+                <a:srgbClr val="000000"/>
+              </a:solidFill>
+              <a:uFill>
+                <a:solidFill>
+                  <a:srgbClr val="ffffff"/>
+                </a:solidFill>
+              </a:uFill>
+              <a:latin typeface="Arial"/>
+            </a:endParaRPr>
+          </a:p>
+        </p:txBody>
+      </p:sp>
+    </p:spTree>
+  </p:cSld>
+</p:sldLayout>
+</file>
+
+<file path=ppt/slideLayouts/slideLayout31.xml><?xml version="1.0" encoding="utf-8"?>
+<p:sldLayout xmlns:a="http://schemas.openxmlformats.org/drawingml/2006/main" xmlns:p="http://schemas.openxmlformats.org/presentationml/2006/main" xmlns:r="http://schemas.openxmlformats.org/officeDocument/2006/relationships" type="twoObjAndObj" preserve="1">
+  <p:cSld name="Title, 2 Content and Content">
+    <p:spTree>
+      <p:nvGrpSpPr>
+        <p:cNvPr id="1" name=""/>
+        <p:cNvGrpSpPr/>
+        <p:nvPr/>
+      </p:nvGrpSpPr>
+      <p:grpSpPr>
+        <a:xfrm>
+          <a:off x="0" y="0"/>
+          <a:ext cx="0" cy="0"/>
+          <a:chOff x="0" y="0"/>
+          <a:chExt cx="0" cy="0"/>
+        </a:xfrm>
+      </p:grpSpPr>
+      <p:sp>
+        <p:nvSpPr>
+          <p:cNvPr id="98" name="PlaceHolder 1"/>
+          <p:cNvSpPr>
+            <a:spLocks noGrp="1"/>
+          </p:cNvSpPr>
+          <p:nvPr>
+            <p:ph type="title"/>
+          </p:nvPr>
+        </p:nvSpPr>
+        <p:spPr>
+          <a:xfrm>
+            <a:off x="457200" y="205200"/>
+            <a:ext cx="8229240" cy="858600"/>
+          </a:xfrm>
+          <a:prstGeom prst="rect">
+            <a:avLst/>
+          </a:prstGeom>
+        </p:spPr>
+        <p:txBody>
+          <a:bodyPr lIns="0" rIns="0" tIns="0" bIns="0" anchor="ctr"/>
+          <a:p>
+            <a:pPr algn="ctr"/>
+            <a:endParaRPr lang="en-US" sz="4400" spc="-1" strike="noStrike">
+              <a:solidFill>
+                <a:srgbClr val="000000"/>
+              </a:solidFill>
+              <a:uFill>
+                <a:solidFill>
+                  <a:srgbClr val="ffffff"/>
+                </a:solidFill>
+              </a:uFill>
+              <a:latin typeface="Arial"/>
+            </a:endParaRPr>
+          </a:p>
+        </p:txBody>
+      </p:sp>
+      <p:sp>
+        <p:nvSpPr>
+          <p:cNvPr id="99" name="PlaceHolder 2"/>
+          <p:cNvSpPr>
+            <a:spLocks noGrp="1"/>
+          </p:cNvSpPr>
+          <p:nvPr>
+            <p:ph type="body"/>
+          </p:nvPr>
+        </p:nvSpPr>
+        <p:spPr>
+          <a:xfrm>
+            <a:off x="457200" y="1203480"/>
+            <a:ext cx="4015800" cy="1422720"/>
+          </a:xfrm>
+          <a:prstGeom prst="rect">
+            <a:avLst/>
+          </a:prstGeom>
+        </p:spPr>
+        <p:txBody>
+          <a:bodyPr lIns="0" rIns="0" tIns="0" bIns="0"/>
+          <a:p>
+            <a:endParaRPr lang="en-US" sz="3200" spc="-1" strike="noStrike">
+              <a:solidFill>
+                <a:srgbClr val="000000"/>
+              </a:solidFill>
+              <a:uFill>
+                <a:solidFill>
+                  <a:srgbClr val="ffffff"/>
+                </a:solidFill>
+              </a:uFill>
+              <a:latin typeface="Arial"/>
+            </a:endParaRPr>
+          </a:p>
+        </p:txBody>
+      </p:sp>
+      <p:sp>
+        <p:nvSpPr>
+          <p:cNvPr id="100" name="PlaceHolder 3"/>
+          <p:cNvSpPr>
+            <a:spLocks noGrp="1"/>
+          </p:cNvSpPr>
+          <p:nvPr>
+            <p:ph type="body"/>
+          </p:nvPr>
+        </p:nvSpPr>
+        <p:spPr>
+          <a:xfrm>
+            <a:off x="457200" y="2761920"/>
+            <a:ext cx="4015800" cy="1422720"/>
+          </a:xfrm>
+          <a:prstGeom prst="rect">
+            <a:avLst/>
+          </a:prstGeom>
+        </p:spPr>
+        <p:txBody>
+          <a:bodyPr lIns="0" rIns="0" tIns="0" bIns="0"/>
+          <a:p>
+            <a:endParaRPr lang="en-US" sz="3200" spc="-1" strike="noStrike">
+              <a:solidFill>
+                <a:srgbClr val="000000"/>
+              </a:solidFill>
+              <a:uFill>
+                <a:solidFill>
+                  <a:srgbClr val="ffffff"/>
+                </a:solidFill>
+              </a:uFill>
+              <a:latin typeface="Arial"/>
+            </a:endParaRPr>
+          </a:p>
+        </p:txBody>
+      </p:sp>
+      <p:sp>
+        <p:nvSpPr>
+          <p:cNvPr id="101" name="PlaceHolder 4"/>
+          <p:cNvSpPr>
+            <a:spLocks noGrp="1"/>
+          </p:cNvSpPr>
+          <p:nvPr>
+            <p:ph type="body"/>
+          </p:nvPr>
+        </p:nvSpPr>
+        <p:spPr>
+          <a:xfrm>
+            <a:off x="4674240" y="1203480"/>
+            <a:ext cx="4015800" cy="2982960"/>
+          </a:xfrm>
+          <a:prstGeom prst="rect">
+            <a:avLst/>
+          </a:prstGeom>
+        </p:spPr>
+        <p:txBody>
+          <a:bodyPr lIns="0" rIns="0" tIns="0" bIns="0"/>
+          <a:p>
+            <a:endParaRPr lang="en-US" sz="3200" spc="-1" strike="noStrike">
+              <a:solidFill>
+                <a:srgbClr val="000000"/>
+              </a:solidFill>
+              <a:uFill>
+                <a:solidFill>
+                  <a:srgbClr val="ffffff"/>
+                </a:solidFill>
+              </a:uFill>
+              <a:latin typeface="Arial"/>
+            </a:endParaRPr>
+          </a:p>
+        </p:txBody>
+      </p:sp>
+    </p:spTree>
+  </p:cSld>
+</p:sldLayout>
+</file>
+
+<file path=ppt/slideLayouts/slideLayout32.xml><?xml version="1.0" encoding="utf-8"?>
+<p:sldLayout xmlns:a="http://schemas.openxmlformats.org/drawingml/2006/main" xmlns:p="http://schemas.openxmlformats.org/presentationml/2006/main" xmlns:r="http://schemas.openxmlformats.org/officeDocument/2006/relationships" type="objAndTwoObj" preserve="1">
+  <p:cSld name="Title Content and 2 Content">
+    <p:spTree>
+      <p:nvGrpSpPr>
+        <p:cNvPr id="1" name=""/>
+        <p:cNvGrpSpPr/>
+        <p:nvPr/>
+      </p:nvGrpSpPr>
+      <p:grpSpPr>
+        <a:xfrm>
+          <a:off x="0" y="0"/>
+          <a:ext cx="0" cy="0"/>
+          <a:chOff x="0" y="0"/>
+          <a:chExt cx="0" cy="0"/>
+        </a:xfrm>
+      </p:grpSpPr>
+      <p:sp>
+        <p:nvSpPr>
+          <p:cNvPr id="102" name="PlaceHolder 1"/>
+          <p:cNvSpPr>
+            <a:spLocks noGrp="1"/>
+          </p:cNvSpPr>
+          <p:nvPr>
+            <p:ph type="title"/>
+          </p:nvPr>
+        </p:nvSpPr>
+        <p:spPr>
+          <a:xfrm>
+            <a:off x="457200" y="205200"/>
+            <a:ext cx="8229240" cy="858600"/>
+          </a:xfrm>
+          <a:prstGeom prst="rect">
+            <a:avLst/>
+          </a:prstGeom>
+        </p:spPr>
+        <p:txBody>
+          <a:bodyPr lIns="0" rIns="0" tIns="0" bIns="0" anchor="ctr"/>
+          <a:p>
+            <a:pPr algn="ctr"/>
+            <a:endParaRPr lang="en-US" sz="4400" spc="-1" strike="noStrike">
+              <a:solidFill>
+                <a:srgbClr val="000000"/>
+              </a:solidFill>
+              <a:uFill>
+                <a:solidFill>
+                  <a:srgbClr val="ffffff"/>
+                </a:solidFill>
+              </a:uFill>
+              <a:latin typeface="Arial"/>
+            </a:endParaRPr>
+          </a:p>
+        </p:txBody>
+      </p:sp>
+      <p:sp>
+        <p:nvSpPr>
+          <p:cNvPr id="103" name="PlaceHolder 2"/>
+          <p:cNvSpPr>
+            <a:spLocks noGrp="1"/>
+          </p:cNvSpPr>
+          <p:nvPr>
+            <p:ph type="body"/>
+          </p:nvPr>
+        </p:nvSpPr>
+        <p:spPr>
+          <a:xfrm>
+            <a:off x="457200" y="1203480"/>
+            <a:ext cx="4015800" cy="2982960"/>
+          </a:xfrm>
+          <a:prstGeom prst="rect">
+            <a:avLst/>
+          </a:prstGeom>
+        </p:spPr>
+        <p:txBody>
+          <a:bodyPr lIns="0" rIns="0" tIns="0" bIns="0"/>
+          <a:p>
+            <a:endParaRPr lang="en-US" sz="3200" spc="-1" strike="noStrike">
+              <a:solidFill>
+                <a:srgbClr val="000000"/>
+              </a:solidFill>
+              <a:uFill>
+                <a:solidFill>
+                  <a:srgbClr val="ffffff"/>
+                </a:solidFill>
+              </a:uFill>
+              <a:latin typeface="Arial"/>
+            </a:endParaRPr>
+          </a:p>
+        </p:txBody>
+      </p:sp>
+      <p:sp>
+        <p:nvSpPr>
+          <p:cNvPr id="104" name="PlaceHolder 3"/>
+          <p:cNvSpPr>
+            <a:spLocks noGrp="1"/>
+          </p:cNvSpPr>
+          <p:nvPr>
+            <p:ph type="body"/>
+          </p:nvPr>
+        </p:nvSpPr>
+        <p:spPr>
+          <a:xfrm>
+            <a:off x="4674240" y="1203480"/>
+            <a:ext cx="4015800" cy="1422720"/>
+          </a:xfrm>
+          <a:prstGeom prst="rect">
+            <a:avLst/>
+          </a:prstGeom>
+        </p:spPr>
+        <p:txBody>
+          <a:bodyPr lIns="0" rIns="0" tIns="0" bIns="0"/>
+          <a:p>
+            <a:endParaRPr lang="en-US" sz="3200" spc="-1" strike="noStrike">
+              <a:solidFill>
+                <a:srgbClr val="000000"/>
+              </a:solidFill>
+              <a:uFill>
+                <a:solidFill>
+                  <a:srgbClr val="ffffff"/>
+                </a:solidFill>
+              </a:uFill>
+              <a:latin typeface="Arial"/>
+            </a:endParaRPr>
+          </a:p>
+        </p:txBody>
+      </p:sp>
+      <p:sp>
+        <p:nvSpPr>
+          <p:cNvPr id="105" name="PlaceHolder 4"/>
+          <p:cNvSpPr>
+            <a:spLocks noGrp="1"/>
+          </p:cNvSpPr>
+          <p:nvPr>
+            <p:ph type="body"/>
+          </p:nvPr>
+        </p:nvSpPr>
+        <p:spPr>
+          <a:xfrm>
+            <a:off x="4674240" y="2761920"/>
+            <a:ext cx="4015800" cy="1422720"/>
+          </a:xfrm>
+          <a:prstGeom prst="rect">
+            <a:avLst/>
+          </a:prstGeom>
+        </p:spPr>
+        <p:txBody>
+          <a:bodyPr lIns="0" rIns="0" tIns="0" bIns="0"/>
+          <a:p>
+            <a:endParaRPr lang="en-US" sz="3200" spc="-1" strike="noStrike">
+              <a:solidFill>
+                <a:srgbClr val="000000"/>
+              </a:solidFill>
+              <a:uFill>
+                <a:solidFill>
+                  <a:srgbClr val="ffffff"/>
+                </a:solidFill>
+              </a:uFill>
+              <a:latin typeface="Arial"/>
+            </a:endParaRPr>
+          </a:p>
+        </p:txBody>
+      </p:sp>
+    </p:spTree>
+  </p:cSld>
+</p:sldLayout>
+</file>
+
+<file path=ppt/slideLayouts/slideLayout33.xml><?xml version="1.0" encoding="utf-8"?>
+<p:sldLayout xmlns:a="http://schemas.openxmlformats.org/drawingml/2006/main" xmlns:p="http://schemas.openxmlformats.org/presentationml/2006/main" xmlns:r="http://schemas.openxmlformats.org/officeDocument/2006/relationships" type="twoObjOverTx" preserve="1">
+  <p:cSld name="Title, 2 Content over Content">
+    <p:spTree>
+      <p:nvGrpSpPr>
+        <p:cNvPr id="1" name=""/>
+        <p:cNvGrpSpPr/>
+        <p:nvPr/>
+      </p:nvGrpSpPr>
+      <p:grpSpPr>
+        <a:xfrm>
+          <a:off x="0" y="0"/>
+          <a:ext cx="0" cy="0"/>
+          <a:chOff x="0" y="0"/>
+          <a:chExt cx="0" cy="0"/>
+        </a:xfrm>
+      </p:grpSpPr>
+      <p:sp>
+        <p:nvSpPr>
+          <p:cNvPr id="106" name="PlaceHolder 1"/>
+          <p:cNvSpPr>
+            <a:spLocks noGrp="1"/>
+          </p:cNvSpPr>
+          <p:nvPr>
+            <p:ph type="title"/>
+          </p:nvPr>
+        </p:nvSpPr>
+        <p:spPr>
+          <a:xfrm>
+            <a:off x="457200" y="205200"/>
+            <a:ext cx="8229240" cy="858600"/>
+          </a:xfrm>
+          <a:prstGeom prst="rect">
+            <a:avLst/>
+          </a:prstGeom>
+        </p:spPr>
+        <p:txBody>
+          <a:bodyPr lIns="0" rIns="0" tIns="0" bIns="0" anchor="ctr"/>
+          <a:p>
+            <a:pPr algn="ctr"/>
+            <a:endParaRPr lang="en-US" sz="4400" spc="-1" strike="noStrike">
+              <a:solidFill>
+                <a:srgbClr val="000000"/>
+              </a:solidFill>
+              <a:uFill>
+                <a:solidFill>
+                  <a:srgbClr val="ffffff"/>
+                </a:solidFill>
+              </a:uFill>
+              <a:latin typeface="Arial"/>
+            </a:endParaRPr>
+          </a:p>
+        </p:txBody>
+      </p:sp>
+      <p:sp>
+        <p:nvSpPr>
+          <p:cNvPr id="107" name="PlaceHolder 2"/>
+          <p:cNvSpPr>
+            <a:spLocks noGrp="1"/>
+          </p:cNvSpPr>
+          <p:nvPr>
+            <p:ph type="body"/>
+          </p:nvPr>
+        </p:nvSpPr>
+        <p:spPr>
+          <a:xfrm>
+            <a:off x="457200" y="1203480"/>
+            <a:ext cx="4015800" cy="1422720"/>
+          </a:xfrm>
+          <a:prstGeom prst="rect">
+            <a:avLst/>
+          </a:prstGeom>
+        </p:spPr>
+        <p:txBody>
+          <a:bodyPr lIns="0" rIns="0" tIns="0" bIns="0"/>
+          <a:p>
+            <a:endParaRPr lang="en-US" sz="3200" spc="-1" strike="noStrike">
+              <a:solidFill>
+                <a:srgbClr val="000000"/>
+              </a:solidFill>
+              <a:uFill>
+                <a:solidFill>
+                  <a:srgbClr val="ffffff"/>
+                </a:solidFill>
+              </a:uFill>
+              <a:latin typeface="Arial"/>
+            </a:endParaRPr>
+          </a:p>
+        </p:txBody>
+      </p:sp>
+      <p:sp>
+        <p:nvSpPr>
+          <p:cNvPr id="108" name="PlaceHolder 3"/>
+          <p:cNvSpPr>
+            <a:spLocks noGrp="1"/>
+          </p:cNvSpPr>
+          <p:nvPr>
+            <p:ph type="body"/>
+          </p:nvPr>
+        </p:nvSpPr>
+        <p:spPr>
+          <a:xfrm>
+            <a:off x="4674240" y="1203480"/>
+            <a:ext cx="4015800" cy="1422720"/>
+          </a:xfrm>
+          <a:prstGeom prst="rect">
+            <a:avLst/>
+          </a:prstGeom>
+        </p:spPr>
+        <p:txBody>
+          <a:bodyPr lIns="0" rIns="0" tIns="0" bIns="0"/>
+          <a:p>
+            <a:endParaRPr lang="en-US" sz="3200" spc="-1" strike="noStrike">
+              <a:solidFill>
+                <a:srgbClr val="000000"/>
+              </a:solidFill>
+              <a:uFill>
+                <a:solidFill>
+                  <a:srgbClr val="ffffff"/>
+                </a:solidFill>
+              </a:uFill>
+              <a:latin typeface="Arial"/>
+            </a:endParaRPr>
+          </a:p>
+        </p:txBody>
+      </p:sp>
+      <p:sp>
+        <p:nvSpPr>
+          <p:cNvPr id="109" name="PlaceHolder 4"/>
+          <p:cNvSpPr>
+            <a:spLocks noGrp="1"/>
+          </p:cNvSpPr>
+          <p:nvPr>
+            <p:ph type="body"/>
+          </p:nvPr>
+        </p:nvSpPr>
+        <p:spPr>
+          <a:xfrm>
+            <a:off x="457200" y="2761920"/>
+            <a:ext cx="8229240" cy="1422720"/>
+          </a:xfrm>
+          <a:prstGeom prst="rect">
+            <a:avLst/>
+          </a:prstGeom>
+        </p:spPr>
+        <p:txBody>
+          <a:bodyPr lIns="0" rIns="0" tIns="0" bIns="0"/>
+          <a:p>
+            <a:endParaRPr lang="en-US" sz="3200" spc="-1" strike="noStrike">
+              <a:solidFill>
+                <a:srgbClr val="000000"/>
+              </a:solidFill>
+              <a:uFill>
+                <a:solidFill>
+                  <a:srgbClr val="ffffff"/>
+                </a:solidFill>
+              </a:uFill>
+              <a:latin typeface="Arial"/>
+            </a:endParaRPr>
+          </a:p>
+        </p:txBody>
+      </p:sp>
+    </p:spTree>
+  </p:cSld>
+</p:sldLayout>
+</file>
+
+<file path=ppt/slideLayouts/slideLayout34.xml><?xml version="1.0" encoding="utf-8"?>
+<p:sldLayout xmlns:a="http://schemas.openxmlformats.org/drawingml/2006/main" xmlns:p="http://schemas.openxmlformats.org/presentationml/2006/main" xmlns:r="http://schemas.openxmlformats.org/officeDocument/2006/relationships" type="objOverTx" preserve="1">
+  <p:cSld name="Title, Content over Content">
+    <p:spTree>
+      <p:nvGrpSpPr>
+        <p:cNvPr id="1" name=""/>
+        <p:cNvGrpSpPr/>
+        <p:nvPr/>
+      </p:nvGrpSpPr>
+      <p:grpSpPr>
+        <a:xfrm>
+          <a:off x="0" y="0"/>
+          <a:ext cx="0" cy="0"/>
+          <a:chOff x="0" y="0"/>
+          <a:chExt cx="0" cy="0"/>
+        </a:xfrm>
+      </p:grpSpPr>
+      <p:sp>
+        <p:nvSpPr>
+          <p:cNvPr id="110" name="PlaceHolder 1"/>
+          <p:cNvSpPr>
+            <a:spLocks noGrp="1"/>
+          </p:cNvSpPr>
+          <p:nvPr>
+            <p:ph type="title"/>
+          </p:nvPr>
+        </p:nvSpPr>
+        <p:spPr>
+          <a:xfrm>
+            <a:off x="457200" y="205200"/>
+            <a:ext cx="8229240" cy="858600"/>
+          </a:xfrm>
+          <a:prstGeom prst="rect">
+            <a:avLst/>
+          </a:prstGeom>
+        </p:spPr>
+        <p:txBody>
+          <a:bodyPr lIns="0" rIns="0" tIns="0" bIns="0" anchor="ctr"/>
+          <a:p>
+            <a:pPr algn="ctr"/>
+            <a:endParaRPr lang="en-US" sz="4400" spc="-1" strike="noStrike">
+              <a:solidFill>
+                <a:srgbClr val="000000"/>
+              </a:solidFill>
+              <a:uFill>
+                <a:solidFill>
+                  <a:srgbClr val="ffffff"/>
+                </a:solidFill>
+              </a:uFill>
+              <a:latin typeface="Arial"/>
+            </a:endParaRPr>
+          </a:p>
+        </p:txBody>
+      </p:sp>
+      <p:sp>
+        <p:nvSpPr>
+          <p:cNvPr id="111" name="PlaceHolder 2"/>
+          <p:cNvSpPr>
+            <a:spLocks noGrp="1"/>
+          </p:cNvSpPr>
+          <p:nvPr>
+            <p:ph type="body"/>
+          </p:nvPr>
+        </p:nvSpPr>
+        <p:spPr>
+          <a:xfrm>
+            <a:off x="457200" y="1203480"/>
+            <a:ext cx="8229240" cy="1422720"/>
+          </a:xfrm>
+          <a:prstGeom prst="rect">
+            <a:avLst/>
+          </a:prstGeom>
+        </p:spPr>
+        <p:txBody>
+          <a:bodyPr lIns="0" rIns="0" tIns="0" bIns="0"/>
+          <a:p>
+            <a:endParaRPr lang="en-US" sz="3200" spc="-1" strike="noStrike">
+              <a:solidFill>
+                <a:srgbClr val="000000"/>
+              </a:solidFill>
+              <a:uFill>
+                <a:solidFill>
+                  <a:srgbClr val="ffffff"/>
+                </a:solidFill>
+              </a:uFill>
+              <a:latin typeface="Arial"/>
+            </a:endParaRPr>
+          </a:p>
+        </p:txBody>
+      </p:sp>
+      <p:sp>
+        <p:nvSpPr>
+          <p:cNvPr id="112" name="PlaceHolder 3"/>
+          <p:cNvSpPr>
+            <a:spLocks noGrp="1"/>
+          </p:cNvSpPr>
+          <p:nvPr>
+            <p:ph type="body"/>
+          </p:nvPr>
+        </p:nvSpPr>
+        <p:spPr>
+          <a:xfrm>
+            <a:off x="457200" y="2761920"/>
+            <a:ext cx="8229240" cy="1422720"/>
+          </a:xfrm>
+          <a:prstGeom prst="rect">
+            <a:avLst/>
+          </a:prstGeom>
+        </p:spPr>
+        <p:txBody>
+          <a:bodyPr lIns="0" rIns="0" tIns="0" bIns="0"/>
+          <a:p>
+            <a:endParaRPr lang="en-US" sz="3200" spc="-1" strike="noStrike">
+              <a:solidFill>
+                <a:srgbClr val="000000"/>
+              </a:solidFill>
+              <a:uFill>
+                <a:solidFill>
+                  <a:srgbClr val="ffffff"/>
+                </a:solidFill>
+              </a:uFill>
+              <a:latin typeface="Arial"/>
+            </a:endParaRPr>
+          </a:p>
+        </p:txBody>
+      </p:sp>
+    </p:spTree>
+  </p:cSld>
+</p:sldLayout>
+</file>
+
+<file path=ppt/slideLayouts/slideLayout35.xml><?xml version="1.0" encoding="utf-8"?>
+<p:sldLayout xmlns:a="http://schemas.openxmlformats.org/drawingml/2006/main" xmlns:p="http://schemas.openxmlformats.org/presentationml/2006/main" xmlns:r="http://schemas.openxmlformats.org/officeDocument/2006/relationships" type="fourObj" preserve="1">
+  <p:cSld name="Title, 4 Content">
+    <p:spTree>
+      <p:nvGrpSpPr>
+        <p:cNvPr id="1" name=""/>
+        <p:cNvGrpSpPr/>
+        <p:nvPr/>
+      </p:nvGrpSpPr>
+      <p:grpSpPr>
+        <a:xfrm>
+          <a:off x="0" y="0"/>
+          <a:ext cx="0" cy="0"/>
+          <a:chOff x="0" y="0"/>
+          <a:chExt cx="0" cy="0"/>
+        </a:xfrm>
+      </p:grpSpPr>
+      <p:sp>
+        <p:nvSpPr>
+          <p:cNvPr id="113" name="PlaceHolder 1"/>
+          <p:cNvSpPr>
+            <a:spLocks noGrp="1"/>
+          </p:cNvSpPr>
+          <p:nvPr>
+            <p:ph type="title"/>
+          </p:nvPr>
+        </p:nvSpPr>
+        <p:spPr>
+          <a:xfrm>
+            <a:off x="457200" y="205200"/>
+            <a:ext cx="8229240" cy="858600"/>
+          </a:xfrm>
+          <a:prstGeom prst="rect">
+            <a:avLst/>
+          </a:prstGeom>
+        </p:spPr>
+        <p:txBody>
+          <a:bodyPr lIns="0" rIns="0" tIns="0" bIns="0" anchor="ctr"/>
+          <a:p>
+            <a:pPr algn="ctr"/>
+            <a:endParaRPr lang="en-US" sz="4400" spc="-1" strike="noStrike">
+              <a:solidFill>
+                <a:srgbClr val="000000"/>
+              </a:solidFill>
+              <a:uFill>
+                <a:solidFill>
+                  <a:srgbClr val="ffffff"/>
+                </a:solidFill>
+              </a:uFill>
+              <a:latin typeface="Arial"/>
+            </a:endParaRPr>
+          </a:p>
+        </p:txBody>
+      </p:sp>
+      <p:sp>
+        <p:nvSpPr>
+          <p:cNvPr id="114" name="PlaceHolder 2"/>
+          <p:cNvSpPr>
+            <a:spLocks noGrp="1"/>
+          </p:cNvSpPr>
+          <p:nvPr>
+            <p:ph type="body"/>
+          </p:nvPr>
+        </p:nvSpPr>
+        <p:spPr>
+          <a:xfrm>
+            <a:off x="457200" y="1203480"/>
+            <a:ext cx="4015800" cy="1422720"/>
+          </a:xfrm>
+          <a:prstGeom prst="rect">
+            <a:avLst/>
+          </a:prstGeom>
+        </p:spPr>
+        <p:txBody>
+          <a:bodyPr lIns="0" rIns="0" tIns="0" bIns="0"/>
+          <a:p>
+            <a:endParaRPr lang="en-US" sz="3200" spc="-1" strike="noStrike">
+              <a:solidFill>
+                <a:srgbClr val="000000"/>
+              </a:solidFill>
+              <a:uFill>
+                <a:solidFill>
+                  <a:srgbClr val="ffffff"/>
+                </a:solidFill>
+              </a:uFill>
+              <a:latin typeface="Arial"/>
+            </a:endParaRPr>
+          </a:p>
+        </p:txBody>
+      </p:sp>
+      <p:sp>
+        <p:nvSpPr>
+          <p:cNvPr id="115" name="PlaceHolder 3"/>
+          <p:cNvSpPr>
+            <a:spLocks noGrp="1"/>
+          </p:cNvSpPr>
+          <p:nvPr>
+            <p:ph type="body"/>
+          </p:nvPr>
+        </p:nvSpPr>
+        <p:spPr>
+          <a:xfrm>
+            <a:off x="4674240" y="1203480"/>
+            <a:ext cx="4015800" cy="1422720"/>
+          </a:xfrm>
+          <a:prstGeom prst="rect">
+            <a:avLst/>
+          </a:prstGeom>
+        </p:spPr>
+        <p:txBody>
+          <a:bodyPr lIns="0" rIns="0" tIns="0" bIns="0"/>
+          <a:p>
+            <a:endParaRPr lang="en-US" sz="3200" spc="-1" strike="noStrike">
+              <a:solidFill>
+                <a:srgbClr val="000000"/>
+              </a:solidFill>
+              <a:uFill>
+                <a:solidFill>
+                  <a:srgbClr val="ffffff"/>
+                </a:solidFill>
+              </a:uFill>
+              <a:latin typeface="Arial"/>
+            </a:endParaRPr>
+          </a:p>
+        </p:txBody>
+      </p:sp>
+      <p:sp>
+        <p:nvSpPr>
+          <p:cNvPr id="116" name="PlaceHolder 4"/>
+          <p:cNvSpPr>
+            <a:spLocks noGrp="1"/>
+          </p:cNvSpPr>
+          <p:nvPr>
+            <p:ph type="body"/>
+          </p:nvPr>
+        </p:nvSpPr>
+        <p:spPr>
+          <a:xfrm>
+            <a:off x="4674240" y="2761920"/>
+            <a:ext cx="4015800" cy="1422720"/>
+          </a:xfrm>
+          <a:prstGeom prst="rect">
+            <a:avLst/>
+          </a:prstGeom>
+        </p:spPr>
+        <p:txBody>
+          <a:bodyPr lIns="0" rIns="0" tIns="0" bIns="0"/>
+          <a:p>
+            <a:endParaRPr lang="en-US" sz="3200" spc="-1" strike="noStrike">
+              <a:solidFill>
+                <a:srgbClr val="000000"/>
+              </a:solidFill>
+              <a:uFill>
+                <a:solidFill>
+                  <a:srgbClr val="ffffff"/>
+                </a:solidFill>
+              </a:uFill>
+              <a:latin typeface="Arial"/>
+            </a:endParaRPr>
+          </a:p>
+        </p:txBody>
+      </p:sp>
+      <p:sp>
+        <p:nvSpPr>
+          <p:cNvPr id="117" name="PlaceHolder 5"/>
+          <p:cNvSpPr>
+            <a:spLocks noGrp="1"/>
+          </p:cNvSpPr>
+          <p:nvPr>
+            <p:ph type="body"/>
+          </p:nvPr>
+        </p:nvSpPr>
+        <p:spPr>
+          <a:xfrm>
+            <a:off x="457200" y="2761920"/>
+            <a:ext cx="4015800" cy="1422720"/>
+          </a:xfrm>
+          <a:prstGeom prst="rect">
+            <a:avLst/>
+          </a:prstGeom>
+        </p:spPr>
+        <p:txBody>
+          <a:bodyPr lIns="0" rIns="0" tIns="0" bIns="0"/>
+          <a:p>
+            <a:endParaRPr lang="en-US" sz="3200" spc="-1" strike="noStrike">
+              <a:solidFill>
+                <a:srgbClr val="000000"/>
+              </a:solidFill>
+              <a:uFill>
+                <a:solidFill>
+                  <a:srgbClr val="ffffff"/>
+                </a:solidFill>
+              </a:uFill>
+              <a:latin typeface="Arial"/>
+            </a:endParaRPr>
+          </a:p>
+        </p:txBody>
+      </p:sp>
+    </p:spTree>
+  </p:cSld>
+</p:sldLayout>
+</file>
+
+<file path=ppt/slideLayouts/slideLayout36.xml><?xml version="1.0" encoding="utf-8"?>
+<p:sldLayout xmlns:a="http://schemas.openxmlformats.org/drawingml/2006/main" xmlns:p="http://schemas.openxmlformats.org/presentationml/2006/main" xmlns:r="http://schemas.openxmlformats.org/officeDocument/2006/relationships" type="blank" preserve="1">
+  <p:cSld name="Title, 6 Content">
+    <p:spTree>
+      <p:nvGrpSpPr>
+        <p:cNvPr id="1" name=""/>
+        <p:cNvGrpSpPr/>
+        <p:nvPr/>
+      </p:nvGrpSpPr>
+      <p:grpSpPr>
+        <a:xfrm>
+          <a:off x="0" y="0"/>
+          <a:ext cx="0" cy="0"/>
+          <a:chOff x="0" y="0"/>
+          <a:chExt cx="0" cy="0"/>
+        </a:xfrm>
+      </p:grpSpPr>
+      <p:sp>
+        <p:nvSpPr>
+          <p:cNvPr id="118" name="PlaceHolder 1"/>
+          <p:cNvSpPr>
+            <a:spLocks noGrp="1"/>
+          </p:cNvSpPr>
+          <p:nvPr>
+            <p:ph type="title"/>
+          </p:nvPr>
+        </p:nvSpPr>
+        <p:spPr>
+          <a:xfrm>
+            <a:off x="457200" y="205200"/>
+            <a:ext cx="8229240" cy="858600"/>
+          </a:xfrm>
+          <a:prstGeom prst="rect">
+            <a:avLst/>
+          </a:prstGeom>
+        </p:spPr>
+        <p:txBody>
+          <a:bodyPr lIns="0" rIns="0" tIns="0" bIns="0" anchor="ctr"/>
+          <a:p>
+            <a:pPr algn="ctr"/>
+            <a:endParaRPr lang="en-US" sz="4400" spc="-1" strike="noStrike">
+              <a:solidFill>
+                <a:srgbClr val="000000"/>
+              </a:solidFill>
+              <a:uFill>
+                <a:solidFill>
+                  <a:srgbClr val="ffffff"/>
+                </a:solidFill>
+              </a:uFill>
+              <a:latin typeface="Arial"/>
+            </a:endParaRPr>
+          </a:p>
+        </p:txBody>
+      </p:sp>
+      <p:sp>
+        <p:nvSpPr>
+          <p:cNvPr id="119" name="PlaceHolder 2"/>
+          <p:cNvSpPr>
+            <a:spLocks noGrp="1"/>
+          </p:cNvSpPr>
+          <p:nvPr>
+            <p:ph type="body"/>
+          </p:nvPr>
+        </p:nvSpPr>
+        <p:spPr>
+          <a:xfrm>
+            <a:off x="457200" y="1203480"/>
+            <a:ext cx="8229240" cy="2982960"/>
+          </a:xfrm>
+          <a:prstGeom prst="rect">
+            <a:avLst/>
+          </a:prstGeom>
+        </p:spPr>
+        <p:txBody>
+          <a:bodyPr lIns="0" rIns="0" tIns="0" bIns="0"/>
+          <a:p>
+            <a:endParaRPr lang="en-US" sz="3200" spc="-1" strike="noStrike">
+              <a:solidFill>
+                <a:srgbClr val="000000"/>
+              </a:solidFill>
+              <a:uFill>
+                <a:solidFill>
+                  <a:srgbClr val="ffffff"/>
+                </a:solidFill>
+              </a:uFill>
+              <a:latin typeface="Arial"/>
+            </a:endParaRPr>
+          </a:p>
+        </p:txBody>
+      </p:sp>
+      <p:sp>
+        <p:nvSpPr>
+          <p:cNvPr id="120" name="PlaceHolder 3"/>
+          <p:cNvSpPr>
+            <a:spLocks noGrp="1"/>
+          </p:cNvSpPr>
+          <p:nvPr>
+            <p:ph type="body"/>
+          </p:nvPr>
+        </p:nvSpPr>
+        <p:spPr>
+          <a:xfrm>
+            <a:off x="457200" y="1203480"/>
+            <a:ext cx="8229240" cy="2982960"/>
+          </a:xfrm>
+          <a:prstGeom prst="rect">
+            <a:avLst/>
+          </a:prstGeom>
+        </p:spPr>
+        <p:txBody>
+          <a:bodyPr lIns="0" rIns="0" tIns="0" bIns="0"/>
+          <a:p>
+            <a:endParaRPr lang="en-US" sz="3200" spc="-1" strike="noStrike">
+              <a:solidFill>
+                <a:srgbClr val="000000"/>
+              </a:solidFill>
+              <a:uFill>
+                <a:solidFill>
+                  <a:srgbClr val="ffffff"/>
+                </a:solidFill>
+              </a:uFill>
+              <a:latin typeface="Arial"/>
+            </a:endParaRPr>
+          </a:p>
+        </p:txBody>
+      </p:sp>
+      <p:pic>
+        <p:nvPicPr>
+          <p:cNvPr id="121" name="" descr=""/>
+          <p:cNvPicPr/>
+          <p:nvPr/>
+        </p:nvPicPr>
+        <p:blipFill>
+          <a:blip r:embed="rId2"/>
+          <a:stretch/>
+        </p:blipFill>
+        <p:spPr>
+          <a:xfrm>
+            <a:off x="2702160" y="1203480"/>
+            <a:ext cx="3738600" cy="2982960"/>
+          </a:xfrm>
+          <a:prstGeom prst="rect">
+            <a:avLst/>
+          </a:prstGeom>
+          <a:ln>
+            <a:noFill/>
+          </a:ln>
+        </p:spPr>
+      </p:pic>
+      <p:pic>
+        <p:nvPicPr>
+          <p:cNvPr id="122" name="" descr=""/>
+          <p:cNvPicPr/>
+          <p:nvPr/>
+        </p:nvPicPr>
+        <p:blipFill>
+          <a:blip r:embed="rId3"/>
+          <a:stretch/>
+        </p:blipFill>
+        <p:spPr>
+          <a:xfrm>
+            <a:off x="2702160" y="1203480"/>
+            <a:ext cx="3738600" cy="2982960"/>
+          </a:xfrm>
+          <a:prstGeom prst="rect">
+            <a:avLst/>
+          </a:prstGeom>
+          <a:ln>
+            <a:noFill/>
+          </a:ln>
+        </p:spPr>
+      </p:pic>
     </p:spTree>
   </p:cSld>
 </p:sldLayout>
@@ -3007,7 +4482,7 @@
         <p:spPr>
           <a:xfrm>
             <a:off x="8128800" y="0"/>
-            <a:ext cx="1014120" cy="1014120"/>
+            <a:ext cx="1013760" cy="1013760"/>
           </a:xfrm>
           <a:prstGeom prst="rect">
             <a:avLst/>
@@ -3035,7 +4510,7 @@
         <p:spPr>
           <a:xfrm flipH="1">
             <a:off x="7112160" y="0"/>
-            <a:ext cx="1014120" cy="1014120"/>
+            <a:ext cx="1013760" cy="1013760"/>
           </a:xfrm>
           <a:prstGeom prst="rtTriangle">
             <a:avLst/>
@@ -3062,8 +4537,8 @@
         </p:nvSpPr>
         <p:spPr>
           <a:xfrm flipH="1" rot="10800000">
-            <a:off x="10156680" y="3044520"/>
-            <a:ext cx="1014120" cy="1014120"/>
+            <a:off x="11170800" y="4058640"/>
+            <a:ext cx="1013760" cy="1013760"/>
           </a:xfrm>
           <a:prstGeom prst="rtTriangle">
             <a:avLst/>
@@ -3090,8 +4565,8 @@
         </p:nvSpPr>
         <p:spPr>
           <a:xfrm rot="10800000">
-            <a:off x="9142920" y="3044520"/>
-            <a:ext cx="1014120" cy="1014120"/>
+            <a:off x="10157040" y="4058640"/>
+            <a:ext cx="1013760" cy="1013760"/>
           </a:xfrm>
           <a:prstGeom prst="rtTriangle">
             <a:avLst/>
@@ -3118,8 +4593,8 @@
         </p:nvSpPr>
         <p:spPr>
           <a:xfrm rot="10800000">
-            <a:off x="11173320" y="4059720"/>
-            <a:ext cx="1014120" cy="1014120"/>
+            <a:off x="12187440" y="5073840"/>
+            <a:ext cx="1013760" cy="1013760"/>
           </a:xfrm>
           <a:prstGeom prst="rtTriangle">
             <a:avLst/>
@@ -3150,8 +4625,8 @@
         </p:nvSpPr>
         <p:spPr>
           <a:xfrm>
-            <a:off x="311760" y="401040"/>
-            <a:ext cx="8519400" cy="624960"/>
+            <a:off x="457200" y="205200"/>
+            <a:ext cx="8229240" cy="858600"/>
           </a:xfrm>
           <a:prstGeom prst="rect">
             <a:avLst/>
@@ -3161,6 +4636,20 @@
           <a:bodyPr lIns="0" rIns="0" tIns="0" bIns="0" anchor="ctr"/>
           <a:p>
             <a:pPr algn="ctr"/>
+            <a:r>
+              <a:rPr lang="en-US" sz="4400" spc="-1" strike="noStrike">
+                <a:solidFill>
+                  <a:srgbClr val="000000"/>
+                </a:solidFill>
+                <a:uFill>
+                  <a:solidFill>
+                    <a:srgbClr val="ffffff"/>
+                  </a:solidFill>
+                </a:uFill>
+                <a:latin typeface="Arial"/>
+              </a:rPr>
+              <a:t>Clique para editar o formato do texto do título</a:t>
+            </a:r>
             <a:endParaRPr lang="en-US" sz="4400" spc="-1" strike="noStrike">
               <a:solidFill>
                 <a:srgbClr val="000000"/>
@@ -3187,8 +4676,8 @@
         </p:nvSpPr>
         <p:spPr>
           <a:xfrm>
-            <a:off x="311760" y="1229760"/>
-            <a:ext cx="8519400" cy="3337920"/>
+            <a:off x="457200" y="1203480"/>
+            <a:ext cx="8229240" cy="2982960"/>
           </a:xfrm>
           <a:prstGeom prst="rect">
             <a:avLst/>
@@ -3206,7 +4695,7 @@
               <a:buChar char=""/>
             </a:pPr>
             <a:r>
-              <a:rPr lang="en-US" sz="1800" spc="-1" strike="noStrike">
+              <a:rPr lang="en-US" sz="3200" spc="-1" strike="noStrike">
                 <a:solidFill>
                   <a:srgbClr val="000000"/>
                 </a:solidFill>
@@ -3219,7 +4708,7 @@
               </a:rPr>
               <a:t>Clique para editar o formato do texto da estrutura de tópicos</a:t>
             </a:r>
-            <a:endParaRPr lang="en-US" sz="1800" spc="-1" strike="noStrike">
+            <a:endParaRPr lang="en-US" sz="3200" spc="-1" strike="noStrike">
               <a:solidFill>
                 <a:srgbClr val="000000"/>
               </a:solidFill>
@@ -3241,7 +4730,7 @@
               <a:buChar char=""/>
             </a:pPr>
             <a:r>
-              <a:rPr lang="en-US" sz="1800" spc="-1" strike="noStrike">
+              <a:rPr lang="en-US" sz="2800" spc="-1" strike="noStrike">
                 <a:solidFill>
                   <a:srgbClr val="000000"/>
                 </a:solidFill>
@@ -3254,7 +4743,7 @@
               </a:rPr>
               <a:t>2.º nível da estrutura de tópicos</a:t>
             </a:r>
-            <a:endParaRPr lang="en-US" sz="1800" spc="-1" strike="noStrike">
+            <a:endParaRPr lang="en-US" sz="2800" spc="-1" strike="noStrike">
               <a:solidFill>
                 <a:srgbClr val="000000"/>
               </a:solidFill>
@@ -3276,7 +4765,7 @@
               <a:buChar char=""/>
             </a:pPr>
             <a:r>
-              <a:rPr lang="en-US" sz="1800" spc="-1" strike="noStrike">
+              <a:rPr lang="en-US" sz="2400" spc="-1" strike="noStrike">
                 <a:solidFill>
                   <a:srgbClr val="000000"/>
                 </a:solidFill>
@@ -3289,7 +4778,7 @@
               </a:rPr>
               <a:t>3.º nível da estrutura de tópicos</a:t>
             </a:r>
-            <a:endParaRPr lang="en-US" sz="1800" spc="-1" strike="noStrike">
+            <a:endParaRPr lang="en-US" sz="2400" spc="-1" strike="noStrike">
               <a:solidFill>
                 <a:srgbClr val="000000"/>
               </a:solidFill>
@@ -3311,7 +4800,7 @@
               <a:buChar char=""/>
             </a:pPr>
             <a:r>
-              <a:rPr lang="en-US" sz="1800" spc="-1" strike="noStrike">
+              <a:rPr lang="en-US" sz="2000" spc="-1" strike="noStrike">
                 <a:solidFill>
                   <a:srgbClr val="000000"/>
                 </a:solidFill>
@@ -3324,7 +4813,7 @@
               </a:rPr>
               <a:t>4.º nível da estrutura de tópicos</a:t>
             </a:r>
-            <a:endParaRPr lang="en-US" sz="1800" spc="-1" strike="noStrike">
+            <a:endParaRPr lang="en-US" sz="2000" spc="-1" strike="noStrike">
               <a:solidFill>
                 <a:srgbClr val="000000"/>
               </a:solidFill>
@@ -3346,7 +4835,7 @@
               <a:buChar char=""/>
             </a:pPr>
             <a:r>
-              <a:rPr lang="en-US" sz="1800" spc="-1" strike="noStrike">
+              <a:rPr lang="en-US" sz="2000" spc="-1" strike="noStrike">
                 <a:solidFill>
                   <a:srgbClr val="000000"/>
                 </a:solidFill>
@@ -3359,7 +4848,7 @@
               </a:rPr>
               <a:t>5.º nível da estrutura de tópicos</a:t>
             </a:r>
-            <a:endParaRPr lang="en-US" sz="1800" spc="-1" strike="noStrike">
+            <a:endParaRPr lang="en-US" sz="2000" spc="-1" strike="noStrike">
               <a:solidFill>
                 <a:srgbClr val="000000"/>
               </a:solidFill>
@@ -3381,7 +4870,7 @@
               <a:buChar char=""/>
             </a:pPr>
             <a:r>
-              <a:rPr lang="en-US" sz="1800" spc="-1" strike="noStrike">
+              <a:rPr lang="en-US" sz="2000" spc="-1" strike="noStrike">
                 <a:solidFill>
                   <a:srgbClr val="000000"/>
                 </a:solidFill>
@@ -3394,7 +4883,7 @@
               </a:rPr>
               <a:t>6.º nível da estrutura de tópicos</a:t>
             </a:r>
-            <a:endParaRPr lang="en-US" sz="1800" spc="-1" strike="noStrike">
+            <a:endParaRPr lang="en-US" sz="2000" spc="-1" strike="noStrike">
               <a:solidFill>
                 <a:srgbClr val="000000"/>
               </a:solidFill>
@@ -3416,7 +4905,7 @@
               <a:buChar char=""/>
             </a:pPr>
             <a:r>
-              <a:rPr lang="en-US" sz="1800" spc="-1" strike="noStrike">
+              <a:rPr lang="en-US" sz="2000" spc="-1" strike="noStrike">
                 <a:solidFill>
                   <a:srgbClr val="000000"/>
                 </a:solidFill>
@@ -3429,7 +4918,7 @@
               </a:rPr>
               <a:t>7.º nível da estrutura de tópicos</a:t>
             </a:r>
-            <a:endParaRPr lang="en-US" sz="1800" spc="-1" strike="noStrike">
+            <a:endParaRPr lang="en-US" sz="2000" spc="-1" strike="noStrike">
               <a:solidFill>
                 <a:srgbClr val="000000"/>
               </a:solidFill>
@@ -3496,7 +4985,7 @@
         <p:spPr>
           <a:xfrm>
             <a:off x="8154720" y="3903840"/>
-            <a:ext cx="988200" cy="986760"/>
+            <a:ext cx="987840" cy="986400"/>
           </a:xfrm>
           <a:prstGeom prst="rtTriangle">
             <a:avLst/>
@@ -3524,7 +5013,7 @@
         <p:spPr>
           <a:xfrm flipH="1">
             <a:off x="6179760" y="3903840"/>
-            <a:ext cx="988200" cy="986760"/>
+            <a:ext cx="987840" cy="986400"/>
           </a:xfrm>
           <a:prstGeom prst="rtTriangle">
             <a:avLst/>
@@ -3552,7 +5041,7 @@
         <p:spPr>
           <a:xfrm>
             <a:off x="7170120" y="3903840"/>
-            <a:ext cx="988200" cy="986760"/>
+            <a:ext cx="987840" cy="986400"/>
           </a:xfrm>
           <a:prstGeom prst="rect">
             <a:avLst/>
@@ -3579,8 +5068,8 @@
         </p:nvSpPr>
         <p:spPr>
           <a:xfrm rot="10800000">
-            <a:off x="11121480" y="6866280"/>
-            <a:ext cx="988200" cy="986760"/>
+            <a:off x="12109680" y="7853040"/>
+            <a:ext cx="987840" cy="986400"/>
           </a:xfrm>
           <a:prstGeom prst="rtTriangle">
             <a:avLst/>
@@ -3608,7 +5097,7 @@
         <p:spPr>
           <a:xfrm>
             <a:off x="0" y="4891680"/>
-            <a:ext cx="9142920" cy="250920"/>
+            <a:ext cx="9142560" cy="250560"/>
           </a:xfrm>
           <a:prstGeom prst="rect">
             <a:avLst/>
@@ -3962,6 +5451,509 @@
     <p:sldLayoutId id="2147483671" r:id="rId11"/>
     <p:sldLayoutId id="2147483672" r:id="rId12"/>
     <p:sldLayoutId id="2147483673" r:id="rId13"/>
+  </p:sldLayoutIdLst>
+</p:sldMaster>
+</file>
+
+<file path=ppt/slideMasters/slideMaster3.xml><?xml version="1.0" encoding="utf-8"?>
+<p:sldMaster xmlns:a="http://schemas.openxmlformats.org/drawingml/2006/main" xmlns:p="http://schemas.openxmlformats.org/presentationml/2006/main" xmlns:r="http://schemas.openxmlformats.org/officeDocument/2006/relationships">
+  <p:cSld>
+    <p:bg>
+      <p:bgPr>
+        <a:solidFill>
+          <a:srgbClr val="ffffff"/>
+        </a:solidFill>
+      </p:bgPr>
+    </p:bg>
+    <p:spTree>
+      <p:nvGrpSpPr>
+        <p:cNvPr id="1" name=""/>
+        <p:cNvGrpSpPr/>
+        <p:nvPr/>
+      </p:nvGrpSpPr>
+      <p:grpSpPr>
+        <a:xfrm>
+          <a:off x="0" y="0"/>
+          <a:ext cx="0" cy="0"/>
+          <a:chOff x="0" y="0"/>
+          <a:chExt cx="0" cy="0"/>
+        </a:xfrm>
+      </p:grpSpPr>
+      <p:sp>
+        <p:nvSpPr>
+          <p:cNvPr id="82" name="CustomShape 1"/>
+          <p:cNvSpPr/>
+          <p:nvPr/>
+        </p:nvSpPr>
+        <p:spPr>
+          <a:xfrm>
+            <a:off x="8154720" y="3903840"/>
+            <a:ext cx="987840" cy="986400"/>
+          </a:xfrm>
+          <a:prstGeom prst="rtTriangle">
+            <a:avLst/>
+          </a:prstGeom>
+          <a:solidFill>
+            <a:schemeClr val="accent5"/>
+          </a:solidFill>
+          <a:ln>
+            <a:noFill/>
+          </a:ln>
+        </p:spPr>
+        <p:style>
+          <a:lnRef idx="0"/>
+          <a:fillRef idx="0"/>
+          <a:effectRef idx="0"/>
+          <a:fontRef idx="minor"/>
+        </p:style>
+      </p:sp>
+      <p:sp>
+        <p:nvSpPr>
+          <p:cNvPr id="83" name="CustomShape 2"/>
+          <p:cNvSpPr/>
+          <p:nvPr/>
+        </p:nvSpPr>
+        <p:spPr>
+          <a:xfrm flipH="1">
+            <a:off x="6179760" y="3903840"/>
+            <a:ext cx="987840" cy="986400"/>
+          </a:xfrm>
+          <a:prstGeom prst="rtTriangle">
+            <a:avLst/>
+          </a:prstGeom>
+          <a:solidFill>
+            <a:schemeClr val="accent5"/>
+          </a:solidFill>
+          <a:ln>
+            <a:noFill/>
+          </a:ln>
+        </p:spPr>
+        <p:style>
+          <a:lnRef idx="0"/>
+          <a:fillRef idx="0"/>
+          <a:effectRef idx="0"/>
+          <a:fontRef idx="minor"/>
+        </p:style>
+      </p:sp>
+      <p:sp>
+        <p:nvSpPr>
+          <p:cNvPr id="84" name="CustomShape 3"/>
+          <p:cNvSpPr/>
+          <p:nvPr/>
+        </p:nvSpPr>
+        <p:spPr>
+          <a:xfrm>
+            <a:off x="7170120" y="3903840"/>
+            <a:ext cx="987840" cy="986400"/>
+          </a:xfrm>
+          <a:prstGeom prst="rect">
+            <a:avLst/>
+          </a:prstGeom>
+          <a:solidFill>
+            <a:schemeClr val="accent4"/>
+          </a:solidFill>
+          <a:ln>
+            <a:noFill/>
+          </a:ln>
+        </p:spPr>
+        <p:style>
+          <a:lnRef idx="0"/>
+          <a:fillRef idx="0"/>
+          <a:effectRef idx="0"/>
+          <a:fontRef idx="minor"/>
+        </p:style>
+      </p:sp>
+      <p:sp>
+        <p:nvSpPr>
+          <p:cNvPr id="85" name="CustomShape 4"/>
+          <p:cNvSpPr/>
+          <p:nvPr/>
+        </p:nvSpPr>
+        <p:spPr>
+          <a:xfrm rot="10800000">
+            <a:off x="12109680" y="7853040"/>
+            <a:ext cx="987840" cy="986400"/>
+          </a:xfrm>
+          <a:prstGeom prst="rtTriangle">
+            <a:avLst/>
+          </a:prstGeom>
+          <a:solidFill>
+            <a:schemeClr val="accent3"/>
+          </a:solidFill>
+          <a:ln>
+            <a:noFill/>
+          </a:ln>
+        </p:spPr>
+        <p:style>
+          <a:lnRef idx="0"/>
+          <a:fillRef idx="0"/>
+          <a:effectRef idx="0"/>
+          <a:fontRef idx="minor"/>
+        </p:style>
+      </p:sp>
+      <p:sp>
+        <p:nvSpPr>
+          <p:cNvPr id="86" name="CustomShape 5"/>
+          <p:cNvSpPr/>
+          <p:nvPr/>
+        </p:nvSpPr>
+        <p:spPr>
+          <a:xfrm>
+            <a:off x="0" y="4891680"/>
+            <a:ext cx="9142560" cy="250560"/>
+          </a:xfrm>
+          <a:prstGeom prst="rect">
+            <a:avLst/>
+          </a:prstGeom>
+          <a:solidFill>
+            <a:schemeClr val="dk1"/>
+          </a:solidFill>
+          <a:ln>
+            <a:noFill/>
+          </a:ln>
+        </p:spPr>
+        <p:style>
+          <a:lnRef idx="0"/>
+          <a:fillRef idx="0"/>
+          <a:effectRef idx="0"/>
+          <a:fontRef idx="minor"/>
+        </p:style>
+      </p:sp>
+      <p:sp>
+        <p:nvSpPr>
+          <p:cNvPr id="87" name="PlaceHolder 6"/>
+          <p:cNvSpPr>
+            <a:spLocks noGrp="1"/>
+          </p:cNvSpPr>
+          <p:nvPr>
+            <p:ph type="title"/>
+          </p:nvPr>
+        </p:nvSpPr>
+        <p:spPr>
+          <a:xfrm>
+            <a:off x="457200" y="205200"/>
+            <a:ext cx="8229240" cy="858600"/>
+          </a:xfrm>
+          <a:prstGeom prst="rect">
+            <a:avLst/>
+          </a:prstGeom>
+        </p:spPr>
+        <p:txBody>
+          <a:bodyPr lIns="0" rIns="0" tIns="0" bIns="0" anchor="ctr"/>
+          <a:p>
+            <a:pPr algn="ctr"/>
+            <a:r>
+              <a:rPr lang="en-US" sz="4400" spc="-1" strike="noStrike">
+                <a:solidFill>
+                  <a:srgbClr val="000000"/>
+                </a:solidFill>
+                <a:uFill>
+                  <a:solidFill>
+                    <a:srgbClr val="ffffff"/>
+                  </a:solidFill>
+                </a:uFill>
+                <a:latin typeface="Arial"/>
+              </a:rPr>
+              <a:t>Clique para editar o formato do texto do título</a:t>
+            </a:r>
+            <a:endParaRPr lang="en-US" sz="4400" spc="-1" strike="noStrike">
+              <a:solidFill>
+                <a:srgbClr val="000000"/>
+              </a:solidFill>
+              <a:uFill>
+                <a:solidFill>
+                  <a:srgbClr val="ffffff"/>
+                </a:solidFill>
+              </a:uFill>
+              <a:latin typeface="Arial"/>
+            </a:endParaRPr>
+          </a:p>
+        </p:txBody>
+      </p:sp>
+      <p:sp>
+        <p:nvSpPr>
+          <p:cNvPr id="88" name="PlaceHolder 7"/>
+          <p:cNvSpPr>
+            <a:spLocks noGrp="1"/>
+          </p:cNvSpPr>
+          <p:nvPr>
+            <p:ph type="body"/>
+          </p:nvPr>
+        </p:nvSpPr>
+        <p:spPr>
+          <a:xfrm>
+            <a:off x="457200" y="1203480"/>
+            <a:ext cx="8229240" cy="2982960"/>
+          </a:xfrm>
+          <a:prstGeom prst="rect">
+            <a:avLst/>
+          </a:prstGeom>
+        </p:spPr>
+        <p:txBody>
+          <a:bodyPr lIns="0" rIns="0" tIns="0" bIns="0"/>
+          <a:p>
+            <a:pPr marL="432000" indent="-324000">
+              <a:buClr>
+                <a:srgbClr val="000000"/>
+              </a:buClr>
+              <a:buSzPct val="45000"/>
+              <a:buFont typeface="Wingdings" charset="2"/>
+              <a:buChar char=""/>
+            </a:pPr>
+            <a:r>
+              <a:rPr lang="en-US" sz="3200" spc="-1" strike="noStrike">
+                <a:solidFill>
+                  <a:srgbClr val="000000"/>
+                </a:solidFill>
+                <a:uFill>
+                  <a:solidFill>
+                    <a:srgbClr val="ffffff"/>
+                  </a:solidFill>
+                </a:uFill>
+                <a:latin typeface="Arial"/>
+              </a:rPr>
+              <a:t>Clique para editar o formato do texto da estrutura de tópicos</a:t>
+            </a:r>
+            <a:endParaRPr lang="en-US" sz="3200" spc="-1" strike="noStrike">
+              <a:solidFill>
+                <a:srgbClr val="000000"/>
+              </a:solidFill>
+              <a:uFill>
+                <a:solidFill>
+                  <a:srgbClr val="ffffff"/>
+                </a:solidFill>
+              </a:uFill>
+              <a:latin typeface="Arial"/>
+            </a:endParaRPr>
+          </a:p>
+          <a:p>
+            <a:pPr lvl="1" marL="864000" indent="-324000">
+              <a:buClr>
+                <a:srgbClr val="000000"/>
+              </a:buClr>
+              <a:buSzPct val="75000"/>
+              <a:buFont typeface="Symbol" charset="2"/>
+              <a:buChar char=""/>
+            </a:pPr>
+            <a:r>
+              <a:rPr lang="en-US" sz="2800" spc="-1" strike="noStrike">
+                <a:solidFill>
+                  <a:srgbClr val="000000"/>
+                </a:solidFill>
+                <a:uFill>
+                  <a:solidFill>
+                    <a:srgbClr val="ffffff"/>
+                  </a:solidFill>
+                </a:uFill>
+                <a:latin typeface="Arial"/>
+              </a:rPr>
+              <a:t>2.º nível da estrutura de tópicos</a:t>
+            </a:r>
+            <a:endParaRPr lang="en-US" sz="2800" spc="-1" strike="noStrike">
+              <a:solidFill>
+                <a:srgbClr val="000000"/>
+              </a:solidFill>
+              <a:uFill>
+                <a:solidFill>
+                  <a:srgbClr val="ffffff"/>
+                </a:solidFill>
+              </a:uFill>
+              <a:latin typeface="Arial"/>
+            </a:endParaRPr>
+          </a:p>
+          <a:p>
+            <a:pPr lvl="2" marL="1296000" indent="-288000">
+              <a:buClr>
+                <a:srgbClr val="000000"/>
+              </a:buClr>
+              <a:buSzPct val="45000"/>
+              <a:buFont typeface="Wingdings" charset="2"/>
+              <a:buChar char=""/>
+            </a:pPr>
+            <a:r>
+              <a:rPr lang="en-US" sz="2400" spc="-1" strike="noStrike">
+                <a:solidFill>
+                  <a:srgbClr val="000000"/>
+                </a:solidFill>
+                <a:uFill>
+                  <a:solidFill>
+                    <a:srgbClr val="ffffff"/>
+                  </a:solidFill>
+                </a:uFill>
+                <a:latin typeface="Arial"/>
+              </a:rPr>
+              <a:t>3.º nível da estrutura de tópicos</a:t>
+            </a:r>
+            <a:endParaRPr lang="en-US" sz="2400" spc="-1" strike="noStrike">
+              <a:solidFill>
+                <a:srgbClr val="000000"/>
+              </a:solidFill>
+              <a:uFill>
+                <a:solidFill>
+                  <a:srgbClr val="ffffff"/>
+                </a:solidFill>
+              </a:uFill>
+              <a:latin typeface="Arial"/>
+            </a:endParaRPr>
+          </a:p>
+          <a:p>
+            <a:pPr lvl="3" marL="1728000" indent="-216000">
+              <a:buClr>
+                <a:srgbClr val="000000"/>
+              </a:buClr>
+              <a:buSzPct val="75000"/>
+              <a:buFont typeface="Symbol" charset="2"/>
+              <a:buChar char=""/>
+            </a:pPr>
+            <a:r>
+              <a:rPr lang="en-US" sz="2000" spc="-1" strike="noStrike">
+                <a:solidFill>
+                  <a:srgbClr val="000000"/>
+                </a:solidFill>
+                <a:uFill>
+                  <a:solidFill>
+                    <a:srgbClr val="ffffff"/>
+                  </a:solidFill>
+                </a:uFill>
+                <a:latin typeface="Arial"/>
+              </a:rPr>
+              <a:t>4.º nível da estrutura de tópicos</a:t>
+            </a:r>
+            <a:endParaRPr lang="en-US" sz="2000" spc="-1" strike="noStrike">
+              <a:solidFill>
+                <a:srgbClr val="000000"/>
+              </a:solidFill>
+              <a:uFill>
+                <a:solidFill>
+                  <a:srgbClr val="ffffff"/>
+                </a:solidFill>
+              </a:uFill>
+              <a:latin typeface="Arial"/>
+            </a:endParaRPr>
+          </a:p>
+          <a:p>
+            <a:pPr lvl="4" marL="2160000" indent="-216000">
+              <a:buClr>
+                <a:srgbClr val="000000"/>
+              </a:buClr>
+              <a:buSzPct val="45000"/>
+              <a:buFont typeface="Wingdings" charset="2"/>
+              <a:buChar char=""/>
+            </a:pPr>
+            <a:r>
+              <a:rPr lang="en-US" sz="2000" spc="-1" strike="noStrike">
+                <a:solidFill>
+                  <a:srgbClr val="000000"/>
+                </a:solidFill>
+                <a:uFill>
+                  <a:solidFill>
+                    <a:srgbClr val="ffffff"/>
+                  </a:solidFill>
+                </a:uFill>
+                <a:latin typeface="Arial"/>
+              </a:rPr>
+              <a:t>5.º nível da estrutura de tópicos</a:t>
+            </a:r>
+            <a:endParaRPr lang="en-US" sz="2000" spc="-1" strike="noStrike">
+              <a:solidFill>
+                <a:srgbClr val="000000"/>
+              </a:solidFill>
+              <a:uFill>
+                <a:solidFill>
+                  <a:srgbClr val="ffffff"/>
+                </a:solidFill>
+              </a:uFill>
+              <a:latin typeface="Arial"/>
+            </a:endParaRPr>
+          </a:p>
+          <a:p>
+            <a:pPr lvl="5" marL="2592000" indent="-216000">
+              <a:buClr>
+                <a:srgbClr val="000000"/>
+              </a:buClr>
+              <a:buSzPct val="45000"/>
+              <a:buFont typeface="Wingdings" charset="2"/>
+              <a:buChar char=""/>
+            </a:pPr>
+            <a:r>
+              <a:rPr lang="en-US" sz="2000" spc="-1" strike="noStrike">
+                <a:solidFill>
+                  <a:srgbClr val="000000"/>
+                </a:solidFill>
+                <a:uFill>
+                  <a:solidFill>
+                    <a:srgbClr val="ffffff"/>
+                  </a:solidFill>
+                </a:uFill>
+                <a:latin typeface="Arial"/>
+              </a:rPr>
+              <a:t>6.º nível da estrutura de tópicos</a:t>
+            </a:r>
+            <a:endParaRPr lang="en-US" sz="2000" spc="-1" strike="noStrike">
+              <a:solidFill>
+                <a:srgbClr val="000000"/>
+              </a:solidFill>
+              <a:uFill>
+                <a:solidFill>
+                  <a:srgbClr val="ffffff"/>
+                </a:solidFill>
+              </a:uFill>
+              <a:latin typeface="Arial"/>
+            </a:endParaRPr>
+          </a:p>
+          <a:p>
+            <a:pPr lvl="6" marL="3024000" indent="-216000">
+              <a:buClr>
+                <a:srgbClr val="000000"/>
+              </a:buClr>
+              <a:buSzPct val="45000"/>
+              <a:buFont typeface="Wingdings" charset="2"/>
+              <a:buChar char=""/>
+            </a:pPr>
+            <a:r>
+              <a:rPr lang="en-US" sz="2000" spc="-1" strike="noStrike">
+                <a:solidFill>
+                  <a:srgbClr val="000000"/>
+                </a:solidFill>
+                <a:uFill>
+                  <a:solidFill>
+                    <a:srgbClr val="ffffff"/>
+                  </a:solidFill>
+                </a:uFill>
+                <a:latin typeface="Arial"/>
+              </a:rPr>
+              <a:t>7.º nível da estrutura de tópicos</a:t>
+            </a:r>
+            <a:endParaRPr lang="en-US" sz="2000" spc="-1" strike="noStrike">
+              <a:solidFill>
+                <a:srgbClr val="000000"/>
+              </a:solidFill>
+              <a:uFill>
+                <a:solidFill>
+                  <a:srgbClr val="ffffff"/>
+                </a:solidFill>
+              </a:uFill>
+              <a:latin typeface="Arial"/>
+            </a:endParaRPr>
+          </a:p>
+        </p:txBody>
+      </p:sp>
+    </p:spTree>
+  </p:cSld>
+  <p:clrMap bg1="lt1" bg2="lt2" tx1="dk1" tx2="dk2" accent1="accent1" accent2="accent2" accent3="accent3" accent4="accent4" accent5="accent5" accent6="accent6" hlink="hlink" folHlink="folHlink"/>
+  <p:sldLayoutIdLst>
+    <p:sldLayoutId id="2147483675" r:id="rId2"/>
+    <p:sldLayoutId id="2147483676" r:id="rId3"/>
+    <p:sldLayoutId id="2147483677" r:id="rId4"/>
+    <p:sldLayoutId id="2147483678" r:id="rId5"/>
+    <p:sldLayoutId id="2147483679" r:id="rId6"/>
+    <p:sldLayoutId id="2147483680" r:id="rId7"/>
+    <p:sldLayoutId id="2147483681" r:id="rId8"/>
+    <p:sldLayoutId id="2147483682" r:id="rId9"/>
+    <p:sldLayoutId id="2147483683" r:id="rId10"/>
+    <p:sldLayoutId id="2147483684" r:id="rId11"/>
+    <p:sldLayoutId id="2147483685" r:id="rId12"/>
+    <p:sldLayoutId id="2147483686" r:id="rId13"/>
   </p:sldLayoutIdLst>
 </p:sldMaster>
 </file>
@@ -3985,14 +5977,14 @@
       </p:grpSpPr>
       <p:sp>
         <p:nvSpPr>
-          <p:cNvPr id="82" name="CustomShape 1"/>
+          <p:cNvPr id="123" name="CustomShape 1"/>
           <p:cNvSpPr/>
           <p:nvPr/>
         </p:nvSpPr>
         <p:spPr>
           <a:xfrm>
             <a:off x="597960" y="1775160"/>
-            <a:ext cx="8220960" cy="837720"/>
+            <a:ext cx="8220600" cy="837360"/>
           </a:xfrm>
           <a:prstGeom prst="rect">
             <a:avLst/>
@@ -4047,14 +6039,14 @@
       </p:sp>
       <p:sp>
         <p:nvSpPr>
-          <p:cNvPr id="83" name="CustomShape 2"/>
+          <p:cNvPr id="124" name="CustomShape 2"/>
           <p:cNvSpPr/>
           <p:nvPr/>
         </p:nvSpPr>
         <p:spPr>
           <a:xfrm>
             <a:off x="597960" y="2715840"/>
-            <a:ext cx="8220960" cy="432000"/>
+            <a:ext cx="8220600" cy="431640"/>
           </a:xfrm>
           <a:prstGeom prst="rect">
             <a:avLst/>
@@ -4193,7 +6185,7 @@
       </p:sp>
       <p:pic>
         <p:nvPicPr>
-          <p:cNvPr id="84" name="Shape 87" descr=""/>
+          <p:cNvPr id="125" name="Shape 87" descr=""/>
           <p:cNvPicPr/>
           <p:nvPr/>
         </p:nvPicPr>
@@ -4204,7 +6196,7 @@
         <p:spPr>
           <a:xfrm>
             <a:off x="5029200" y="879120"/>
-            <a:ext cx="4123440" cy="2229120"/>
+            <a:ext cx="4123080" cy="2228760"/>
           </a:xfrm>
           <a:prstGeom prst="rect">
             <a:avLst/>
@@ -4216,7 +6208,7 @@
       </p:pic>
       <p:pic>
         <p:nvPicPr>
-          <p:cNvPr id="85" name="" descr=""/>
+          <p:cNvPr id="126" name="" descr=""/>
           <p:cNvPicPr/>
           <p:nvPr/>
         </p:nvPicPr>
@@ -4227,7 +6219,7 @@
         <p:spPr>
           <a:xfrm>
             <a:off x="3840480" y="1366200"/>
-            <a:ext cx="5211720" cy="2931120"/>
+            <a:ext cx="5211360" cy="2930760"/>
           </a:xfrm>
           <a:prstGeom prst="rect">
             <a:avLst/>
@@ -4239,7 +6231,7 @@
       </p:pic>
       <p:pic>
         <p:nvPicPr>
-          <p:cNvPr id="86" name="" descr=""/>
+          <p:cNvPr id="127" name="" descr=""/>
           <p:cNvPicPr/>
           <p:nvPr/>
         </p:nvPicPr>
@@ -4250,7 +6242,7 @@
         <p:spPr>
           <a:xfrm>
             <a:off x="4663440" y="1200240"/>
-            <a:ext cx="7131960" cy="4011480"/>
+            <a:ext cx="7131600" cy="4011120"/>
           </a:xfrm>
           <a:prstGeom prst="rect">
             <a:avLst/>
@@ -4262,7 +6254,7 @@
       </p:pic>
       <p:pic>
         <p:nvPicPr>
-          <p:cNvPr id="87" name="" descr=""/>
+          <p:cNvPr id="128" name="" descr=""/>
           <p:cNvPicPr/>
           <p:nvPr/>
         </p:nvPicPr>
@@ -4273,7 +6265,7 @@
         <p:spPr>
           <a:xfrm>
             <a:off x="731520" y="276480"/>
-            <a:ext cx="675720" cy="637560"/>
+            <a:ext cx="675360" cy="637200"/>
           </a:xfrm>
           <a:prstGeom prst="rect">
             <a:avLst/>
@@ -4285,7 +6277,7 @@
       </p:pic>
       <p:pic>
         <p:nvPicPr>
-          <p:cNvPr id="88" name="" descr=""/>
+          <p:cNvPr id="129" name="" descr=""/>
           <p:cNvPicPr/>
           <p:nvPr/>
         </p:nvPicPr>
@@ -4296,7 +6288,7 @@
         <p:spPr>
           <a:xfrm>
             <a:off x="731520" y="642240"/>
-            <a:ext cx="675720" cy="637560"/>
+            <a:ext cx="675360" cy="637200"/>
           </a:xfrm>
           <a:prstGeom prst="rect">
             <a:avLst/>
@@ -4308,7 +6300,7 @@
       </p:pic>
       <p:pic>
         <p:nvPicPr>
-          <p:cNvPr id="89" name="" descr=""/>
+          <p:cNvPr id="130" name="" descr=""/>
           <p:cNvPicPr/>
           <p:nvPr/>
         </p:nvPicPr>
@@ -4319,7 +6311,7 @@
         <p:spPr>
           <a:xfrm>
             <a:off x="1152720" y="642240"/>
-            <a:ext cx="675720" cy="637560"/>
+            <a:ext cx="675360" cy="637200"/>
           </a:xfrm>
           <a:prstGeom prst="rect">
             <a:avLst/>
@@ -4331,7 +6323,7 @@
       </p:pic>
       <p:pic>
         <p:nvPicPr>
-          <p:cNvPr id="90" name="" descr=""/>
+          <p:cNvPr id="131" name="" descr=""/>
           <p:cNvPicPr/>
           <p:nvPr/>
         </p:nvPicPr>
@@ -4342,7 +6334,7 @@
         <p:spPr>
           <a:xfrm>
             <a:off x="1152720" y="1008000"/>
-            <a:ext cx="675720" cy="637560"/>
+            <a:ext cx="675360" cy="637200"/>
           </a:xfrm>
           <a:prstGeom prst="rect">
             <a:avLst/>
@@ -4354,7 +6346,7 @@
       </p:pic>
       <p:pic>
         <p:nvPicPr>
-          <p:cNvPr id="91" name="" descr=""/>
+          <p:cNvPr id="132" name="" descr=""/>
           <p:cNvPicPr/>
           <p:nvPr/>
         </p:nvPicPr>
@@ -4365,7 +6357,7 @@
         <p:spPr>
           <a:xfrm>
             <a:off x="6090480" y="182880"/>
-            <a:ext cx="675720" cy="637560"/>
+            <a:ext cx="675360" cy="637200"/>
           </a:xfrm>
           <a:prstGeom prst="rect">
             <a:avLst/>
@@ -4377,7 +6369,7 @@
       </p:pic>
       <p:pic>
         <p:nvPicPr>
-          <p:cNvPr id="92" name="" descr=""/>
+          <p:cNvPr id="133" name="" descr=""/>
           <p:cNvPicPr/>
           <p:nvPr/>
         </p:nvPicPr>
@@ -4388,7 +6380,7 @@
         <p:spPr>
           <a:xfrm>
             <a:off x="6492240" y="182880"/>
-            <a:ext cx="675720" cy="637560"/>
+            <a:ext cx="675360" cy="637200"/>
           </a:xfrm>
           <a:prstGeom prst="rect">
             <a:avLst/>
@@ -4400,7 +6392,7 @@
       </p:pic>
       <p:pic>
         <p:nvPicPr>
-          <p:cNvPr id="93" name="" descr=""/>
+          <p:cNvPr id="134" name="" descr=""/>
           <p:cNvPicPr/>
           <p:nvPr/>
         </p:nvPicPr>
@@ -4411,7 +6403,7 @@
         <p:spPr>
           <a:xfrm>
             <a:off x="6492240" y="562320"/>
-            <a:ext cx="675720" cy="637560"/>
+            <a:ext cx="675360" cy="637200"/>
           </a:xfrm>
           <a:prstGeom prst="rect">
             <a:avLst/>
@@ -4475,14 +6467,14 @@
       </p:grpSpPr>
       <p:sp>
         <p:nvSpPr>
-          <p:cNvPr id="123" name="CustomShape 1"/>
+          <p:cNvPr id="165" name="CustomShape 1"/>
           <p:cNvSpPr/>
           <p:nvPr/>
         </p:nvSpPr>
         <p:spPr>
           <a:xfrm>
             <a:off x="311760" y="410040"/>
-            <a:ext cx="8519400" cy="606600"/>
+            <a:ext cx="8519040" cy="606240"/>
           </a:xfrm>
           <a:prstGeom prst="rect">
             <a:avLst/>
@@ -4537,14 +6529,14 @@
       </p:sp>
       <p:sp>
         <p:nvSpPr>
-          <p:cNvPr id="124" name="CustomShape 2"/>
+          <p:cNvPr id="166" name="CustomShape 2"/>
           <p:cNvSpPr/>
           <p:nvPr/>
         </p:nvSpPr>
         <p:spPr>
           <a:xfrm>
             <a:off x="311760" y="1229760"/>
-            <a:ext cx="4031640" cy="3349800"/>
+            <a:ext cx="4031280" cy="3349440"/>
           </a:xfrm>
           <a:prstGeom prst="rect">
             <a:avLst/>
@@ -4563,7 +6555,7 @@
         <p:txBody>
           <a:bodyPr lIns="90000" rIns="90000" tIns="91440" bIns="91440"/>
           <a:p>
-            <a:pPr marL="457200" indent="-227520">
+            <a:pPr marL="457200" indent="-227160">
               <a:lnSpc>
                 <a:spcPct val="100000"/>
               </a:lnSpc>
@@ -4691,7 +6683,7 @@
             </a:endParaRPr>
           </a:p>
           <a:p>
-            <a:pPr marL="457200" indent="-227520">
+            <a:pPr marL="457200" indent="-227160">
               <a:lnSpc>
                 <a:spcPct val="100000"/>
               </a:lnSpc>
@@ -4759,7 +6751,7 @@
             </a:endParaRPr>
           </a:p>
           <a:p>
-            <a:pPr marL="457200" indent="-227520">
+            <a:pPr marL="457200" indent="-227160">
               <a:lnSpc>
                 <a:spcPct val="100000"/>
               </a:lnSpc>
@@ -4830,7 +6822,7 @@
       </p:sp>
       <p:pic>
         <p:nvPicPr>
-          <p:cNvPr id="125" name="Shape 127" descr=""/>
+          <p:cNvPr id="167" name="Shape 127" descr=""/>
           <p:cNvPicPr/>
           <p:nvPr/>
         </p:nvPicPr>
@@ -4841,7 +6833,7 @@
         <p:spPr>
           <a:xfrm>
             <a:off x="4279680" y="193680"/>
-            <a:ext cx="1151280" cy="732240"/>
+            <a:ext cx="1150920" cy="731880"/>
           </a:xfrm>
           <a:prstGeom prst="rect">
             <a:avLst/>
@@ -4853,7 +6845,7 @@
       </p:pic>
       <p:pic>
         <p:nvPicPr>
-          <p:cNvPr id="126" name="Shape 128" descr=""/>
+          <p:cNvPr id="168" name="Shape 128" descr=""/>
           <p:cNvPicPr/>
           <p:nvPr/>
         </p:nvPicPr>
@@ -4864,7 +6856,7 @@
         <p:spPr>
           <a:xfrm>
             <a:off x="4468320" y="1137960"/>
-            <a:ext cx="4548960" cy="2856600"/>
+            <a:ext cx="4548600" cy="2856240"/>
           </a:xfrm>
           <a:prstGeom prst="rect">
             <a:avLst/>
@@ -4928,14 +6920,14 @@
       </p:grpSpPr>
       <p:sp>
         <p:nvSpPr>
-          <p:cNvPr id="127" name="CustomShape 1"/>
+          <p:cNvPr id="169" name="CustomShape 1"/>
           <p:cNvSpPr/>
           <p:nvPr/>
         </p:nvSpPr>
         <p:spPr>
           <a:xfrm>
             <a:off x="311760" y="410040"/>
-            <a:ext cx="8519400" cy="606600"/>
+            <a:ext cx="8519040" cy="606240"/>
           </a:xfrm>
           <a:prstGeom prst="rect">
             <a:avLst/>
@@ -4990,14 +6982,14 @@
       </p:sp>
       <p:sp>
         <p:nvSpPr>
-          <p:cNvPr id="128" name="CustomShape 2"/>
+          <p:cNvPr id="170" name="CustomShape 2"/>
           <p:cNvSpPr/>
           <p:nvPr/>
         </p:nvSpPr>
         <p:spPr>
           <a:xfrm>
             <a:off x="311760" y="1229760"/>
-            <a:ext cx="3873960" cy="3383640"/>
+            <a:ext cx="3873600" cy="3383280"/>
           </a:xfrm>
           <a:prstGeom prst="rect">
             <a:avLst/>
@@ -5175,7 +7167,7 @@
       </p:sp>
       <p:pic>
         <p:nvPicPr>
-          <p:cNvPr id="129" name="Shape 135" descr=""/>
+          <p:cNvPr id="171" name="Shape 135" descr=""/>
           <p:cNvPicPr/>
           <p:nvPr/>
         </p:nvPicPr>
@@ -5186,7 +7178,7 @@
         <p:spPr>
           <a:xfrm>
             <a:off x="4431960" y="592920"/>
-            <a:ext cx="1742040" cy="1075320"/>
+            <a:ext cx="1741680" cy="1074960"/>
           </a:xfrm>
           <a:prstGeom prst="rect">
             <a:avLst/>
@@ -5198,14 +7190,14 @@
       </p:pic>
       <p:sp>
         <p:nvSpPr>
-          <p:cNvPr id="130" name="CustomShape 3"/>
+          <p:cNvPr id="172" name="CustomShape 3"/>
           <p:cNvSpPr/>
           <p:nvPr/>
         </p:nvSpPr>
         <p:spPr>
           <a:xfrm>
             <a:off x="5728680" y="2836080"/>
-            <a:ext cx="2295000" cy="663120"/>
+            <a:ext cx="2294640" cy="662760"/>
           </a:xfrm>
           <a:prstGeom prst="rect">
             <a:avLst/>
@@ -5342,14 +7334,14 @@
       </p:grpSpPr>
       <p:sp>
         <p:nvSpPr>
-          <p:cNvPr id="131" name="CustomShape 1"/>
+          <p:cNvPr id="173" name="CustomShape 1"/>
           <p:cNvSpPr/>
           <p:nvPr/>
         </p:nvSpPr>
         <p:spPr>
           <a:xfrm>
             <a:off x="311760" y="410040"/>
-            <a:ext cx="8519400" cy="606600"/>
+            <a:ext cx="8519040" cy="606240"/>
           </a:xfrm>
           <a:prstGeom prst="rect">
             <a:avLst/>
@@ -5404,14 +7396,14 @@
       </p:sp>
       <p:sp>
         <p:nvSpPr>
-          <p:cNvPr id="132" name="CustomShape 2"/>
+          <p:cNvPr id="174" name="CustomShape 2"/>
           <p:cNvSpPr/>
           <p:nvPr/>
         </p:nvSpPr>
         <p:spPr>
           <a:xfrm>
             <a:off x="311760" y="1229760"/>
-            <a:ext cx="8387280" cy="3338640"/>
+            <a:ext cx="8386920" cy="3338280"/>
           </a:xfrm>
           <a:prstGeom prst="rect">
             <a:avLst/>
@@ -5611,14 +7603,14 @@
       </p:grpSpPr>
       <p:sp>
         <p:nvSpPr>
-          <p:cNvPr id="133" name="CustomShape 1"/>
+          <p:cNvPr id="175" name="CustomShape 1"/>
           <p:cNvSpPr/>
           <p:nvPr/>
         </p:nvSpPr>
         <p:spPr>
           <a:xfrm>
             <a:off x="311760" y="410040"/>
-            <a:ext cx="8519400" cy="606600"/>
+            <a:ext cx="8519040" cy="606240"/>
           </a:xfrm>
           <a:prstGeom prst="rect">
             <a:avLst/>
@@ -5673,14 +7665,14 @@
       </p:sp>
       <p:sp>
         <p:nvSpPr>
-          <p:cNvPr id="134" name="CustomShape 2"/>
+          <p:cNvPr id="176" name="CustomShape 2"/>
           <p:cNvSpPr/>
           <p:nvPr/>
         </p:nvSpPr>
         <p:spPr>
           <a:xfrm>
             <a:off x="311760" y="1229760"/>
-            <a:ext cx="3367800" cy="1075680"/>
+            <a:ext cx="3367440" cy="1075320"/>
           </a:xfrm>
           <a:prstGeom prst="rect">
             <a:avLst/>
@@ -5732,7 +7724,7 @@
                 <a:latin typeface="Roboto"/>
                 <a:ea typeface="Roboto"/>
               </a:rPr>
-              <a:t>smartSprite</a:t>
+              <a:t>smartSpriteFX</a:t>
             </a:r>
             <a:r>
               <a:rPr lang="en-US" sz="1800" spc="-1" strike="noStrike">
@@ -5765,7 +7757,7 @@
       </p:sp>
       <p:pic>
         <p:nvPicPr>
-          <p:cNvPr id="135" name="Shape 149" descr=""/>
+          <p:cNvPr id="177" name="Shape 149" descr=""/>
           <p:cNvPicPr/>
           <p:nvPr/>
         </p:nvPicPr>
@@ -5776,7 +7768,7 @@
         <p:spPr>
           <a:xfrm>
             <a:off x="311760" y="2352240"/>
-            <a:ext cx="2590920" cy="2328480"/>
+            <a:ext cx="2590560" cy="2328120"/>
           </a:xfrm>
           <a:prstGeom prst="rect">
             <a:avLst/>
@@ -5788,7 +7780,7 @@
       </p:pic>
       <p:pic>
         <p:nvPicPr>
-          <p:cNvPr id="136" name="Shape 150" descr=""/>
+          <p:cNvPr id="178" name="Shape 150" descr=""/>
           <p:cNvPicPr/>
           <p:nvPr/>
         </p:nvPicPr>
@@ -5799,7 +7791,7 @@
         <p:spPr>
           <a:xfrm>
             <a:off x="5126760" y="869760"/>
-            <a:ext cx="3505680" cy="3200040"/>
+            <a:ext cx="3505320" cy="3199680"/>
           </a:xfrm>
           <a:prstGeom prst="rect">
             <a:avLst/>
@@ -5811,14 +7803,14 @@
       </p:pic>
       <p:sp>
         <p:nvSpPr>
-          <p:cNvPr id="137" name="CustomShape 3"/>
+          <p:cNvPr id="179" name="CustomShape 3"/>
           <p:cNvSpPr/>
           <p:nvPr/>
         </p:nvSpPr>
         <p:spPr>
           <a:xfrm>
             <a:off x="3415680" y="2093400"/>
-            <a:ext cx="1710000" cy="1450800"/>
+            <a:ext cx="1709640" cy="1450440"/>
           </a:xfrm>
           <a:prstGeom prst="rightArrow">
             <a:avLst>
@@ -5842,68 +7834,6 @@
           <a:effectRef idx="0"/>
           <a:fontRef idx="minor"/>
         </p:style>
-      </p:sp>
-      <p:sp>
-        <p:nvSpPr>
-          <p:cNvPr id="138" name="CustomShape 4"/>
-          <p:cNvSpPr/>
-          <p:nvPr/>
-        </p:nvSpPr>
-        <p:spPr>
-          <a:xfrm>
-            <a:off x="5278680" y="4220640"/>
-            <a:ext cx="3443040" cy="268920"/>
-          </a:xfrm>
-          <a:prstGeom prst="rect">
-            <a:avLst/>
-          </a:prstGeom>
-          <a:noFill/>
-          <a:ln>
-            <a:noFill/>
-          </a:ln>
-        </p:spPr>
-        <p:style>
-          <a:lnRef idx="0"/>
-          <a:fillRef idx="0"/>
-          <a:effectRef idx="0"/>
-          <a:fontRef idx="minor"/>
-        </p:style>
-        <p:txBody>
-          <a:bodyPr lIns="90000" rIns="90000" tIns="91440" bIns="91440"/>
-          <a:p>
-            <a:pPr>
-              <a:lnSpc>
-                <a:spcPct val="100000"/>
-              </a:lnSpc>
-            </a:pPr>
-            <a:r>
-              <a:rPr i="1" lang="en-US" sz="1100" spc="-1" strike="noStrike">
-                <a:solidFill>
-                  <a:srgbClr val="000000"/>
-                </a:solidFill>
-                <a:uFill>
-                  <a:solidFill>
-                    <a:srgbClr val="ffffff"/>
-                  </a:solidFill>
-                </a:uFill>
-                <a:latin typeface="Arial"/>
-                <a:ea typeface="Arial"/>
-              </a:rPr>
-              <a:t>*Vision from Windows. The black colors means transparency</a:t>
-            </a:r>
-            <a:endParaRPr lang="en-US" sz="1800" spc="-1" strike="noStrike">
-              <a:solidFill>
-                <a:srgbClr val="000000"/>
-              </a:solidFill>
-              <a:uFill>
-                <a:solidFill>
-                  <a:srgbClr val="ffffff"/>
-                </a:solidFill>
-              </a:uFill>
-              <a:latin typeface="Arial"/>
-            </a:endParaRPr>
-          </a:p>
-        </p:txBody>
       </p:sp>
     </p:spTree>
   </p:cSld>
@@ -5959,14 +7889,14 @@
       </p:grpSpPr>
       <p:sp>
         <p:nvSpPr>
-          <p:cNvPr id="139" name="CustomShape 1"/>
-          <p:cNvSpPr/>
+          <p:cNvPr id="180" name="TextShape 1"/>
+          <p:cNvSpPr txBox="1"/>
           <p:nvPr/>
         </p:nvSpPr>
         <p:spPr>
           <a:xfrm>
-            <a:off x="311760" y="410040"/>
-            <a:ext cx="8519400" cy="606600"/>
+            <a:off x="457560" y="1188720"/>
+            <a:ext cx="8229240" cy="617760"/>
           </a:xfrm>
           <a:prstGeom prst="rect">
             <a:avLst/>
@@ -5976,24 +7906,18 @@
             <a:noFill/>
           </a:ln>
         </p:spPr>
-        <p:style>
-          <a:lnRef idx="0"/>
-          <a:fillRef idx="0"/>
-          <a:effectRef idx="0"/>
-          <a:fontRef idx="minor"/>
-        </p:style>
-        <p:txBody>
-          <a:bodyPr lIns="90000" rIns="90000" tIns="91440" bIns="91440"/>
-          <a:p>
-            <a:pPr>
+        <p:txBody>
+          <a:bodyPr lIns="0" rIns="0" tIns="0" bIns="0" anchor="ctr"/>
+          <a:p>
+            <a:pPr algn="ctr">
               <a:lnSpc>
                 <a:spcPct val="100000"/>
               </a:lnSpc>
             </a:pPr>
             <a:r>
-              <a:rPr lang="en-US" sz="3000" spc="-1" strike="noStrike">
-                <a:solidFill>
-                  <a:srgbClr val="2a3990"/>
+              <a:rPr b="1" lang="en-US" sz="2600" spc="-1" strike="noStrike">
+                <a:solidFill>
+                  <a:srgbClr val="000000"/>
                 </a:solidFill>
                 <a:uFill>
                   <a:solidFill>
@@ -6001,34 +7925,33 @@
                   </a:solidFill>
                 </a:uFill>
                 <a:latin typeface="Roboto"/>
-                <a:ea typeface="Roboto"/>
-              </a:rPr>
-              <a:t>Appendix: Future tools</a:t>
-            </a:r>
-            <a:endParaRPr lang="en-US" sz="1800" spc="-1" strike="noStrike">
-              <a:solidFill>
-                <a:srgbClr val="000000"/>
-              </a:solidFill>
-              <a:uFill>
-                <a:solidFill>
-                  <a:srgbClr val="ffffff"/>
-                </a:solidFill>
-              </a:uFill>
-              <a:latin typeface="Arial"/>
-            </a:endParaRPr>
-          </a:p>
-        </p:txBody>
-      </p:sp>
-      <p:sp>
-        <p:nvSpPr>
-          <p:cNvPr id="140" name="CustomShape 2"/>
-          <p:cNvSpPr/>
+              </a:rPr>
+              <a:t>Effect “Animation-oriented” mode</a:t>
+            </a:r>
+            <a:endParaRPr lang="en-US" sz="2600" spc="-1" strike="noStrike">
+              <a:solidFill>
+                <a:srgbClr val="000000"/>
+              </a:solidFill>
+              <a:uFill>
+                <a:solidFill>
+                  <a:srgbClr val="ffffff"/>
+                </a:solidFill>
+              </a:uFill>
+              <a:latin typeface="Arial"/>
+            </a:endParaRPr>
+          </a:p>
+        </p:txBody>
+      </p:sp>
+      <p:sp>
+        <p:nvSpPr>
+          <p:cNvPr id="181" name="TextShape 2"/>
+          <p:cNvSpPr txBox="1"/>
           <p:nvPr/>
         </p:nvSpPr>
         <p:spPr>
           <a:xfrm>
-            <a:off x="311760" y="1229760"/>
-            <a:ext cx="8519400" cy="3337920"/>
+            <a:off x="3840480" y="3677040"/>
+            <a:ext cx="1474560" cy="346320"/>
           </a:xfrm>
           <a:prstGeom prst="rect">
             <a:avLst/>
@@ -6038,39 +7961,22 @@
             <a:noFill/>
           </a:ln>
         </p:spPr>
-        <p:style>
-          <a:lnRef idx="0"/>
-          <a:fillRef idx="0"/>
-          <a:effectRef idx="0"/>
-          <a:fontRef idx="minor"/>
-        </p:style>
-        <p:txBody>
-          <a:bodyPr lIns="90000" rIns="90000" tIns="91440" bIns="91440"/>
-          <a:p>
-            <a:pPr marL="457200" indent="-227520">
-              <a:lnSpc>
-                <a:spcPct val="100000"/>
-              </a:lnSpc>
-              <a:buClr>
-                <a:srgbClr val="434343"/>
-              </a:buClr>
-              <a:buFont typeface="Roboto"/>
-              <a:buChar char="-"/>
-            </a:pPr>
+        <p:txBody>
+          <a:bodyPr lIns="90000" rIns="90000" tIns="45000" bIns="45000"/>
+          <a:p>
             <a:r>
               <a:rPr lang="en-US" sz="1800" spc="-1" strike="noStrike">
                 <a:solidFill>
-                  <a:srgbClr val="434343"/>
-                </a:solidFill>
-                <a:uFill>
-                  <a:solidFill>
-                    <a:srgbClr val="ffffff"/>
-                  </a:solidFill>
-                </a:uFill>
-                <a:latin typeface="Roboto"/>
-                <a:ea typeface="Roboto"/>
-              </a:rPr>
-              <a:t>We are preparing some animation futures based on pieces.</a:t>
+                  <a:srgbClr val="000000"/>
+                </a:solidFill>
+                <a:uFill>
+                  <a:solidFill>
+                    <a:srgbClr val="ffffff"/>
+                  </a:solidFill>
+                </a:uFill>
+                <a:latin typeface="Arial"/>
+              </a:rPr>
+              <a:t>Step-by-step</a:t>
             </a:r>
             <a:endParaRPr lang="en-US" sz="1800" spc="-1" strike="noStrike">
               <a:solidFill>
@@ -6084,146 +7990,146 @@
               <a:latin typeface="Arial"/>
             </a:endParaRPr>
           </a:p>
-          <a:p>
-            <a:pPr marL="457200" indent="-227520">
-              <a:lnSpc>
-                <a:spcPct val="100000"/>
-              </a:lnSpc>
-              <a:buClr>
-                <a:srgbClr val="434343"/>
-              </a:buClr>
-              <a:buFont typeface="Roboto"/>
-              <a:buChar char="-"/>
-            </a:pPr>
-            <a:r>
-              <a:rPr lang="en-US" sz="1800" spc="-1" strike="noStrike">
-                <a:solidFill>
-                  <a:srgbClr val="434343"/>
-                </a:solidFill>
-                <a:uFill>
-                  <a:solidFill>
-                    <a:srgbClr val="ffffff"/>
-                  </a:solidFill>
-                </a:uFill>
-                <a:latin typeface="Roboto"/>
-                <a:ea typeface="Roboto"/>
-              </a:rPr>
-              <a:t>Support for developers. This animation futures will can be supported by thirth parties</a:t>
-            </a:r>
-            <a:endParaRPr lang="en-US" sz="1800" spc="-1" strike="noStrike">
-              <a:solidFill>
-                <a:srgbClr val="000000"/>
-              </a:solidFill>
-              <a:uFill>
-                <a:solidFill>
-                  <a:srgbClr val="ffffff"/>
-                </a:solidFill>
-              </a:uFill>
-              <a:latin typeface="Arial"/>
-            </a:endParaRPr>
-          </a:p>
-          <a:p>
-            <a:pPr>
-              <a:lnSpc>
-                <a:spcPct val="100000"/>
-              </a:lnSpc>
-            </a:pPr>
-            <a:endParaRPr lang="en-US" sz="1800" spc="-1" strike="noStrike">
-              <a:solidFill>
-                <a:srgbClr val="000000"/>
-              </a:solidFill>
-              <a:uFill>
-                <a:solidFill>
-                  <a:srgbClr val="ffffff"/>
-                </a:solidFill>
-              </a:uFill>
-              <a:latin typeface="Arial"/>
-            </a:endParaRPr>
-          </a:p>
-          <a:p>
-            <a:pPr>
-              <a:lnSpc>
-                <a:spcPct val="100000"/>
-              </a:lnSpc>
-            </a:pPr>
-            <a:r>
-              <a:rPr lang="en-US" sz="1800" spc="-1" strike="noStrike">
-                <a:solidFill>
-                  <a:srgbClr val="434343"/>
-                </a:solidFill>
-                <a:uFill>
-                  <a:solidFill>
-                    <a:srgbClr val="ffffff"/>
-                  </a:solidFill>
-                </a:uFill>
-                <a:latin typeface="Roboto"/>
-                <a:ea typeface="Roboto"/>
-              </a:rPr>
-              <a:t>Subscribe!</a:t>
-            </a:r>
-            <a:endParaRPr lang="en-US" sz="1800" spc="-1" strike="noStrike">
-              <a:solidFill>
-                <a:srgbClr val="000000"/>
-              </a:solidFill>
-              <a:uFill>
-                <a:solidFill>
-                  <a:srgbClr val="ffffff"/>
-                </a:solidFill>
-              </a:uFill>
-              <a:latin typeface="Arial"/>
-            </a:endParaRPr>
-          </a:p>
-          <a:p>
-            <a:pPr>
-              <a:lnSpc>
-                <a:spcPct val="100000"/>
-              </a:lnSpc>
-            </a:pPr>
-            <a:r>
-              <a:rPr lang="en-US" sz="1800" spc="-1" strike="noStrike">
-                <a:solidFill>
-                  <a:srgbClr val="434343"/>
-                </a:solidFill>
-                <a:uFill>
-                  <a:solidFill>
-                    <a:srgbClr val="ffffff"/>
-                  </a:solidFill>
-                </a:uFill>
-                <a:latin typeface="Roboto"/>
-                <a:ea typeface="Roboto"/>
-              </a:rPr>
-              <a:t>Know more in </a:t>
-            </a:r>
-            <a:r>
-              <a:rPr lang="en-US" sz="1800" spc="-1" strike="noStrike" u="sng">
-                <a:solidFill>
-                  <a:srgbClr val="0000ff"/>
-                </a:solidFill>
-                <a:uFill>
-                  <a:solidFill>
-                    <a:srgbClr val="ffffff"/>
-                  </a:solidFill>
-                </a:uFill>
-                <a:latin typeface="Roboto"/>
-                <a:ea typeface="Roboto"/>
-                <a:hlinkClick r:id="rId1"/>
-              </a:rPr>
-              <a:t>https://www.facebook.com/smartsuiteforindiegame/</a:t>
-            </a:r>
-            <a:endParaRPr lang="en-US" sz="1800" spc="-1" strike="noStrike">
-              <a:solidFill>
-                <a:srgbClr val="000000"/>
-              </a:solidFill>
-              <a:uFill>
-                <a:solidFill>
-                  <a:srgbClr val="ffffff"/>
-                </a:solidFill>
-              </a:uFill>
-              <a:latin typeface="Arial"/>
-            </a:endParaRPr>
-          </a:p>
-        </p:txBody>
-      </p:sp>
+        </p:txBody>
+      </p:sp>
+      <p:pic>
+        <p:nvPicPr>
+          <p:cNvPr id="182" name="" descr=""/>
+          <p:cNvPicPr/>
+          <p:nvPr/>
+        </p:nvPicPr>
+        <p:blipFill>
+          <a:blip r:embed="rId1"/>
+          <a:stretch/>
+        </p:blipFill>
+        <p:spPr>
+          <a:xfrm>
+            <a:off x="3749040" y="1645920"/>
+            <a:ext cx="1950840" cy="1096920"/>
+          </a:xfrm>
+          <a:prstGeom prst="rect">
+            <a:avLst/>
+          </a:prstGeom>
+          <a:ln>
+            <a:noFill/>
+          </a:ln>
+        </p:spPr>
+      </p:pic>
+      <p:pic>
+        <p:nvPicPr>
+          <p:cNvPr id="183" name="" descr=""/>
+          <p:cNvPicPr/>
+          <p:nvPr/>
+        </p:nvPicPr>
+        <p:blipFill>
+          <a:blip r:embed="rId2"/>
+          <a:stretch/>
+        </p:blipFill>
+        <p:spPr>
+          <a:xfrm>
+            <a:off x="3931920" y="1583640"/>
+            <a:ext cx="3200040" cy="1799640"/>
+          </a:xfrm>
+          <a:prstGeom prst="rect">
+            <a:avLst/>
+          </a:prstGeom>
+          <a:ln>
+            <a:noFill/>
+          </a:ln>
+        </p:spPr>
+      </p:pic>
+      <p:pic>
+        <p:nvPicPr>
+          <p:cNvPr id="184" name="" descr=""/>
+          <p:cNvPicPr/>
+          <p:nvPr/>
+        </p:nvPicPr>
+        <p:blipFill>
+          <a:blip r:embed="rId3"/>
+          <a:stretch/>
+        </p:blipFill>
+        <p:spPr>
+          <a:xfrm>
+            <a:off x="2926080" y="1831680"/>
+            <a:ext cx="675360" cy="637200"/>
+          </a:xfrm>
+          <a:prstGeom prst="rect">
+            <a:avLst/>
+          </a:prstGeom>
+          <a:ln>
+            <a:noFill/>
+          </a:ln>
+        </p:spPr>
+      </p:pic>
+      <p:pic>
+        <p:nvPicPr>
+          <p:cNvPr id="185" name="" descr=""/>
+          <p:cNvPicPr/>
+          <p:nvPr/>
+        </p:nvPicPr>
+        <p:blipFill>
+          <a:blip r:embed="rId4"/>
+          <a:stretch/>
+        </p:blipFill>
+        <p:spPr>
+          <a:xfrm>
+            <a:off x="2926080" y="2197440"/>
+            <a:ext cx="675360" cy="637200"/>
+          </a:xfrm>
+          <a:prstGeom prst="rect">
+            <a:avLst/>
+          </a:prstGeom>
+          <a:ln>
+            <a:noFill/>
+          </a:ln>
+        </p:spPr>
+      </p:pic>
+      <p:pic>
+        <p:nvPicPr>
+          <p:cNvPr id="186" name="" descr=""/>
+          <p:cNvPicPr/>
+          <p:nvPr/>
+        </p:nvPicPr>
+        <p:blipFill>
+          <a:blip r:embed="rId5"/>
+          <a:stretch/>
+        </p:blipFill>
+        <p:spPr>
+          <a:xfrm>
+            <a:off x="3347280" y="2197440"/>
+            <a:ext cx="675360" cy="637200"/>
+          </a:xfrm>
+          <a:prstGeom prst="rect">
+            <a:avLst/>
+          </a:prstGeom>
+          <a:ln>
+            <a:noFill/>
+          </a:ln>
+        </p:spPr>
+      </p:pic>
+      <p:pic>
+        <p:nvPicPr>
+          <p:cNvPr id="187" name="" descr=""/>
+          <p:cNvPicPr/>
+          <p:nvPr/>
+        </p:nvPicPr>
+        <p:blipFill>
+          <a:blip r:embed="rId6"/>
+          <a:stretch/>
+        </p:blipFill>
+        <p:spPr>
+          <a:xfrm>
+            <a:off x="3347280" y="2563200"/>
+            <a:ext cx="675360" cy="637200"/>
+          </a:xfrm>
+          <a:prstGeom prst="rect">
+            <a:avLst/>
+          </a:prstGeom>
+          <a:ln>
+            <a:noFill/>
+          </a:ln>
+        </p:spPr>
+      </p:pic>
     </p:spTree>
   </p:cSld>
   <p:transition spd="slow">
@@ -6278,14 +8184,14 @@
       </p:grpSpPr>
       <p:sp>
         <p:nvSpPr>
-          <p:cNvPr id="94" name="CustomShape 1"/>
+          <p:cNvPr id="135" name="CustomShape 1"/>
           <p:cNvSpPr/>
           <p:nvPr/>
         </p:nvSpPr>
         <p:spPr>
           <a:xfrm>
             <a:off x="311760" y="410040"/>
-            <a:ext cx="8519400" cy="606600"/>
+            <a:ext cx="8519040" cy="606240"/>
           </a:xfrm>
           <a:prstGeom prst="rect">
             <a:avLst/>
@@ -6340,14 +8246,14 @@
       </p:sp>
       <p:sp>
         <p:nvSpPr>
-          <p:cNvPr id="95" name="CustomShape 2"/>
+          <p:cNvPr id="136" name="CustomShape 2"/>
           <p:cNvSpPr/>
           <p:nvPr/>
         </p:nvSpPr>
         <p:spPr>
           <a:xfrm>
             <a:off x="311760" y="1229760"/>
-            <a:ext cx="8519400" cy="3337920"/>
+            <a:ext cx="8519040" cy="3337560"/>
           </a:xfrm>
           <a:prstGeom prst="rect">
             <a:avLst/>
@@ -6566,14 +8472,14 @@
       </p:grpSpPr>
       <p:sp>
         <p:nvSpPr>
-          <p:cNvPr id="96" name="CustomShape 1"/>
+          <p:cNvPr id="137" name="CustomShape 1"/>
           <p:cNvSpPr/>
           <p:nvPr/>
         </p:nvSpPr>
         <p:spPr>
           <a:xfrm>
             <a:off x="311760" y="410040"/>
-            <a:ext cx="8519400" cy="606600"/>
+            <a:ext cx="8519040" cy="606240"/>
           </a:xfrm>
           <a:prstGeom prst="rect">
             <a:avLst/>
@@ -6628,14 +8534,14 @@
       </p:sp>
       <p:sp>
         <p:nvSpPr>
-          <p:cNvPr id="97" name="CustomShape 2"/>
+          <p:cNvPr id="138" name="CustomShape 2"/>
           <p:cNvSpPr/>
           <p:nvPr/>
         </p:nvSpPr>
         <p:spPr>
           <a:xfrm>
             <a:off x="311760" y="1229760"/>
-            <a:ext cx="8519400" cy="3337920"/>
+            <a:ext cx="8519040" cy="3337560"/>
           </a:xfrm>
           <a:prstGeom prst="rect">
             <a:avLst/>
@@ -6836,14 +8742,14 @@
       </p:grpSpPr>
       <p:sp>
         <p:nvSpPr>
-          <p:cNvPr id="98" name="CustomShape 1"/>
+          <p:cNvPr id="139" name="CustomShape 1"/>
           <p:cNvSpPr/>
           <p:nvPr/>
         </p:nvSpPr>
         <p:spPr>
           <a:xfrm>
             <a:off x="311760" y="410040"/>
-            <a:ext cx="8519400" cy="606600"/>
+            <a:ext cx="8519040" cy="606240"/>
           </a:xfrm>
           <a:prstGeom prst="rect">
             <a:avLst/>
@@ -6898,14 +8804,14 @@
       </p:sp>
       <p:sp>
         <p:nvSpPr>
-          <p:cNvPr id="99" name="CustomShape 2"/>
+          <p:cNvPr id="140" name="CustomShape 2"/>
           <p:cNvSpPr/>
           <p:nvPr/>
         </p:nvSpPr>
         <p:spPr>
           <a:xfrm>
             <a:off x="311760" y="1229760"/>
-            <a:ext cx="8519400" cy="3337920"/>
+            <a:ext cx="8519040" cy="3337560"/>
           </a:xfrm>
           <a:prstGeom prst="rect">
             <a:avLst/>
@@ -6987,7 +8893,7 @@
             </a:endParaRPr>
           </a:p>
           <a:p>
-            <a:pPr marL="457200" indent="-227520">
+            <a:pPr marL="457200" indent="-227160">
               <a:lnSpc>
                 <a:spcPct val="100000"/>
               </a:lnSpc>
@@ -7025,7 +8931,7 @@
             </a:endParaRPr>
           </a:p>
           <a:p>
-            <a:pPr marL="457200" indent="-227520">
+            <a:pPr marL="457200" indent="-227160">
               <a:lnSpc>
                 <a:spcPct val="100000"/>
               </a:lnSpc>
@@ -7151,14 +9057,14 @@
       </p:grpSpPr>
       <p:sp>
         <p:nvSpPr>
-          <p:cNvPr id="100" name="TextShape 1"/>
-          <p:cNvSpPr txBox="1"/>
+          <p:cNvPr id="141" name="CustomShape 1"/>
+          <p:cNvSpPr/>
           <p:nvPr/>
         </p:nvSpPr>
         <p:spPr>
           <a:xfrm>
-            <a:off x="2343600" y="365760"/>
-            <a:ext cx="3966480" cy="373680"/>
+            <a:off x="2194560" y="365760"/>
+            <a:ext cx="4297680" cy="373320"/>
           </a:xfrm>
           <a:prstGeom prst="rect">
             <a:avLst/>
@@ -7168,6 +9074,12 @@
             <a:noFill/>
           </a:ln>
         </p:spPr>
+        <p:style>
+          <a:lnRef idx="0"/>
+          <a:fillRef idx="0"/>
+          <a:effectRef idx="0"/>
+          <a:fontRef idx="minor"/>
+        </p:style>
         <p:txBody>
           <a:bodyPr lIns="90000" rIns="90000" tIns="45000" bIns="45000"/>
           <a:p>
@@ -7185,9 +9097,9 @@
               </a:rPr>
               <a:t>The Main Screen / Switch Mode</a:t>
             </a:r>
-            <a:endParaRPr b="1" lang="en-US" sz="2000" spc="-1" strike="noStrike">
-              <a:solidFill>
-                <a:srgbClr val="9900ff"/>
+            <a:endParaRPr lang="en-US" sz="1800" spc="-1" strike="noStrike">
+              <a:solidFill>
+                <a:srgbClr val="000000"/>
               </a:solidFill>
               <a:uFill>
                 <a:solidFill>
@@ -7201,7 +9113,7 @@
       </p:sp>
       <p:pic>
         <p:nvPicPr>
-          <p:cNvPr id="101" name="" descr=""/>
+          <p:cNvPr id="142" name="" descr=""/>
           <p:cNvPicPr/>
           <p:nvPr/>
         </p:nvPicPr>
@@ -7212,7 +9124,7 @@
         <p:spPr>
           <a:xfrm>
             <a:off x="3108960" y="2011680"/>
-            <a:ext cx="5073480" cy="2263680"/>
+            <a:ext cx="5073120" cy="2263320"/>
           </a:xfrm>
           <a:prstGeom prst="rect">
             <a:avLst/>
@@ -7221,7 +9133,7 @@
             <a:noFill/>
           </a:ln>
           <a:effectLst>
-            <a:outerShdw dist="101823" dir="2700000">
+            <a:outerShdw dir="2700000" dist="101823">
               <a:srgbClr val="808080"/>
             </a:outerShdw>
           </a:effectLst>
@@ -7229,14 +9141,14 @@
       </p:pic>
       <p:sp>
         <p:nvSpPr>
-          <p:cNvPr id="102" name="TextShape 2"/>
-          <p:cNvSpPr txBox="1"/>
+          <p:cNvPr id="143" name="CustomShape 2"/>
+          <p:cNvSpPr/>
           <p:nvPr/>
         </p:nvSpPr>
         <p:spPr>
           <a:xfrm>
             <a:off x="274320" y="1280520"/>
-            <a:ext cx="2377440" cy="3034440"/>
+            <a:ext cx="2377080" cy="3034080"/>
           </a:xfrm>
           <a:prstGeom prst="rect">
             <a:avLst/>
@@ -7246,6 +9158,12 @@
             <a:noFill/>
           </a:ln>
         </p:spPr>
+        <p:style>
+          <a:lnRef idx="0"/>
+          <a:fillRef idx="0"/>
+          <a:effectRef idx="0"/>
+          <a:fontRef idx="minor"/>
+        </p:style>
         <p:txBody>
           <a:bodyPr lIns="90000" rIns="90000" tIns="45000" bIns="45000"/>
           <a:p>
@@ -7291,33 +9209,36 @@
               </a:rPr>
               <a:t>”. Here, you can choose one of two modes:</a:t>
             </a:r>
-            <a:endParaRPr lang="en-US" sz="1500" spc="-1" strike="noStrike">
-              <a:solidFill>
-                <a:srgbClr val="000000"/>
-              </a:solidFill>
-              <a:uFill>
-                <a:solidFill>
-                  <a:srgbClr val="ffffff"/>
-                </a:solidFill>
-              </a:uFill>
-              <a:latin typeface="Roboto"/>
-            </a:endParaRPr>
-          </a:p>
-          <a:p>
-            <a:endParaRPr lang="en-US" sz="1500" spc="-1" strike="noStrike">
-              <a:solidFill>
-                <a:srgbClr val="000000"/>
-              </a:solidFill>
-              <a:uFill>
-                <a:solidFill>
-                  <a:srgbClr val="ffffff"/>
-                </a:solidFill>
-              </a:uFill>
-              <a:latin typeface="Roboto"/>
-            </a:endParaRPr>
-          </a:p>
-          <a:p>
-            <a:pPr marL="216000" indent="-216000">
+            <a:endParaRPr lang="en-US" sz="1800" spc="-1" strike="noStrike">
+              <a:solidFill>
+                <a:srgbClr val="000000"/>
+              </a:solidFill>
+              <a:uFill>
+                <a:solidFill>
+                  <a:srgbClr val="ffffff"/>
+                </a:solidFill>
+              </a:uFill>
+              <a:latin typeface="Arial"/>
+            </a:endParaRPr>
+          </a:p>
+          <a:p>
+            <a:endParaRPr lang="en-US" sz="1800" spc="-1" strike="noStrike">
+              <a:solidFill>
+                <a:srgbClr val="000000"/>
+              </a:solidFill>
+              <a:uFill>
+                <a:solidFill>
+                  <a:srgbClr val="ffffff"/>
+                </a:solidFill>
+              </a:uFill>
+              <a:latin typeface="Arial"/>
+            </a:endParaRPr>
+          </a:p>
+          <a:p>
+            <a:pPr marL="216000" indent="-215640">
+              <a:lnSpc>
+                <a:spcPct val="100000"/>
+              </a:lnSpc>
               <a:buClr>
                 <a:srgbClr val="000000"/>
               </a:buClr>
@@ -7339,20 +9260,23 @@
               </a:rPr>
               <a:t>Landscape “Piece-oriented” mode</a:t>
             </a:r>
-            <a:endParaRPr lang="en-US" sz="1500" spc="-1" strike="noStrike">
-              <a:solidFill>
-                <a:srgbClr val="000000"/>
-              </a:solidFill>
-              <a:uFill>
-                <a:solidFill>
-                  <a:srgbClr val="ffffff"/>
-                </a:solidFill>
-              </a:uFill>
-              <a:latin typeface="Roboto"/>
-            </a:endParaRPr>
-          </a:p>
-          <a:p>
-            <a:pPr marL="216000" indent="-216000">
+            <a:endParaRPr lang="en-US" sz="1800" spc="-1" strike="noStrike">
+              <a:solidFill>
+                <a:srgbClr val="000000"/>
+              </a:solidFill>
+              <a:uFill>
+                <a:solidFill>
+                  <a:srgbClr val="ffffff"/>
+                </a:solidFill>
+              </a:uFill>
+              <a:latin typeface="Arial"/>
+            </a:endParaRPr>
+          </a:p>
+          <a:p>
+            <a:pPr marL="216000" indent="-215640">
+              <a:lnSpc>
+                <a:spcPct val="100000"/>
+              </a:lnSpc>
               <a:buClr>
                 <a:srgbClr val="000000"/>
               </a:buClr>
@@ -7374,20 +9298,23 @@
               </a:rPr>
               <a:t> </a:t>
             </a:r>
-            <a:endParaRPr lang="en-US" sz="1500" spc="-1" strike="noStrike">
-              <a:solidFill>
-                <a:srgbClr val="000000"/>
-              </a:solidFill>
-              <a:uFill>
-                <a:solidFill>
-                  <a:srgbClr val="ffffff"/>
-                </a:solidFill>
-              </a:uFill>
-              <a:latin typeface="Roboto"/>
-            </a:endParaRPr>
-          </a:p>
-          <a:p>
-            <a:pPr marL="216000" indent="-216000">
+            <a:endParaRPr lang="en-US" sz="1800" spc="-1" strike="noStrike">
+              <a:solidFill>
+                <a:srgbClr val="000000"/>
+              </a:solidFill>
+              <a:uFill>
+                <a:solidFill>
+                  <a:srgbClr val="ffffff"/>
+                </a:solidFill>
+              </a:uFill>
+              <a:latin typeface="Arial"/>
+            </a:endParaRPr>
+          </a:p>
+          <a:p>
+            <a:pPr marL="216000" indent="-215640">
+              <a:lnSpc>
+                <a:spcPct val="100000"/>
+              </a:lnSpc>
               <a:buClr>
                 <a:srgbClr val="000000"/>
               </a:buClr>
@@ -7409,27 +9336,6 @@
               </a:rPr>
               <a:t>Effect “Animation-oriented” mode</a:t>
             </a:r>
-            <a:endParaRPr lang="en-US" sz="1500" spc="-1" strike="noStrike">
-              <a:solidFill>
-                <a:srgbClr val="000000"/>
-              </a:solidFill>
-              <a:uFill>
-                <a:solidFill>
-                  <a:srgbClr val="ffffff"/>
-                </a:solidFill>
-              </a:uFill>
-              <a:latin typeface="Roboto"/>
-            </a:endParaRPr>
-          </a:p>
-          <a:p>
-            <a:pPr marL="216000" indent="-216000">
-              <a:buClr>
-                <a:srgbClr val="000000"/>
-              </a:buClr>
-              <a:buSzPct val="45000"/>
-              <a:buFont typeface="Wingdings" charset="2"/>
-              <a:buChar char=""/>
-            </a:pPr>
             <a:r>
               <a:rPr lang="en-US" sz="1500" spc="-1" strike="noStrike">
                 <a:solidFill>
@@ -7444,30 +9350,30 @@
               </a:rPr>
               <a:t> </a:t>
             </a:r>
-            <a:endParaRPr lang="en-US" sz="1500" spc="-1" strike="noStrike">
-              <a:solidFill>
-                <a:srgbClr val="000000"/>
-              </a:solidFill>
-              <a:uFill>
-                <a:solidFill>
-                  <a:srgbClr val="ffffff"/>
-                </a:solidFill>
-              </a:uFill>
-              <a:latin typeface="Roboto"/>
-            </a:endParaRPr>
-          </a:p>
-        </p:txBody>
-      </p:sp>
-      <p:sp>
-        <p:nvSpPr>
-          <p:cNvPr id="103" name="CustomShape 3"/>
+            <a:endParaRPr lang="en-US" sz="1800" spc="-1" strike="noStrike">
+              <a:solidFill>
+                <a:srgbClr val="000000"/>
+              </a:solidFill>
+              <a:uFill>
+                <a:solidFill>
+                  <a:srgbClr val="ffffff"/>
+                </a:solidFill>
+              </a:uFill>
+              <a:latin typeface="Arial"/>
+            </a:endParaRPr>
+          </a:p>
+        </p:txBody>
+      </p:sp>
+      <p:sp>
+        <p:nvSpPr>
+          <p:cNvPr id="144" name="CustomShape 3"/>
           <p:cNvSpPr/>
           <p:nvPr/>
         </p:nvSpPr>
         <p:spPr>
           <a:xfrm>
             <a:off x="6400800" y="1920240"/>
-            <a:ext cx="1920240" cy="548640"/>
+            <a:ext cx="1919880" cy="548280"/>
           </a:xfrm>
           <a:prstGeom prst="ellipse">
             <a:avLst/>
@@ -7489,14 +9395,14 @@
       </p:sp>
       <p:sp>
         <p:nvSpPr>
-          <p:cNvPr id="104" name="TextShape 4"/>
-          <p:cNvSpPr txBox="1"/>
+          <p:cNvPr id="145" name="CustomShape 4"/>
+          <p:cNvSpPr/>
           <p:nvPr/>
         </p:nvSpPr>
         <p:spPr>
           <a:xfrm>
             <a:off x="3474720" y="914400"/>
-            <a:ext cx="3931920" cy="457200"/>
+            <a:ext cx="3931560" cy="456840"/>
           </a:xfrm>
           <a:prstGeom prst="rect">
             <a:avLst/>
@@ -7506,6 +9412,12 @@
             <a:noFill/>
           </a:ln>
         </p:spPr>
+        <p:style>
+          <a:lnRef idx="0"/>
+          <a:fillRef idx="0"/>
+          <a:effectRef idx="0"/>
+          <a:fontRef idx="minor"/>
+        </p:style>
         <p:txBody>
           <a:bodyPr lIns="90000" rIns="90000" tIns="45000" bIns="45000"/>
           <a:p>
@@ -7523,36 +9435,48 @@
               </a:rPr>
               <a:t>You can return to Switch Mode whenever you want, just clicking in shortcut in top of screen.</a:t>
             </a:r>
-            <a:endParaRPr i="1" lang="en-US" sz="1200" spc="-1" strike="noStrike">
-              <a:solidFill>
-                <a:srgbClr val="000000"/>
-              </a:solidFill>
-              <a:uFill>
-                <a:solidFill>
-                  <a:srgbClr val="ffffff"/>
-                </a:solidFill>
-              </a:uFill>
-              <a:latin typeface="Arial"/>
-            </a:endParaRPr>
-          </a:p>
-        </p:txBody>
-      </p:sp>
-      <p:cxnSp>
-        <p:nvCxnSpPr>
-          <p:cNvPr id="105" name="Line 5"/>
-          <p:cNvCxnSpPr>
-            <a:endCxn id="103" idx="0"/>
-          </p:cNvCxnSpPr>
+            <a:endParaRPr lang="en-US" sz="1800" spc="-1" strike="noStrike">
+              <a:solidFill>
+                <a:srgbClr val="000000"/>
+              </a:solidFill>
+              <a:uFill>
+                <a:solidFill>
+                  <a:srgbClr val="ffffff"/>
+                </a:solidFill>
+              </a:uFill>
+              <a:latin typeface="Arial"/>
+            </a:endParaRPr>
+          </a:p>
+        </p:txBody>
+      </p:sp>
+      <p:sp>
+        <p:nvSpPr>
+          <p:cNvPr id="146" name="CustomShape 5"/>
+          <p:cNvSpPr/>
           <p:nvPr/>
-        </p:nvCxnSpPr>
+        </p:nvSpPr>
         <p:spPr>
           <a:xfrm>
             <a:off x="6319800" y="1243800"/>
-            <a:ext cx="1041480" cy="676800"/>
-          </a:xfrm>
-          <a:prstGeom prst="straightConnector1">
-            <a:avLst/>
-          </a:prstGeom>
+            <a:ext cx="1041120" cy="676440"/>
+          </a:xfrm>
+          <a:custGeom>
+            <a:avLst/>
+            <a:gdLst/>
+            <a:ahLst/>
+            <a:rect l="l" t="t" r="r" b="b"/>
+            <a:pathLst>
+              <a:path w="21600" h="21600">
+                <a:moveTo>
+                  <a:pt x="0" y="0"/>
+                </a:moveTo>
+                <a:lnTo>
+                  <a:pt x="21600" y="21600"/>
+                </a:lnTo>
+              </a:path>
+            </a:pathLst>
+          </a:custGeom>
+          <a:noFill/>
           <a:ln>
             <a:solidFill>
               <a:srgbClr val="000000"/>
@@ -7560,7 +9484,13 @@
             <a:tailEnd len="med" type="triangle" w="med"/>
           </a:ln>
         </p:spPr>
-      </p:cxnSp>
+        <p:style>
+          <a:lnRef idx="0"/>
+          <a:fillRef idx="0"/>
+          <a:effectRef idx="0"/>
+          <a:fontRef idx="minor"/>
+        </p:style>
+      </p:sp>
     </p:spTree>
   </p:cSld>
   <p:transition spd="slow">
@@ -7615,7 +9545,7 @@
       </p:grpSpPr>
       <p:pic>
         <p:nvPicPr>
-          <p:cNvPr id="106" name="" descr=""/>
+          <p:cNvPr id="147" name="" descr=""/>
           <p:cNvPicPr/>
           <p:nvPr/>
         </p:nvPicPr>
@@ -7626,7 +9556,7 @@
         <p:spPr>
           <a:xfrm>
             <a:off x="6918480" y="1463040"/>
-            <a:ext cx="1951200" cy="1097280"/>
+            <a:ext cx="1950840" cy="1096920"/>
           </a:xfrm>
           <a:prstGeom prst="rect">
             <a:avLst/>
@@ -7638,7 +9568,7 @@
       </p:pic>
       <p:pic>
         <p:nvPicPr>
-          <p:cNvPr id="107" name="" descr=""/>
+          <p:cNvPr id="148" name="" descr=""/>
           <p:cNvPicPr/>
           <p:nvPr/>
         </p:nvPicPr>
@@ -7649,7 +9579,7 @@
         <p:spPr>
           <a:xfrm>
             <a:off x="6949440" y="1463040"/>
-            <a:ext cx="3200400" cy="1800000"/>
+            <a:ext cx="3200040" cy="1799640"/>
           </a:xfrm>
           <a:prstGeom prst="rect">
             <a:avLst/>
@@ -7661,7 +9591,7 @@
       </p:pic>
       <p:pic>
         <p:nvPicPr>
-          <p:cNvPr id="108" name="" descr=""/>
+          <p:cNvPr id="149" name="" descr=""/>
           <p:cNvPicPr/>
           <p:nvPr/>
         </p:nvPicPr>
@@ -7672,7 +9602,7 @@
         <p:spPr>
           <a:xfrm>
             <a:off x="7955280" y="3477240"/>
-            <a:ext cx="675720" cy="637560"/>
+            <a:ext cx="675360" cy="637200"/>
           </a:xfrm>
           <a:prstGeom prst="rect">
             <a:avLst/>
@@ -7684,7 +9614,7 @@
       </p:pic>
       <p:pic>
         <p:nvPicPr>
-          <p:cNvPr id="109" name="" descr=""/>
+          <p:cNvPr id="150" name="" descr=""/>
           <p:cNvPicPr/>
           <p:nvPr/>
         </p:nvPicPr>
@@ -7695,7 +9625,7 @@
         <p:spPr>
           <a:xfrm>
             <a:off x="7955280" y="3843000"/>
-            <a:ext cx="675720" cy="637560"/>
+            <a:ext cx="675360" cy="637200"/>
           </a:xfrm>
           <a:prstGeom prst="rect">
             <a:avLst/>
@@ -7707,7 +9637,7 @@
       </p:pic>
       <p:pic>
         <p:nvPicPr>
-          <p:cNvPr id="110" name="" descr=""/>
+          <p:cNvPr id="151" name="" descr=""/>
           <p:cNvPicPr/>
           <p:nvPr/>
         </p:nvPicPr>
@@ -7718,7 +9648,7 @@
         <p:spPr>
           <a:xfrm>
             <a:off x="8376480" y="3843000"/>
-            <a:ext cx="675720" cy="637560"/>
+            <a:ext cx="675360" cy="637200"/>
           </a:xfrm>
           <a:prstGeom prst="rect">
             <a:avLst/>
@@ -7730,7 +9660,7 @@
       </p:pic>
       <p:pic>
         <p:nvPicPr>
-          <p:cNvPr id="111" name="" descr=""/>
+          <p:cNvPr id="152" name="" descr=""/>
           <p:cNvPicPr/>
           <p:nvPr/>
         </p:nvPicPr>
@@ -7741,7 +9671,7 @@
         <p:spPr>
           <a:xfrm>
             <a:off x="8376480" y="4208760"/>
-            <a:ext cx="675720" cy="637560"/>
+            <a:ext cx="675360" cy="637200"/>
           </a:xfrm>
           <a:prstGeom prst="rect">
             <a:avLst/>
@@ -7753,7 +9683,7 @@
       </p:pic>
       <p:pic>
         <p:nvPicPr>
-          <p:cNvPr id="112" name="Shape 87" descr=""/>
+          <p:cNvPr id="153" name="Shape 87" descr=""/>
           <p:cNvPicPr/>
           <p:nvPr/>
         </p:nvPicPr>
@@ -7764,7 +9694,7 @@
         <p:spPr>
           <a:xfrm>
             <a:off x="5870880" y="274320"/>
-            <a:ext cx="2367720" cy="1280160"/>
+            <a:ext cx="2367360" cy="1279800"/>
           </a:xfrm>
           <a:prstGeom prst="rect">
             <a:avLst/>
@@ -7776,14 +9706,14 @@
       </p:pic>
       <p:sp>
         <p:nvSpPr>
-          <p:cNvPr id="113" name="TextShape 1"/>
-          <p:cNvSpPr txBox="1"/>
+          <p:cNvPr id="154" name="CustomShape 1"/>
+          <p:cNvSpPr/>
           <p:nvPr/>
         </p:nvSpPr>
         <p:spPr>
           <a:xfrm>
             <a:off x="548640" y="376920"/>
-            <a:ext cx="7863840" cy="4560840"/>
+            <a:ext cx="7863480" cy="4560480"/>
           </a:xfrm>
           <a:prstGeom prst="rect">
             <a:avLst/>
@@ -7793,10 +9723,19 @@
             <a:noFill/>
           </a:ln>
         </p:spPr>
+        <p:style>
+          <a:lnRef idx="0"/>
+          <a:fillRef idx="0"/>
+          <a:effectRef idx="0"/>
+          <a:fontRef idx="minor"/>
+        </p:style>
         <p:txBody>
           <a:bodyPr lIns="90000" rIns="90000" tIns="45000" bIns="45000"/>
           <a:p>
-            <a:pPr marL="216000" indent="-216000">
+            <a:pPr marL="216000" indent="-215640">
+              <a:lnSpc>
+                <a:spcPct val="100000"/>
+              </a:lnSpc>
               <a:buClr>
                 <a:srgbClr val="000000"/>
               </a:buClr>
@@ -7818,20 +9757,23 @@
               </a:rPr>
               <a:t>Landscape “Piece-oriented” mode</a:t>
             </a:r>
-            <a:endParaRPr lang="en-US" sz="1400" spc="-1" strike="noStrike">
-              <a:solidFill>
-                <a:srgbClr val="000000"/>
-              </a:solidFill>
-              <a:uFill>
-                <a:solidFill>
-                  <a:srgbClr val="ffffff"/>
-                </a:solidFill>
-              </a:uFill>
-              <a:latin typeface="Roboto"/>
-            </a:endParaRPr>
-          </a:p>
-          <a:p>
-            <a:pPr marL="448200">
+            <a:endParaRPr lang="en-US" sz="1800" spc="-1" strike="noStrike">
+              <a:solidFill>
+                <a:srgbClr val="000000"/>
+              </a:solidFill>
+              <a:uFill>
+                <a:solidFill>
+                  <a:srgbClr val="ffffff"/>
+                </a:solidFill>
+              </a:uFill>
+              <a:latin typeface="Arial"/>
+            </a:endParaRPr>
+          </a:p>
+          <a:p>
+            <a:pPr marL="448200" indent="-215640">
+              <a:lnSpc>
+                <a:spcPct val="100000"/>
+              </a:lnSpc>
               <a:buClr>
                 <a:srgbClr val="000000"/>
               </a:buClr>
@@ -7853,20 +9795,23 @@
               </a:rPr>
               <a:t>Piece-oriented mode it is all about cut pieces of an image, normally a draft and create new images from it in an organized way.</a:t>
             </a:r>
-            <a:endParaRPr lang="en-US" sz="1400" spc="-1" strike="noStrike">
-              <a:solidFill>
-                <a:srgbClr val="000000"/>
-              </a:solidFill>
-              <a:uFill>
-                <a:solidFill>
-                  <a:srgbClr val="ffffff"/>
-                </a:solidFill>
-              </a:uFill>
-              <a:latin typeface="Roboto"/>
-            </a:endParaRPr>
-          </a:p>
-          <a:p>
-            <a:pPr marL="448200">
+            <a:endParaRPr lang="en-US" sz="1800" spc="-1" strike="noStrike">
+              <a:solidFill>
+                <a:srgbClr val="000000"/>
+              </a:solidFill>
+              <a:uFill>
+                <a:solidFill>
+                  <a:srgbClr val="ffffff"/>
+                </a:solidFill>
+              </a:uFill>
+              <a:latin typeface="Arial"/>
+            </a:endParaRPr>
+          </a:p>
+          <a:p>
+            <a:pPr marL="448200" indent="-215640">
+              <a:lnSpc>
+                <a:spcPct val="100000"/>
+              </a:lnSpc>
               <a:buClr>
                 <a:srgbClr val="000000"/>
               </a:buClr>
@@ -7888,20 +9833,23 @@
               </a:rPr>
               <a:t>Piece-oriented mode was intended to support you to think an image like a big scene and the pieces like 2D Game Objects in Unity Game Framework, provide you automatically made transparent backgrounds in which of these pieces without lead with masks and layers</a:t>
             </a:r>
-            <a:endParaRPr lang="en-US" sz="1400" spc="-1" strike="noStrike">
-              <a:solidFill>
-                <a:srgbClr val="000000"/>
-              </a:solidFill>
-              <a:uFill>
-                <a:solidFill>
-                  <a:srgbClr val="ffffff"/>
-                </a:solidFill>
-              </a:uFill>
-              <a:latin typeface="Roboto"/>
-            </a:endParaRPr>
-          </a:p>
-          <a:p>
-            <a:pPr marL="216000" indent="-216000">
+            <a:endParaRPr lang="en-US" sz="1800" spc="-1" strike="noStrike">
+              <a:solidFill>
+                <a:srgbClr val="000000"/>
+              </a:solidFill>
+              <a:uFill>
+                <a:solidFill>
+                  <a:srgbClr val="ffffff"/>
+                </a:solidFill>
+              </a:uFill>
+              <a:latin typeface="Arial"/>
+            </a:endParaRPr>
+          </a:p>
+          <a:p>
+            <a:pPr marL="216000" indent="-215640">
+              <a:lnSpc>
+                <a:spcPct val="100000"/>
+              </a:lnSpc>
               <a:buClr>
                 <a:srgbClr val="000000"/>
               </a:buClr>
@@ -7923,20 +9871,23 @@
               </a:rPr>
               <a:t> </a:t>
             </a:r>
-            <a:endParaRPr lang="en-US" sz="1400" spc="-1" strike="noStrike">
-              <a:solidFill>
-                <a:srgbClr val="000000"/>
-              </a:solidFill>
-              <a:uFill>
-                <a:solidFill>
-                  <a:srgbClr val="ffffff"/>
-                </a:solidFill>
-              </a:uFill>
-              <a:latin typeface="Roboto"/>
-            </a:endParaRPr>
-          </a:p>
-          <a:p>
-            <a:pPr marL="216000" indent="-216000">
+            <a:endParaRPr lang="en-US" sz="1800" spc="-1" strike="noStrike">
+              <a:solidFill>
+                <a:srgbClr val="000000"/>
+              </a:solidFill>
+              <a:uFill>
+                <a:solidFill>
+                  <a:srgbClr val="ffffff"/>
+                </a:solidFill>
+              </a:uFill>
+              <a:latin typeface="Arial"/>
+            </a:endParaRPr>
+          </a:p>
+          <a:p>
+            <a:pPr marL="216000" indent="-215640">
+              <a:lnSpc>
+                <a:spcPct val="100000"/>
+              </a:lnSpc>
               <a:buClr>
                 <a:srgbClr val="000000"/>
               </a:buClr>
@@ -7958,20 +9909,23 @@
               </a:rPr>
               <a:t>Effect “Animation-oriented” mode</a:t>
             </a:r>
-            <a:endParaRPr lang="en-US" sz="1400" spc="-1" strike="noStrike">
-              <a:solidFill>
-                <a:srgbClr val="000000"/>
-              </a:solidFill>
-              <a:uFill>
-                <a:solidFill>
-                  <a:srgbClr val="ffffff"/>
-                </a:solidFill>
-              </a:uFill>
-              <a:latin typeface="Roboto"/>
-            </a:endParaRPr>
-          </a:p>
-          <a:p>
-            <a:pPr lvl="1" marL="432000" indent="-216000">
+            <a:endParaRPr lang="en-US" sz="1800" spc="-1" strike="noStrike">
+              <a:solidFill>
+                <a:srgbClr val="000000"/>
+              </a:solidFill>
+              <a:uFill>
+                <a:solidFill>
+                  <a:srgbClr val="ffffff"/>
+                </a:solidFill>
+              </a:uFill>
+              <a:latin typeface="Arial"/>
+            </a:endParaRPr>
+          </a:p>
+          <a:p>
+            <a:pPr lvl="1" marL="432000" indent="-215640">
+              <a:lnSpc>
+                <a:spcPct val="100000"/>
+              </a:lnSpc>
               <a:buClr>
                 <a:srgbClr val="000000"/>
               </a:buClr>
@@ -7993,20 +9947,23 @@
               </a:rPr>
               <a:t>The Animation-oriented mode brings to you the ability to apply in several images at once a couple of filters which are added each other to produce one single result per image. Among them:</a:t>
             </a:r>
-            <a:endParaRPr lang="en-US" sz="1400" spc="-1" strike="noStrike">
-              <a:solidFill>
-                <a:srgbClr val="000000"/>
-              </a:solidFill>
-              <a:uFill>
-                <a:solidFill>
-                  <a:srgbClr val="ffffff"/>
-                </a:solidFill>
-              </a:uFill>
-              <a:latin typeface="Roboto"/>
-            </a:endParaRPr>
-          </a:p>
-          <a:p>
-            <a:pPr lvl="2" marL="648000" indent="-216000">
+            <a:endParaRPr lang="en-US" sz="1800" spc="-1" strike="noStrike">
+              <a:solidFill>
+                <a:srgbClr val="000000"/>
+              </a:solidFill>
+              <a:uFill>
+                <a:solidFill>
+                  <a:srgbClr val="ffffff"/>
+                </a:solidFill>
+              </a:uFill>
+              <a:latin typeface="Arial"/>
+            </a:endParaRPr>
+          </a:p>
+          <a:p>
+            <a:pPr lvl="2" marL="648000" indent="-215640">
+              <a:lnSpc>
+                <a:spcPct val="100000"/>
+              </a:lnSpc>
               <a:buClr>
                 <a:srgbClr val="000000"/>
               </a:buClr>
@@ -8028,20 +9985,23 @@
               </a:rPr>
               <a:t>Transform images in a 8 bit video-game style</a:t>
             </a:r>
-            <a:endParaRPr lang="en-US" sz="1400" spc="-1" strike="noStrike">
-              <a:solidFill>
-                <a:srgbClr val="000000"/>
-              </a:solidFill>
-              <a:uFill>
-                <a:solidFill>
-                  <a:srgbClr val="ffffff"/>
-                </a:solidFill>
-              </a:uFill>
-              <a:latin typeface="Roboto"/>
-            </a:endParaRPr>
-          </a:p>
-          <a:p>
-            <a:pPr lvl="2" marL="648000" indent="-216000">
+            <a:endParaRPr lang="en-US" sz="1800" spc="-1" strike="noStrike">
+              <a:solidFill>
+                <a:srgbClr val="000000"/>
+              </a:solidFill>
+              <a:uFill>
+                <a:solidFill>
+                  <a:srgbClr val="ffffff"/>
+                </a:solidFill>
+              </a:uFill>
+              <a:latin typeface="Arial"/>
+            </a:endParaRPr>
+          </a:p>
+          <a:p>
+            <a:pPr lvl="2" marL="648000" indent="-215640">
+              <a:lnSpc>
+                <a:spcPct val="100000"/>
+              </a:lnSpc>
               <a:buClr>
                 <a:srgbClr val="000000"/>
               </a:buClr>
@@ -8063,20 +10023,23 @@
               </a:rPr>
               <a:t>Work with images of characters adding automatically a transparent background, or even drawing a shading around them, without point anything.</a:t>
             </a:r>
-            <a:endParaRPr lang="en-US" sz="1400" spc="-1" strike="noStrike">
-              <a:solidFill>
-                <a:srgbClr val="000000"/>
-              </a:solidFill>
-              <a:uFill>
-                <a:solidFill>
-                  <a:srgbClr val="ffffff"/>
-                </a:solidFill>
-              </a:uFill>
-              <a:latin typeface="Roboto"/>
-            </a:endParaRPr>
-          </a:p>
-          <a:p>
-            <a:pPr lvl="1" marL="432000" indent="-216000">
+            <a:endParaRPr lang="en-US" sz="1800" spc="-1" strike="noStrike">
+              <a:solidFill>
+                <a:srgbClr val="000000"/>
+              </a:solidFill>
+              <a:uFill>
+                <a:solidFill>
+                  <a:srgbClr val="ffffff"/>
+                </a:solidFill>
+              </a:uFill>
+              <a:latin typeface="Arial"/>
+            </a:endParaRPr>
+          </a:p>
+          <a:p>
+            <a:pPr lvl="1" marL="432000" indent="-215640">
+              <a:lnSpc>
+                <a:spcPct val="100000"/>
+              </a:lnSpc>
               <a:buClr>
                 <a:srgbClr val="000000"/>
               </a:buClr>
@@ -8096,53 +10059,18 @@
                 </a:uFill>
                 <a:latin typeface="Roboto"/>
               </a:rPr>
-              <a:t>The Animation-oriented mode was intended to support Blender 3D artists interested in transform their animations, generated in pictures, in 2D aspect to use in Unity Game Framework, like pre-rendered images – like games like “Donkey-Kong Country” or even traditional 2D animation, like Strider or Ghouls and Ghosts</a:t>
-            </a:r>
-            <a:endParaRPr lang="en-US" sz="1400" spc="-1" strike="noStrike">
-              <a:solidFill>
-                <a:srgbClr val="000000"/>
-              </a:solidFill>
-              <a:uFill>
-                <a:solidFill>
-                  <a:srgbClr val="ffffff"/>
-                </a:solidFill>
-              </a:uFill>
-              <a:latin typeface="Roboto"/>
-            </a:endParaRPr>
-          </a:p>
-          <a:p>
-            <a:pPr lvl="2" marL="648000" indent="-216000">
-              <a:buClr>
-                <a:srgbClr val="000000"/>
-              </a:buClr>
-              <a:buSzPct val="45000"/>
-              <a:buFont typeface="Wingdings" charset="2"/>
-              <a:buChar char=""/>
-            </a:pPr>
-            <a:r>
-              <a:rPr lang="en-US" sz="1400" spc="-1" strike="noStrike">
-                <a:solidFill>
-                  <a:srgbClr val="000000"/>
-                </a:solidFill>
-                <a:uFill>
-                  <a:solidFill>
-                    <a:srgbClr val="ffffff"/>
-                  </a:solidFill>
-                </a:uFill>
-                <a:latin typeface="Roboto"/>
-              </a:rPr>
-              <a:t> </a:t>
-            </a:r>
-            <a:endParaRPr lang="en-US" sz="1400" spc="-1" strike="noStrike">
-              <a:solidFill>
-                <a:srgbClr val="000000"/>
-              </a:solidFill>
-              <a:uFill>
-                <a:solidFill>
-                  <a:srgbClr val="ffffff"/>
-                </a:solidFill>
-              </a:uFill>
-              <a:latin typeface="Roboto"/>
+              <a:t>The Animation-oriented mode was intended to support Blender 3D artists interested in transform their animations, generated in pictures, in 2D aspect to use in Unity Game Framework, like pre-rendered images – like games like “Donkey-Kong Country” or even traditional 2D animation, like Strider or Ghouls and Ghosts </a:t>
+            </a:r>
+            <a:endParaRPr lang="en-US" sz="1800" spc="-1" strike="noStrike">
+              <a:solidFill>
+                <a:srgbClr val="000000"/>
+              </a:solidFill>
+              <a:uFill>
+                <a:solidFill>
+                  <a:srgbClr val="ffffff"/>
+                </a:solidFill>
+              </a:uFill>
+              <a:latin typeface="Arial"/>
             </a:endParaRPr>
           </a:p>
         </p:txBody>
@@ -8201,14 +10129,14 @@
       </p:grpSpPr>
       <p:sp>
         <p:nvSpPr>
-          <p:cNvPr id="114" name="TextShape 1"/>
-          <p:cNvSpPr txBox="1"/>
+          <p:cNvPr id="155" name="CustomShape 1"/>
+          <p:cNvSpPr/>
           <p:nvPr/>
         </p:nvSpPr>
         <p:spPr>
           <a:xfrm>
-            <a:off x="457200" y="205200"/>
-            <a:ext cx="8229240" cy="3981240"/>
+            <a:off x="365760" y="753840"/>
+            <a:ext cx="8228880" cy="617760"/>
           </a:xfrm>
           <a:prstGeom prst="rect">
             <a:avLst/>
@@ -8218,12 +10146,22 @@
             <a:noFill/>
           </a:ln>
         </p:spPr>
+        <p:style>
+          <a:lnRef idx="0"/>
+          <a:fillRef idx="0"/>
+          <a:effectRef idx="0"/>
+          <a:fontRef idx="minor"/>
+        </p:style>
         <p:txBody>
           <a:bodyPr lIns="0" rIns="0" tIns="0" bIns="0" anchor="ctr"/>
           <a:p>
-            <a:pPr algn="ctr"/>
-            <a:r>
-              <a:rPr b="1" lang="en-US" sz="3200" spc="-1" strike="noStrike">
+            <a:pPr algn="ctr">
+              <a:lnSpc>
+                <a:spcPct val="100000"/>
+              </a:lnSpc>
+            </a:pPr>
+            <a:r>
+              <a:rPr b="1" lang="en-US" sz="2600" spc="-1" strike="noStrike">
                 <a:solidFill>
                   <a:srgbClr val="000000"/>
                 </a:solidFill>
@@ -8232,27 +10170,27 @@
                     <a:srgbClr val="ffffff"/>
                   </a:solidFill>
                 </a:uFill>
-                <a:latin typeface="Arial"/>
+                <a:latin typeface="Roboto"/>
               </a:rPr>
               <a:t>Landscape “Piece-oriented” mode</a:t>
             </a:r>
-            <a:endParaRPr lang="en-US" sz="3200" spc="-1" strike="noStrike">
-              <a:solidFill>
-                <a:srgbClr val="000000"/>
-              </a:solidFill>
-              <a:uFill>
-                <a:solidFill>
-                  <a:srgbClr val="ffffff"/>
-                </a:solidFill>
-              </a:uFill>
-              <a:latin typeface="Arial"/>
+            <a:endParaRPr lang="en-US" sz="2600" spc="-1" strike="noStrike">
+              <a:solidFill>
+                <a:srgbClr val="000000"/>
+              </a:solidFill>
+              <a:uFill>
+                <a:solidFill>
+                  <a:srgbClr val="ffffff"/>
+                </a:solidFill>
+              </a:uFill>
+              <a:latin typeface="Roboto"/>
             </a:endParaRPr>
           </a:p>
         </p:txBody>
       </p:sp>
       <p:pic>
         <p:nvPicPr>
-          <p:cNvPr id="115" name="Shape 87" descr=""/>
+          <p:cNvPr id="156" name="Shape 87" descr=""/>
           <p:cNvPicPr/>
           <p:nvPr/>
         </p:nvPicPr>
@@ -8262,8 +10200,8 @@
         </p:blipFill>
         <p:spPr>
           <a:xfrm>
-            <a:off x="3191760" y="2468880"/>
-            <a:ext cx="2843280" cy="1537200"/>
+            <a:off x="3191760" y="1480680"/>
+            <a:ext cx="2842920" cy="1536840"/>
           </a:xfrm>
           <a:prstGeom prst="rect">
             <a:avLst/>
@@ -8273,6 +10211,56 @@
           </a:ln>
         </p:spPr>
       </p:pic>
+      <p:sp>
+        <p:nvSpPr>
+          <p:cNvPr id="157" name="TextShape 2"/>
+          <p:cNvSpPr txBox="1"/>
+          <p:nvPr/>
+        </p:nvSpPr>
+        <p:spPr>
+          <a:xfrm>
+            <a:off x="3828960" y="3311280"/>
+            <a:ext cx="1474560" cy="346320"/>
+          </a:xfrm>
+          <a:prstGeom prst="rect">
+            <a:avLst/>
+          </a:prstGeom>
+          <a:noFill/>
+          <a:ln>
+            <a:noFill/>
+          </a:ln>
+        </p:spPr>
+        <p:txBody>
+          <a:bodyPr lIns="90000" rIns="90000" tIns="45000" bIns="45000"/>
+          <a:p>
+            <a:r>
+              <a:rPr lang="en-US" sz="1800" spc="-1" strike="noStrike">
+                <a:solidFill>
+                  <a:srgbClr val="000000"/>
+                </a:solidFill>
+                <a:uFill>
+                  <a:solidFill>
+                    <a:srgbClr val="ffffff"/>
+                  </a:solidFill>
+                </a:uFill>
+                <a:latin typeface="Arial"/>
+              </a:rPr>
+              <a:t>Step-by-step</a:t>
+            </a:r>
+            <a:endParaRPr lang="en-US" sz="1800" spc="-1" strike="noStrike">
+              <a:solidFill>
+                <a:srgbClr val="000000"/>
+              </a:solidFill>
+              <a:uFill>
+                <a:solidFill>
+                  <a:srgbClr val="ffffff"/>
+                </a:solidFill>
+              </a:uFill>
+              <a:latin typeface="Arial"/>
+            </a:endParaRPr>
+          </a:p>
+        </p:txBody>
+      </p:sp>
     </p:spTree>
   </p:cSld>
   <p:transition spd="slow">
@@ -8327,14 +10315,14 @@
       </p:grpSpPr>
       <p:sp>
         <p:nvSpPr>
-          <p:cNvPr id="116" name="CustomShape 1"/>
+          <p:cNvPr id="158" name="CustomShape 1"/>
           <p:cNvSpPr/>
           <p:nvPr/>
         </p:nvSpPr>
         <p:spPr>
           <a:xfrm>
             <a:off x="311760" y="410040"/>
-            <a:ext cx="8519400" cy="606600"/>
+            <a:ext cx="8519040" cy="606240"/>
           </a:xfrm>
           <a:prstGeom prst="rect">
             <a:avLst/>
@@ -8353,7 +10341,7 @@
         <p:txBody>
           <a:bodyPr lIns="90000" rIns="90000" tIns="91440" bIns="91440"/>
           <a:p>
-            <a:pPr marL="457200" indent="-227520">
+            <a:pPr marL="457200" indent="-227160">
               <a:lnSpc>
                 <a:spcPct val="100000"/>
               </a:lnSpc>
@@ -8394,14 +10382,14 @@
       </p:sp>
       <p:sp>
         <p:nvSpPr>
-          <p:cNvPr id="117" name="CustomShape 2"/>
+          <p:cNvPr id="159" name="CustomShape 2"/>
           <p:cNvSpPr/>
           <p:nvPr/>
         </p:nvSpPr>
         <p:spPr>
           <a:xfrm>
             <a:off x="311760" y="1229760"/>
-            <a:ext cx="3873960" cy="3473640"/>
+            <a:ext cx="3873600" cy="3473280"/>
           </a:xfrm>
           <a:prstGeom prst="rect">
             <a:avLst/>
@@ -8474,7 +10462,7 @@
       </p:sp>
       <p:pic>
         <p:nvPicPr>
-          <p:cNvPr id="118" name="Shape 112" descr=""/>
+          <p:cNvPr id="160" name="Shape 112" descr=""/>
           <p:cNvPicPr/>
           <p:nvPr/>
         </p:nvPicPr>
@@ -8485,7 +10473,7 @@
         <p:spPr>
           <a:xfrm>
             <a:off x="4302000" y="1631880"/>
-            <a:ext cx="4625280" cy="2482920"/>
+            <a:ext cx="4624920" cy="2482560"/>
           </a:xfrm>
           <a:prstGeom prst="rect">
             <a:avLst/>
@@ -8549,14 +10537,14 @@
       </p:grpSpPr>
       <p:sp>
         <p:nvSpPr>
-          <p:cNvPr id="119" name="CustomShape 1"/>
+          <p:cNvPr id="161" name="CustomShape 1"/>
           <p:cNvSpPr/>
           <p:nvPr/>
         </p:nvSpPr>
         <p:spPr>
           <a:xfrm>
             <a:off x="311760" y="410040"/>
-            <a:ext cx="8519400" cy="606600"/>
+            <a:ext cx="8519040" cy="606240"/>
           </a:xfrm>
           <a:prstGeom prst="rect">
             <a:avLst/>
@@ -8611,14 +10599,14 @@
       </p:sp>
       <p:sp>
         <p:nvSpPr>
-          <p:cNvPr id="120" name="CustomShape 2"/>
+          <p:cNvPr id="162" name="CustomShape 2"/>
           <p:cNvSpPr/>
           <p:nvPr/>
         </p:nvSpPr>
         <p:spPr>
           <a:xfrm>
             <a:off x="311760" y="1229760"/>
-            <a:ext cx="4380480" cy="3337920"/>
+            <a:ext cx="4380120" cy="3337560"/>
           </a:xfrm>
           <a:prstGeom prst="rect">
             <a:avLst/>
@@ -8637,7 +10625,7 @@
         <p:txBody>
           <a:bodyPr lIns="90000" rIns="90000" tIns="91440" bIns="91440"/>
           <a:p>
-            <a:pPr marL="457200" indent="-227520">
+            <a:pPr marL="457200" indent="-227160">
               <a:lnSpc>
                 <a:spcPct val="100000"/>
               </a:lnSpc>
@@ -8705,7 +10693,7 @@
             </a:endParaRPr>
           </a:p>
           <a:p>
-            <a:pPr marL="457200" indent="-227520">
+            <a:pPr marL="457200" indent="-227160">
               <a:lnSpc>
                 <a:spcPct val="100000"/>
               </a:lnSpc>
@@ -8758,7 +10746,7 @@
             </a:endParaRPr>
           </a:p>
           <a:p>
-            <a:pPr marL="457200" indent="-227520">
+            <a:pPr marL="457200" indent="-227160">
               <a:lnSpc>
                 <a:spcPct val="100000"/>
               </a:lnSpc>
@@ -8811,7 +10799,7 @@
             </a:endParaRPr>
           </a:p>
           <a:p>
-            <a:pPr marL="457200" indent="-227520">
+            <a:pPr marL="457200" indent="-227160">
               <a:lnSpc>
                 <a:spcPct val="100000"/>
               </a:lnSpc>
@@ -8882,7 +10870,7 @@
       </p:sp>
       <p:pic>
         <p:nvPicPr>
-          <p:cNvPr id="121" name="Shape 119" descr=""/>
+          <p:cNvPr id="163" name="Shape 119" descr=""/>
           <p:cNvPicPr/>
           <p:nvPr/>
         </p:nvPicPr>
@@ -8893,7 +10881,7 @@
         <p:spPr>
           <a:xfrm>
             <a:off x="4862160" y="299880"/>
-            <a:ext cx="1732320" cy="2494440"/>
+            <a:ext cx="1731960" cy="2494080"/>
           </a:xfrm>
           <a:prstGeom prst="rect">
             <a:avLst/>
@@ -8905,7 +10893,7 @@
       </p:pic>
       <p:pic>
         <p:nvPicPr>
-          <p:cNvPr id="122" name="Shape 120" descr=""/>
+          <p:cNvPr id="164" name="Shape 120" descr=""/>
           <p:cNvPicPr/>
           <p:nvPr/>
         </p:nvPicPr>
@@ -8916,7 +10904,7 @@
         <p:spPr>
           <a:xfrm>
             <a:off x="6595560" y="3371040"/>
-            <a:ext cx="2113560" cy="856080"/>
+            <a:ext cx="2113200" cy="855720"/>
           </a:xfrm>
           <a:prstGeom prst="rect">
             <a:avLst/>
@@ -9405,4 +11393,227 @@
     </a:fmtScheme>
   </a:themeElements>
 </a:theme>
+</file>
+
+<file path=ppt/theme/theme3.xml><?xml version="1.0" encoding="utf-8"?>
+<a:theme xmlns:a="http://schemas.openxmlformats.org/drawingml/2006/main" name="Office Theme">
+  <a:themeElements>
+    <a:clrScheme name="Office">
+      <a:dk1>
+        <a:sysClr val="windowText" lastClr="000000"/>
+      </a:dk1>
+      <a:lt1>
+        <a:sysClr val="window" lastClr="FFFFFF"/>
+      </a:lt1>
+      <a:dk2>
+        <a:srgbClr val="1F497D"/>
+      </a:dk2>
+      <a:lt2>
+        <a:srgbClr val="EEECE1"/>
+      </a:lt2>
+      <a:accent1>
+        <a:srgbClr val="4F81BD"/>
+      </a:accent1>
+      <a:accent2>
+        <a:srgbClr val="C0504D"/>
+      </a:accent2>
+      <a:accent3>
+        <a:srgbClr val="9BBB59"/>
+      </a:accent3>
+      <a:accent4>
+        <a:srgbClr val="8064A2"/>
+      </a:accent4>
+      <a:accent5>
+        <a:srgbClr val="4BACC6"/>
+      </a:accent5>
+      <a:accent6>
+        <a:srgbClr val="F79646"/>
+      </a:accent6>
+      <a:hlink>
+        <a:srgbClr val="0000FF"/>
+      </a:hlink>
+      <a:folHlink>
+        <a:srgbClr val="800080"/>
+      </a:folHlink>
+    </a:clrScheme>
+    <a:fontScheme name="Office">
+      <a:majorFont>
+        <a:latin typeface="Arial"/>
+        <a:ea typeface="DejaVu Sans"/>
+        <a:cs typeface="DejaVu Sans"/>
+      </a:majorFont>
+      <a:minorFont>
+        <a:latin typeface="Arial"/>
+        <a:ea typeface="DejaVu Sans"/>
+        <a:cs typeface="DejaVu Sans"/>
+      </a:minorFont>
+    </a:fontScheme>
+    <a:fmtScheme name="Office">
+      <a:fillStyleLst>
+        <a:solidFill>
+          <a:schemeClr val="phClr"/>
+        </a:solidFill>
+        <a:gradFill rotWithShape="1">
+          <a:gsLst>
+            <a:gs pos="0">
+              <a:schemeClr val="phClr">
+                <a:tint val="50000"/>
+                <a:satMod val="300000"/>
+              </a:schemeClr>
+            </a:gs>
+            <a:gs pos="35000">
+              <a:schemeClr val="phClr">
+                <a:tint val="37000"/>
+                <a:satMod val="300000"/>
+              </a:schemeClr>
+            </a:gs>
+            <a:gs pos="100000">
+              <a:schemeClr val="phClr">
+                <a:tint val="15000"/>
+                <a:satMod val="350000"/>
+              </a:schemeClr>
+            </a:gs>
+          </a:gsLst>
+          <a:lin ang="16200000" scaled="1"/>
+        </a:gradFill>
+        <a:gradFill rotWithShape="1">
+          <a:gsLst>
+            <a:gs pos="0">
+              <a:schemeClr val="phClr">
+                <a:shade val="51000"/>
+                <a:satMod val="130000"/>
+              </a:schemeClr>
+            </a:gs>
+            <a:gs pos="80000">
+              <a:schemeClr val="phClr">
+                <a:shade val="93000"/>
+                <a:satMod val="130000"/>
+              </a:schemeClr>
+            </a:gs>
+            <a:gs pos="100000">
+              <a:schemeClr val="phClr">
+                <a:shade val="94000"/>
+                <a:satMod val="135000"/>
+              </a:schemeClr>
+            </a:gs>
+          </a:gsLst>
+          <a:lin ang="16200000" scaled="0"/>
+        </a:gradFill>
+      </a:fillStyleLst>
+      <a:lnStyleLst>
+        <a:ln w="9525" cap="flat" cmpd="sng" algn="ctr">
+          <a:solidFill>
+            <a:schemeClr val="phClr">
+              <a:shade val="95000"/>
+              <a:satMod val="105000"/>
+            </a:schemeClr>
+          </a:solidFill>
+          <a:prstDash val="solid"/>
+        </a:ln>
+        <a:ln w="25400" cap="flat" cmpd="sng" algn="ctr">
+          <a:solidFill>
+            <a:schemeClr val="phClr"/>
+          </a:solidFill>
+          <a:prstDash val="solid"/>
+        </a:ln>
+        <a:ln w="38100" cap="flat" cmpd="sng" algn="ctr">
+          <a:solidFill>
+            <a:schemeClr val="phClr"/>
+          </a:solidFill>
+          <a:prstDash val="solid"/>
+        </a:ln>
+      </a:lnStyleLst>
+      <a:effectStyleLst>
+        <a:effectStyle>
+          <a:effectLst>
+            <a:outerShdw blurRad="40000" dist="20000" dir="5400000" rotWithShape="0">
+              <a:srgbClr val="000000">
+                <a:alpha val="38000"/>
+              </a:srgbClr>
+            </a:outerShdw>
+          </a:effectLst>
+        </a:effectStyle>
+        <a:effectStyle>
+          <a:effectLst>
+            <a:outerShdw blurRad="40000" dist="23000" dir="5400000" rotWithShape="0">
+              <a:srgbClr val="000000">
+                <a:alpha val="35000"/>
+              </a:srgbClr>
+            </a:outerShdw>
+          </a:effectLst>
+        </a:effectStyle>
+        <a:effectStyle>
+          <a:effectLst>
+            <a:outerShdw blurRad="40000" dist="23000" dir="5400000" rotWithShape="0">
+              <a:srgbClr val="000000">
+                <a:alpha val="35000"/>
+              </a:srgbClr>
+            </a:outerShdw>
+          </a:effectLst>
+          <a:scene3d>
+            <a:camera prst="orthographicFront">
+              <a:rot lat="0" lon="0" rev="0"/>
+            </a:camera>
+            <a:lightRig rig="threePt" dir="t">
+              <a:rot lat="0" lon="0" rev="1200000"/>
+            </a:lightRig>
+          </a:scene3d>
+          <a:sp3d>
+            <a:bevelT w="63500" h="25400"/>
+          </a:sp3d>
+        </a:effectStyle>
+      </a:effectStyleLst>
+      <a:bgFillStyleLst>
+        <a:solidFill>
+          <a:schemeClr val="phClr"/>
+        </a:solidFill>
+        <a:gradFill rotWithShape="1">
+          <a:gsLst>
+            <a:gs pos="0">
+              <a:schemeClr val="phClr">
+                <a:tint val="40000"/>
+                <a:satMod val="350000"/>
+              </a:schemeClr>
+            </a:gs>
+            <a:gs pos="40000">
+              <a:schemeClr val="phClr">
+                <a:tint val="45000"/>
+                <a:shade val="99000"/>
+                <a:satMod val="350000"/>
+              </a:schemeClr>
+            </a:gs>
+            <a:gs pos="100000">
+              <a:schemeClr val="phClr">
+                <a:shade val="20000"/>
+                <a:satMod val="255000"/>
+              </a:schemeClr>
+            </a:gs>
+          </a:gsLst>
+          <a:path path="circle">
+            <a:fillToRect l="50000" t="-80000" r="50000" b="180000"/>
+          </a:path>
+        </a:gradFill>
+        <a:gradFill rotWithShape="1">
+          <a:gsLst>
+            <a:gs pos="0">
+              <a:schemeClr val="phClr">
+                <a:tint val="80000"/>
+                <a:satMod val="300000"/>
+              </a:schemeClr>
+            </a:gs>
+            <a:gs pos="100000">
+              <a:schemeClr val="phClr">
+                <a:shade val="30000"/>
+                <a:satMod val="200000"/>
+              </a:schemeClr>
+            </a:gs>
+          </a:gsLst>
+          <a:path path="circle">
+            <a:fillToRect l="50000" t="50000" r="50000" b="50000"/>
+          </a:path>
+        </a:gradFill>
+      </a:bgFillStyleLst>
+    </a:fmtScheme>
+  </a:themeElements>
+</a:theme>
 </file>
</xml_diff>

<commit_message>
Documentação de browsers de Animation-mode
</commit_message>
<xml_diff>
--- a/[doc]/Using smartSpriteFX.pptx
+++ b/[doc]/Using smartSpriteFX.pptx
@@ -25,6 +25,7 @@
     <p:sldId id="270" r:id="rId20"/>
     <p:sldId id="271" r:id="rId21"/>
     <p:sldId id="272" r:id="rId22"/>
+    <p:sldId id="273" r:id="rId23"/>
   </p:sldIdLst>
   <p:sldSz cx="9144000" cy="5143500"/>
   <p:notesSz cx="7772400" cy="10058400"/>
@@ -5960,7 +5961,7 @@
         <p:spPr>
           <a:xfrm>
             <a:off x="8128800" y="0"/>
-            <a:ext cx="1013400" cy="1013400"/>
+            <a:ext cx="1013040" cy="1013040"/>
           </a:xfrm>
           <a:prstGeom prst="rect">
             <a:avLst/>
@@ -5988,7 +5989,7 @@
         <p:spPr>
           <a:xfrm flipH="1">
             <a:off x="7111440" y="0"/>
-            <a:ext cx="1013400" cy="1013400"/>
+            <a:ext cx="1013040" cy="1013040"/>
           </a:xfrm>
           <a:prstGeom prst="rtTriangle">
             <a:avLst/>
@@ -6015,8 +6016,8 @@
         </p:nvSpPr>
         <p:spPr>
           <a:xfrm flipH="1" rot="10800000">
-            <a:off x="12183840" y="5072400"/>
-            <a:ext cx="1013400" cy="1013400"/>
+            <a:off x="13197240" y="6085800"/>
+            <a:ext cx="1013040" cy="1013040"/>
           </a:xfrm>
           <a:prstGeom prst="rtTriangle">
             <a:avLst/>
@@ -6043,8 +6044,8 @@
         </p:nvSpPr>
         <p:spPr>
           <a:xfrm rot="10800000">
-            <a:off x="11170800" y="5072400"/>
-            <a:ext cx="1013400" cy="1013400"/>
+            <a:off x="12184200" y="6085800"/>
+            <a:ext cx="1013040" cy="1013040"/>
           </a:xfrm>
           <a:prstGeom prst="rtTriangle">
             <a:avLst/>
@@ -6071,8 +6072,8 @@
         </p:nvSpPr>
         <p:spPr>
           <a:xfrm rot="10800000">
-            <a:off x="13201200" y="6087600"/>
-            <a:ext cx="1013400" cy="1013400"/>
+            <a:off x="14214600" y="7101000"/>
+            <a:ext cx="1013040" cy="1013040"/>
           </a:xfrm>
           <a:prstGeom prst="rtTriangle">
             <a:avLst/>
@@ -6463,7 +6464,7 @@
         <p:spPr>
           <a:xfrm>
             <a:off x="8154720" y="3903840"/>
-            <a:ext cx="987480" cy="986040"/>
+            <a:ext cx="987120" cy="985680"/>
           </a:xfrm>
           <a:prstGeom prst="rtTriangle">
             <a:avLst/>
@@ -6491,7 +6492,7 @@
         <p:spPr>
           <a:xfrm flipH="1">
             <a:off x="6179040" y="3903840"/>
-            <a:ext cx="987480" cy="986040"/>
+            <a:ext cx="987120" cy="985680"/>
           </a:xfrm>
           <a:prstGeom prst="rtTriangle">
             <a:avLst/>
@@ -6519,7 +6520,7 @@
         <p:spPr>
           <a:xfrm>
             <a:off x="7170120" y="3903840"/>
-            <a:ext cx="987480" cy="986040"/>
+            <a:ext cx="987120" cy="985680"/>
           </a:xfrm>
           <a:prstGeom prst="rect">
             <a:avLst/>
@@ -6546,8 +6547,8 @@
         </p:nvSpPr>
         <p:spPr>
           <a:xfrm rot="10800000">
-            <a:off x="13097520" y="8839440"/>
-            <a:ext cx="987480" cy="986040"/>
+            <a:off x="14085000" y="9825480"/>
+            <a:ext cx="987120" cy="985680"/>
           </a:xfrm>
           <a:prstGeom prst="rtTriangle">
             <a:avLst/>
@@ -6575,7 +6576,7 @@
         <p:spPr>
           <a:xfrm>
             <a:off x="0" y="4891680"/>
-            <a:ext cx="9142200" cy="250200"/>
+            <a:ext cx="9141840" cy="249840"/>
           </a:xfrm>
           <a:prstGeom prst="rect">
             <a:avLst/>
@@ -6966,7 +6967,7 @@
         <p:spPr>
           <a:xfrm>
             <a:off x="8154720" y="3903840"/>
-            <a:ext cx="987480" cy="986040"/>
+            <a:ext cx="987120" cy="985680"/>
           </a:xfrm>
           <a:prstGeom prst="rtTriangle">
             <a:avLst/>
@@ -6994,7 +6995,7 @@
         <p:spPr>
           <a:xfrm flipH="1">
             <a:off x="6179040" y="3903840"/>
-            <a:ext cx="987480" cy="986040"/>
+            <a:ext cx="987120" cy="985680"/>
           </a:xfrm>
           <a:prstGeom prst="rtTriangle">
             <a:avLst/>
@@ -7022,7 +7023,7 @@
         <p:spPr>
           <a:xfrm>
             <a:off x="7170120" y="3903840"/>
-            <a:ext cx="987480" cy="986040"/>
+            <a:ext cx="987120" cy="985680"/>
           </a:xfrm>
           <a:prstGeom prst="rect">
             <a:avLst/>
@@ -7049,8 +7050,8 @@
         </p:nvSpPr>
         <p:spPr>
           <a:xfrm rot="10800000">
-            <a:off x="13097520" y="8839440"/>
-            <a:ext cx="987480" cy="986040"/>
+            <a:off x="14085000" y="9825480"/>
+            <a:ext cx="987120" cy="985680"/>
           </a:xfrm>
           <a:prstGeom prst="rtTriangle">
             <a:avLst/>
@@ -7078,7 +7079,7 @@
         <p:spPr>
           <a:xfrm>
             <a:off x="0" y="4891680"/>
-            <a:ext cx="9142200" cy="250200"/>
+            <a:ext cx="9141840" cy="249840"/>
           </a:xfrm>
           <a:prstGeom prst="rect">
             <a:avLst/>
@@ -7469,7 +7470,7 @@
         <p:spPr>
           <a:xfrm>
             <a:off x="8154720" y="3903840"/>
-            <a:ext cx="987480" cy="986040"/>
+            <a:ext cx="987120" cy="985680"/>
           </a:xfrm>
           <a:prstGeom prst="rtTriangle">
             <a:avLst/>
@@ -7497,7 +7498,7 @@
         <p:spPr>
           <a:xfrm flipH="1">
             <a:off x="6179040" y="3903840"/>
-            <a:ext cx="987480" cy="986040"/>
+            <a:ext cx="987120" cy="985680"/>
           </a:xfrm>
           <a:prstGeom prst="rtTriangle">
             <a:avLst/>
@@ -7525,7 +7526,7 @@
         <p:spPr>
           <a:xfrm>
             <a:off x="7170120" y="3903840"/>
-            <a:ext cx="987480" cy="986040"/>
+            <a:ext cx="987120" cy="985680"/>
           </a:xfrm>
           <a:prstGeom prst="rect">
             <a:avLst/>
@@ -7552,8 +7553,8 @@
         </p:nvSpPr>
         <p:spPr>
           <a:xfrm rot="10800000">
-            <a:off x="13097520" y="8839440"/>
-            <a:ext cx="987480" cy="986040"/>
+            <a:off x="14085000" y="9825480"/>
+            <a:ext cx="987120" cy="985680"/>
           </a:xfrm>
           <a:prstGeom prst="rtTriangle">
             <a:avLst/>
@@ -7581,7 +7582,7 @@
         <p:spPr>
           <a:xfrm>
             <a:off x="0" y="4891680"/>
-            <a:ext cx="9142200" cy="250200"/>
+            <a:ext cx="9141840" cy="249840"/>
           </a:xfrm>
           <a:prstGeom prst="rect">
             <a:avLst/>
@@ -7965,7 +7966,7 @@
         <p:spPr>
           <a:xfrm>
             <a:off x="597960" y="1775160"/>
-            <a:ext cx="8220240" cy="837000"/>
+            <a:ext cx="8219880" cy="836640"/>
           </a:xfrm>
           <a:prstGeom prst="rect">
             <a:avLst/>
@@ -8027,7 +8028,7 @@
         <p:spPr>
           <a:xfrm>
             <a:off x="597960" y="2715840"/>
-            <a:ext cx="8220240" cy="431280"/>
+            <a:ext cx="8219880" cy="430920"/>
           </a:xfrm>
           <a:prstGeom prst="rect">
             <a:avLst/>
@@ -8177,7 +8178,7 @@
         <p:spPr>
           <a:xfrm>
             <a:off x="5029200" y="879120"/>
-            <a:ext cx="4122720" cy="2228400"/>
+            <a:ext cx="4122360" cy="2228040"/>
           </a:xfrm>
           <a:prstGeom prst="rect">
             <a:avLst/>
@@ -8200,7 +8201,7 @@
         <p:spPr>
           <a:xfrm>
             <a:off x="3840480" y="1366200"/>
-            <a:ext cx="5211000" cy="2930400"/>
+            <a:ext cx="5210640" cy="2930040"/>
           </a:xfrm>
           <a:prstGeom prst="rect">
             <a:avLst/>
@@ -8223,7 +8224,7 @@
         <p:spPr>
           <a:xfrm>
             <a:off x="4663440" y="1200240"/>
-            <a:ext cx="7131240" cy="4010760"/>
+            <a:ext cx="7130880" cy="4010400"/>
           </a:xfrm>
           <a:prstGeom prst="rect">
             <a:avLst/>
@@ -8246,7 +8247,7 @@
         <p:spPr>
           <a:xfrm>
             <a:off x="731520" y="276480"/>
-            <a:ext cx="675000" cy="636840"/>
+            <a:ext cx="674640" cy="636480"/>
           </a:xfrm>
           <a:prstGeom prst="rect">
             <a:avLst/>
@@ -8269,7 +8270,7 @@
         <p:spPr>
           <a:xfrm>
             <a:off x="731520" y="642240"/>
-            <a:ext cx="675000" cy="636840"/>
+            <a:ext cx="674640" cy="636480"/>
           </a:xfrm>
           <a:prstGeom prst="rect">
             <a:avLst/>
@@ -8292,7 +8293,7 @@
         <p:spPr>
           <a:xfrm>
             <a:off x="1152720" y="642240"/>
-            <a:ext cx="675000" cy="636840"/>
+            <a:ext cx="674640" cy="636480"/>
           </a:xfrm>
           <a:prstGeom prst="rect">
             <a:avLst/>
@@ -8315,7 +8316,7 @@
         <p:spPr>
           <a:xfrm>
             <a:off x="1152720" y="1008000"/>
-            <a:ext cx="675000" cy="636840"/>
+            <a:ext cx="674640" cy="636480"/>
           </a:xfrm>
           <a:prstGeom prst="rect">
             <a:avLst/>
@@ -8338,7 +8339,7 @@
         <p:spPr>
           <a:xfrm>
             <a:off x="6090480" y="182880"/>
-            <a:ext cx="675000" cy="636840"/>
+            <a:ext cx="674640" cy="636480"/>
           </a:xfrm>
           <a:prstGeom prst="rect">
             <a:avLst/>
@@ -8361,7 +8362,7 @@
         <p:spPr>
           <a:xfrm>
             <a:off x="6492240" y="182880"/>
-            <a:ext cx="675000" cy="636840"/>
+            <a:ext cx="674640" cy="636480"/>
           </a:xfrm>
           <a:prstGeom prst="rect">
             <a:avLst/>
@@ -8384,7 +8385,7 @@
         <p:spPr>
           <a:xfrm>
             <a:off x="6492240" y="562320"/>
-            <a:ext cx="675000" cy="636840"/>
+            <a:ext cx="674640" cy="636480"/>
           </a:xfrm>
           <a:prstGeom prst="rect">
             <a:avLst/>
@@ -8455,7 +8456,7 @@
         <p:spPr>
           <a:xfrm>
             <a:off x="311760" y="410040"/>
-            <a:ext cx="8518680" cy="605880"/>
+            <a:ext cx="8518320" cy="605520"/>
           </a:xfrm>
           <a:prstGeom prst="rect">
             <a:avLst/>
@@ -8517,7 +8518,7 @@
         <p:spPr>
           <a:xfrm>
             <a:off x="311760" y="1229760"/>
-            <a:ext cx="4030920" cy="3349080"/>
+            <a:ext cx="4030560" cy="3348720"/>
           </a:xfrm>
           <a:prstGeom prst="rect">
             <a:avLst/>
@@ -8536,7 +8537,7 @@
         <p:txBody>
           <a:bodyPr lIns="90000" rIns="90000" tIns="91440" bIns="91440"/>
           <a:p>
-            <a:pPr marL="457200" indent="-226800">
+            <a:pPr marL="457200" indent="-226440">
               <a:lnSpc>
                 <a:spcPct val="100000"/>
               </a:lnSpc>
@@ -8664,7 +8665,7 @@
             </a:endParaRPr>
           </a:p>
           <a:p>
-            <a:pPr marL="457200" indent="-226800">
+            <a:pPr marL="457200" indent="-226440">
               <a:lnSpc>
                 <a:spcPct val="100000"/>
               </a:lnSpc>
@@ -8732,7 +8733,7 @@
             </a:endParaRPr>
           </a:p>
           <a:p>
-            <a:pPr marL="457200" indent="-226800">
+            <a:pPr marL="457200" indent="-226440">
               <a:lnSpc>
                 <a:spcPct val="100000"/>
               </a:lnSpc>
@@ -8814,7 +8815,7 @@
         <p:spPr>
           <a:xfrm>
             <a:off x="4279680" y="193680"/>
-            <a:ext cx="1150560" cy="731520"/>
+            <a:ext cx="1150200" cy="731160"/>
           </a:xfrm>
           <a:prstGeom prst="rect">
             <a:avLst/>
@@ -8822,6 +8823,11 @@
           <a:ln>
             <a:noFill/>
           </a:ln>
+          <a:effectLst>
+            <a:outerShdw dist="101823" dir="2700000">
+              <a:srgbClr val="808080"/>
+            </a:outerShdw>
+          </a:effectLst>
         </p:spPr>
       </p:pic>
       <p:pic>
@@ -8837,7 +8843,7 @@
         <p:spPr>
           <a:xfrm>
             <a:off x="4468320" y="1137960"/>
-            <a:ext cx="4548240" cy="2855880"/>
+            <a:ext cx="4547880" cy="2855520"/>
           </a:xfrm>
           <a:prstGeom prst="rect">
             <a:avLst/>
@@ -8845,6 +8851,11 @@
           <a:ln>
             <a:noFill/>
           </a:ln>
+          <a:effectLst>
+            <a:outerShdw dist="101823" dir="2700000">
+              <a:srgbClr val="808080"/>
+            </a:outerShdw>
+          </a:effectLst>
         </p:spPr>
       </p:pic>
     </p:spTree>
@@ -8908,7 +8919,7 @@
         <p:spPr>
           <a:xfrm>
             <a:off x="311760" y="410040"/>
-            <a:ext cx="8518680" cy="605880"/>
+            <a:ext cx="8518320" cy="605520"/>
           </a:xfrm>
           <a:prstGeom prst="rect">
             <a:avLst/>
@@ -8970,7 +8981,7 @@
         <p:spPr>
           <a:xfrm>
             <a:off x="311760" y="1229760"/>
-            <a:ext cx="3873240" cy="3382920"/>
+            <a:ext cx="3872880" cy="3382560"/>
           </a:xfrm>
           <a:prstGeom prst="rect">
             <a:avLst/>
@@ -9159,7 +9170,7 @@
         <p:spPr>
           <a:xfrm>
             <a:off x="4431960" y="592920"/>
-            <a:ext cx="1741320" cy="1074600"/>
+            <a:ext cx="1740960" cy="1074240"/>
           </a:xfrm>
           <a:prstGeom prst="rect">
             <a:avLst/>
@@ -9167,6 +9178,11 @@
           <a:ln>
             <a:noFill/>
           </a:ln>
+          <a:effectLst>
+            <a:outerShdw dist="101823" dir="2700000">
+              <a:srgbClr val="808080"/>
+            </a:outerShdw>
+          </a:effectLst>
         </p:spPr>
       </p:pic>
       <p:sp>
@@ -9178,7 +9194,7 @@
         <p:spPr>
           <a:xfrm>
             <a:off x="5728680" y="2836080"/>
-            <a:ext cx="2294280" cy="662400"/>
+            <a:ext cx="2293920" cy="662040"/>
           </a:xfrm>
           <a:prstGeom prst="rect">
             <a:avLst/>
@@ -9322,7 +9338,7 @@
         <p:spPr>
           <a:xfrm>
             <a:off x="311760" y="410040"/>
-            <a:ext cx="8518680" cy="605880"/>
+            <a:ext cx="8518320" cy="605520"/>
           </a:xfrm>
           <a:prstGeom prst="rect">
             <a:avLst/>
@@ -9384,7 +9400,7 @@
         <p:spPr>
           <a:xfrm>
             <a:off x="311760" y="1229760"/>
-            <a:ext cx="8386560" cy="3337920"/>
+            <a:ext cx="8386200" cy="3337560"/>
           </a:xfrm>
           <a:prstGeom prst="rect">
             <a:avLst/>
@@ -9591,7 +9607,7 @@
         <p:spPr>
           <a:xfrm>
             <a:off x="311760" y="410040"/>
-            <a:ext cx="8518680" cy="605880"/>
+            <a:ext cx="8518320" cy="605520"/>
           </a:xfrm>
           <a:prstGeom prst="rect">
             <a:avLst/>
@@ -9653,7 +9669,7 @@
         <p:spPr>
           <a:xfrm>
             <a:off x="311760" y="1229760"/>
-            <a:ext cx="3367080" cy="1074960"/>
+            <a:ext cx="3366720" cy="1074600"/>
           </a:xfrm>
           <a:prstGeom prst="rect">
             <a:avLst/>
@@ -9749,7 +9765,7 @@
         <p:spPr>
           <a:xfrm>
             <a:off x="311760" y="2352240"/>
-            <a:ext cx="2590200" cy="2327760"/>
+            <a:ext cx="2589840" cy="2327400"/>
           </a:xfrm>
           <a:prstGeom prst="rect">
             <a:avLst/>
@@ -9772,7 +9788,7 @@
         <p:spPr>
           <a:xfrm>
             <a:off x="5126760" y="869760"/>
-            <a:ext cx="3504960" cy="3199320"/>
+            <a:ext cx="3504600" cy="3198960"/>
           </a:xfrm>
           <a:prstGeom prst="rect">
             <a:avLst/>
@@ -9791,7 +9807,7 @@
         <p:spPr>
           <a:xfrm>
             <a:off x="3415680" y="2093400"/>
-            <a:ext cx="1709280" cy="1450080"/>
+            <a:ext cx="1708920" cy="1449720"/>
           </a:xfrm>
           <a:prstGeom prst="rightArrow">
             <a:avLst>
@@ -9877,7 +9893,7 @@
         <p:spPr>
           <a:xfrm>
             <a:off x="457200" y="0"/>
-            <a:ext cx="8228880" cy="617400"/>
+            <a:ext cx="8228520" cy="617040"/>
           </a:xfrm>
           <a:prstGeom prst="rect">
             <a:avLst/>
@@ -9912,6 +9928,7 @@
                   </a:solidFill>
                 </a:uFill>
                 <a:latin typeface="Roboto"/>
+                <a:ea typeface="DejaVu Sans"/>
               </a:rPr>
               <a:t>Effect “Animation-oriented” mode</a:t>
             </a:r>
@@ -9942,7 +9959,7 @@
         <p:spPr>
           <a:xfrm>
             <a:off x="2079360" y="1188720"/>
-            <a:ext cx="4687200" cy="2468880"/>
+            <a:ext cx="4686840" cy="2468520"/>
           </a:xfrm>
           <a:prstGeom prst="rect">
             <a:avLst/>
@@ -9951,7 +9968,7 @@
             <a:noFill/>
           </a:ln>
           <a:effectLst>
-            <a:outerShdw dist="101823" dir="2700000">
+            <a:outerShdw dir="2700000" dist="101823">
               <a:srgbClr val="808080"/>
             </a:outerShdw>
           </a:effectLst>
@@ -9966,7 +9983,7 @@
         <p:spPr>
           <a:xfrm>
             <a:off x="2926080" y="1737360"/>
-            <a:ext cx="2194560" cy="1645920"/>
+            <a:ext cx="2194200" cy="1645560"/>
           </a:xfrm>
           <a:prstGeom prst="ellipse">
             <a:avLst/>
@@ -9988,14 +10005,14 @@
       </p:sp>
       <p:sp>
         <p:nvSpPr>
-          <p:cNvPr id="244" name="TextShape 3"/>
-          <p:cNvSpPr txBox="1"/>
+          <p:cNvPr id="244" name="CustomShape 3"/>
+          <p:cNvSpPr/>
           <p:nvPr/>
         </p:nvSpPr>
         <p:spPr>
           <a:xfrm>
             <a:off x="3657600" y="3931920"/>
-            <a:ext cx="1097280" cy="274320"/>
+            <a:ext cx="1096920" cy="273960"/>
           </a:xfrm>
           <a:prstGeom prst="rect">
             <a:avLst/>
@@ -10005,6 +10022,12 @@
             <a:noFill/>
           </a:ln>
         </p:spPr>
+        <p:style>
+          <a:lnRef idx="0"/>
+          <a:fillRef idx="0"/>
+          <a:effectRef idx="0"/>
+          <a:fontRef idx="minor"/>
+        </p:style>
         <p:txBody>
           <a:bodyPr lIns="90000" rIns="90000" tIns="45000" bIns="45000"/>
           <a:p>
@@ -10022,7 +10045,7 @@
               </a:rPr>
               <a:t>Preview board</a:t>
             </a:r>
-            <a:endParaRPr i="1" lang="en-US" sz="1000" spc="-1" strike="noStrike">
+            <a:endParaRPr lang="en-US" sz="1800" spc="-1" strike="noStrike">
               <a:solidFill>
                 <a:srgbClr val="000000"/>
               </a:solidFill>
@@ -10073,7 +10096,7 @@
         <p:spPr>
           <a:xfrm>
             <a:off x="2011680" y="1371600"/>
-            <a:ext cx="2926080" cy="365760"/>
+            <a:ext cx="2925720" cy="365400"/>
           </a:xfrm>
           <a:prstGeom prst="ellipse">
             <a:avLst/>
@@ -10095,14 +10118,14 @@
       </p:sp>
       <p:sp>
         <p:nvSpPr>
-          <p:cNvPr id="247" name="TextShape 6"/>
-          <p:cNvSpPr txBox="1"/>
+          <p:cNvPr id="247" name="CustomShape 6"/>
+          <p:cNvSpPr/>
           <p:nvPr/>
         </p:nvSpPr>
         <p:spPr>
           <a:xfrm>
             <a:off x="3474720" y="731520"/>
-            <a:ext cx="822960" cy="232200"/>
+            <a:ext cx="822600" cy="231840"/>
           </a:xfrm>
           <a:prstGeom prst="rect">
             <a:avLst/>
@@ -10112,6 +10135,12 @@
             <a:noFill/>
           </a:ln>
         </p:spPr>
+        <p:style>
+          <a:lnRef idx="0"/>
+          <a:fillRef idx="0"/>
+          <a:effectRef idx="0"/>
+          <a:fontRef idx="minor"/>
+        </p:style>
         <p:txBody>
           <a:bodyPr lIns="90000" rIns="90000" tIns="45000" bIns="45000"/>
           <a:p>
@@ -10129,7 +10158,7 @@
               </a:rPr>
               <a:t>Frames</a:t>
             </a:r>
-            <a:endParaRPr i="1" lang="en-US" sz="1000" spc="-1" strike="noStrike">
+            <a:endParaRPr lang="en-US" sz="1800" spc="-1" strike="noStrike">
               <a:solidFill>
                 <a:srgbClr val="000000"/>
               </a:solidFill>
@@ -10180,7 +10209,7 @@
         <p:spPr>
           <a:xfrm>
             <a:off x="5303880" y="1188720"/>
-            <a:ext cx="1645560" cy="365760"/>
+            <a:ext cx="1645200" cy="365400"/>
           </a:xfrm>
           <a:prstGeom prst="ellipse">
             <a:avLst/>
@@ -10202,14 +10231,14 @@
       </p:sp>
       <p:sp>
         <p:nvSpPr>
-          <p:cNvPr id="250" name="TextShape 9"/>
-          <p:cNvSpPr txBox="1"/>
+          <p:cNvPr id="250" name="CustomShape 9"/>
+          <p:cNvSpPr/>
           <p:nvPr/>
         </p:nvSpPr>
         <p:spPr>
           <a:xfrm>
             <a:off x="6492240" y="617400"/>
-            <a:ext cx="1097280" cy="232200"/>
+            <a:ext cx="1096920" cy="231840"/>
           </a:xfrm>
           <a:prstGeom prst="rect">
             <a:avLst/>
@@ -10219,6 +10248,12 @@
             <a:noFill/>
           </a:ln>
         </p:spPr>
+        <p:style>
+          <a:lnRef idx="0"/>
+          <a:fillRef idx="0"/>
+          <a:effectRef idx="0"/>
+          <a:fontRef idx="minor"/>
+        </p:style>
         <p:txBody>
           <a:bodyPr lIns="90000" rIns="90000" tIns="45000" bIns="45000"/>
           <a:p>
@@ -10236,7 +10271,7 @@
               </a:rPr>
               <a:t>Shortcut menu</a:t>
             </a:r>
-            <a:endParaRPr i="1" lang="en-US" sz="1000" spc="-1" strike="noStrike">
+            <a:endParaRPr lang="en-US" sz="1800" spc="-1" strike="noStrike">
               <a:solidFill>
                 <a:srgbClr val="000000"/>
               </a:solidFill>
@@ -10287,7 +10322,7 @@
         <p:spPr>
           <a:xfrm>
             <a:off x="2011680" y="1920240"/>
-            <a:ext cx="731520" cy="731520"/>
+            <a:ext cx="731160" cy="731160"/>
           </a:xfrm>
           <a:prstGeom prst="ellipse">
             <a:avLst/>
@@ -10309,14 +10344,14 @@
       </p:sp>
       <p:sp>
         <p:nvSpPr>
-          <p:cNvPr id="253" name="TextShape 12"/>
-          <p:cNvSpPr txBox="1"/>
+          <p:cNvPr id="253" name="CustomShape 12"/>
+          <p:cNvSpPr/>
           <p:nvPr/>
         </p:nvSpPr>
         <p:spPr>
           <a:xfrm>
             <a:off x="548640" y="2011680"/>
-            <a:ext cx="1280160" cy="374040"/>
+            <a:ext cx="1279800" cy="373680"/>
           </a:xfrm>
           <a:prstGeom prst="rect">
             <a:avLst/>
@@ -10326,6 +10361,12 @@
             <a:noFill/>
           </a:ln>
         </p:spPr>
+        <p:style>
+          <a:lnRef idx="0"/>
+          <a:fillRef idx="0"/>
+          <a:effectRef idx="0"/>
+          <a:fontRef idx="minor"/>
+        </p:style>
         <p:txBody>
           <a:bodyPr lIns="90000" rIns="90000" tIns="45000" bIns="45000"/>
           <a:p>
@@ -10343,7 +10384,7 @@
               </a:rPr>
               <a:t>Opens the animation folder</a:t>
             </a:r>
-            <a:endParaRPr i="1" lang="en-US" sz="1000" spc="-1" strike="noStrike">
+            <a:endParaRPr lang="en-US" sz="1800" spc="-1" strike="noStrike">
               <a:solidFill>
                 <a:srgbClr val="000000"/>
               </a:solidFill>
@@ -10394,7 +10435,7 @@
         <p:spPr>
           <a:xfrm>
             <a:off x="2011680" y="2743200"/>
-            <a:ext cx="731520" cy="731520"/>
+            <a:ext cx="731160" cy="731160"/>
           </a:xfrm>
           <a:prstGeom prst="ellipse">
             <a:avLst/>
@@ -10416,14 +10457,14 @@
       </p:sp>
       <p:sp>
         <p:nvSpPr>
-          <p:cNvPr id="256" name="TextShape 15"/>
-          <p:cNvSpPr txBox="1"/>
+          <p:cNvPr id="256" name="CustomShape 15"/>
+          <p:cNvSpPr/>
           <p:nvPr/>
         </p:nvSpPr>
         <p:spPr>
           <a:xfrm>
             <a:off x="822960" y="2926080"/>
-            <a:ext cx="914400" cy="274320"/>
+            <a:ext cx="914040" cy="273960"/>
           </a:xfrm>
           <a:prstGeom prst="rect">
             <a:avLst/>
@@ -10433,6 +10474,12 @@
             <a:noFill/>
           </a:ln>
         </p:spPr>
+        <p:style>
+          <a:lnRef idx="0"/>
+          <a:fillRef idx="0"/>
+          <a:effectRef idx="0"/>
+          <a:fontRef idx="minor"/>
+        </p:style>
         <p:txBody>
           <a:bodyPr lIns="90000" rIns="90000" tIns="45000" bIns="45000"/>
           <a:p>
@@ -10450,7 +10497,7 @@
               </a:rPr>
               <a:t>Filter pallet</a:t>
             </a:r>
-            <a:endParaRPr i="1" lang="en-US" sz="1000" spc="-1" strike="noStrike">
+            <a:endParaRPr lang="en-US" sz="1800" spc="-1" strike="noStrike">
               <a:solidFill>
                 <a:srgbClr val="000000"/>
               </a:solidFill>
@@ -10501,7 +10548,7 @@
         <p:spPr>
           <a:xfrm>
             <a:off x="5577840" y="1645920"/>
-            <a:ext cx="1280160" cy="1097280"/>
+            <a:ext cx="1279800" cy="1096920"/>
           </a:xfrm>
           <a:prstGeom prst="ellipse">
             <a:avLst/>
@@ -10523,14 +10570,14 @@
       </p:sp>
       <p:sp>
         <p:nvSpPr>
-          <p:cNvPr id="259" name="TextShape 18"/>
-          <p:cNvSpPr txBox="1"/>
+          <p:cNvPr id="259" name="CustomShape 18"/>
+          <p:cNvSpPr/>
           <p:nvPr/>
         </p:nvSpPr>
         <p:spPr>
           <a:xfrm>
             <a:off x="7406640" y="1596600"/>
-            <a:ext cx="1097280" cy="780840"/>
+            <a:ext cx="1096920" cy="780480"/>
           </a:xfrm>
           <a:prstGeom prst="rect">
             <a:avLst/>
@@ -10540,6 +10587,12 @@
             <a:noFill/>
           </a:ln>
         </p:spPr>
+        <p:style>
+          <a:lnRef idx="0"/>
+          <a:fillRef idx="0"/>
+          <a:effectRef idx="0"/>
+          <a:fontRef idx="minor"/>
+        </p:style>
         <p:txBody>
           <a:bodyPr lIns="90000" rIns="90000" tIns="45000" bIns="45000"/>
           <a:p>
@@ -10557,7 +10610,7 @@
               </a:rPr>
               <a:t>Selected filters and commands to preview and apply filters</a:t>
             </a:r>
-            <a:endParaRPr i="1" lang="en-US" sz="1000" spc="-1" strike="noStrike">
+            <a:endParaRPr lang="en-US" sz="1800" spc="-1" strike="noStrike">
               <a:solidFill>
                 <a:srgbClr val="000000"/>
               </a:solidFill>
@@ -10608,7 +10661,7 @@
         <p:spPr>
           <a:xfrm>
             <a:off x="5303520" y="2743200"/>
-            <a:ext cx="1280160" cy="914400"/>
+            <a:ext cx="1279800" cy="914040"/>
           </a:xfrm>
           <a:prstGeom prst="ellipse">
             <a:avLst/>
@@ -10630,14 +10683,14 @@
       </p:sp>
       <p:sp>
         <p:nvSpPr>
-          <p:cNvPr id="262" name="TextShape 21"/>
-          <p:cNvSpPr txBox="1"/>
+          <p:cNvPr id="262" name="CustomShape 21"/>
+          <p:cNvSpPr/>
           <p:nvPr/>
         </p:nvSpPr>
         <p:spPr>
           <a:xfrm>
             <a:off x="6217920" y="4015080"/>
-            <a:ext cx="1554480" cy="374040"/>
+            <a:ext cx="1554120" cy="373680"/>
           </a:xfrm>
           <a:prstGeom prst="rect">
             <a:avLst/>
@@ -10647,6 +10700,12 @@
             <a:noFill/>
           </a:ln>
         </p:spPr>
+        <p:style>
+          <a:lnRef idx="0"/>
+          <a:fillRef idx="0"/>
+          <a:effectRef idx="0"/>
+          <a:fontRef idx="minor"/>
+        </p:style>
         <p:txBody>
           <a:bodyPr lIns="90000" rIns="90000" tIns="45000" bIns="45000"/>
           <a:p>
@@ -10664,7 +10723,7 @@
               </a:rPr>
               <a:t>Filter configuration panel</a:t>
             </a:r>
-            <a:endParaRPr i="1" lang="en-US" sz="1000" spc="-1" strike="noStrike">
+            <a:endParaRPr lang="en-US" sz="1800" spc="-1" strike="noStrike">
               <a:solidFill>
                 <a:srgbClr val="000000"/>
               </a:solidFill>
@@ -10715,7 +10774,7 @@
         <p:spPr>
           <a:xfrm>
             <a:off x="5212440" y="2011680"/>
-            <a:ext cx="273960" cy="274320"/>
+            <a:ext cx="273600" cy="273960"/>
           </a:xfrm>
           <a:prstGeom prst="ellipse">
             <a:avLst/>
@@ -10737,14 +10796,14 @@
       </p:sp>
       <p:sp>
         <p:nvSpPr>
-          <p:cNvPr id="265" name="TextShape 24"/>
-          <p:cNvSpPr txBox="1"/>
+          <p:cNvPr id="265" name="CustomShape 24"/>
+          <p:cNvSpPr/>
           <p:nvPr/>
         </p:nvSpPr>
         <p:spPr>
           <a:xfrm>
             <a:off x="4572000" y="631800"/>
-            <a:ext cx="1554480" cy="374040"/>
+            <a:ext cx="1554120" cy="373680"/>
           </a:xfrm>
           <a:prstGeom prst="rect">
             <a:avLst/>
@@ -10754,6 +10813,12 @@
             <a:noFill/>
           </a:ln>
         </p:spPr>
+        <p:style>
+          <a:lnRef idx="0"/>
+          <a:fillRef idx="0"/>
+          <a:effectRef idx="0"/>
+          <a:fontRef idx="minor"/>
+        </p:style>
         <p:txBody>
           <a:bodyPr lIns="90000" rIns="90000" tIns="45000" bIns="45000"/>
           <a:p>
@@ -10769,9 +10834,9 @@
                 </a:uFill>
                 <a:latin typeface="Arial"/>
               </a:rPr>
-              <a:t>Fit frame in preview board</a:t>
+              <a:t>Fits frame in preview board</a:t>
             </a:r>
-            <a:endParaRPr i="1" lang="en-US" sz="1000" spc="-1" strike="noStrike">
+            <a:endParaRPr lang="en-US" sz="1800" spc="-1" strike="noStrike">
               <a:solidFill>
                 <a:srgbClr val="000000"/>
               </a:solidFill>
@@ -10867,14 +10932,14 @@
       </p:grpSpPr>
       <p:sp>
         <p:nvSpPr>
-          <p:cNvPr id="267" name="TextShape 1"/>
-          <p:cNvSpPr txBox="1"/>
+          <p:cNvPr id="267" name="CustomShape 1"/>
+          <p:cNvSpPr/>
           <p:nvPr/>
         </p:nvSpPr>
         <p:spPr>
           <a:xfrm>
             <a:off x="365760" y="288720"/>
-            <a:ext cx="5577840" cy="534240"/>
+            <a:ext cx="5577480" cy="533880"/>
           </a:xfrm>
           <a:prstGeom prst="rect">
             <a:avLst/>
@@ -10884,6 +10949,12 @@
             <a:noFill/>
           </a:ln>
         </p:spPr>
+        <p:style>
+          <a:lnRef idx="0"/>
+          <a:fillRef idx="0"/>
+          <a:effectRef idx="0"/>
+          <a:fontRef idx="minor"/>
+        </p:style>
         <p:txBody>
           <a:bodyPr lIns="90000" rIns="90000" tIns="45000" bIns="45000"/>
           <a:p>
@@ -10923,14 +10994,14 @@
       </p:sp>
       <p:sp>
         <p:nvSpPr>
-          <p:cNvPr id="268" name="TextShape 2"/>
-          <p:cNvSpPr txBox="1"/>
+          <p:cNvPr id="268" name="CustomShape 2"/>
+          <p:cNvSpPr/>
           <p:nvPr/>
         </p:nvSpPr>
         <p:spPr>
           <a:xfrm>
             <a:off x="457200" y="1005840"/>
-            <a:ext cx="8138160" cy="2394000"/>
+            <a:ext cx="8137800" cy="2393640"/>
           </a:xfrm>
           <a:prstGeom prst="rect">
             <a:avLst/>
@@ -10940,6 +11011,12 @@
             <a:noFill/>
           </a:ln>
         </p:spPr>
+        <p:style>
+          <a:lnRef idx="0"/>
+          <a:fillRef idx="0"/>
+          <a:effectRef idx="0"/>
+          <a:fontRef idx="minor"/>
+        </p:style>
         <p:txBody>
           <a:bodyPr lIns="90000" rIns="90000" tIns="45000" bIns="45000"/>
           <a:p>
@@ -11201,14 +11278,14 @@
       </p:grpSpPr>
       <p:sp>
         <p:nvSpPr>
-          <p:cNvPr id="269" name="TextShape 1"/>
-          <p:cNvSpPr txBox="1"/>
+          <p:cNvPr id="269" name="CustomShape 1"/>
+          <p:cNvSpPr/>
           <p:nvPr/>
         </p:nvSpPr>
         <p:spPr>
           <a:xfrm>
             <a:off x="457200" y="156960"/>
-            <a:ext cx="6787800" cy="483120"/>
+            <a:ext cx="6787440" cy="482760"/>
           </a:xfrm>
           <a:prstGeom prst="rect">
             <a:avLst/>
@@ -11218,6 +11295,12 @@
             <a:noFill/>
           </a:ln>
         </p:spPr>
+        <p:style>
+          <a:lnRef idx="0"/>
+          <a:fillRef idx="0"/>
+          <a:effectRef idx="0"/>
+          <a:fontRef idx="minor"/>
+        </p:style>
         <p:txBody>
           <a:bodyPr lIns="90000" rIns="90000" tIns="45000" bIns="45000"/>
           <a:p>
@@ -11241,7 +11324,7 @@
               </a:rPr>
               <a:t>Quick explanation about Animation in Blender...</a:t>
             </a:r>
-            <a:endParaRPr lang="en-US" sz="1600" spc="-1" strike="noStrike">
+            <a:endParaRPr lang="en-US" sz="1800" spc="-1" strike="noStrike">
               <a:solidFill>
                 <a:srgbClr val="000000"/>
               </a:solidFill>
@@ -11268,7 +11351,7 @@
         <p:spPr>
           <a:xfrm>
             <a:off x="2626920" y="1345320"/>
-            <a:ext cx="4139640" cy="2129400"/>
+            <a:ext cx="4139280" cy="2129040"/>
           </a:xfrm>
           <a:prstGeom prst="rect">
             <a:avLst/>
@@ -11277,7 +11360,7 @@
             <a:noFill/>
           </a:ln>
           <a:effectLst>
-            <a:outerShdw dist="101823" dir="2700000">
+            <a:outerShdw dir="2700000" dist="101823">
               <a:srgbClr val="808080"/>
             </a:outerShdw>
           </a:effectLst>
@@ -11292,7 +11375,7 @@
         <p:spPr>
           <a:xfrm>
             <a:off x="5029200" y="2743200"/>
-            <a:ext cx="1702080" cy="731520"/>
+            <a:ext cx="1701720" cy="731160"/>
           </a:xfrm>
           <a:prstGeom prst="ellipse">
             <a:avLst/>
@@ -11321,7 +11404,7 @@
         <p:spPr>
           <a:xfrm>
             <a:off x="2560320" y="1280160"/>
-            <a:ext cx="846000" cy="236520"/>
+            <a:ext cx="845640" cy="236160"/>
           </a:xfrm>
           <a:prstGeom prst="ellipse">
             <a:avLst/>
@@ -11350,7 +11433,7 @@
         <p:spPr>
           <a:xfrm>
             <a:off x="4977720" y="1345320"/>
-            <a:ext cx="1753560" cy="236520"/>
+            <a:ext cx="1753200" cy="236160"/>
           </a:xfrm>
           <a:prstGeom prst="ellipse">
             <a:avLst/>
@@ -11379,7 +11462,7 @@
         <p:spPr>
           <a:xfrm>
             <a:off x="3466800" y="1694160"/>
-            <a:ext cx="1148400" cy="1064520"/>
+            <a:ext cx="1148040" cy="1064160"/>
           </a:xfrm>
           <a:prstGeom prst="ellipse">
             <a:avLst/>
@@ -11408,7 +11491,7 @@
         <p:spPr>
           <a:xfrm>
             <a:off x="5067000" y="2140920"/>
-            <a:ext cx="968040" cy="236520"/>
+            <a:ext cx="967680" cy="236160"/>
           </a:xfrm>
           <a:prstGeom prst="ellipse">
             <a:avLst/>
@@ -11437,7 +11520,7 @@
         <p:spPr>
           <a:xfrm>
             <a:off x="2680920" y="3172680"/>
-            <a:ext cx="1693440" cy="236880"/>
+            <a:ext cx="1693080" cy="236520"/>
           </a:xfrm>
           <a:prstGeom prst="ellipse">
             <a:avLst/>
@@ -11459,14 +11542,14 @@
       </p:sp>
       <p:sp>
         <p:nvSpPr>
-          <p:cNvPr id="277" name="TextShape 8"/>
-          <p:cNvSpPr txBox="1"/>
+          <p:cNvPr id="277" name="CustomShape 8"/>
+          <p:cNvSpPr/>
           <p:nvPr/>
         </p:nvSpPr>
         <p:spPr>
           <a:xfrm>
             <a:off x="457200" y="672840"/>
-            <a:ext cx="2468880" cy="515880"/>
+            <a:ext cx="2468520" cy="515520"/>
           </a:xfrm>
           <a:prstGeom prst="rect">
             <a:avLst/>
@@ -11476,6 +11559,12 @@
             <a:noFill/>
           </a:ln>
         </p:spPr>
+        <p:style>
+          <a:lnRef idx="0"/>
+          <a:fillRef idx="0"/>
+          <a:effectRef idx="0"/>
+          <a:fontRef idx="minor"/>
+        </p:style>
         <p:txBody>
           <a:bodyPr lIns="90000" rIns="90000" tIns="45000" bIns="45000"/>
           <a:p>
@@ -11493,30 +11582,30 @@
               </a:rPr>
               <a:t>In Render menu, you can Render animation. That is the last thing that you are going to do</a:t>
             </a:r>
-            <a:endParaRPr i="1" lang="en-US" sz="1000" spc="-1" strike="noStrike">
-              <a:solidFill>
-                <a:srgbClr val="000000"/>
-              </a:solidFill>
-              <a:uFill>
-                <a:solidFill>
-                  <a:srgbClr val="ffffff"/>
-                </a:solidFill>
-              </a:uFill>
-              <a:latin typeface="Arial"/>
-            </a:endParaRPr>
-          </a:p>
-        </p:txBody>
-      </p:sp>
-      <p:sp>
-        <p:nvSpPr>
-          <p:cNvPr id="278" name="TextShape 9"/>
-          <p:cNvSpPr txBox="1"/>
+            <a:endParaRPr lang="en-US" sz="1800" spc="-1" strike="noStrike">
+              <a:solidFill>
+                <a:srgbClr val="000000"/>
+              </a:solidFill>
+              <a:uFill>
+                <a:solidFill>
+                  <a:srgbClr val="ffffff"/>
+                </a:solidFill>
+              </a:uFill>
+              <a:latin typeface="Arial"/>
+            </a:endParaRPr>
+          </a:p>
+        </p:txBody>
+      </p:sp>
+      <p:sp>
+        <p:nvSpPr>
+          <p:cNvPr id="278" name="CustomShape 9"/>
+          <p:cNvSpPr/>
           <p:nvPr/>
         </p:nvSpPr>
         <p:spPr>
           <a:xfrm>
             <a:off x="249480" y="2743200"/>
-            <a:ext cx="1853640" cy="799560"/>
+            <a:ext cx="1853280" cy="799200"/>
           </a:xfrm>
           <a:prstGeom prst="rect">
             <a:avLst/>
@@ -11526,6 +11615,12 @@
             <a:noFill/>
           </a:ln>
         </p:spPr>
+        <p:style>
+          <a:lnRef idx="0"/>
+          <a:fillRef idx="0"/>
+          <a:effectRef idx="0"/>
+          <a:fontRef idx="minor"/>
+        </p:style>
         <p:txBody>
           <a:bodyPr lIns="90000" rIns="90000" tIns="45000" bIns="45000"/>
           <a:p>
@@ -11543,30 +11638,30 @@
               </a:rPr>
               <a:t>You create objects and skeletons (called “armature”). You move the bones around the axis along the key frames to create animation</a:t>
             </a:r>
-            <a:endParaRPr i="1" lang="en-US" sz="1000" spc="-1" strike="noStrike">
-              <a:solidFill>
-                <a:srgbClr val="000000"/>
-              </a:solidFill>
-              <a:uFill>
-                <a:solidFill>
-                  <a:srgbClr val="ffffff"/>
-                </a:solidFill>
-              </a:uFill>
-              <a:latin typeface="Arial"/>
-            </a:endParaRPr>
-          </a:p>
-        </p:txBody>
-      </p:sp>
-      <p:sp>
-        <p:nvSpPr>
-          <p:cNvPr id="279" name="TextShape 10"/>
-          <p:cNvSpPr txBox="1"/>
+            <a:endParaRPr lang="en-US" sz="1800" spc="-1" strike="noStrike">
+              <a:solidFill>
+                <a:srgbClr val="000000"/>
+              </a:solidFill>
+              <a:uFill>
+                <a:solidFill>
+                  <a:srgbClr val="ffffff"/>
+                </a:solidFill>
+              </a:uFill>
+              <a:latin typeface="Arial"/>
+            </a:endParaRPr>
+          </a:p>
+        </p:txBody>
+      </p:sp>
+      <p:sp>
+        <p:nvSpPr>
+          <p:cNvPr id="279" name="CustomShape 10"/>
+          <p:cNvSpPr/>
           <p:nvPr/>
         </p:nvSpPr>
         <p:spPr>
           <a:xfrm>
             <a:off x="6400800" y="631800"/>
-            <a:ext cx="2468880" cy="515880"/>
+            <a:ext cx="2468520" cy="515520"/>
           </a:xfrm>
           <a:prstGeom prst="rect">
             <a:avLst/>
@@ -11576,6 +11671,12 @@
             <a:noFill/>
           </a:ln>
         </p:spPr>
+        <p:style>
+          <a:lnRef idx="0"/>
+          <a:fillRef idx="0"/>
+          <a:effectRef idx="0"/>
+          <a:fontRef idx="minor"/>
+        </p:style>
         <p:txBody>
           <a:bodyPr lIns="90000" rIns="90000" tIns="45000" bIns="45000"/>
           <a:p>
@@ -11593,30 +11694,30 @@
               </a:rPr>
               <a:t>The moves (position of bones) can be grouped like “Actions”, Here you have a time line</a:t>
             </a:r>
-            <a:endParaRPr i="1" lang="en-US" sz="1000" spc="-1" strike="noStrike">
-              <a:solidFill>
-                <a:srgbClr val="000000"/>
-              </a:solidFill>
-              <a:uFill>
-                <a:solidFill>
-                  <a:srgbClr val="ffffff"/>
-                </a:solidFill>
-              </a:uFill>
-              <a:latin typeface="Arial"/>
-            </a:endParaRPr>
-          </a:p>
-        </p:txBody>
-      </p:sp>
-      <p:sp>
-        <p:nvSpPr>
-          <p:cNvPr id="280" name="TextShape 11"/>
-          <p:cNvSpPr txBox="1"/>
+            <a:endParaRPr lang="en-US" sz="1800" spc="-1" strike="noStrike">
+              <a:solidFill>
+                <a:srgbClr val="000000"/>
+              </a:solidFill>
+              <a:uFill>
+                <a:solidFill>
+                  <a:srgbClr val="ffffff"/>
+                </a:solidFill>
+              </a:uFill>
+              <a:latin typeface="Arial"/>
+            </a:endParaRPr>
+          </a:p>
+        </p:txBody>
+      </p:sp>
+      <p:sp>
+        <p:nvSpPr>
+          <p:cNvPr id="280" name="CustomShape 11"/>
+          <p:cNvSpPr/>
           <p:nvPr/>
         </p:nvSpPr>
         <p:spPr>
           <a:xfrm>
             <a:off x="5760720" y="3731400"/>
-            <a:ext cx="2468880" cy="657720"/>
+            <a:ext cx="2468520" cy="657360"/>
           </a:xfrm>
           <a:prstGeom prst="rect">
             <a:avLst/>
@@ -11626,6 +11727,12 @@
             <a:noFill/>
           </a:ln>
         </p:spPr>
+        <p:style>
+          <a:lnRef idx="0"/>
+          <a:fillRef idx="0"/>
+          <a:effectRef idx="0"/>
+          <a:fontRef idx="minor"/>
+        </p:style>
         <p:txBody>
           <a:bodyPr lIns="90000" rIns="90000" tIns="45000" bIns="45000"/>
           <a:p>
@@ -11671,7 +11778,7 @@
               </a:rPr>
               <a:t>.</a:t>
             </a:r>
-            <a:endParaRPr i="1" lang="en-US" sz="1000" spc="-1" strike="noStrike">
+            <a:endParaRPr lang="en-US" sz="1800" spc="-1" strike="noStrike">
               <a:solidFill>
                 <a:srgbClr val="000000"/>
               </a:solidFill>
@@ -11907,14 +12014,14 @@
       </p:grpSpPr>
       <p:sp>
         <p:nvSpPr>
-          <p:cNvPr id="287" name="TextShape 1"/>
-          <p:cNvSpPr txBox="1"/>
+          <p:cNvPr id="287" name="CustomShape 1"/>
+          <p:cNvSpPr/>
           <p:nvPr/>
         </p:nvSpPr>
         <p:spPr>
           <a:xfrm>
             <a:off x="365760" y="288720"/>
-            <a:ext cx="8229600" cy="355680"/>
+            <a:ext cx="8229240" cy="355320"/>
           </a:xfrm>
           <a:prstGeom prst="rect">
             <a:avLst/>
@@ -11924,6 +12031,12 @@
             <a:noFill/>
           </a:ln>
         </p:spPr>
+        <p:style>
+          <a:lnRef idx="0"/>
+          <a:fillRef idx="0"/>
+          <a:effectRef idx="0"/>
+          <a:fontRef idx="minor"/>
+        </p:style>
         <p:txBody>
           <a:bodyPr lIns="90000" rIns="90000" tIns="45000" bIns="45000"/>
           <a:p>
@@ -11961,6 +12074,263 @@
           </a:p>
         </p:txBody>
       </p:sp>
+      <p:pic>
+        <p:nvPicPr>
+          <p:cNvPr id="288" name="" descr=""/>
+          <p:cNvPicPr/>
+          <p:nvPr/>
+        </p:nvPicPr>
+        <p:blipFill>
+          <a:blip r:embed="rId1"/>
+          <a:stretch/>
+        </p:blipFill>
+        <p:spPr>
+          <a:xfrm>
+            <a:off x="4248360" y="707040"/>
+            <a:ext cx="1695240" cy="2219040"/>
+          </a:xfrm>
+          <a:prstGeom prst="rect">
+            <a:avLst/>
+          </a:prstGeom>
+          <a:ln>
+            <a:noFill/>
+          </a:ln>
+          <a:effectLst>
+            <a:outerShdw dist="101823" dir="2700000">
+              <a:srgbClr val="808080"/>
+            </a:outerShdw>
+          </a:effectLst>
+        </p:spPr>
+      </p:pic>
+      <p:sp>
+        <p:nvSpPr>
+          <p:cNvPr id="289" name="CustomShape 2"/>
+          <p:cNvSpPr/>
+          <p:nvPr/>
+        </p:nvSpPr>
+        <p:spPr>
+          <a:xfrm>
+            <a:off x="182880" y="822960"/>
+            <a:ext cx="3830760" cy="2103120"/>
+          </a:xfrm>
+          <a:prstGeom prst="rect">
+            <a:avLst/>
+          </a:prstGeom>
+          <a:noFill/>
+          <a:ln>
+            <a:noFill/>
+          </a:ln>
+        </p:spPr>
+        <p:style>
+          <a:lnRef idx="0"/>
+          <a:fillRef idx="0"/>
+          <a:effectRef idx="0"/>
+          <a:fontRef idx="minor"/>
+        </p:style>
+        <p:txBody>
+          <a:bodyPr lIns="90000" rIns="90000" tIns="91440" bIns="91440"/>
+          <a:p>
+            <a:pPr marL="457200" indent="-226440">
+              <a:lnSpc>
+                <a:spcPct val="100000"/>
+              </a:lnSpc>
+              <a:buClr>
+                <a:srgbClr val="434343"/>
+              </a:buClr>
+              <a:buFont typeface="Roboto"/>
+              <a:buAutoNum type="arabicParenR"/>
+            </a:pPr>
+            <a:r>
+              <a:rPr lang="en-US" sz="1800" spc="-1" strike="noStrike">
+                <a:solidFill>
+                  <a:srgbClr val="434343"/>
+                </a:solidFill>
+                <a:uFill>
+                  <a:solidFill>
+                    <a:srgbClr val="ffffff"/>
+                  </a:solidFill>
+                </a:uFill>
+                <a:latin typeface="Roboto"/>
+                <a:ea typeface="Roboto"/>
+              </a:rPr>
+              <a:t>Select the folder which contains the images</a:t>
+            </a:r>
+            <a:endParaRPr lang="en-US" sz="1800" spc="-1" strike="noStrike">
+              <a:solidFill>
+                <a:srgbClr val="000000"/>
+              </a:solidFill>
+              <a:uFill>
+                <a:solidFill>
+                  <a:srgbClr val="ffffff"/>
+                </a:solidFill>
+              </a:uFill>
+              <a:latin typeface="Arial"/>
+            </a:endParaRPr>
+          </a:p>
+          <a:p>
+            <a:pPr marL="457200" indent="-226440">
+              <a:lnSpc>
+                <a:spcPct val="100000"/>
+              </a:lnSpc>
+              <a:buClr>
+                <a:srgbClr val="434343"/>
+              </a:buClr>
+              <a:buFont typeface="Roboto"/>
+              <a:buAutoNum type="arabicParenR"/>
+            </a:pPr>
+            <a:r>
+              <a:rPr lang="en-US" sz="1800" spc="-1" strike="noStrike">
+                <a:solidFill>
+                  <a:srgbClr val="434343"/>
+                </a:solidFill>
+                <a:uFill>
+                  <a:solidFill>
+                    <a:srgbClr val="ffffff"/>
+                  </a:solidFill>
+                </a:uFill>
+                <a:latin typeface="Roboto"/>
+                <a:ea typeface="Roboto"/>
+              </a:rPr>
+              <a:t>After that, note the </a:t>
+            </a:r>
+            <a:r>
+              <a:rPr b="1" lang="en-US" sz="1800" spc="-1" strike="noStrike">
+                <a:solidFill>
+                  <a:srgbClr val="434343"/>
+                </a:solidFill>
+                <a:uFill>
+                  <a:solidFill>
+                    <a:srgbClr val="ffffff"/>
+                  </a:solidFill>
+                </a:uFill>
+                <a:latin typeface="Roboto"/>
+                <a:ea typeface="Roboto"/>
+              </a:rPr>
+              <a:t>Toolbox/Effect filters</a:t>
+            </a:r>
+            <a:r>
+              <a:rPr lang="en-US" sz="1800" spc="-1" strike="noStrike">
+                <a:solidFill>
+                  <a:srgbClr val="434343"/>
+                </a:solidFill>
+                <a:uFill>
+                  <a:solidFill>
+                    <a:srgbClr val="ffffff"/>
+                  </a:solidFill>
+                </a:uFill>
+                <a:latin typeface="Roboto"/>
+                <a:ea typeface="Roboto"/>
+              </a:rPr>
+              <a:t>. It will have filled with filters. Open a group and give a double-click over it to select a filter that you desire.</a:t>
+            </a:r>
+            <a:endParaRPr lang="en-US" sz="1800" spc="-1" strike="noStrike">
+              <a:solidFill>
+                <a:srgbClr val="000000"/>
+              </a:solidFill>
+              <a:uFill>
+                <a:solidFill>
+                  <a:srgbClr val="ffffff"/>
+                </a:solidFill>
+              </a:uFill>
+              <a:latin typeface="Arial"/>
+            </a:endParaRPr>
+          </a:p>
+          <a:p>
+            <a:pPr marL="457200" indent="-226440">
+              <a:lnSpc>
+                <a:spcPct val="100000"/>
+              </a:lnSpc>
+              <a:buClr>
+                <a:srgbClr val="434343"/>
+              </a:buClr>
+              <a:buFont typeface="Roboto"/>
+              <a:buAutoNum type="arabicParenR"/>
+            </a:pPr>
+            <a:r>
+              <a:rPr lang="en-US" sz="1800" spc="-1" strike="noStrike">
+                <a:solidFill>
+                  <a:srgbClr val="434343"/>
+                </a:solidFill>
+                <a:uFill>
+                  <a:solidFill>
+                    <a:srgbClr val="ffffff"/>
+                  </a:solidFill>
+                </a:uFill>
+                <a:latin typeface="Roboto"/>
+                <a:ea typeface="Roboto"/>
+              </a:rPr>
+              <a:t>Note the right panel. The selected filters will show up. You can remove them if you want. </a:t>
+            </a:r>
+            <a:endParaRPr lang="en-US" sz="1800" spc="-1" strike="noStrike">
+              <a:solidFill>
+                <a:srgbClr val="000000"/>
+              </a:solidFill>
+              <a:uFill>
+                <a:solidFill>
+                  <a:srgbClr val="ffffff"/>
+                </a:solidFill>
+              </a:uFill>
+              <a:latin typeface="Arial"/>
+            </a:endParaRPr>
+          </a:p>
+        </p:txBody>
+      </p:sp>
+      <p:pic>
+        <p:nvPicPr>
+          <p:cNvPr id="290" name="" descr=""/>
+          <p:cNvPicPr/>
+          <p:nvPr/>
+        </p:nvPicPr>
+        <p:blipFill>
+          <a:blip r:embed="rId2"/>
+          <a:stretch/>
+        </p:blipFill>
+        <p:spPr>
+          <a:xfrm>
+            <a:off x="4998960" y="1737360"/>
+            <a:ext cx="1676160" cy="2962080"/>
+          </a:xfrm>
+          <a:prstGeom prst="rect">
+            <a:avLst/>
+          </a:prstGeom>
+          <a:ln>
+            <a:noFill/>
+          </a:ln>
+          <a:effectLst>
+            <a:outerShdw dist="101823" dir="2700000">
+              <a:srgbClr val="808080"/>
+            </a:outerShdw>
+          </a:effectLst>
+        </p:spPr>
+      </p:pic>
+      <p:pic>
+        <p:nvPicPr>
+          <p:cNvPr id="291" name="" descr=""/>
+          <p:cNvPicPr/>
+          <p:nvPr/>
+        </p:nvPicPr>
+        <p:blipFill>
+          <a:blip r:embed="rId3"/>
+          <a:stretch/>
+        </p:blipFill>
+        <p:spPr>
+          <a:xfrm>
+            <a:off x="6364800" y="794880"/>
+            <a:ext cx="2504880" cy="2314080"/>
+          </a:xfrm>
+          <a:prstGeom prst="rect">
+            <a:avLst/>
+          </a:prstGeom>
+          <a:ln>
+            <a:noFill/>
+          </a:ln>
+          <a:effectLst>
+            <a:outerShdw dist="101823" dir="2700000">
+              <a:srgbClr val="808080"/>
+            </a:outerShdw>
+          </a:effectLst>
+        </p:spPr>
+      </p:pic>
     </p:spTree>
   </p:cSld>
   <p:transition spd="slow">
@@ -11996,6 +12366,31 @@
 </p:sld>
 </file>
 
+<file path=ppt/slides/slide18.xml><?xml version="1.0" encoding="utf-8"?>
+<p:sld xmlns:a="http://schemas.openxmlformats.org/drawingml/2006/main" xmlns:p="http://schemas.openxmlformats.org/presentationml/2006/main" xmlns:r="http://schemas.openxmlformats.org/officeDocument/2006/relationships">
+  <p:cSld>
+    <p:spTree>
+      <p:nvGrpSpPr>
+        <p:cNvPr id="1" name=""/>
+        <p:cNvGrpSpPr/>
+        <p:nvPr/>
+      </p:nvGrpSpPr>
+      <p:grpSpPr>
+        <a:xfrm>
+          <a:off x="0" y="0"/>
+          <a:ext cx="0" cy="0"/>
+          <a:chOff x="0" y="0"/>
+          <a:chExt cx="0" cy="0"/>
+        </a:xfrm>
+      </p:grpSpPr>
+    </p:spTree>
+  </p:cSld>
+  <p:transition spd="slow">
+    <p:fade/>
+  </p:transition>
+</p:sld>
+</file>
+
 <file path=ppt/slides/slide2.xml><?xml version="1.0" encoding="utf-8"?>
 <p:sld xmlns:a="http://schemas.openxmlformats.org/drawingml/2006/main" xmlns:p="http://schemas.openxmlformats.org/presentationml/2006/main" xmlns:r="http://schemas.openxmlformats.org/officeDocument/2006/relationships">
   <p:cSld>
@@ -12022,7 +12417,7 @@
         <p:spPr>
           <a:xfrm>
             <a:off x="311760" y="410040"/>
-            <a:ext cx="8518680" cy="605880"/>
+            <a:ext cx="8518320" cy="605520"/>
           </a:xfrm>
           <a:prstGeom prst="rect">
             <a:avLst/>
@@ -12084,7 +12479,7 @@
         <p:spPr>
           <a:xfrm>
             <a:off x="311760" y="1229760"/>
-            <a:ext cx="8518680" cy="3337200"/>
+            <a:ext cx="8518320" cy="3336840"/>
           </a:xfrm>
           <a:prstGeom prst="rect">
             <a:avLst/>
@@ -12310,7 +12705,7 @@
         <p:spPr>
           <a:xfrm>
             <a:off x="311760" y="410040"/>
-            <a:ext cx="8518680" cy="605880"/>
+            <a:ext cx="8518320" cy="605520"/>
           </a:xfrm>
           <a:prstGeom prst="rect">
             <a:avLst/>
@@ -12372,7 +12767,7 @@
         <p:spPr>
           <a:xfrm>
             <a:off x="311760" y="1229760"/>
-            <a:ext cx="8518680" cy="3337200"/>
+            <a:ext cx="8518320" cy="3336840"/>
           </a:xfrm>
           <a:prstGeom prst="rect">
             <a:avLst/>
@@ -12580,7 +12975,7 @@
         <p:spPr>
           <a:xfrm>
             <a:off x="311760" y="410040"/>
-            <a:ext cx="8518680" cy="605880"/>
+            <a:ext cx="8518320" cy="605520"/>
           </a:xfrm>
           <a:prstGeom prst="rect">
             <a:avLst/>
@@ -12642,7 +13037,7 @@
         <p:spPr>
           <a:xfrm>
             <a:off x="311760" y="1229760"/>
-            <a:ext cx="8518680" cy="3337200"/>
+            <a:ext cx="8518320" cy="3336840"/>
           </a:xfrm>
           <a:prstGeom prst="rect">
             <a:avLst/>
@@ -12724,7 +13119,7 @@
             </a:endParaRPr>
           </a:p>
           <a:p>
-            <a:pPr marL="457200" indent="-226800">
+            <a:pPr marL="457200" indent="-226440">
               <a:lnSpc>
                 <a:spcPct val="100000"/>
               </a:lnSpc>
@@ -12762,7 +13157,7 @@
             </a:endParaRPr>
           </a:p>
           <a:p>
-            <a:pPr marL="457200" indent="-226800">
+            <a:pPr marL="457200" indent="-226440">
               <a:lnSpc>
                 <a:spcPct val="100000"/>
               </a:lnSpc>
@@ -12895,7 +13290,7 @@
         <p:spPr>
           <a:xfrm>
             <a:off x="2194560" y="365760"/>
-            <a:ext cx="4297320" cy="372960"/>
+            <a:ext cx="4296960" cy="372600"/>
           </a:xfrm>
           <a:prstGeom prst="rect">
             <a:avLst/>
@@ -12956,7 +13351,7 @@
         <p:spPr>
           <a:xfrm>
             <a:off x="3108960" y="2011680"/>
-            <a:ext cx="5072760" cy="2262960"/>
+            <a:ext cx="5072400" cy="2262600"/>
           </a:xfrm>
           <a:prstGeom prst="rect">
             <a:avLst/>
@@ -12980,7 +13375,7 @@
         <p:spPr>
           <a:xfrm>
             <a:off x="274320" y="1280520"/>
-            <a:ext cx="2376720" cy="3033720"/>
+            <a:ext cx="2376360" cy="3033360"/>
           </a:xfrm>
           <a:prstGeom prst="rect">
             <a:avLst/>
@@ -13070,7 +13465,7 @@
             </a:endParaRPr>
           </a:p>
           <a:p>
-            <a:pPr marL="216000" indent="-215280">
+            <a:pPr marL="216000" indent="-214920">
               <a:lnSpc>
                 <a:spcPct val="100000"/>
               </a:lnSpc>
@@ -13109,7 +13504,7 @@
             </a:endParaRPr>
           </a:p>
           <a:p>
-            <a:pPr marL="216000" indent="-215280">
+            <a:pPr marL="216000" indent="-214920">
               <a:lnSpc>
                 <a:spcPct val="100000"/>
               </a:lnSpc>
@@ -13148,7 +13543,7 @@
             </a:endParaRPr>
           </a:p>
           <a:p>
-            <a:pPr marL="216000" indent="-215280">
+            <a:pPr marL="216000" indent="-214920">
               <a:lnSpc>
                 <a:spcPct val="100000"/>
               </a:lnSpc>
@@ -13212,7 +13607,7 @@
         <p:spPr>
           <a:xfrm>
             <a:off x="6400800" y="1920240"/>
-            <a:ext cx="1919520" cy="547920"/>
+            <a:ext cx="1919160" cy="547560"/>
           </a:xfrm>
           <a:prstGeom prst="ellipse">
             <a:avLst/>
@@ -13241,7 +13636,7 @@
         <p:spPr>
           <a:xfrm>
             <a:off x="3474720" y="914400"/>
-            <a:ext cx="3931200" cy="456480"/>
+            <a:ext cx="3930840" cy="456120"/>
           </a:xfrm>
           <a:prstGeom prst="rect">
             <a:avLst/>
@@ -13298,7 +13693,7 @@
         <p:spPr>
           <a:xfrm>
             <a:off x="6319800" y="1243800"/>
-            <a:ext cx="1040760" cy="676080"/>
+            <a:ext cx="1040400" cy="675720"/>
           </a:xfrm>
           <a:custGeom>
             <a:avLst/>
@@ -13396,7 +13791,7 @@
         <p:spPr>
           <a:xfrm>
             <a:off x="6918480" y="1463040"/>
-            <a:ext cx="1950480" cy="1096560"/>
+            <a:ext cx="1950120" cy="1096200"/>
           </a:xfrm>
           <a:prstGeom prst="rect">
             <a:avLst/>
@@ -13419,7 +13814,7 @@
         <p:spPr>
           <a:xfrm>
             <a:off x="6949440" y="1463040"/>
-            <a:ext cx="3199680" cy="1799280"/>
+            <a:ext cx="3199320" cy="1798920"/>
           </a:xfrm>
           <a:prstGeom prst="rect">
             <a:avLst/>
@@ -13442,7 +13837,7 @@
         <p:spPr>
           <a:xfrm>
             <a:off x="7955280" y="3477240"/>
-            <a:ext cx="675000" cy="636840"/>
+            <a:ext cx="674640" cy="636480"/>
           </a:xfrm>
           <a:prstGeom prst="rect">
             <a:avLst/>
@@ -13465,7 +13860,7 @@
         <p:spPr>
           <a:xfrm>
             <a:off x="7955280" y="3843000"/>
-            <a:ext cx="675000" cy="636840"/>
+            <a:ext cx="674640" cy="636480"/>
           </a:xfrm>
           <a:prstGeom prst="rect">
             <a:avLst/>
@@ -13488,7 +13883,7 @@
         <p:spPr>
           <a:xfrm>
             <a:off x="8376480" y="3843000"/>
-            <a:ext cx="675000" cy="636840"/>
+            <a:ext cx="674640" cy="636480"/>
           </a:xfrm>
           <a:prstGeom prst="rect">
             <a:avLst/>
@@ -13511,7 +13906,7 @@
         <p:spPr>
           <a:xfrm>
             <a:off x="8376480" y="4208760"/>
-            <a:ext cx="675000" cy="636840"/>
+            <a:ext cx="674640" cy="636480"/>
           </a:xfrm>
           <a:prstGeom prst="rect">
             <a:avLst/>
@@ -13534,7 +13929,7 @@
         <p:spPr>
           <a:xfrm>
             <a:off x="5870880" y="274320"/>
-            <a:ext cx="2367000" cy="1279440"/>
+            <a:ext cx="2366640" cy="1279080"/>
           </a:xfrm>
           <a:prstGeom prst="rect">
             <a:avLst/>
@@ -13553,7 +13948,7 @@
         <p:spPr>
           <a:xfrm>
             <a:off x="548640" y="376920"/>
-            <a:ext cx="7863120" cy="4560120"/>
+            <a:ext cx="7862760" cy="4559760"/>
           </a:xfrm>
           <a:prstGeom prst="rect">
             <a:avLst/>
@@ -13572,7 +13967,7 @@
         <p:txBody>
           <a:bodyPr lIns="90000" rIns="90000" tIns="45000" bIns="45000"/>
           <a:p>
-            <a:pPr marL="216000" indent="-215280">
+            <a:pPr marL="216000" indent="-214920">
               <a:lnSpc>
                 <a:spcPct val="100000"/>
               </a:lnSpc>
@@ -13611,7 +14006,7 @@
             </a:endParaRPr>
           </a:p>
           <a:p>
-            <a:pPr marL="448200" indent="-215280">
+            <a:pPr marL="448200" indent="-214920">
               <a:lnSpc>
                 <a:spcPct val="100000"/>
               </a:lnSpc>
@@ -13650,7 +14045,7 @@
             </a:endParaRPr>
           </a:p>
           <a:p>
-            <a:pPr marL="448200" indent="-215280">
+            <a:pPr marL="448200" indent="-214920">
               <a:lnSpc>
                 <a:spcPct val="100000"/>
               </a:lnSpc>
@@ -13689,7 +14084,7 @@
             </a:endParaRPr>
           </a:p>
           <a:p>
-            <a:pPr marL="216000" indent="-215280">
+            <a:pPr marL="216000" indent="-214920">
               <a:lnSpc>
                 <a:spcPct val="100000"/>
               </a:lnSpc>
@@ -13728,7 +14123,7 @@
             </a:endParaRPr>
           </a:p>
           <a:p>
-            <a:pPr marL="216000" indent="-215280">
+            <a:pPr marL="216000" indent="-214920">
               <a:lnSpc>
                 <a:spcPct val="100000"/>
               </a:lnSpc>
@@ -13767,7 +14162,7 @@
             </a:endParaRPr>
           </a:p>
           <a:p>
-            <a:pPr lvl="1" marL="432000" indent="-215280">
+            <a:pPr lvl="1" marL="432000" indent="-214920">
               <a:lnSpc>
                 <a:spcPct val="100000"/>
               </a:lnSpc>
@@ -13806,7 +14201,7 @@
             </a:endParaRPr>
           </a:p>
           <a:p>
-            <a:pPr lvl="2" marL="648000" indent="-215280">
+            <a:pPr lvl="2" marL="648000" indent="-214920">
               <a:lnSpc>
                 <a:spcPct val="100000"/>
               </a:lnSpc>
@@ -13845,7 +14240,7 @@
             </a:endParaRPr>
           </a:p>
           <a:p>
-            <a:pPr lvl="2" marL="648000" indent="-215280">
+            <a:pPr lvl="2" marL="648000" indent="-214920">
               <a:lnSpc>
                 <a:spcPct val="100000"/>
               </a:lnSpc>
@@ -13884,7 +14279,7 @@
             </a:endParaRPr>
           </a:p>
           <a:p>
-            <a:pPr lvl="1" marL="432000" indent="-215280">
+            <a:pPr lvl="1" marL="432000" indent="-214920">
               <a:lnSpc>
                 <a:spcPct val="100000"/>
               </a:lnSpc>
@@ -13985,7 +14380,7 @@
         <p:spPr>
           <a:xfrm>
             <a:off x="366840" y="0"/>
-            <a:ext cx="8228520" cy="617400"/>
+            <a:ext cx="8228160" cy="617040"/>
           </a:xfrm>
           <a:prstGeom prst="rect">
             <a:avLst/>
@@ -14051,7 +14446,7 @@
         <p:spPr>
           <a:xfrm>
             <a:off x="2194560" y="1325880"/>
-            <a:ext cx="4480560" cy="2057400"/>
+            <a:ext cx="4480200" cy="2057040"/>
           </a:xfrm>
           <a:prstGeom prst="rect">
             <a:avLst/>
@@ -14060,7 +14455,7 @@
             <a:noFill/>
           </a:ln>
           <a:effectLst>
-            <a:outerShdw dist="101823" dir="2700000">
+            <a:outerShdw dir="2700000" dist="101823">
               <a:srgbClr val="808080"/>
             </a:outerShdw>
           </a:effectLst>
@@ -14068,14 +14463,14 @@
       </p:pic>
       <p:sp>
         <p:nvSpPr>
-          <p:cNvPr id="198" name="TextShape 2"/>
-          <p:cNvSpPr txBox="1"/>
+          <p:cNvPr id="198" name="CustomShape 2"/>
+          <p:cNvSpPr/>
           <p:nvPr/>
         </p:nvSpPr>
         <p:spPr>
           <a:xfrm>
             <a:off x="457200" y="822960"/>
-            <a:ext cx="1280160" cy="374040"/>
+            <a:ext cx="1279800" cy="373680"/>
           </a:xfrm>
           <a:prstGeom prst="rect">
             <a:avLst/>
@@ -14085,6 +14480,12 @@
             <a:noFill/>
           </a:ln>
         </p:spPr>
+        <p:style>
+          <a:lnRef idx="0"/>
+          <a:fillRef idx="0"/>
+          <a:effectRef idx="0"/>
+          <a:fontRef idx="minor"/>
+        </p:style>
         <p:txBody>
           <a:bodyPr lIns="90000" rIns="90000" tIns="45000" bIns="45000"/>
           <a:p>
@@ -14102,30 +14503,30 @@
               </a:rPr>
               <a:t>Opens new draft</a:t>
             </a:r>
-            <a:endParaRPr i="1" lang="en-US" sz="1000" spc="-1" strike="noStrike">
-              <a:solidFill>
-                <a:srgbClr val="000000"/>
-              </a:solidFill>
-              <a:uFill>
-                <a:solidFill>
-                  <a:srgbClr val="ffffff"/>
-                </a:solidFill>
-              </a:uFill>
-              <a:latin typeface="Arial"/>
-            </a:endParaRPr>
-          </a:p>
-        </p:txBody>
-      </p:sp>
-      <p:sp>
-        <p:nvSpPr>
-          <p:cNvPr id="199" name="TextShape 3"/>
-          <p:cNvSpPr txBox="1"/>
+            <a:endParaRPr lang="en-US" sz="1800" spc="-1" strike="noStrike">
+              <a:solidFill>
+                <a:srgbClr val="000000"/>
+              </a:solidFill>
+              <a:uFill>
+                <a:solidFill>
+                  <a:srgbClr val="ffffff"/>
+                </a:solidFill>
+              </a:uFill>
+              <a:latin typeface="Arial"/>
+            </a:endParaRPr>
+          </a:p>
+        </p:txBody>
+      </p:sp>
+      <p:sp>
+        <p:nvSpPr>
+          <p:cNvPr id="199" name="CustomShape 3"/>
+          <p:cNvSpPr/>
           <p:nvPr/>
         </p:nvSpPr>
         <p:spPr>
           <a:xfrm>
             <a:off x="457200" y="2593440"/>
-            <a:ext cx="1371600" cy="374040"/>
+            <a:ext cx="1371240" cy="373680"/>
           </a:xfrm>
           <a:prstGeom prst="rect">
             <a:avLst/>
@@ -14135,6 +14536,12 @@
             <a:noFill/>
           </a:ln>
         </p:spPr>
+        <p:style>
+          <a:lnRef idx="0"/>
+          <a:fillRef idx="0"/>
+          <a:effectRef idx="0"/>
+          <a:fontRef idx="minor"/>
+        </p:style>
         <p:txBody>
           <a:bodyPr lIns="90000" rIns="90000" tIns="45000" bIns="45000"/>
           <a:p>
@@ -14152,30 +14559,30 @@
               </a:rPr>
               <a:t>Resumes the project</a:t>
             </a:r>
-            <a:endParaRPr i="1" lang="en-US" sz="1000" spc="-1" strike="noStrike">
-              <a:solidFill>
-                <a:srgbClr val="000000"/>
-              </a:solidFill>
-              <a:uFill>
-                <a:solidFill>
-                  <a:srgbClr val="ffffff"/>
-                </a:solidFill>
-              </a:uFill>
-              <a:latin typeface="Arial"/>
-            </a:endParaRPr>
-          </a:p>
-        </p:txBody>
-      </p:sp>
-      <p:sp>
-        <p:nvSpPr>
-          <p:cNvPr id="200" name="TextShape 4"/>
-          <p:cNvSpPr txBox="1"/>
+            <a:endParaRPr lang="en-US" sz="1800" spc="-1" strike="noStrike">
+              <a:solidFill>
+                <a:srgbClr val="000000"/>
+              </a:solidFill>
+              <a:uFill>
+                <a:solidFill>
+                  <a:srgbClr val="ffffff"/>
+                </a:solidFill>
+              </a:uFill>
+              <a:latin typeface="Arial"/>
+            </a:endParaRPr>
+          </a:p>
+        </p:txBody>
+      </p:sp>
+      <p:sp>
+        <p:nvSpPr>
+          <p:cNvPr id="200" name="CustomShape 4"/>
+          <p:cNvSpPr/>
           <p:nvPr/>
         </p:nvSpPr>
         <p:spPr>
           <a:xfrm>
             <a:off x="7315200" y="2419560"/>
-            <a:ext cx="1371600" cy="232200"/>
+            <a:ext cx="1371240" cy="231840"/>
           </a:xfrm>
           <a:prstGeom prst="rect">
             <a:avLst/>
@@ -14185,6 +14592,12 @@
             <a:noFill/>
           </a:ln>
         </p:spPr>
+        <p:style>
+          <a:lnRef idx="0"/>
+          <a:fillRef idx="0"/>
+          <a:effectRef idx="0"/>
+          <a:fontRef idx="minor"/>
+        </p:style>
         <p:txBody>
           <a:bodyPr lIns="90000" rIns="90000" tIns="45000" bIns="45000"/>
           <a:p>
@@ -14202,30 +14615,30 @@
               </a:rPr>
               <a:t>Piece hierarchy tree</a:t>
             </a:r>
-            <a:endParaRPr i="1" lang="en-US" sz="1000" spc="-1" strike="noStrike">
-              <a:solidFill>
-                <a:srgbClr val="000000"/>
-              </a:solidFill>
-              <a:uFill>
-                <a:solidFill>
-                  <a:srgbClr val="ffffff"/>
-                </a:solidFill>
-              </a:uFill>
-              <a:latin typeface="Arial"/>
-            </a:endParaRPr>
-          </a:p>
-        </p:txBody>
-      </p:sp>
-      <p:sp>
-        <p:nvSpPr>
-          <p:cNvPr id="201" name="TextShape 5"/>
-          <p:cNvSpPr txBox="1"/>
+            <a:endParaRPr lang="en-US" sz="1800" spc="-1" strike="noStrike">
+              <a:solidFill>
+                <a:srgbClr val="000000"/>
+              </a:solidFill>
+              <a:uFill>
+                <a:solidFill>
+                  <a:srgbClr val="ffffff"/>
+                </a:solidFill>
+              </a:uFill>
+              <a:latin typeface="Arial"/>
+            </a:endParaRPr>
+          </a:p>
+        </p:txBody>
+      </p:sp>
+      <p:sp>
+        <p:nvSpPr>
+          <p:cNvPr id="201" name="CustomShape 5"/>
+          <p:cNvSpPr/>
           <p:nvPr/>
         </p:nvSpPr>
         <p:spPr>
           <a:xfrm>
             <a:off x="7498080" y="872280"/>
-            <a:ext cx="1097280" cy="232200"/>
+            <a:ext cx="1096920" cy="231840"/>
           </a:xfrm>
           <a:prstGeom prst="rect">
             <a:avLst/>
@@ -14235,6 +14648,12 @@
             <a:noFill/>
           </a:ln>
         </p:spPr>
+        <p:style>
+          <a:lnRef idx="0"/>
+          <a:fillRef idx="0"/>
+          <a:effectRef idx="0"/>
+          <a:fontRef idx="minor"/>
+        </p:style>
         <p:txBody>
           <a:bodyPr lIns="90000" rIns="90000" tIns="45000" bIns="45000"/>
           <a:p>
@@ -14252,30 +14671,30 @@
               </a:rPr>
               <a:t>Shortcut menu</a:t>
             </a:r>
-            <a:endParaRPr i="1" lang="en-US" sz="1000" spc="-1" strike="noStrike">
-              <a:solidFill>
-                <a:srgbClr val="000000"/>
-              </a:solidFill>
-              <a:uFill>
-                <a:solidFill>
-                  <a:srgbClr val="ffffff"/>
-                </a:solidFill>
-              </a:uFill>
-              <a:latin typeface="Arial"/>
-            </a:endParaRPr>
-          </a:p>
-        </p:txBody>
-      </p:sp>
-      <p:sp>
-        <p:nvSpPr>
-          <p:cNvPr id="202" name="TextShape 6"/>
-          <p:cNvSpPr txBox="1"/>
+            <a:endParaRPr lang="en-US" sz="1800" spc="-1" strike="noStrike">
+              <a:solidFill>
+                <a:srgbClr val="000000"/>
+              </a:solidFill>
+              <a:uFill>
+                <a:solidFill>
+                  <a:srgbClr val="ffffff"/>
+                </a:solidFill>
+              </a:uFill>
+              <a:latin typeface="Arial"/>
+            </a:endParaRPr>
+          </a:p>
+        </p:txBody>
+      </p:sp>
+      <p:sp>
+        <p:nvSpPr>
+          <p:cNvPr id="202" name="CustomShape 6"/>
+          <p:cNvSpPr/>
           <p:nvPr/>
         </p:nvSpPr>
         <p:spPr>
           <a:xfrm>
             <a:off x="7406640" y="3474720"/>
-            <a:ext cx="1097280" cy="232200"/>
+            <a:ext cx="1096920" cy="231840"/>
           </a:xfrm>
           <a:prstGeom prst="rect">
             <a:avLst/>
@@ -14285,6 +14704,12 @@
             <a:noFill/>
           </a:ln>
         </p:spPr>
+        <p:style>
+          <a:lnRef idx="0"/>
+          <a:fillRef idx="0"/>
+          <a:effectRef idx="0"/>
+          <a:fontRef idx="minor"/>
+        </p:style>
         <p:txBody>
           <a:bodyPr lIns="90000" rIns="90000" tIns="45000" bIns="45000"/>
           <a:p>
@@ -14302,7 +14727,7 @@
               </a:rPr>
               <a:t>Commands</a:t>
             </a:r>
-            <a:endParaRPr i="1" lang="en-US" sz="1000" spc="-1" strike="noStrike">
+            <a:endParaRPr lang="en-US" sz="1800" spc="-1" strike="noStrike">
               <a:solidFill>
                 <a:srgbClr val="000000"/>
               </a:solidFill>
@@ -14325,7 +14750,7 @@
         <p:spPr>
           <a:xfrm>
             <a:off x="5669280" y="2926080"/>
-            <a:ext cx="1005840" cy="365760"/>
+            <a:ext cx="1005480" cy="365400"/>
           </a:xfrm>
           <a:prstGeom prst="ellipse">
             <a:avLst/>
@@ -14354,7 +14779,7 @@
         <p:spPr>
           <a:xfrm>
             <a:off x="2103120" y="2194560"/>
-            <a:ext cx="1005840" cy="365760"/>
+            <a:ext cx="1005480" cy="365400"/>
           </a:xfrm>
           <a:prstGeom prst="ellipse">
             <a:avLst/>
@@ -14383,7 +14808,7 @@
         <p:spPr>
           <a:xfrm>
             <a:off x="5852160" y="1188720"/>
-            <a:ext cx="1005840" cy="457200"/>
+            <a:ext cx="1005480" cy="456840"/>
           </a:xfrm>
           <a:prstGeom prst="ellipse">
             <a:avLst/>
@@ -14412,7 +14837,7 @@
         <p:spPr>
           <a:xfrm>
             <a:off x="5577840" y="1737360"/>
-            <a:ext cx="1097280" cy="1097280"/>
+            <a:ext cx="1096920" cy="1096920"/>
           </a:xfrm>
           <a:prstGeom prst="ellipse">
             <a:avLst/>
@@ -14441,7 +14866,7 @@
         <p:spPr>
           <a:xfrm>
             <a:off x="2926080" y="1463040"/>
-            <a:ext cx="274320" cy="274320"/>
+            <a:ext cx="273960" cy="273960"/>
           </a:xfrm>
           <a:prstGeom prst="ellipse">
             <a:avLst/>
@@ -14610,7 +15035,7 @@
         <p:spPr>
           <a:xfrm>
             <a:off x="3291840" y="1645920"/>
-            <a:ext cx="2377440" cy="1645920"/>
+            <a:ext cx="2377080" cy="1645560"/>
           </a:xfrm>
           <a:prstGeom prst="ellipse">
             <a:avLst/>
@@ -14632,14 +15057,14 @@
       </p:sp>
       <p:sp>
         <p:nvSpPr>
-          <p:cNvPr id="214" name="TextShape 18"/>
-          <p:cNvSpPr txBox="1"/>
+          <p:cNvPr id="214" name="CustomShape 18"/>
+          <p:cNvSpPr/>
           <p:nvPr/>
         </p:nvSpPr>
         <p:spPr>
           <a:xfrm>
             <a:off x="4297680" y="3965040"/>
-            <a:ext cx="548640" cy="241200"/>
+            <a:ext cx="548280" cy="240840"/>
           </a:xfrm>
           <a:prstGeom prst="rect">
             <a:avLst/>
@@ -14649,6 +15074,12 @@
             <a:noFill/>
           </a:ln>
         </p:spPr>
+        <p:style>
+          <a:lnRef idx="0"/>
+          <a:fillRef idx="0"/>
+          <a:effectRef idx="0"/>
+          <a:fontRef idx="minor"/>
+        </p:style>
         <p:txBody>
           <a:bodyPr lIns="90000" rIns="90000" tIns="45000" bIns="45000"/>
           <a:p>
@@ -14666,7 +15097,7 @@
               </a:rPr>
               <a:t>Draft</a:t>
             </a:r>
-            <a:endParaRPr i="1" lang="en-US" sz="1000" spc="-1" strike="noStrike">
+            <a:endParaRPr lang="en-US" sz="1800" spc="-1" strike="noStrike">
               <a:solidFill>
                 <a:srgbClr val="000000"/>
               </a:solidFill>
@@ -14717,7 +15148,7 @@
         <p:spPr>
           <a:xfrm>
             <a:off x="2103120" y="1737360"/>
-            <a:ext cx="1005840" cy="365760"/>
+            <a:ext cx="1005480" cy="365400"/>
           </a:xfrm>
           <a:prstGeom prst="ellipse">
             <a:avLst/>
@@ -14739,14 +15170,14 @@
       </p:sp>
       <p:sp>
         <p:nvSpPr>
-          <p:cNvPr id="217" name="TextShape 21"/>
-          <p:cNvSpPr txBox="1"/>
+          <p:cNvPr id="217" name="CustomShape 21"/>
+          <p:cNvSpPr/>
           <p:nvPr/>
         </p:nvSpPr>
         <p:spPr>
           <a:xfrm>
             <a:off x="3474720" y="682200"/>
-            <a:ext cx="1097280" cy="232200"/>
+            <a:ext cx="1096920" cy="231840"/>
           </a:xfrm>
           <a:prstGeom prst="rect">
             <a:avLst/>
@@ -14756,6 +15187,12 @@
             <a:noFill/>
           </a:ln>
         </p:spPr>
+        <p:style>
+          <a:lnRef idx="0"/>
+          <a:fillRef idx="0"/>
+          <a:effectRef idx="0"/>
+          <a:fontRef idx="minor"/>
+        </p:style>
         <p:txBody>
           <a:bodyPr lIns="90000" rIns="90000" tIns="45000" bIns="45000"/>
           <a:p>
@@ -14773,7 +15210,7 @@
               </a:rPr>
               <a:t>Anchor ON/OFF</a:t>
             </a:r>
-            <a:endParaRPr i="1" lang="en-US" sz="1000" spc="-1" strike="noStrike">
+            <a:endParaRPr lang="en-US" sz="1800" spc="-1" strike="noStrike">
               <a:solidFill>
                 <a:srgbClr val="000000"/>
               </a:solidFill>
@@ -14876,7 +15313,7 @@
         <p:spPr>
           <a:xfrm>
             <a:off x="311760" y="410040"/>
-            <a:ext cx="8518680" cy="605880"/>
+            <a:ext cx="8518320" cy="605520"/>
           </a:xfrm>
           <a:prstGeom prst="rect">
             <a:avLst/>
@@ -14895,7 +15332,7 @@
         <p:txBody>
           <a:bodyPr lIns="90000" rIns="90000" tIns="91440" bIns="91440"/>
           <a:p>
-            <a:pPr marL="457200" indent="-226800">
+            <a:pPr marL="457200" indent="-226440">
               <a:lnSpc>
                 <a:spcPct val="100000"/>
               </a:lnSpc>
@@ -14943,7 +15380,7 @@
         <p:spPr>
           <a:xfrm>
             <a:off x="311760" y="1229760"/>
-            <a:ext cx="3873240" cy="3472920"/>
+            <a:ext cx="3872880" cy="3472560"/>
           </a:xfrm>
           <a:prstGeom prst="rect">
             <a:avLst/>
@@ -15027,7 +15464,7 @@
         <p:spPr>
           <a:xfrm>
             <a:off x="4302000" y="1631880"/>
-            <a:ext cx="4624560" cy="2482200"/>
+            <a:ext cx="4624200" cy="2481840"/>
           </a:xfrm>
           <a:prstGeom prst="rect">
             <a:avLst/>
@@ -15098,7 +15535,7 @@
         <p:spPr>
           <a:xfrm>
             <a:off x="311760" y="410040"/>
-            <a:ext cx="8518680" cy="605880"/>
+            <a:ext cx="8518320" cy="605520"/>
           </a:xfrm>
           <a:prstGeom prst="rect">
             <a:avLst/>
@@ -15160,7 +15597,7 @@
         <p:spPr>
           <a:xfrm>
             <a:off x="311760" y="1229760"/>
-            <a:ext cx="4379760" cy="3337200"/>
+            <a:ext cx="4379400" cy="3336840"/>
           </a:xfrm>
           <a:prstGeom prst="rect">
             <a:avLst/>
@@ -15179,7 +15616,7 @@
         <p:txBody>
           <a:bodyPr lIns="90000" rIns="90000" tIns="91440" bIns="91440"/>
           <a:p>
-            <a:pPr marL="457200" indent="-226800">
+            <a:pPr marL="457200" indent="-226440">
               <a:lnSpc>
                 <a:spcPct val="100000"/>
               </a:lnSpc>
@@ -15247,7 +15684,7 @@
             </a:endParaRPr>
           </a:p>
           <a:p>
-            <a:pPr marL="457200" indent="-226800">
+            <a:pPr marL="457200" indent="-226440">
               <a:lnSpc>
                 <a:spcPct val="100000"/>
               </a:lnSpc>
@@ -15300,7 +15737,7 @@
             </a:endParaRPr>
           </a:p>
           <a:p>
-            <a:pPr marL="457200" indent="-226800">
+            <a:pPr marL="457200" indent="-226440">
               <a:lnSpc>
                 <a:spcPct val="100000"/>
               </a:lnSpc>
@@ -15353,7 +15790,7 @@
             </a:endParaRPr>
           </a:p>
           <a:p>
-            <a:pPr marL="457200" indent="-226800">
+            <a:pPr marL="457200" indent="-226440">
               <a:lnSpc>
                 <a:spcPct val="100000"/>
               </a:lnSpc>
@@ -15435,7 +15872,7 @@
         <p:spPr>
           <a:xfrm>
             <a:off x="4862160" y="299880"/>
-            <a:ext cx="1731600" cy="2493720"/>
+            <a:ext cx="1731240" cy="2493360"/>
           </a:xfrm>
           <a:prstGeom prst="rect">
             <a:avLst/>
@@ -15443,6 +15880,11 @@
           <a:ln>
             <a:noFill/>
           </a:ln>
+          <a:effectLst>
+            <a:outerShdw dist="101823" dir="2700000">
+              <a:srgbClr val="808080"/>
+            </a:outerShdw>
+          </a:effectLst>
         </p:spPr>
       </p:pic>
       <p:pic>
@@ -15458,7 +15900,7 @@
         <p:spPr>
           <a:xfrm>
             <a:off x="6595560" y="3371040"/>
-            <a:ext cx="2112840" cy="855360"/>
+            <a:ext cx="2112480" cy="855000"/>
           </a:xfrm>
           <a:prstGeom prst="rect">
             <a:avLst/>
@@ -15466,6 +15908,11 @@
           <a:ln>
             <a:noFill/>
           </a:ln>
+          <a:effectLst>
+            <a:outerShdw dist="101823" dir="2700000">
+              <a:srgbClr val="808080"/>
+            </a:outerShdw>
+          </a:effectLst>
         </p:spPr>
       </p:pic>
     </p:spTree>

</xml_diff>

<commit_message>
Compilação do pacote Documentação alterada para atualizar passos de instalação
</commit_message>
<xml_diff>
--- a/[doc]/Using smartSpriteFX.pptx
+++ b/[doc]/Using smartSpriteFX.pptx
@@ -5419,7 +5419,7 @@
       </p:grpSpPr>
       <p:sp>
         <p:nvSpPr>
-          <p:cNvPr id="169" name="PlaceHolder 1"/>
+          <p:cNvPr id="171" name="PlaceHolder 1"/>
           <p:cNvSpPr>
             <a:spLocks noGrp="1"/>
           </p:cNvSpPr>
@@ -5456,7 +5456,7 @@
       </p:sp>
       <p:sp>
         <p:nvSpPr>
-          <p:cNvPr id="170" name="PlaceHolder 2"/>
+          <p:cNvPr id="172" name="PlaceHolder 2"/>
           <p:cNvSpPr>
             <a:spLocks noGrp="1"/>
           </p:cNvSpPr>
@@ -5515,7 +5515,7 @@
       </p:grpSpPr>
       <p:sp>
         <p:nvSpPr>
-          <p:cNvPr id="171" name="PlaceHolder 1"/>
+          <p:cNvPr id="173" name="PlaceHolder 1"/>
           <p:cNvSpPr>
             <a:spLocks noGrp="1"/>
           </p:cNvSpPr>
@@ -5552,7 +5552,7 @@
       </p:sp>
       <p:sp>
         <p:nvSpPr>
-          <p:cNvPr id="172" name="PlaceHolder 2"/>
+          <p:cNvPr id="174" name="PlaceHolder 2"/>
           <p:cNvSpPr>
             <a:spLocks noGrp="1"/>
           </p:cNvSpPr>
@@ -5610,7 +5610,7 @@
       </p:grpSpPr>
       <p:sp>
         <p:nvSpPr>
-          <p:cNvPr id="173" name="PlaceHolder 1"/>
+          <p:cNvPr id="175" name="PlaceHolder 1"/>
           <p:cNvSpPr>
             <a:spLocks noGrp="1"/>
           </p:cNvSpPr>
@@ -5647,7 +5647,7 @@
       </p:sp>
       <p:sp>
         <p:nvSpPr>
-          <p:cNvPr id="174" name="PlaceHolder 2"/>
+          <p:cNvPr id="176" name="PlaceHolder 2"/>
           <p:cNvSpPr>
             <a:spLocks noGrp="1"/>
           </p:cNvSpPr>
@@ -5683,7 +5683,7 @@
       </p:sp>
       <p:sp>
         <p:nvSpPr>
-          <p:cNvPr id="175" name="PlaceHolder 3"/>
+          <p:cNvPr id="177" name="PlaceHolder 3"/>
           <p:cNvSpPr>
             <a:spLocks noGrp="1"/>
           </p:cNvSpPr>
@@ -5741,7 +5741,7 @@
       </p:grpSpPr>
       <p:sp>
         <p:nvSpPr>
-          <p:cNvPr id="176" name="PlaceHolder 1"/>
+          <p:cNvPr id="178" name="PlaceHolder 1"/>
           <p:cNvSpPr>
             <a:spLocks noGrp="1"/>
           </p:cNvSpPr>
@@ -5800,7 +5800,7 @@
       </p:grpSpPr>
       <p:sp>
         <p:nvSpPr>
-          <p:cNvPr id="177" name="PlaceHolder 1"/>
+          <p:cNvPr id="179" name="PlaceHolder 1"/>
           <p:cNvSpPr>
             <a:spLocks noGrp="1"/>
           </p:cNvSpPr>
@@ -5859,7 +5859,7 @@
       </p:grpSpPr>
       <p:sp>
         <p:nvSpPr>
-          <p:cNvPr id="178" name="PlaceHolder 1"/>
+          <p:cNvPr id="180" name="PlaceHolder 1"/>
           <p:cNvSpPr>
             <a:spLocks noGrp="1"/>
           </p:cNvSpPr>
@@ -5896,7 +5896,7 @@
       </p:sp>
       <p:sp>
         <p:nvSpPr>
-          <p:cNvPr id="179" name="PlaceHolder 2"/>
+          <p:cNvPr id="181" name="PlaceHolder 2"/>
           <p:cNvSpPr>
             <a:spLocks noGrp="1"/>
           </p:cNvSpPr>
@@ -5932,7 +5932,7 @@
       </p:sp>
       <p:sp>
         <p:nvSpPr>
-          <p:cNvPr id="180" name="PlaceHolder 3"/>
+          <p:cNvPr id="182" name="PlaceHolder 3"/>
           <p:cNvSpPr>
             <a:spLocks noGrp="1"/>
           </p:cNvSpPr>
@@ -5968,7 +5968,7 @@
       </p:sp>
       <p:sp>
         <p:nvSpPr>
-          <p:cNvPr id="181" name="PlaceHolder 4"/>
+          <p:cNvPr id="183" name="PlaceHolder 4"/>
           <p:cNvSpPr>
             <a:spLocks noGrp="1"/>
           </p:cNvSpPr>
@@ -6026,7 +6026,7 @@
       </p:grpSpPr>
       <p:sp>
         <p:nvSpPr>
-          <p:cNvPr id="182" name="PlaceHolder 1"/>
+          <p:cNvPr id="184" name="PlaceHolder 1"/>
           <p:cNvSpPr>
             <a:spLocks noGrp="1"/>
           </p:cNvSpPr>
@@ -6063,7 +6063,7 @@
       </p:sp>
       <p:sp>
         <p:nvSpPr>
-          <p:cNvPr id="183" name="PlaceHolder 2"/>
+          <p:cNvPr id="185" name="PlaceHolder 2"/>
           <p:cNvSpPr>
             <a:spLocks noGrp="1"/>
           </p:cNvSpPr>
@@ -6099,7 +6099,7 @@
       </p:sp>
       <p:sp>
         <p:nvSpPr>
-          <p:cNvPr id="184" name="PlaceHolder 3"/>
+          <p:cNvPr id="186" name="PlaceHolder 3"/>
           <p:cNvSpPr>
             <a:spLocks noGrp="1"/>
           </p:cNvSpPr>
@@ -6135,7 +6135,7 @@
       </p:sp>
       <p:sp>
         <p:nvSpPr>
-          <p:cNvPr id="185" name="PlaceHolder 4"/>
+          <p:cNvPr id="187" name="PlaceHolder 4"/>
           <p:cNvSpPr>
             <a:spLocks noGrp="1"/>
           </p:cNvSpPr>
@@ -6193,7 +6193,7 @@
       </p:grpSpPr>
       <p:sp>
         <p:nvSpPr>
-          <p:cNvPr id="186" name="PlaceHolder 1"/>
+          <p:cNvPr id="188" name="PlaceHolder 1"/>
           <p:cNvSpPr>
             <a:spLocks noGrp="1"/>
           </p:cNvSpPr>
@@ -6230,7 +6230,7 @@
       </p:sp>
       <p:sp>
         <p:nvSpPr>
-          <p:cNvPr id="187" name="PlaceHolder 2"/>
+          <p:cNvPr id="189" name="PlaceHolder 2"/>
           <p:cNvSpPr>
             <a:spLocks noGrp="1"/>
           </p:cNvSpPr>
@@ -6266,7 +6266,7 @@
       </p:sp>
       <p:sp>
         <p:nvSpPr>
-          <p:cNvPr id="188" name="PlaceHolder 3"/>
+          <p:cNvPr id="190" name="PlaceHolder 3"/>
           <p:cNvSpPr>
             <a:spLocks noGrp="1"/>
           </p:cNvSpPr>
@@ -6302,7 +6302,7 @@
       </p:sp>
       <p:sp>
         <p:nvSpPr>
-          <p:cNvPr id="189" name="PlaceHolder 4"/>
+          <p:cNvPr id="191" name="PlaceHolder 4"/>
           <p:cNvSpPr>
             <a:spLocks noGrp="1"/>
           </p:cNvSpPr>
@@ -6360,7 +6360,7 @@
       </p:grpSpPr>
       <p:sp>
         <p:nvSpPr>
-          <p:cNvPr id="190" name="PlaceHolder 1"/>
+          <p:cNvPr id="192" name="PlaceHolder 1"/>
           <p:cNvSpPr>
             <a:spLocks noGrp="1"/>
           </p:cNvSpPr>
@@ -6397,7 +6397,7 @@
       </p:sp>
       <p:sp>
         <p:nvSpPr>
-          <p:cNvPr id="191" name="PlaceHolder 2"/>
+          <p:cNvPr id="193" name="PlaceHolder 2"/>
           <p:cNvSpPr>
             <a:spLocks noGrp="1"/>
           </p:cNvSpPr>
@@ -6433,7 +6433,7 @@
       </p:sp>
       <p:sp>
         <p:nvSpPr>
-          <p:cNvPr id="192" name="PlaceHolder 3"/>
+          <p:cNvPr id="194" name="PlaceHolder 3"/>
           <p:cNvSpPr>
             <a:spLocks noGrp="1"/>
           </p:cNvSpPr>
@@ -6491,7 +6491,7 @@
       </p:grpSpPr>
       <p:sp>
         <p:nvSpPr>
-          <p:cNvPr id="193" name="PlaceHolder 1"/>
+          <p:cNvPr id="195" name="PlaceHolder 1"/>
           <p:cNvSpPr>
             <a:spLocks noGrp="1"/>
           </p:cNvSpPr>
@@ -6528,7 +6528,7 @@
       </p:sp>
       <p:sp>
         <p:nvSpPr>
-          <p:cNvPr id="194" name="PlaceHolder 2"/>
+          <p:cNvPr id="196" name="PlaceHolder 2"/>
           <p:cNvSpPr>
             <a:spLocks noGrp="1"/>
           </p:cNvSpPr>
@@ -6564,7 +6564,7 @@
       </p:sp>
       <p:sp>
         <p:nvSpPr>
-          <p:cNvPr id="195" name="PlaceHolder 3"/>
+          <p:cNvPr id="197" name="PlaceHolder 3"/>
           <p:cNvSpPr>
             <a:spLocks noGrp="1"/>
           </p:cNvSpPr>
@@ -6600,7 +6600,7 @@
       </p:sp>
       <p:sp>
         <p:nvSpPr>
-          <p:cNvPr id="196" name="PlaceHolder 4"/>
+          <p:cNvPr id="198" name="PlaceHolder 4"/>
           <p:cNvSpPr>
             <a:spLocks noGrp="1"/>
           </p:cNvSpPr>
@@ -6636,7 +6636,7 @@
       </p:sp>
       <p:sp>
         <p:nvSpPr>
-          <p:cNvPr id="197" name="PlaceHolder 5"/>
+          <p:cNvPr id="199" name="PlaceHolder 5"/>
           <p:cNvSpPr>
             <a:spLocks noGrp="1"/>
           </p:cNvSpPr>
@@ -6753,7 +6753,7 @@
       </p:grpSpPr>
       <p:sp>
         <p:nvSpPr>
-          <p:cNvPr id="198" name="PlaceHolder 1"/>
+          <p:cNvPr id="200" name="PlaceHolder 1"/>
           <p:cNvSpPr>
             <a:spLocks noGrp="1"/>
           </p:cNvSpPr>
@@ -6790,7 +6790,7 @@
       </p:sp>
       <p:sp>
         <p:nvSpPr>
-          <p:cNvPr id="199" name="PlaceHolder 2"/>
+          <p:cNvPr id="201" name="PlaceHolder 2"/>
           <p:cNvSpPr>
             <a:spLocks noGrp="1"/>
           </p:cNvSpPr>
@@ -6826,7 +6826,7 @@
       </p:sp>
       <p:sp>
         <p:nvSpPr>
-          <p:cNvPr id="200" name="PlaceHolder 3"/>
+          <p:cNvPr id="202" name="PlaceHolder 3"/>
           <p:cNvSpPr>
             <a:spLocks noGrp="1"/>
           </p:cNvSpPr>
@@ -6862,7 +6862,7 @@
       </p:sp>
       <p:pic>
         <p:nvPicPr>
-          <p:cNvPr id="201" name="" descr=""/>
+          <p:cNvPr id="203" name="" descr=""/>
           <p:cNvPicPr/>
           <p:nvPr/>
         </p:nvPicPr>
@@ -6885,7 +6885,7 @@
       </p:pic>
       <p:pic>
         <p:nvPicPr>
-          <p:cNvPr id="202" name="" descr=""/>
+          <p:cNvPr id="204" name="" descr=""/>
           <p:cNvPicPr/>
           <p:nvPr/>
         </p:nvPicPr>
@@ -7445,7 +7445,7 @@
         <p:spPr>
           <a:xfrm>
             <a:off x="8128800" y="0"/>
-            <a:ext cx="1011960" cy="1011960"/>
+            <a:ext cx="1011600" cy="1011600"/>
           </a:xfrm>
           <a:prstGeom prst="rect">
             <a:avLst/>
@@ -7473,7 +7473,7 @@
         <p:spPr>
           <a:xfrm flipH="1">
             <a:off x="7110000" y="0"/>
-            <a:ext cx="1011960" cy="1011960"/>
+            <a:ext cx="1011600" cy="1011600"/>
           </a:xfrm>
           <a:prstGeom prst="rtTriangle">
             <a:avLst/>
@@ -7500,8 +7500,8 @@
         </p:nvSpPr>
         <p:spPr>
           <a:xfrm flipH="1" rot="10800000">
-            <a:off x="16233840" y="9123840"/>
-            <a:ext cx="1011960" cy="1011960"/>
+            <a:off x="17245800" y="10135800"/>
+            <a:ext cx="1011600" cy="1011600"/>
           </a:xfrm>
           <a:prstGeom prst="rtTriangle">
             <a:avLst/>
@@ -7528,8 +7528,8 @@
         </p:nvSpPr>
         <p:spPr>
           <a:xfrm rot="10800000">
-            <a:off x="15222240" y="9123840"/>
-            <a:ext cx="1011960" cy="1011960"/>
+            <a:off x="16234200" y="10135800"/>
+            <a:ext cx="1011600" cy="1011600"/>
           </a:xfrm>
           <a:prstGeom prst="rtTriangle">
             <a:avLst/>
@@ -7556,8 +7556,8 @@
         </p:nvSpPr>
         <p:spPr>
           <a:xfrm rot="10800000">
-            <a:off x="17252640" y="10139040"/>
-            <a:ext cx="1011960" cy="1011960"/>
+            <a:off x="18264600" y="11151000"/>
+            <a:ext cx="1011600" cy="1011600"/>
           </a:xfrm>
           <a:prstGeom prst="rtTriangle">
             <a:avLst/>
@@ -7948,7 +7948,7 @@
         <p:spPr>
           <a:xfrm>
             <a:off x="8154720" y="3903840"/>
-            <a:ext cx="986040" cy="984600"/>
+            <a:ext cx="985680" cy="984240"/>
           </a:xfrm>
           <a:prstGeom prst="rtTriangle">
             <a:avLst/>
@@ -7976,7 +7976,7 @@
         <p:spPr>
           <a:xfrm flipH="1">
             <a:off x="6177600" y="3903840"/>
-            <a:ext cx="986040" cy="984600"/>
+            <a:ext cx="985680" cy="984240"/>
           </a:xfrm>
           <a:prstGeom prst="rtTriangle">
             <a:avLst/>
@@ -8004,7 +8004,7 @@
         <p:spPr>
           <a:xfrm>
             <a:off x="7170120" y="3903840"/>
-            <a:ext cx="986040" cy="984600"/>
+            <a:ext cx="985680" cy="984240"/>
           </a:xfrm>
           <a:prstGeom prst="rect">
             <a:avLst/>
@@ -8031,8 +8031,8 @@
         </p:nvSpPr>
         <p:spPr>
           <a:xfrm rot="10800000">
-            <a:off x="17045280" y="12781440"/>
-            <a:ext cx="986040" cy="984600"/>
+            <a:off x="18031320" y="13766040"/>
+            <a:ext cx="985680" cy="984240"/>
           </a:xfrm>
           <a:prstGeom prst="rtTriangle">
             <a:avLst/>
@@ -8060,7 +8060,7 @@
         <p:spPr>
           <a:xfrm>
             <a:off x="0" y="4891680"/>
-            <a:ext cx="9140760" cy="248760"/>
+            <a:ext cx="9140400" cy="248400"/>
           </a:xfrm>
           <a:prstGeom prst="rect">
             <a:avLst/>
@@ -8451,7 +8451,7 @@
         <p:spPr>
           <a:xfrm>
             <a:off x="8154720" y="3903840"/>
-            <a:ext cx="986040" cy="984600"/>
+            <a:ext cx="985680" cy="984240"/>
           </a:xfrm>
           <a:prstGeom prst="rtTriangle">
             <a:avLst/>
@@ -8479,7 +8479,7 @@
         <p:spPr>
           <a:xfrm flipH="1">
             <a:off x="6177600" y="3903840"/>
-            <a:ext cx="986040" cy="984600"/>
+            <a:ext cx="985680" cy="984240"/>
           </a:xfrm>
           <a:prstGeom prst="rtTriangle">
             <a:avLst/>
@@ -8507,7 +8507,7 @@
         <p:spPr>
           <a:xfrm>
             <a:off x="7170120" y="3903840"/>
-            <a:ext cx="986040" cy="984600"/>
+            <a:ext cx="985680" cy="984240"/>
           </a:xfrm>
           <a:prstGeom prst="rect">
             <a:avLst/>
@@ -8534,8 +8534,8 @@
         </p:nvSpPr>
         <p:spPr>
           <a:xfrm rot="10800000">
-            <a:off x="17045280" y="12781440"/>
-            <a:ext cx="986040" cy="984600"/>
+            <a:off x="18031320" y="13766040"/>
+            <a:ext cx="985680" cy="984240"/>
           </a:xfrm>
           <a:prstGeom prst="rtTriangle">
             <a:avLst/>
@@ -8563,7 +8563,7 @@
         <p:spPr>
           <a:xfrm>
             <a:off x="0" y="4891680"/>
-            <a:ext cx="9140760" cy="248760"/>
+            <a:ext cx="9140400" cy="248400"/>
           </a:xfrm>
           <a:prstGeom prst="rect">
             <a:avLst/>
@@ -8954,7 +8954,7 @@
         <p:spPr>
           <a:xfrm>
             <a:off x="8154720" y="3903840"/>
-            <a:ext cx="986040" cy="984600"/>
+            <a:ext cx="985680" cy="984240"/>
           </a:xfrm>
           <a:prstGeom prst="rtTriangle">
             <a:avLst/>
@@ -8982,7 +8982,7 @@
         <p:spPr>
           <a:xfrm flipH="1">
             <a:off x="6177600" y="3903840"/>
-            <a:ext cx="986040" cy="984600"/>
+            <a:ext cx="985680" cy="984240"/>
           </a:xfrm>
           <a:prstGeom prst="rtTriangle">
             <a:avLst/>
@@ -9010,7 +9010,7 @@
         <p:spPr>
           <a:xfrm>
             <a:off x="7170120" y="3903840"/>
-            <a:ext cx="986040" cy="984600"/>
+            <a:ext cx="985680" cy="984240"/>
           </a:xfrm>
           <a:prstGeom prst="rect">
             <a:avLst/>
@@ -9037,8 +9037,8 @@
         </p:nvSpPr>
         <p:spPr>
           <a:xfrm rot="10800000">
-            <a:off x="17045280" y="12781440"/>
-            <a:ext cx="986040" cy="984600"/>
+            <a:off x="18031320" y="13766040"/>
+            <a:ext cx="985680" cy="984240"/>
           </a:xfrm>
           <a:prstGeom prst="rtTriangle">
             <a:avLst/>
@@ -9066,7 +9066,7 @@
         <p:spPr>
           <a:xfrm>
             <a:off x="0" y="4891680"/>
-            <a:ext cx="9140760" cy="248760"/>
+            <a:ext cx="9140400" cy="248400"/>
           </a:xfrm>
           <a:prstGeom prst="rect">
             <a:avLst/>
@@ -9457,7 +9457,7 @@
         <p:spPr>
           <a:xfrm>
             <a:off x="8154720" y="3903840"/>
-            <a:ext cx="986040" cy="984600"/>
+            <a:ext cx="985680" cy="984240"/>
           </a:xfrm>
           <a:prstGeom prst="rtTriangle">
             <a:avLst/>
@@ -9485,7 +9485,7 @@
         <p:spPr>
           <a:xfrm flipH="1">
             <a:off x="6177600" y="3903840"/>
-            <a:ext cx="986040" cy="984600"/>
+            <a:ext cx="985680" cy="984240"/>
           </a:xfrm>
           <a:prstGeom prst="rtTriangle">
             <a:avLst/>
@@ -9513,7 +9513,7 @@
         <p:spPr>
           <a:xfrm>
             <a:off x="7170120" y="3903840"/>
-            <a:ext cx="986040" cy="984600"/>
+            <a:ext cx="985680" cy="984240"/>
           </a:xfrm>
           <a:prstGeom prst="rect">
             <a:avLst/>
@@ -9540,8 +9540,8 @@
         </p:nvSpPr>
         <p:spPr>
           <a:xfrm rot="10800000">
-            <a:off x="17045280" y="12781440"/>
-            <a:ext cx="986040" cy="984600"/>
+            <a:off x="18031320" y="13766040"/>
+            <a:ext cx="985680" cy="984240"/>
           </a:xfrm>
           <a:prstGeom prst="rtTriangle">
             <a:avLst/>
@@ -9569,7 +9569,7 @@
         <p:spPr>
           <a:xfrm>
             <a:off x="0" y="4891680"/>
-            <a:ext cx="9140760" cy="248760"/>
+            <a:ext cx="9140400" cy="248400"/>
           </a:xfrm>
           <a:prstGeom prst="rect">
             <a:avLst/>
@@ -9587,6 +9587,325 @@
           <a:effectRef idx="0"/>
           <a:fontRef idx="minor"/>
         </p:style>
+      </p:sp>
+      <p:sp>
+        <p:nvSpPr>
+          <p:cNvPr id="169" name="PlaceHolder 6"/>
+          <p:cNvSpPr>
+            <a:spLocks noGrp="1"/>
+          </p:cNvSpPr>
+          <p:nvPr>
+            <p:ph type="title"/>
+          </p:nvPr>
+        </p:nvSpPr>
+        <p:spPr>
+          <a:xfrm>
+            <a:off x="457200" y="205200"/>
+            <a:ext cx="8229240" cy="858600"/>
+          </a:xfrm>
+          <a:prstGeom prst="rect">
+            <a:avLst/>
+          </a:prstGeom>
+        </p:spPr>
+        <p:txBody>
+          <a:bodyPr lIns="0" rIns="0" tIns="0" bIns="0" anchor="ctr"/>
+          <a:p>
+            <a:pPr algn="ctr"/>
+            <a:r>
+              <a:rPr lang="en-US" sz="4400" spc="-1" strike="noStrike">
+                <a:solidFill>
+                  <a:srgbClr val="000000"/>
+                </a:solidFill>
+                <a:uFill>
+                  <a:solidFill>
+                    <a:srgbClr val="ffffff"/>
+                  </a:solidFill>
+                </a:uFill>
+                <a:latin typeface="Arial"/>
+              </a:rPr>
+              <a:t>Clique para editar o formato do texto do título</a:t>
+            </a:r>
+            <a:endParaRPr lang="en-US" sz="4400" spc="-1" strike="noStrike">
+              <a:solidFill>
+                <a:srgbClr val="000000"/>
+              </a:solidFill>
+              <a:uFill>
+                <a:solidFill>
+                  <a:srgbClr val="ffffff"/>
+                </a:solidFill>
+              </a:uFill>
+              <a:latin typeface="Arial"/>
+            </a:endParaRPr>
+          </a:p>
+        </p:txBody>
+      </p:sp>
+      <p:sp>
+        <p:nvSpPr>
+          <p:cNvPr id="170" name="PlaceHolder 7"/>
+          <p:cNvSpPr>
+            <a:spLocks noGrp="1"/>
+          </p:cNvSpPr>
+          <p:nvPr>
+            <p:ph type="body"/>
+          </p:nvPr>
+        </p:nvSpPr>
+        <p:spPr>
+          <a:xfrm>
+            <a:off x="457200" y="1203480"/>
+            <a:ext cx="8229240" cy="2982960"/>
+          </a:xfrm>
+          <a:prstGeom prst="rect">
+            <a:avLst/>
+          </a:prstGeom>
+        </p:spPr>
+        <p:txBody>
+          <a:bodyPr lIns="0" rIns="0" tIns="0" bIns="0"/>
+          <a:p>
+            <a:pPr marL="432000" indent="-324000">
+              <a:buClr>
+                <a:srgbClr val="000000"/>
+              </a:buClr>
+              <a:buSzPct val="45000"/>
+              <a:buFont typeface="Wingdings" charset="2"/>
+              <a:buChar char=""/>
+            </a:pPr>
+            <a:r>
+              <a:rPr lang="en-US" sz="3200" spc="-1" strike="noStrike">
+                <a:solidFill>
+                  <a:srgbClr val="000000"/>
+                </a:solidFill>
+                <a:uFill>
+                  <a:solidFill>
+                    <a:srgbClr val="ffffff"/>
+                  </a:solidFill>
+                </a:uFill>
+                <a:latin typeface="Arial"/>
+              </a:rPr>
+              <a:t>Clique para editar o formato do texto da estrutura de tópicos</a:t>
+            </a:r>
+            <a:endParaRPr lang="en-US" sz="3200" spc="-1" strike="noStrike">
+              <a:solidFill>
+                <a:srgbClr val="000000"/>
+              </a:solidFill>
+              <a:uFill>
+                <a:solidFill>
+                  <a:srgbClr val="ffffff"/>
+                </a:solidFill>
+              </a:uFill>
+              <a:latin typeface="Arial"/>
+            </a:endParaRPr>
+          </a:p>
+          <a:p>
+            <a:pPr lvl="1" marL="864000" indent="-324000">
+              <a:buClr>
+                <a:srgbClr val="000000"/>
+              </a:buClr>
+              <a:buSzPct val="75000"/>
+              <a:buFont typeface="Symbol" charset="2"/>
+              <a:buChar char=""/>
+            </a:pPr>
+            <a:r>
+              <a:rPr lang="en-US" sz="2800" spc="-1" strike="noStrike">
+                <a:solidFill>
+                  <a:srgbClr val="000000"/>
+                </a:solidFill>
+                <a:uFill>
+                  <a:solidFill>
+                    <a:srgbClr val="ffffff"/>
+                  </a:solidFill>
+                </a:uFill>
+                <a:latin typeface="Arial"/>
+              </a:rPr>
+              <a:t>2.º nível da estrutura de tópicos</a:t>
+            </a:r>
+            <a:endParaRPr lang="en-US" sz="2800" spc="-1" strike="noStrike">
+              <a:solidFill>
+                <a:srgbClr val="000000"/>
+              </a:solidFill>
+              <a:uFill>
+                <a:solidFill>
+                  <a:srgbClr val="ffffff"/>
+                </a:solidFill>
+              </a:uFill>
+              <a:latin typeface="Arial"/>
+            </a:endParaRPr>
+          </a:p>
+          <a:p>
+            <a:pPr lvl="2" marL="1296000" indent="-288000">
+              <a:buClr>
+                <a:srgbClr val="000000"/>
+              </a:buClr>
+              <a:buSzPct val="45000"/>
+              <a:buFont typeface="Wingdings" charset="2"/>
+              <a:buChar char=""/>
+            </a:pPr>
+            <a:r>
+              <a:rPr lang="en-US" sz="2400" spc="-1" strike="noStrike">
+                <a:solidFill>
+                  <a:srgbClr val="000000"/>
+                </a:solidFill>
+                <a:uFill>
+                  <a:solidFill>
+                    <a:srgbClr val="ffffff"/>
+                  </a:solidFill>
+                </a:uFill>
+                <a:latin typeface="Arial"/>
+              </a:rPr>
+              <a:t>3.º nível da estrutura de tópicos</a:t>
+            </a:r>
+            <a:endParaRPr lang="en-US" sz="2400" spc="-1" strike="noStrike">
+              <a:solidFill>
+                <a:srgbClr val="000000"/>
+              </a:solidFill>
+              <a:uFill>
+                <a:solidFill>
+                  <a:srgbClr val="ffffff"/>
+                </a:solidFill>
+              </a:uFill>
+              <a:latin typeface="Arial"/>
+            </a:endParaRPr>
+          </a:p>
+          <a:p>
+            <a:pPr lvl="3" marL="1728000" indent="-216000">
+              <a:buClr>
+                <a:srgbClr val="000000"/>
+              </a:buClr>
+              <a:buSzPct val="75000"/>
+              <a:buFont typeface="Symbol" charset="2"/>
+              <a:buChar char=""/>
+            </a:pPr>
+            <a:r>
+              <a:rPr lang="en-US" sz="2000" spc="-1" strike="noStrike">
+                <a:solidFill>
+                  <a:srgbClr val="000000"/>
+                </a:solidFill>
+                <a:uFill>
+                  <a:solidFill>
+                    <a:srgbClr val="ffffff"/>
+                  </a:solidFill>
+                </a:uFill>
+                <a:latin typeface="Arial"/>
+              </a:rPr>
+              <a:t>4.º nível da estrutura de tópicos</a:t>
+            </a:r>
+            <a:endParaRPr lang="en-US" sz="2000" spc="-1" strike="noStrike">
+              <a:solidFill>
+                <a:srgbClr val="000000"/>
+              </a:solidFill>
+              <a:uFill>
+                <a:solidFill>
+                  <a:srgbClr val="ffffff"/>
+                </a:solidFill>
+              </a:uFill>
+              <a:latin typeface="Arial"/>
+            </a:endParaRPr>
+          </a:p>
+          <a:p>
+            <a:pPr lvl="4" marL="2160000" indent="-216000">
+              <a:buClr>
+                <a:srgbClr val="000000"/>
+              </a:buClr>
+              <a:buSzPct val="45000"/>
+              <a:buFont typeface="Wingdings" charset="2"/>
+              <a:buChar char=""/>
+            </a:pPr>
+            <a:r>
+              <a:rPr lang="en-US" sz="2000" spc="-1" strike="noStrike">
+                <a:solidFill>
+                  <a:srgbClr val="000000"/>
+                </a:solidFill>
+                <a:uFill>
+                  <a:solidFill>
+                    <a:srgbClr val="ffffff"/>
+                  </a:solidFill>
+                </a:uFill>
+                <a:latin typeface="Arial"/>
+              </a:rPr>
+              <a:t>5.º nível da estrutura de tópicos</a:t>
+            </a:r>
+            <a:endParaRPr lang="en-US" sz="2000" spc="-1" strike="noStrike">
+              <a:solidFill>
+                <a:srgbClr val="000000"/>
+              </a:solidFill>
+              <a:uFill>
+                <a:solidFill>
+                  <a:srgbClr val="ffffff"/>
+                </a:solidFill>
+              </a:uFill>
+              <a:latin typeface="Arial"/>
+            </a:endParaRPr>
+          </a:p>
+          <a:p>
+            <a:pPr lvl="5" marL="2592000" indent="-216000">
+              <a:buClr>
+                <a:srgbClr val="000000"/>
+              </a:buClr>
+              <a:buSzPct val="45000"/>
+              <a:buFont typeface="Wingdings" charset="2"/>
+              <a:buChar char=""/>
+            </a:pPr>
+            <a:r>
+              <a:rPr lang="en-US" sz="2000" spc="-1" strike="noStrike">
+                <a:solidFill>
+                  <a:srgbClr val="000000"/>
+                </a:solidFill>
+                <a:uFill>
+                  <a:solidFill>
+                    <a:srgbClr val="ffffff"/>
+                  </a:solidFill>
+                </a:uFill>
+                <a:latin typeface="Arial"/>
+              </a:rPr>
+              <a:t>6.º nível da estrutura de tópicos</a:t>
+            </a:r>
+            <a:endParaRPr lang="en-US" sz="2000" spc="-1" strike="noStrike">
+              <a:solidFill>
+                <a:srgbClr val="000000"/>
+              </a:solidFill>
+              <a:uFill>
+                <a:solidFill>
+                  <a:srgbClr val="ffffff"/>
+                </a:solidFill>
+              </a:uFill>
+              <a:latin typeface="Arial"/>
+            </a:endParaRPr>
+          </a:p>
+          <a:p>
+            <a:pPr lvl="6" marL="3024000" indent="-216000">
+              <a:buClr>
+                <a:srgbClr val="000000"/>
+              </a:buClr>
+              <a:buSzPct val="45000"/>
+              <a:buFont typeface="Wingdings" charset="2"/>
+              <a:buChar char=""/>
+            </a:pPr>
+            <a:r>
+              <a:rPr lang="en-US" sz="2000" spc="-1" strike="noStrike">
+                <a:solidFill>
+                  <a:srgbClr val="000000"/>
+                </a:solidFill>
+                <a:uFill>
+                  <a:solidFill>
+                    <a:srgbClr val="ffffff"/>
+                  </a:solidFill>
+                </a:uFill>
+                <a:latin typeface="Arial"/>
+              </a:rPr>
+              <a:t>7.º nível da estrutura de tópicos</a:t>
+            </a:r>
+            <a:endParaRPr lang="en-US" sz="2000" spc="-1" strike="noStrike">
+              <a:solidFill>
+                <a:srgbClr val="000000"/>
+              </a:solidFill>
+              <a:uFill>
+                <a:solidFill>
+                  <a:srgbClr val="ffffff"/>
+                </a:solidFill>
+              </a:uFill>
+              <a:latin typeface="Arial"/>
+            </a:endParaRPr>
+          </a:p>
+        </p:txBody>
       </p:sp>
     </p:spTree>
   </p:cSld>
@@ -9627,14 +9946,14 @@
       </p:grpSpPr>
       <p:sp>
         <p:nvSpPr>
-          <p:cNvPr id="203" name="CustomShape 1"/>
+          <p:cNvPr id="205" name="CustomShape 1"/>
           <p:cNvSpPr/>
           <p:nvPr/>
         </p:nvSpPr>
         <p:spPr>
           <a:xfrm>
             <a:off x="597960" y="1775160"/>
-            <a:ext cx="8218800" cy="835560"/>
+            <a:ext cx="8218440" cy="835200"/>
           </a:xfrm>
           <a:prstGeom prst="rect">
             <a:avLst/>
@@ -9689,14 +10008,14 @@
       </p:sp>
       <p:sp>
         <p:nvSpPr>
-          <p:cNvPr id="204" name="CustomShape 2"/>
+          <p:cNvPr id="206" name="CustomShape 2"/>
           <p:cNvSpPr/>
           <p:nvPr/>
         </p:nvSpPr>
         <p:spPr>
           <a:xfrm>
             <a:off x="597960" y="2715840"/>
-            <a:ext cx="8218800" cy="429840"/>
+            <a:ext cx="8218440" cy="429480"/>
           </a:xfrm>
           <a:prstGeom prst="rect">
             <a:avLst/>
@@ -9835,7 +10154,7 @@
       </p:sp>
       <p:pic>
         <p:nvPicPr>
-          <p:cNvPr id="205" name="Shape 87" descr=""/>
+          <p:cNvPr id="207" name="Shape 87" descr=""/>
           <p:cNvPicPr/>
           <p:nvPr/>
         </p:nvPicPr>
@@ -9846,7 +10165,7 @@
         <p:spPr>
           <a:xfrm>
             <a:off x="5029200" y="879120"/>
-            <a:ext cx="4121280" cy="2226960"/>
+            <a:ext cx="4120920" cy="2226600"/>
           </a:xfrm>
           <a:prstGeom prst="rect">
             <a:avLst/>
@@ -9858,7 +10177,7 @@
       </p:pic>
       <p:pic>
         <p:nvPicPr>
-          <p:cNvPr id="206" name="" descr=""/>
+          <p:cNvPr id="208" name="" descr=""/>
           <p:cNvPicPr/>
           <p:nvPr/>
         </p:nvPicPr>
@@ -9869,7 +10188,7 @@
         <p:spPr>
           <a:xfrm>
             <a:off x="3840480" y="1366200"/>
-            <a:ext cx="5209560" cy="2928960"/>
+            <a:ext cx="5209200" cy="2928600"/>
           </a:xfrm>
           <a:prstGeom prst="rect">
             <a:avLst/>
@@ -9881,7 +10200,7 @@
       </p:pic>
       <p:pic>
         <p:nvPicPr>
-          <p:cNvPr id="207" name="" descr=""/>
+          <p:cNvPr id="209" name="" descr=""/>
           <p:cNvPicPr/>
           <p:nvPr/>
         </p:nvPicPr>
@@ -9892,7 +10211,7 @@
         <p:spPr>
           <a:xfrm>
             <a:off x="4663440" y="1200240"/>
-            <a:ext cx="7129800" cy="4009320"/>
+            <a:ext cx="7129440" cy="4008960"/>
           </a:xfrm>
           <a:prstGeom prst="rect">
             <a:avLst/>
@@ -9904,7 +10223,7 @@
       </p:pic>
       <p:pic>
         <p:nvPicPr>
-          <p:cNvPr id="208" name="" descr=""/>
+          <p:cNvPr id="210" name="" descr=""/>
           <p:cNvPicPr/>
           <p:nvPr/>
         </p:nvPicPr>
@@ -9915,7 +10234,7 @@
         <p:spPr>
           <a:xfrm>
             <a:off x="731520" y="276480"/>
-            <a:ext cx="673560" cy="635400"/>
+            <a:ext cx="673200" cy="635040"/>
           </a:xfrm>
           <a:prstGeom prst="rect">
             <a:avLst/>
@@ -9927,7 +10246,7 @@
       </p:pic>
       <p:pic>
         <p:nvPicPr>
-          <p:cNvPr id="209" name="" descr=""/>
+          <p:cNvPr id="211" name="" descr=""/>
           <p:cNvPicPr/>
           <p:nvPr/>
         </p:nvPicPr>
@@ -9938,7 +10257,7 @@
         <p:spPr>
           <a:xfrm>
             <a:off x="731520" y="642240"/>
-            <a:ext cx="673560" cy="635400"/>
+            <a:ext cx="673200" cy="635040"/>
           </a:xfrm>
           <a:prstGeom prst="rect">
             <a:avLst/>
@@ -9950,7 +10269,7 @@
       </p:pic>
       <p:pic>
         <p:nvPicPr>
-          <p:cNvPr id="210" name="" descr=""/>
+          <p:cNvPr id="212" name="" descr=""/>
           <p:cNvPicPr/>
           <p:nvPr/>
         </p:nvPicPr>
@@ -9961,7 +10280,7 @@
         <p:spPr>
           <a:xfrm>
             <a:off x="1152720" y="642240"/>
-            <a:ext cx="673560" cy="635400"/>
+            <a:ext cx="673200" cy="635040"/>
           </a:xfrm>
           <a:prstGeom prst="rect">
             <a:avLst/>
@@ -9973,7 +10292,7 @@
       </p:pic>
       <p:pic>
         <p:nvPicPr>
-          <p:cNvPr id="211" name="" descr=""/>
+          <p:cNvPr id="213" name="" descr=""/>
           <p:cNvPicPr/>
           <p:nvPr/>
         </p:nvPicPr>
@@ -9984,7 +10303,7 @@
         <p:spPr>
           <a:xfrm>
             <a:off x="1152720" y="1008000"/>
-            <a:ext cx="673560" cy="635400"/>
+            <a:ext cx="673200" cy="635040"/>
           </a:xfrm>
           <a:prstGeom prst="rect">
             <a:avLst/>
@@ -9996,7 +10315,7 @@
       </p:pic>
       <p:pic>
         <p:nvPicPr>
-          <p:cNvPr id="212" name="" descr=""/>
+          <p:cNvPr id="214" name="" descr=""/>
           <p:cNvPicPr/>
           <p:nvPr/>
         </p:nvPicPr>
@@ -10007,7 +10326,7 @@
         <p:spPr>
           <a:xfrm>
             <a:off x="6090480" y="182880"/>
-            <a:ext cx="673560" cy="635400"/>
+            <a:ext cx="673200" cy="635040"/>
           </a:xfrm>
           <a:prstGeom prst="rect">
             <a:avLst/>
@@ -10019,7 +10338,7 @@
       </p:pic>
       <p:pic>
         <p:nvPicPr>
-          <p:cNvPr id="213" name="" descr=""/>
+          <p:cNvPr id="215" name="" descr=""/>
           <p:cNvPicPr/>
           <p:nvPr/>
         </p:nvPicPr>
@@ -10030,7 +10349,7 @@
         <p:spPr>
           <a:xfrm>
             <a:off x="6492240" y="182880"/>
-            <a:ext cx="673560" cy="635400"/>
+            <a:ext cx="673200" cy="635040"/>
           </a:xfrm>
           <a:prstGeom prst="rect">
             <a:avLst/>
@@ -10042,7 +10361,7 @@
       </p:pic>
       <p:pic>
         <p:nvPicPr>
-          <p:cNvPr id="214" name="" descr=""/>
+          <p:cNvPr id="216" name="" descr=""/>
           <p:cNvPicPr/>
           <p:nvPr/>
         </p:nvPicPr>
@@ -10053,7 +10372,7 @@
         <p:spPr>
           <a:xfrm>
             <a:off x="6492240" y="562320"/>
-            <a:ext cx="673560" cy="635400"/>
+            <a:ext cx="673200" cy="635040"/>
           </a:xfrm>
           <a:prstGeom prst="rect">
             <a:avLst/>
@@ -10117,14 +10436,14 @@
       </p:grpSpPr>
       <p:sp>
         <p:nvSpPr>
-          <p:cNvPr id="265" name="CustomShape 1"/>
+          <p:cNvPr id="267" name="CustomShape 1"/>
           <p:cNvSpPr/>
           <p:nvPr/>
         </p:nvSpPr>
         <p:spPr>
           <a:xfrm>
             <a:off x="311760" y="410040"/>
-            <a:ext cx="8517240" cy="604440"/>
+            <a:ext cx="8516880" cy="604080"/>
           </a:xfrm>
           <a:prstGeom prst="rect">
             <a:avLst/>
@@ -10179,14 +10498,14 @@
       </p:sp>
       <p:sp>
         <p:nvSpPr>
-          <p:cNvPr id="266" name="CustomShape 2"/>
+          <p:cNvPr id="268" name="CustomShape 2"/>
           <p:cNvSpPr/>
           <p:nvPr/>
         </p:nvSpPr>
         <p:spPr>
           <a:xfrm>
             <a:off x="311760" y="1229760"/>
-            <a:ext cx="4029480" cy="3347640"/>
+            <a:ext cx="4029120" cy="3347280"/>
           </a:xfrm>
           <a:prstGeom prst="rect">
             <a:avLst/>
@@ -10205,7 +10524,7 @@
         <p:txBody>
           <a:bodyPr lIns="90000" rIns="90000" tIns="91440" bIns="91440"/>
           <a:p>
-            <a:pPr marL="457200" indent="-225360">
+            <a:pPr marL="457200" indent="-225000">
               <a:lnSpc>
                 <a:spcPct val="100000"/>
               </a:lnSpc>
@@ -10333,7 +10652,7 @@
             </a:endParaRPr>
           </a:p>
           <a:p>
-            <a:pPr marL="457200" indent="-225360">
+            <a:pPr marL="457200" indent="-225000">
               <a:lnSpc>
                 <a:spcPct val="100000"/>
               </a:lnSpc>
@@ -10401,7 +10720,7 @@
             </a:endParaRPr>
           </a:p>
           <a:p>
-            <a:pPr marL="457200" indent="-225360">
+            <a:pPr marL="457200" indent="-225000">
               <a:lnSpc>
                 <a:spcPct val="100000"/>
               </a:lnSpc>
@@ -10472,7 +10791,7 @@
       </p:sp>
       <p:pic>
         <p:nvPicPr>
-          <p:cNvPr id="267" name="Shape 127" descr=""/>
+          <p:cNvPr id="269" name="Shape 127" descr=""/>
           <p:cNvPicPr/>
           <p:nvPr/>
         </p:nvPicPr>
@@ -10483,7 +10802,7 @@
         <p:spPr>
           <a:xfrm>
             <a:off x="4279680" y="193680"/>
-            <a:ext cx="1149120" cy="730080"/>
+            <a:ext cx="1148760" cy="729720"/>
           </a:xfrm>
           <a:prstGeom prst="rect">
             <a:avLst/>
@@ -10500,7 +10819,7 @@
       </p:pic>
       <p:pic>
         <p:nvPicPr>
-          <p:cNvPr id="268" name="Shape 128" descr=""/>
+          <p:cNvPr id="270" name="Shape 128" descr=""/>
           <p:cNvPicPr/>
           <p:nvPr/>
         </p:nvPicPr>
@@ -10511,7 +10830,7 @@
         <p:spPr>
           <a:xfrm>
             <a:off x="4468320" y="1137960"/>
-            <a:ext cx="4546800" cy="2854440"/>
+            <a:ext cx="4546440" cy="2854080"/>
           </a:xfrm>
           <a:prstGeom prst="rect">
             <a:avLst/>
@@ -10580,14 +10899,14 @@
       </p:grpSpPr>
       <p:sp>
         <p:nvSpPr>
-          <p:cNvPr id="269" name="CustomShape 1"/>
+          <p:cNvPr id="271" name="CustomShape 1"/>
           <p:cNvSpPr/>
           <p:nvPr/>
         </p:nvSpPr>
         <p:spPr>
           <a:xfrm>
             <a:off x="311760" y="410040"/>
-            <a:ext cx="8517240" cy="604440"/>
+            <a:ext cx="8516880" cy="604080"/>
           </a:xfrm>
           <a:prstGeom prst="rect">
             <a:avLst/>
@@ -10642,14 +10961,14 @@
       </p:sp>
       <p:sp>
         <p:nvSpPr>
-          <p:cNvPr id="270" name="CustomShape 2"/>
+          <p:cNvPr id="272" name="CustomShape 2"/>
           <p:cNvSpPr/>
           <p:nvPr/>
         </p:nvSpPr>
         <p:spPr>
           <a:xfrm>
             <a:off x="311760" y="1229760"/>
-            <a:ext cx="3871800" cy="3381480"/>
+            <a:ext cx="3871440" cy="3381120"/>
           </a:xfrm>
           <a:prstGeom prst="rect">
             <a:avLst/>
@@ -10827,7 +11146,7 @@
       </p:sp>
       <p:pic>
         <p:nvPicPr>
-          <p:cNvPr id="271" name="Shape 135" descr=""/>
+          <p:cNvPr id="273" name="Shape 135" descr=""/>
           <p:cNvPicPr/>
           <p:nvPr/>
         </p:nvPicPr>
@@ -10838,7 +11157,7 @@
         <p:spPr>
           <a:xfrm>
             <a:off x="4431960" y="592920"/>
-            <a:ext cx="1739880" cy="1073160"/>
+            <a:ext cx="1739520" cy="1072800"/>
           </a:xfrm>
           <a:prstGeom prst="rect">
             <a:avLst/>
@@ -10855,14 +11174,14 @@
       </p:pic>
       <p:sp>
         <p:nvSpPr>
-          <p:cNvPr id="272" name="CustomShape 3"/>
+          <p:cNvPr id="274" name="CustomShape 3"/>
           <p:cNvSpPr/>
           <p:nvPr/>
         </p:nvSpPr>
         <p:spPr>
           <a:xfrm>
             <a:off x="5728680" y="2836080"/>
-            <a:ext cx="2292840" cy="660960"/>
+            <a:ext cx="2292480" cy="660600"/>
           </a:xfrm>
           <a:prstGeom prst="rect">
             <a:avLst/>
@@ -10999,14 +11318,14 @@
       </p:grpSpPr>
       <p:sp>
         <p:nvSpPr>
-          <p:cNvPr id="273" name="CustomShape 1"/>
+          <p:cNvPr id="275" name="CustomShape 1"/>
           <p:cNvSpPr/>
           <p:nvPr/>
         </p:nvSpPr>
         <p:spPr>
           <a:xfrm>
             <a:off x="311760" y="410040"/>
-            <a:ext cx="8517240" cy="604440"/>
+            <a:ext cx="8516880" cy="604080"/>
           </a:xfrm>
           <a:prstGeom prst="rect">
             <a:avLst/>
@@ -11061,14 +11380,14 @@
       </p:sp>
       <p:sp>
         <p:nvSpPr>
-          <p:cNvPr id="274" name="CustomShape 2"/>
+          <p:cNvPr id="276" name="CustomShape 2"/>
           <p:cNvSpPr/>
           <p:nvPr/>
         </p:nvSpPr>
         <p:spPr>
           <a:xfrm>
             <a:off x="311760" y="1229760"/>
-            <a:ext cx="8385120" cy="3336480"/>
+            <a:ext cx="8384760" cy="3336120"/>
           </a:xfrm>
           <a:prstGeom prst="rect">
             <a:avLst/>
@@ -11268,14 +11587,14 @@
       </p:grpSpPr>
       <p:sp>
         <p:nvSpPr>
-          <p:cNvPr id="275" name="CustomShape 1"/>
+          <p:cNvPr id="277" name="CustomShape 1"/>
           <p:cNvSpPr/>
           <p:nvPr/>
         </p:nvSpPr>
         <p:spPr>
           <a:xfrm>
             <a:off x="311760" y="410040"/>
-            <a:ext cx="8517240" cy="604440"/>
+            <a:ext cx="8516880" cy="604080"/>
           </a:xfrm>
           <a:prstGeom prst="rect">
             <a:avLst/>
@@ -11330,14 +11649,14 @@
       </p:sp>
       <p:sp>
         <p:nvSpPr>
-          <p:cNvPr id="276" name="CustomShape 2"/>
+          <p:cNvPr id="278" name="CustomShape 2"/>
           <p:cNvSpPr/>
           <p:nvPr/>
         </p:nvSpPr>
         <p:spPr>
           <a:xfrm>
             <a:off x="311760" y="1229760"/>
-            <a:ext cx="3365640" cy="1073520"/>
+            <a:ext cx="3365280" cy="1073160"/>
           </a:xfrm>
           <a:prstGeom prst="rect">
             <a:avLst/>
@@ -11422,7 +11741,7 @@
       </p:sp>
       <p:pic>
         <p:nvPicPr>
-          <p:cNvPr id="277" name="Shape 149" descr=""/>
+          <p:cNvPr id="279" name="Shape 149" descr=""/>
           <p:cNvPicPr/>
           <p:nvPr/>
         </p:nvPicPr>
@@ -11433,7 +11752,7 @@
         <p:spPr>
           <a:xfrm>
             <a:off x="311760" y="2352240"/>
-            <a:ext cx="2588760" cy="2326320"/>
+            <a:ext cx="2588400" cy="2325960"/>
           </a:xfrm>
           <a:prstGeom prst="rect">
             <a:avLst/>
@@ -11445,7 +11764,7 @@
       </p:pic>
       <p:pic>
         <p:nvPicPr>
-          <p:cNvPr id="278" name="Shape 150" descr=""/>
+          <p:cNvPr id="280" name="Shape 150" descr=""/>
           <p:cNvPicPr/>
           <p:nvPr/>
         </p:nvPicPr>
@@ -11456,7 +11775,7 @@
         <p:spPr>
           <a:xfrm>
             <a:off x="5126760" y="869760"/>
-            <a:ext cx="3503520" cy="3197880"/>
+            <a:ext cx="3503160" cy="3197520"/>
           </a:xfrm>
           <a:prstGeom prst="rect">
             <a:avLst/>
@@ -11468,14 +11787,14 @@
       </p:pic>
       <p:sp>
         <p:nvSpPr>
-          <p:cNvPr id="279" name="CustomShape 3"/>
+          <p:cNvPr id="281" name="CustomShape 3"/>
           <p:cNvSpPr/>
           <p:nvPr/>
         </p:nvSpPr>
         <p:spPr>
           <a:xfrm>
             <a:off x="3415680" y="2093400"/>
-            <a:ext cx="1707840" cy="1448640"/>
+            <a:ext cx="1707480" cy="1448280"/>
           </a:xfrm>
           <a:prstGeom prst="rightArrow">
             <a:avLst>
@@ -11554,14 +11873,14 @@
       </p:grpSpPr>
       <p:sp>
         <p:nvSpPr>
-          <p:cNvPr id="280" name="CustomShape 1"/>
+          <p:cNvPr id="282" name="CustomShape 1"/>
           <p:cNvSpPr/>
           <p:nvPr/>
         </p:nvSpPr>
         <p:spPr>
           <a:xfrm>
             <a:off x="457200" y="0"/>
-            <a:ext cx="8227440" cy="615960"/>
+            <a:ext cx="8227080" cy="615600"/>
           </a:xfrm>
           <a:prstGeom prst="rect">
             <a:avLst/>
@@ -11616,7 +11935,7 @@
       </p:sp>
       <p:pic>
         <p:nvPicPr>
-          <p:cNvPr id="281" name="" descr=""/>
+          <p:cNvPr id="283" name="" descr=""/>
           <p:cNvPicPr/>
           <p:nvPr/>
         </p:nvPicPr>
@@ -11627,7 +11946,7 @@
         <p:spPr>
           <a:xfrm>
             <a:off x="2079360" y="1188720"/>
-            <a:ext cx="4685760" cy="2467440"/>
+            <a:ext cx="4685400" cy="2467080"/>
           </a:xfrm>
           <a:prstGeom prst="rect">
             <a:avLst/>
@@ -11644,14 +11963,14 @@
       </p:pic>
       <p:sp>
         <p:nvSpPr>
-          <p:cNvPr id="282" name="CustomShape 2"/>
+          <p:cNvPr id="284" name="CustomShape 2"/>
           <p:cNvSpPr/>
           <p:nvPr/>
         </p:nvSpPr>
         <p:spPr>
           <a:xfrm>
             <a:off x="2926080" y="1737360"/>
-            <a:ext cx="2193120" cy="1644480"/>
+            <a:ext cx="2192760" cy="1644120"/>
           </a:xfrm>
           <a:prstGeom prst="ellipse">
             <a:avLst/>
@@ -11673,14 +11992,14 @@
       </p:sp>
       <p:sp>
         <p:nvSpPr>
-          <p:cNvPr id="283" name="CustomShape 3"/>
+          <p:cNvPr id="285" name="CustomShape 3"/>
           <p:cNvSpPr/>
           <p:nvPr/>
         </p:nvSpPr>
         <p:spPr>
           <a:xfrm>
             <a:off x="3657600" y="3931920"/>
-            <a:ext cx="1095840" cy="272880"/>
+            <a:ext cx="1095480" cy="272520"/>
           </a:xfrm>
           <a:prstGeom prst="rect">
             <a:avLst/>
@@ -11730,7 +12049,7 @@
       </p:sp>
       <p:sp>
         <p:nvSpPr>
-          <p:cNvPr id="284" name="Line 4"/>
+          <p:cNvPr id="286" name="Line 4"/>
           <p:cNvSpPr/>
           <p:nvPr/>
         </p:nvSpPr>
@@ -11758,14 +12077,14 @@
       </p:sp>
       <p:sp>
         <p:nvSpPr>
-          <p:cNvPr id="285" name="CustomShape 5"/>
+          <p:cNvPr id="287" name="CustomShape 5"/>
           <p:cNvSpPr/>
           <p:nvPr/>
         </p:nvSpPr>
         <p:spPr>
           <a:xfrm>
             <a:off x="2011680" y="1371600"/>
-            <a:ext cx="2924640" cy="364320"/>
+            <a:ext cx="2924280" cy="363960"/>
           </a:xfrm>
           <a:prstGeom prst="ellipse">
             <a:avLst/>
@@ -11787,14 +12106,14 @@
       </p:sp>
       <p:sp>
         <p:nvSpPr>
-          <p:cNvPr id="286" name="CustomShape 6"/>
+          <p:cNvPr id="288" name="CustomShape 6"/>
           <p:cNvSpPr/>
           <p:nvPr/>
         </p:nvSpPr>
         <p:spPr>
           <a:xfrm>
             <a:off x="3474720" y="731520"/>
-            <a:ext cx="821520" cy="230760"/>
+            <a:ext cx="821160" cy="230400"/>
           </a:xfrm>
           <a:prstGeom prst="rect">
             <a:avLst/>
@@ -11844,7 +12163,7 @@
       </p:sp>
       <p:sp>
         <p:nvSpPr>
-          <p:cNvPr id="287" name="Line 7"/>
+          <p:cNvPr id="289" name="Line 7"/>
           <p:cNvSpPr/>
           <p:nvPr/>
         </p:nvSpPr>
@@ -11872,14 +12191,14 @@
       </p:sp>
       <p:sp>
         <p:nvSpPr>
-          <p:cNvPr id="288" name="CustomShape 8"/>
+          <p:cNvPr id="290" name="CustomShape 8"/>
           <p:cNvSpPr/>
           <p:nvPr/>
         </p:nvSpPr>
         <p:spPr>
           <a:xfrm>
             <a:off x="5303880" y="1188720"/>
-            <a:ext cx="1644120" cy="364320"/>
+            <a:ext cx="1643760" cy="363960"/>
           </a:xfrm>
           <a:prstGeom prst="ellipse">
             <a:avLst/>
@@ -11901,14 +12220,14 @@
       </p:sp>
       <p:sp>
         <p:nvSpPr>
-          <p:cNvPr id="289" name="CustomShape 9"/>
+          <p:cNvPr id="291" name="CustomShape 9"/>
           <p:cNvSpPr/>
           <p:nvPr/>
         </p:nvSpPr>
         <p:spPr>
           <a:xfrm>
             <a:off x="6492240" y="617400"/>
-            <a:ext cx="1095840" cy="230760"/>
+            <a:ext cx="1095480" cy="230400"/>
           </a:xfrm>
           <a:prstGeom prst="rect">
             <a:avLst/>
@@ -11958,7 +12277,7 @@
       </p:sp>
       <p:sp>
         <p:nvSpPr>
-          <p:cNvPr id="290" name="Line 10"/>
+          <p:cNvPr id="292" name="Line 10"/>
           <p:cNvSpPr/>
           <p:nvPr/>
         </p:nvSpPr>
@@ -11986,14 +12305,14 @@
       </p:sp>
       <p:sp>
         <p:nvSpPr>
-          <p:cNvPr id="291" name="CustomShape 11"/>
+          <p:cNvPr id="293" name="CustomShape 11"/>
           <p:cNvSpPr/>
           <p:nvPr/>
         </p:nvSpPr>
         <p:spPr>
           <a:xfrm>
             <a:off x="2011680" y="1920240"/>
-            <a:ext cx="730080" cy="730080"/>
+            <a:ext cx="729720" cy="729720"/>
           </a:xfrm>
           <a:prstGeom prst="ellipse">
             <a:avLst/>
@@ -12015,14 +12334,14 @@
       </p:sp>
       <p:sp>
         <p:nvSpPr>
-          <p:cNvPr id="292" name="CustomShape 12"/>
+          <p:cNvPr id="294" name="CustomShape 12"/>
           <p:cNvSpPr/>
           <p:nvPr/>
         </p:nvSpPr>
         <p:spPr>
           <a:xfrm>
             <a:off x="548640" y="2011680"/>
-            <a:ext cx="1278720" cy="372600"/>
+            <a:ext cx="1278360" cy="372240"/>
           </a:xfrm>
           <a:prstGeom prst="rect">
             <a:avLst/>
@@ -12072,7 +12391,7 @@
       </p:sp>
       <p:sp>
         <p:nvSpPr>
-          <p:cNvPr id="293" name="Line 13"/>
+          <p:cNvPr id="295" name="Line 13"/>
           <p:cNvSpPr/>
           <p:nvPr/>
         </p:nvSpPr>
@@ -12100,14 +12419,14 @@
       </p:sp>
       <p:sp>
         <p:nvSpPr>
-          <p:cNvPr id="294" name="CustomShape 14"/>
+          <p:cNvPr id="296" name="CustomShape 14"/>
           <p:cNvSpPr/>
           <p:nvPr/>
         </p:nvSpPr>
         <p:spPr>
           <a:xfrm>
             <a:off x="2011680" y="2743200"/>
-            <a:ext cx="730080" cy="730080"/>
+            <a:ext cx="729720" cy="729720"/>
           </a:xfrm>
           <a:prstGeom prst="ellipse">
             <a:avLst/>
@@ -12129,14 +12448,14 @@
       </p:sp>
       <p:sp>
         <p:nvSpPr>
-          <p:cNvPr id="295" name="CustomShape 15"/>
+          <p:cNvPr id="297" name="CustomShape 15"/>
           <p:cNvSpPr/>
           <p:nvPr/>
         </p:nvSpPr>
         <p:spPr>
           <a:xfrm>
             <a:off x="822960" y="2926080"/>
-            <a:ext cx="912960" cy="272880"/>
+            <a:ext cx="912600" cy="272520"/>
           </a:xfrm>
           <a:prstGeom prst="rect">
             <a:avLst/>
@@ -12186,7 +12505,7 @@
       </p:sp>
       <p:sp>
         <p:nvSpPr>
-          <p:cNvPr id="296" name="Line 16"/>
+          <p:cNvPr id="298" name="Line 16"/>
           <p:cNvSpPr/>
           <p:nvPr/>
         </p:nvSpPr>
@@ -12214,14 +12533,14 @@
       </p:sp>
       <p:sp>
         <p:nvSpPr>
-          <p:cNvPr id="297" name="CustomShape 17"/>
+          <p:cNvPr id="299" name="CustomShape 17"/>
           <p:cNvSpPr/>
           <p:nvPr/>
         </p:nvSpPr>
         <p:spPr>
           <a:xfrm>
             <a:off x="5577840" y="1645920"/>
-            <a:ext cx="1278720" cy="1095840"/>
+            <a:ext cx="1278360" cy="1095480"/>
           </a:xfrm>
           <a:prstGeom prst="ellipse">
             <a:avLst/>
@@ -12243,14 +12562,14 @@
       </p:sp>
       <p:sp>
         <p:nvSpPr>
-          <p:cNvPr id="298" name="CustomShape 18"/>
+          <p:cNvPr id="300" name="CustomShape 18"/>
           <p:cNvSpPr/>
           <p:nvPr/>
         </p:nvSpPr>
         <p:spPr>
           <a:xfrm>
             <a:off x="7406640" y="1596600"/>
-            <a:ext cx="1095840" cy="779400"/>
+            <a:ext cx="1095480" cy="779040"/>
           </a:xfrm>
           <a:prstGeom prst="rect">
             <a:avLst/>
@@ -12300,7 +12619,7 @@
       </p:sp>
       <p:sp>
         <p:nvSpPr>
-          <p:cNvPr id="299" name="Line 19"/>
+          <p:cNvPr id="301" name="Line 19"/>
           <p:cNvSpPr/>
           <p:nvPr/>
         </p:nvSpPr>
@@ -12328,14 +12647,14 @@
       </p:sp>
       <p:sp>
         <p:nvSpPr>
-          <p:cNvPr id="300" name="CustomShape 20"/>
+          <p:cNvPr id="302" name="CustomShape 20"/>
           <p:cNvSpPr/>
           <p:nvPr/>
         </p:nvSpPr>
         <p:spPr>
           <a:xfrm>
             <a:off x="5303520" y="2743200"/>
-            <a:ext cx="1278720" cy="912960"/>
+            <a:ext cx="1278360" cy="912600"/>
           </a:xfrm>
           <a:prstGeom prst="ellipse">
             <a:avLst/>
@@ -12357,14 +12676,14 @@
       </p:sp>
       <p:sp>
         <p:nvSpPr>
-          <p:cNvPr id="301" name="CustomShape 21"/>
+          <p:cNvPr id="303" name="CustomShape 21"/>
           <p:cNvSpPr/>
           <p:nvPr/>
         </p:nvSpPr>
         <p:spPr>
           <a:xfrm>
             <a:off x="6217920" y="4015080"/>
-            <a:ext cx="1553040" cy="372600"/>
+            <a:ext cx="1552680" cy="372240"/>
           </a:xfrm>
           <a:prstGeom prst="rect">
             <a:avLst/>
@@ -12414,7 +12733,7 @@
       </p:sp>
       <p:sp>
         <p:nvSpPr>
-          <p:cNvPr id="302" name="Line 22"/>
+          <p:cNvPr id="304" name="Line 22"/>
           <p:cNvSpPr/>
           <p:nvPr/>
         </p:nvSpPr>
@@ -12442,14 +12761,14 @@
       </p:sp>
       <p:sp>
         <p:nvSpPr>
-          <p:cNvPr id="303" name="CustomShape 23"/>
+          <p:cNvPr id="305" name="CustomShape 23"/>
           <p:cNvSpPr/>
           <p:nvPr/>
         </p:nvSpPr>
         <p:spPr>
           <a:xfrm>
             <a:off x="5212440" y="2011680"/>
-            <a:ext cx="272520" cy="272880"/>
+            <a:ext cx="272160" cy="272520"/>
           </a:xfrm>
           <a:prstGeom prst="ellipse">
             <a:avLst/>
@@ -12471,14 +12790,14 @@
       </p:sp>
       <p:sp>
         <p:nvSpPr>
-          <p:cNvPr id="304" name="CustomShape 24"/>
+          <p:cNvPr id="306" name="CustomShape 24"/>
           <p:cNvSpPr/>
           <p:nvPr/>
         </p:nvSpPr>
         <p:spPr>
           <a:xfrm>
             <a:off x="4572000" y="631800"/>
-            <a:ext cx="1553040" cy="372600"/>
+            <a:ext cx="1552680" cy="372240"/>
           </a:xfrm>
           <a:prstGeom prst="rect">
             <a:avLst/>
@@ -12528,7 +12847,7 @@
       </p:sp>
       <p:sp>
         <p:nvSpPr>
-          <p:cNvPr id="305" name="Line 25"/>
+          <p:cNvPr id="307" name="Line 25"/>
           <p:cNvSpPr/>
           <p:nvPr/>
         </p:nvSpPr>
@@ -12608,14 +12927,14 @@
       </p:grpSpPr>
       <p:sp>
         <p:nvSpPr>
-          <p:cNvPr id="306" name="CustomShape 1"/>
+          <p:cNvPr id="308" name="CustomShape 1"/>
           <p:cNvSpPr/>
           <p:nvPr/>
         </p:nvSpPr>
         <p:spPr>
           <a:xfrm>
             <a:off x="365760" y="288720"/>
-            <a:ext cx="5576400" cy="532800"/>
+            <a:ext cx="5576040" cy="532440"/>
           </a:xfrm>
           <a:prstGeom prst="rect">
             <a:avLst/>
@@ -12670,14 +12989,14 @@
       </p:sp>
       <p:sp>
         <p:nvSpPr>
-          <p:cNvPr id="307" name="CustomShape 2"/>
+          <p:cNvPr id="309" name="CustomShape 2"/>
           <p:cNvSpPr/>
           <p:nvPr/>
         </p:nvSpPr>
         <p:spPr>
           <a:xfrm>
             <a:off x="457200" y="1005840"/>
-            <a:ext cx="8136720" cy="2392560"/>
+            <a:ext cx="8136360" cy="2392200"/>
           </a:xfrm>
           <a:prstGeom prst="rect">
             <a:avLst/>
@@ -12962,14 +13281,14 @@
       </p:grpSpPr>
       <p:sp>
         <p:nvSpPr>
-          <p:cNvPr id="308" name="CustomShape 1"/>
+          <p:cNvPr id="310" name="CustomShape 1"/>
           <p:cNvSpPr/>
           <p:nvPr/>
         </p:nvSpPr>
         <p:spPr>
           <a:xfrm>
             <a:off x="457200" y="156960"/>
-            <a:ext cx="6786360" cy="481680"/>
+            <a:ext cx="6786000" cy="481320"/>
           </a:xfrm>
           <a:prstGeom prst="rect">
             <a:avLst/>
@@ -13024,7 +13343,7 @@
       </p:sp>
       <p:pic>
         <p:nvPicPr>
-          <p:cNvPr id="309" name="" descr=""/>
+          <p:cNvPr id="311" name="" descr=""/>
           <p:cNvPicPr/>
           <p:nvPr/>
         </p:nvPicPr>
@@ -13035,7 +13354,7 @@
         <p:spPr>
           <a:xfrm>
             <a:off x="2626920" y="1345320"/>
-            <a:ext cx="4138200" cy="2127960"/>
+            <a:ext cx="4137840" cy="2127600"/>
           </a:xfrm>
           <a:prstGeom prst="rect">
             <a:avLst/>
@@ -13052,14 +13371,14 @@
       </p:pic>
       <p:sp>
         <p:nvSpPr>
-          <p:cNvPr id="310" name="CustomShape 2"/>
+          <p:cNvPr id="312" name="CustomShape 2"/>
           <p:cNvSpPr/>
           <p:nvPr/>
         </p:nvSpPr>
         <p:spPr>
           <a:xfrm>
             <a:off x="5029200" y="2743200"/>
-            <a:ext cx="1700640" cy="730080"/>
+            <a:ext cx="1700280" cy="729720"/>
           </a:xfrm>
           <a:prstGeom prst="ellipse">
             <a:avLst/>
@@ -13081,14 +13400,14 @@
       </p:sp>
       <p:sp>
         <p:nvSpPr>
-          <p:cNvPr id="311" name="CustomShape 3"/>
+          <p:cNvPr id="313" name="CustomShape 3"/>
           <p:cNvSpPr/>
           <p:nvPr/>
         </p:nvSpPr>
         <p:spPr>
           <a:xfrm>
             <a:off x="2560320" y="1280160"/>
-            <a:ext cx="844560" cy="235080"/>
+            <a:ext cx="844200" cy="234720"/>
           </a:xfrm>
           <a:prstGeom prst="ellipse">
             <a:avLst/>
@@ -13110,14 +13429,14 @@
       </p:sp>
       <p:sp>
         <p:nvSpPr>
-          <p:cNvPr id="312" name="CustomShape 4"/>
+          <p:cNvPr id="314" name="CustomShape 4"/>
           <p:cNvSpPr/>
           <p:nvPr/>
         </p:nvSpPr>
         <p:spPr>
           <a:xfrm>
             <a:off x="4977720" y="1345320"/>
-            <a:ext cx="1752120" cy="235080"/>
+            <a:ext cx="1751760" cy="234720"/>
           </a:xfrm>
           <a:prstGeom prst="ellipse">
             <a:avLst/>
@@ -13139,14 +13458,14 @@
       </p:sp>
       <p:sp>
         <p:nvSpPr>
-          <p:cNvPr id="313" name="CustomShape 5"/>
+          <p:cNvPr id="315" name="CustomShape 5"/>
           <p:cNvSpPr/>
           <p:nvPr/>
         </p:nvSpPr>
         <p:spPr>
           <a:xfrm>
             <a:off x="3466800" y="1694160"/>
-            <a:ext cx="1146960" cy="1063080"/>
+            <a:ext cx="1146600" cy="1062720"/>
           </a:xfrm>
           <a:prstGeom prst="ellipse">
             <a:avLst/>
@@ -13168,14 +13487,14 @@
       </p:sp>
       <p:sp>
         <p:nvSpPr>
-          <p:cNvPr id="314" name="CustomShape 6"/>
+          <p:cNvPr id="316" name="CustomShape 6"/>
           <p:cNvSpPr/>
           <p:nvPr/>
         </p:nvSpPr>
         <p:spPr>
           <a:xfrm>
             <a:off x="5067000" y="2140920"/>
-            <a:ext cx="966600" cy="235080"/>
+            <a:ext cx="966240" cy="234720"/>
           </a:xfrm>
           <a:prstGeom prst="ellipse">
             <a:avLst/>
@@ -13197,14 +13516,14 @@
       </p:sp>
       <p:sp>
         <p:nvSpPr>
-          <p:cNvPr id="315" name="CustomShape 7"/>
+          <p:cNvPr id="317" name="CustomShape 7"/>
           <p:cNvSpPr/>
           <p:nvPr/>
         </p:nvSpPr>
         <p:spPr>
           <a:xfrm>
             <a:off x="2680920" y="3172680"/>
-            <a:ext cx="1692000" cy="235440"/>
+            <a:ext cx="1691640" cy="235080"/>
           </a:xfrm>
           <a:prstGeom prst="ellipse">
             <a:avLst/>
@@ -13226,14 +13545,14 @@
       </p:sp>
       <p:sp>
         <p:nvSpPr>
-          <p:cNvPr id="316" name="CustomShape 8"/>
+          <p:cNvPr id="318" name="CustomShape 8"/>
           <p:cNvSpPr/>
           <p:nvPr/>
         </p:nvSpPr>
         <p:spPr>
           <a:xfrm>
             <a:off x="457200" y="672840"/>
-            <a:ext cx="2467440" cy="514440"/>
+            <a:ext cx="2467080" cy="514080"/>
           </a:xfrm>
           <a:prstGeom prst="rect">
             <a:avLst/>
@@ -13283,14 +13602,14 @@
       </p:sp>
       <p:sp>
         <p:nvSpPr>
-          <p:cNvPr id="317" name="CustomShape 9"/>
+          <p:cNvPr id="319" name="CustomShape 9"/>
           <p:cNvSpPr/>
           <p:nvPr/>
         </p:nvSpPr>
         <p:spPr>
           <a:xfrm>
             <a:off x="249480" y="2743200"/>
-            <a:ext cx="1852200" cy="798120"/>
+            <a:ext cx="1851840" cy="797760"/>
           </a:xfrm>
           <a:prstGeom prst="rect">
             <a:avLst/>
@@ -13340,14 +13659,14 @@
       </p:sp>
       <p:sp>
         <p:nvSpPr>
-          <p:cNvPr id="318" name="CustomShape 10"/>
+          <p:cNvPr id="320" name="CustomShape 10"/>
           <p:cNvSpPr/>
           <p:nvPr/>
         </p:nvSpPr>
         <p:spPr>
           <a:xfrm>
             <a:off x="6400800" y="631800"/>
-            <a:ext cx="2467440" cy="514440"/>
+            <a:ext cx="2467080" cy="514080"/>
           </a:xfrm>
           <a:prstGeom prst="rect">
             <a:avLst/>
@@ -13397,14 +13716,14 @@
       </p:sp>
       <p:sp>
         <p:nvSpPr>
-          <p:cNvPr id="319" name="CustomShape 11"/>
+          <p:cNvPr id="321" name="CustomShape 11"/>
           <p:cNvSpPr/>
           <p:nvPr/>
         </p:nvSpPr>
         <p:spPr>
           <a:xfrm>
             <a:off x="5760720" y="3731400"/>
-            <a:ext cx="2467440" cy="656280"/>
+            <a:ext cx="2467080" cy="655920"/>
           </a:xfrm>
           <a:prstGeom prst="rect">
             <a:avLst/>
@@ -13484,7 +13803,7 @@
       </p:sp>
       <p:sp>
         <p:nvSpPr>
-          <p:cNvPr id="320" name="Line 12"/>
+          <p:cNvPr id="322" name="Line 12"/>
           <p:cNvSpPr/>
           <p:nvPr/>
         </p:nvSpPr>
@@ -13512,7 +13831,7 @@
       </p:sp>
       <p:sp>
         <p:nvSpPr>
-          <p:cNvPr id="321" name="Line 13"/>
+          <p:cNvPr id="323" name="Line 13"/>
           <p:cNvSpPr/>
           <p:nvPr/>
         </p:nvSpPr>
@@ -13540,7 +13859,7 @@
       </p:sp>
       <p:sp>
         <p:nvSpPr>
-          <p:cNvPr id="322" name="Line 14"/>
+          <p:cNvPr id="324" name="Line 14"/>
           <p:cNvSpPr/>
           <p:nvPr/>
         </p:nvSpPr>
@@ -13568,7 +13887,7 @@
       </p:sp>
       <p:sp>
         <p:nvSpPr>
-          <p:cNvPr id="323" name="Line 15"/>
+          <p:cNvPr id="325" name="Line 15"/>
           <p:cNvSpPr/>
           <p:nvPr/>
         </p:nvSpPr>
@@ -13596,7 +13915,7 @@
       </p:sp>
       <p:sp>
         <p:nvSpPr>
-          <p:cNvPr id="324" name="Line 16"/>
+          <p:cNvPr id="326" name="Line 16"/>
           <p:cNvSpPr/>
           <p:nvPr/>
         </p:nvSpPr>
@@ -13624,7 +13943,7 @@
       </p:sp>
       <p:sp>
         <p:nvSpPr>
-          <p:cNvPr id="325" name="Line 17"/>
+          <p:cNvPr id="327" name="Line 17"/>
           <p:cNvSpPr/>
           <p:nvPr/>
         </p:nvSpPr>
@@ -13704,14 +14023,14 @@
       </p:grpSpPr>
       <p:sp>
         <p:nvSpPr>
-          <p:cNvPr id="326" name="CustomShape 1"/>
+          <p:cNvPr id="328" name="CustomShape 1"/>
           <p:cNvSpPr/>
           <p:nvPr/>
         </p:nvSpPr>
         <p:spPr>
           <a:xfrm>
             <a:off x="365760" y="288720"/>
-            <a:ext cx="8228160" cy="354240"/>
+            <a:ext cx="8227800" cy="353880"/>
           </a:xfrm>
           <a:prstGeom prst="rect">
             <a:avLst/>
@@ -13766,7 +14085,7 @@
       </p:sp>
       <p:pic>
         <p:nvPicPr>
-          <p:cNvPr id="327" name="" descr=""/>
+          <p:cNvPr id="329" name="" descr=""/>
           <p:cNvPicPr/>
           <p:nvPr/>
         </p:nvPicPr>
@@ -13777,7 +14096,7 @@
         <p:spPr>
           <a:xfrm>
             <a:off x="4248360" y="707040"/>
-            <a:ext cx="1694160" cy="2217960"/>
+            <a:ext cx="1693800" cy="2217600"/>
           </a:xfrm>
           <a:prstGeom prst="rect">
             <a:avLst/>
@@ -13794,14 +14113,14 @@
       </p:pic>
       <p:sp>
         <p:nvSpPr>
-          <p:cNvPr id="328" name="CustomShape 2"/>
+          <p:cNvPr id="330" name="CustomShape 2"/>
           <p:cNvSpPr/>
           <p:nvPr/>
         </p:nvSpPr>
         <p:spPr>
           <a:xfrm>
             <a:off x="182880" y="822960"/>
-            <a:ext cx="3829680" cy="2102040"/>
+            <a:ext cx="3829320" cy="2101680"/>
           </a:xfrm>
           <a:prstGeom prst="rect">
             <a:avLst/>
@@ -13820,7 +14139,7 @@
         <p:txBody>
           <a:bodyPr lIns="90000" rIns="90000" tIns="91440" bIns="91440"/>
           <a:p>
-            <a:pPr marL="457200" indent="-225360">
+            <a:pPr marL="457200" indent="-225000">
               <a:lnSpc>
                 <a:spcPct val="100000"/>
               </a:lnSpc>
@@ -13858,7 +14177,7 @@
             </a:endParaRPr>
           </a:p>
           <a:p>
-            <a:pPr marL="457200" indent="-225360">
+            <a:pPr marL="457200" indent="-225000">
               <a:lnSpc>
                 <a:spcPct val="100000"/>
               </a:lnSpc>
@@ -13926,7 +14245,7 @@
             </a:endParaRPr>
           </a:p>
           <a:p>
-            <a:pPr marL="457200" indent="-225360">
+            <a:pPr marL="457200" indent="-225000">
               <a:lnSpc>
                 <a:spcPct val="100000"/>
               </a:lnSpc>
@@ -13967,7 +14286,7 @@
       </p:sp>
       <p:pic>
         <p:nvPicPr>
-          <p:cNvPr id="329" name="" descr=""/>
+          <p:cNvPr id="331" name="" descr=""/>
           <p:cNvPicPr/>
           <p:nvPr/>
         </p:nvPicPr>
@@ -13978,7 +14297,7 @@
         <p:spPr>
           <a:xfrm>
             <a:off x="4998960" y="1737360"/>
-            <a:ext cx="1675080" cy="2961000"/>
+            <a:ext cx="1674720" cy="2960640"/>
           </a:xfrm>
           <a:prstGeom prst="rect">
             <a:avLst/>
@@ -13995,7 +14314,7 @@
       </p:pic>
       <p:pic>
         <p:nvPicPr>
-          <p:cNvPr id="330" name="" descr=""/>
+          <p:cNvPr id="332" name="" descr=""/>
           <p:cNvPicPr/>
           <p:nvPr/>
         </p:nvPicPr>
@@ -14006,7 +14325,7 @@
         <p:spPr>
           <a:xfrm>
             <a:off x="6364800" y="794880"/>
-            <a:ext cx="2503800" cy="2313000"/>
+            <a:ext cx="2503440" cy="2312640"/>
           </a:xfrm>
           <a:prstGeom prst="rect">
             <a:avLst/>
@@ -14075,14 +14394,14 @@
       </p:grpSpPr>
       <p:sp>
         <p:nvSpPr>
-          <p:cNvPr id="331" name="CustomShape 1"/>
+          <p:cNvPr id="333" name="CustomShape 1"/>
           <p:cNvSpPr/>
           <p:nvPr/>
         </p:nvSpPr>
         <p:spPr>
           <a:xfrm>
             <a:off x="260280" y="126360"/>
-            <a:ext cx="8517240" cy="604440"/>
+            <a:ext cx="8516880" cy="604080"/>
           </a:xfrm>
           <a:prstGeom prst="rect">
             <a:avLst/>
@@ -14137,7 +14456,7 @@
       </p:sp>
       <p:pic>
         <p:nvPicPr>
-          <p:cNvPr id="332" name="" descr=""/>
+          <p:cNvPr id="334" name="" descr=""/>
           <p:cNvPicPr/>
           <p:nvPr/>
         </p:nvPicPr>
@@ -14148,7 +14467,7 @@
         <p:spPr>
           <a:xfrm>
             <a:off x="365760" y="1006200"/>
-            <a:ext cx="3268080" cy="2867760"/>
+            <a:ext cx="3267720" cy="2867400"/>
           </a:xfrm>
           <a:prstGeom prst="rect">
             <a:avLst/>
@@ -14165,14 +14484,14 @@
       </p:pic>
       <p:sp>
         <p:nvSpPr>
-          <p:cNvPr id="333" name="CustomShape 2"/>
+          <p:cNvPr id="335" name="CustomShape 2"/>
           <p:cNvSpPr/>
           <p:nvPr/>
         </p:nvSpPr>
         <p:spPr>
           <a:xfrm>
             <a:off x="182880" y="1005840"/>
-            <a:ext cx="913680" cy="913680"/>
+            <a:ext cx="913320" cy="913320"/>
           </a:xfrm>
           <a:prstGeom prst="ellipse">
             <a:avLst/>
@@ -14194,7 +14513,7 @@
       </p:sp>
       <p:pic>
         <p:nvPicPr>
-          <p:cNvPr id="334" name="" descr=""/>
+          <p:cNvPr id="336" name="" descr=""/>
           <p:cNvPicPr/>
           <p:nvPr/>
         </p:nvPicPr>
@@ -14205,7 +14524,7 @@
         <p:spPr>
           <a:xfrm>
             <a:off x="3073320" y="731520"/>
-            <a:ext cx="2503800" cy="2313000"/>
+            <a:ext cx="2503440" cy="2312640"/>
           </a:xfrm>
           <a:prstGeom prst="rect">
             <a:avLst/>
@@ -14222,14 +14541,14 @@
       </p:pic>
       <p:sp>
         <p:nvSpPr>
-          <p:cNvPr id="335" name="CustomShape 3"/>
+          <p:cNvPr id="337" name="CustomShape 3"/>
           <p:cNvSpPr/>
           <p:nvPr/>
         </p:nvSpPr>
         <p:spPr>
           <a:xfrm>
             <a:off x="3840480" y="2011680"/>
-            <a:ext cx="913680" cy="913680"/>
+            <a:ext cx="913320" cy="913320"/>
           </a:xfrm>
           <a:prstGeom prst="ellipse">
             <a:avLst/>
@@ -14251,7 +14570,7 @@
       </p:sp>
       <p:pic>
         <p:nvPicPr>
-          <p:cNvPr id="336" name="" descr=""/>
+          <p:cNvPr id="338" name="" descr=""/>
           <p:cNvPicPr/>
           <p:nvPr/>
         </p:nvPicPr>
@@ -14262,7 +14581,7 @@
         <p:spPr>
           <a:xfrm>
             <a:off x="5760720" y="1280160"/>
-            <a:ext cx="3113640" cy="2475360"/>
+            <a:ext cx="3113280" cy="2475000"/>
           </a:xfrm>
           <a:prstGeom prst="rect">
             <a:avLst/>
@@ -14279,14 +14598,14 @@
       </p:pic>
       <p:sp>
         <p:nvSpPr>
-          <p:cNvPr id="337" name="CustomShape 4"/>
+          <p:cNvPr id="339" name="CustomShape 4"/>
           <p:cNvSpPr/>
           <p:nvPr/>
         </p:nvSpPr>
         <p:spPr>
           <a:xfrm>
             <a:off x="5760720" y="1097280"/>
-            <a:ext cx="3113640" cy="2833920"/>
+            <a:ext cx="3113280" cy="2833560"/>
           </a:xfrm>
           <a:prstGeom prst="ellipse">
             <a:avLst/>
@@ -14308,14 +14627,14 @@
       </p:sp>
       <p:sp>
         <p:nvSpPr>
-          <p:cNvPr id="338" name="CustomShape 5"/>
+          <p:cNvPr id="340" name="CustomShape 5"/>
           <p:cNvSpPr/>
           <p:nvPr/>
         </p:nvSpPr>
         <p:spPr>
           <a:xfrm>
             <a:off x="3932640" y="4114800"/>
-            <a:ext cx="2467440" cy="514440"/>
+            <a:ext cx="2467080" cy="514080"/>
           </a:xfrm>
           <a:prstGeom prst="rect">
             <a:avLst/>
@@ -14365,7 +14684,7 @@
       </p:sp>
       <p:sp>
         <p:nvSpPr>
-          <p:cNvPr id="339" name="Line 6"/>
+          <p:cNvPr id="341" name="Line 6"/>
           <p:cNvSpPr/>
           <p:nvPr/>
         </p:nvSpPr>
@@ -14393,7 +14712,7 @@
       </p:sp>
       <p:sp>
         <p:nvSpPr>
-          <p:cNvPr id="340" name="Line 7"/>
+          <p:cNvPr id="342" name="Line 7"/>
           <p:cNvSpPr/>
           <p:nvPr/>
         </p:nvSpPr>
@@ -14421,14 +14740,14 @@
       </p:sp>
       <p:sp>
         <p:nvSpPr>
-          <p:cNvPr id="341" name="CustomShape 8"/>
+          <p:cNvPr id="343" name="CustomShape 8"/>
           <p:cNvSpPr/>
           <p:nvPr/>
         </p:nvSpPr>
         <p:spPr>
           <a:xfrm>
             <a:off x="5029200" y="640080"/>
-            <a:ext cx="547920" cy="547920"/>
+            <a:ext cx="547560" cy="547560"/>
           </a:xfrm>
           <a:prstGeom prst="ellipse">
             <a:avLst/>
@@ -14450,14 +14769,14 @@
       </p:sp>
       <p:sp>
         <p:nvSpPr>
-          <p:cNvPr id="342" name="CustomShape 9"/>
+          <p:cNvPr id="344" name="CustomShape 9"/>
           <p:cNvSpPr/>
           <p:nvPr/>
         </p:nvSpPr>
         <p:spPr>
           <a:xfrm>
             <a:off x="6309360" y="307800"/>
-            <a:ext cx="2467440" cy="514440"/>
+            <a:ext cx="2467080" cy="514080"/>
           </a:xfrm>
           <a:prstGeom prst="rect">
             <a:avLst/>
@@ -14507,7 +14826,7 @@
       </p:sp>
       <p:sp>
         <p:nvSpPr>
-          <p:cNvPr id="343" name="Line 10"/>
+          <p:cNvPr id="345" name="Line 10"/>
           <p:cNvSpPr/>
           <p:nvPr/>
         </p:nvSpPr>
@@ -14587,14 +14906,14 @@
       </p:grpSpPr>
       <p:sp>
         <p:nvSpPr>
-          <p:cNvPr id="344" name="CustomShape 1"/>
+          <p:cNvPr id="346" name="CustomShape 1"/>
           <p:cNvSpPr/>
           <p:nvPr/>
         </p:nvSpPr>
         <p:spPr>
           <a:xfrm>
             <a:off x="260280" y="126360"/>
-            <a:ext cx="8517240" cy="604440"/>
+            <a:ext cx="8516880" cy="604080"/>
           </a:xfrm>
           <a:prstGeom prst="rect">
             <a:avLst/>
@@ -14649,7 +14968,7 @@
       </p:sp>
       <p:pic>
         <p:nvPicPr>
-          <p:cNvPr id="345" name="" descr=""/>
+          <p:cNvPr id="347" name="" descr=""/>
           <p:cNvPicPr/>
           <p:nvPr/>
         </p:nvPicPr>
@@ -14660,7 +14979,7 @@
         <p:spPr>
           <a:xfrm>
             <a:off x="457200" y="1280160"/>
-            <a:ext cx="2503800" cy="2313000"/>
+            <a:ext cx="2503440" cy="2312640"/>
           </a:xfrm>
           <a:prstGeom prst="rect">
             <a:avLst/>
@@ -14677,14 +14996,14 @@
       </p:pic>
       <p:sp>
         <p:nvSpPr>
-          <p:cNvPr id="346" name="CustomShape 2"/>
+          <p:cNvPr id="348" name="CustomShape 2"/>
           <p:cNvSpPr/>
           <p:nvPr/>
         </p:nvSpPr>
         <p:spPr>
           <a:xfrm>
             <a:off x="548640" y="1188720"/>
-            <a:ext cx="913680" cy="913680"/>
+            <a:ext cx="913320" cy="913320"/>
           </a:xfrm>
           <a:prstGeom prst="ellipse">
             <a:avLst/>
@@ -14706,7 +15025,7 @@
       </p:sp>
       <p:pic>
         <p:nvPicPr>
-          <p:cNvPr id="347" name="" descr=""/>
+          <p:cNvPr id="349" name="" descr=""/>
           <p:cNvPicPr/>
           <p:nvPr/>
         </p:nvPicPr>
@@ -14717,7 +15036,7 @@
         <p:spPr>
           <a:xfrm>
             <a:off x="4581720" y="779400"/>
-            <a:ext cx="2732760" cy="3609000"/>
+            <a:ext cx="2732400" cy="3608640"/>
           </a:xfrm>
           <a:prstGeom prst="rect">
             <a:avLst/>
@@ -14786,14 +15105,14 @@
       </p:grpSpPr>
       <p:sp>
         <p:nvSpPr>
-          <p:cNvPr id="215" name="CustomShape 1"/>
+          <p:cNvPr id="217" name="CustomShape 1"/>
           <p:cNvSpPr/>
           <p:nvPr/>
         </p:nvSpPr>
         <p:spPr>
           <a:xfrm>
             <a:off x="311760" y="410040"/>
-            <a:ext cx="8517240" cy="604440"/>
+            <a:ext cx="8516880" cy="604080"/>
           </a:xfrm>
           <a:prstGeom prst="rect">
             <a:avLst/>
@@ -14848,14 +15167,14 @@
       </p:sp>
       <p:sp>
         <p:nvSpPr>
-          <p:cNvPr id="216" name="CustomShape 2"/>
+          <p:cNvPr id="218" name="CustomShape 2"/>
           <p:cNvSpPr/>
           <p:nvPr/>
         </p:nvSpPr>
         <p:spPr>
           <a:xfrm>
             <a:off x="311760" y="1229760"/>
-            <a:ext cx="8517240" cy="3335760"/>
+            <a:ext cx="8516880" cy="3335400"/>
           </a:xfrm>
           <a:prstGeom prst="rect">
             <a:avLst/>
@@ -15074,14 +15393,14 @@
       </p:grpSpPr>
       <p:sp>
         <p:nvSpPr>
-          <p:cNvPr id="348" name="CustomShape 1"/>
+          <p:cNvPr id="350" name="CustomShape 1"/>
           <p:cNvSpPr/>
           <p:nvPr/>
         </p:nvSpPr>
         <p:spPr>
           <a:xfrm>
             <a:off x="260280" y="126360"/>
-            <a:ext cx="8517240" cy="604440"/>
+            <a:ext cx="8516880" cy="604080"/>
           </a:xfrm>
           <a:prstGeom prst="rect">
             <a:avLst/>
@@ -15136,7 +15455,7 @@
       </p:sp>
       <p:pic>
         <p:nvPicPr>
-          <p:cNvPr id="349" name="" descr=""/>
+          <p:cNvPr id="351" name="" descr=""/>
           <p:cNvPicPr/>
           <p:nvPr/>
         </p:nvPicPr>
@@ -15147,7 +15466,7 @@
         <p:spPr>
           <a:xfrm>
             <a:off x="238680" y="1188720"/>
-            <a:ext cx="2503800" cy="2313000"/>
+            <a:ext cx="2503440" cy="2312640"/>
           </a:xfrm>
           <a:prstGeom prst="rect">
             <a:avLst/>
@@ -15164,14 +15483,14 @@
       </p:pic>
       <p:sp>
         <p:nvSpPr>
-          <p:cNvPr id="350" name="CustomShape 2"/>
+          <p:cNvPr id="352" name="CustomShape 2"/>
           <p:cNvSpPr/>
           <p:nvPr/>
         </p:nvSpPr>
         <p:spPr>
           <a:xfrm>
             <a:off x="274320" y="1737360"/>
-            <a:ext cx="913680" cy="913680"/>
+            <a:ext cx="913320" cy="913320"/>
           </a:xfrm>
           <a:prstGeom prst="ellipse">
             <a:avLst/>
@@ -15193,7 +15512,7 @@
       </p:sp>
       <p:pic>
         <p:nvPicPr>
-          <p:cNvPr id="351" name="" descr=""/>
+          <p:cNvPr id="353" name="" descr=""/>
           <p:cNvPicPr/>
           <p:nvPr/>
         </p:nvPicPr>
@@ -15204,7 +15523,7 @@
         <p:spPr>
           <a:xfrm>
             <a:off x="2370240" y="690120"/>
-            <a:ext cx="3846960" cy="1503720"/>
+            <a:ext cx="3846600" cy="1503360"/>
           </a:xfrm>
           <a:prstGeom prst="rect">
             <a:avLst/>
@@ -15221,14 +15540,14 @@
       </p:pic>
       <p:sp>
         <p:nvSpPr>
-          <p:cNvPr id="352" name="CustomShape 3"/>
+          <p:cNvPr id="354" name="CustomShape 3"/>
           <p:cNvSpPr/>
           <p:nvPr/>
         </p:nvSpPr>
         <p:spPr>
           <a:xfrm>
             <a:off x="2286000" y="1554480"/>
-            <a:ext cx="4022640" cy="273600"/>
+            <a:ext cx="4022280" cy="273240"/>
           </a:xfrm>
           <a:prstGeom prst="ellipse">
             <a:avLst/>
@@ -15250,7 +15569,7 @@
       </p:sp>
       <p:pic>
         <p:nvPicPr>
-          <p:cNvPr id="353" name="" descr=""/>
+          <p:cNvPr id="355" name="" descr=""/>
           <p:cNvPicPr/>
           <p:nvPr/>
         </p:nvPicPr>
@@ -15261,7 +15580,7 @@
         <p:spPr>
           <a:xfrm>
             <a:off x="6062760" y="1920240"/>
-            <a:ext cx="2989080" cy="2880360"/>
+            <a:ext cx="2988720" cy="2880000"/>
           </a:xfrm>
           <a:prstGeom prst="rect">
             <a:avLst/>
@@ -15278,14 +15597,14 @@
       </p:pic>
       <p:sp>
         <p:nvSpPr>
-          <p:cNvPr id="354" name="CustomShape 4"/>
+          <p:cNvPr id="356" name="CustomShape 4"/>
           <p:cNvSpPr/>
           <p:nvPr/>
         </p:nvSpPr>
         <p:spPr>
           <a:xfrm>
             <a:off x="365760" y="3840480"/>
-            <a:ext cx="1096560" cy="273600"/>
+            <a:ext cx="1096200" cy="273240"/>
           </a:xfrm>
           <a:prstGeom prst="rect">
             <a:avLst/>
@@ -15335,7 +15654,7 @@
       </p:sp>
       <p:sp>
         <p:nvSpPr>
-          <p:cNvPr id="355" name="Line 5"/>
+          <p:cNvPr id="357" name="Line 5"/>
           <p:cNvSpPr/>
           <p:nvPr/>
         </p:nvSpPr>
@@ -15363,14 +15682,14 @@
       </p:sp>
       <p:sp>
         <p:nvSpPr>
-          <p:cNvPr id="356" name="CustomShape 6"/>
+          <p:cNvPr id="358" name="CustomShape 6"/>
           <p:cNvSpPr/>
           <p:nvPr/>
         </p:nvSpPr>
         <p:spPr>
           <a:xfrm>
             <a:off x="3291840" y="2834640"/>
-            <a:ext cx="2559600" cy="273600"/>
+            <a:ext cx="2559240" cy="273240"/>
           </a:xfrm>
           <a:prstGeom prst="rect">
             <a:avLst/>
@@ -15420,7 +15739,7 @@
       </p:sp>
       <p:sp>
         <p:nvSpPr>
-          <p:cNvPr id="357" name="Line 7"/>
+          <p:cNvPr id="359" name="Line 7"/>
           <p:cNvSpPr/>
           <p:nvPr/>
         </p:nvSpPr>
@@ -15448,14 +15767,14 @@
       </p:sp>
       <p:sp>
         <p:nvSpPr>
-          <p:cNvPr id="358" name="CustomShape 8"/>
+          <p:cNvPr id="360" name="CustomShape 8"/>
           <p:cNvSpPr/>
           <p:nvPr/>
         </p:nvSpPr>
         <p:spPr>
           <a:xfrm>
             <a:off x="3383280" y="3840480"/>
-            <a:ext cx="1462320" cy="273600"/>
+            <a:ext cx="1461960" cy="273240"/>
           </a:xfrm>
           <a:prstGeom prst="rect">
             <a:avLst/>
@@ -15505,7 +15824,7 @@
       </p:sp>
       <p:sp>
         <p:nvSpPr>
-          <p:cNvPr id="359" name="Line 9"/>
+          <p:cNvPr id="361" name="Line 9"/>
           <p:cNvSpPr/>
           <p:nvPr/>
         </p:nvSpPr>
@@ -15585,14 +15904,14 @@
       </p:grpSpPr>
       <p:sp>
         <p:nvSpPr>
-          <p:cNvPr id="360" name="CustomShape 1"/>
+          <p:cNvPr id="362" name="CustomShape 1"/>
           <p:cNvSpPr/>
           <p:nvPr/>
         </p:nvSpPr>
         <p:spPr>
           <a:xfrm>
             <a:off x="260280" y="126360"/>
-            <a:ext cx="8517240" cy="604440"/>
+            <a:ext cx="8516880" cy="604080"/>
           </a:xfrm>
           <a:prstGeom prst="rect">
             <a:avLst/>
@@ -15647,7 +15966,7 @@
       </p:sp>
       <p:pic>
         <p:nvPicPr>
-          <p:cNvPr id="361" name="" descr=""/>
+          <p:cNvPr id="363" name="" descr=""/>
           <p:cNvPicPr/>
           <p:nvPr/>
         </p:nvPicPr>
@@ -15658,7 +15977,7 @@
         <p:spPr>
           <a:xfrm>
             <a:off x="2834640" y="731160"/>
-            <a:ext cx="2834280" cy="1990080"/>
+            <a:ext cx="2833920" cy="1989720"/>
           </a:xfrm>
           <a:prstGeom prst="rect">
             <a:avLst/>
@@ -15675,7 +15994,7 @@
       </p:pic>
       <p:pic>
         <p:nvPicPr>
-          <p:cNvPr id="362" name="" descr=""/>
+          <p:cNvPr id="364" name="" descr=""/>
           <p:cNvPicPr/>
           <p:nvPr/>
         </p:nvPicPr>
@@ -15686,7 +16005,7 @@
         <p:spPr>
           <a:xfrm>
             <a:off x="6035040" y="2481120"/>
-            <a:ext cx="2074680" cy="1999080"/>
+            <a:ext cx="2074320" cy="1998720"/>
           </a:xfrm>
           <a:prstGeom prst="rect">
             <a:avLst/>
@@ -15703,14 +16022,14 @@
       </p:pic>
       <p:sp>
         <p:nvSpPr>
-          <p:cNvPr id="363" name="CustomShape 2"/>
+          <p:cNvPr id="365" name="CustomShape 2"/>
           <p:cNvSpPr/>
           <p:nvPr/>
         </p:nvSpPr>
         <p:spPr>
           <a:xfrm>
             <a:off x="274320" y="2214000"/>
-            <a:ext cx="1919880" cy="345960"/>
+            <a:ext cx="1919520" cy="345600"/>
           </a:xfrm>
           <a:prstGeom prst="rect">
             <a:avLst/>
@@ -15729,14 +16048,14 @@
       </p:sp>
       <p:sp>
         <p:nvSpPr>
-          <p:cNvPr id="364" name="CustomShape 3"/>
+          <p:cNvPr id="366" name="CustomShape 3"/>
           <p:cNvSpPr/>
           <p:nvPr/>
         </p:nvSpPr>
         <p:spPr>
           <a:xfrm>
             <a:off x="275400" y="948240"/>
-            <a:ext cx="2010240" cy="331560"/>
+            <a:ext cx="2009880" cy="331200"/>
           </a:xfrm>
           <a:prstGeom prst="rect">
             <a:avLst/>
@@ -15786,14 +16105,14 @@
       </p:sp>
       <p:sp>
         <p:nvSpPr>
-          <p:cNvPr id="365" name="CustomShape 4"/>
+          <p:cNvPr id="367" name="CustomShape 4"/>
           <p:cNvSpPr/>
           <p:nvPr/>
         </p:nvSpPr>
         <p:spPr>
           <a:xfrm>
             <a:off x="2834640" y="3474720"/>
-            <a:ext cx="2010240" cy="331560"/>
+            <a:ext cx="2009880" cy="331200"/>
           </a:xfrm>
           <a:prstGeom prst="rect">
             <a:avLst/>
@@ -15843,7 +16162,7 @@
       </p:sp>
       <p:sp>
         <p:nvSpPr>
-          <p:cNvPr id="366" name="Line 5"/>
+          <p:cNvPr id="368" name="Line 5"/>
           <p:cNvSpPr/>
           <p:nvPr/>
         </p:nvSpPr>
@@ -15871,7 +16190,7 @@
       </p:sp>
       <p:sp>
         <p:nvSpPr>
-          <p:cNvPr id="367" name="Line 6"/>
+          <p:cNvPr id="369" name="Line 6"/>
           <p:cNvSpPr/>
           <p:nvPr/>
         </p:nvSpPr>
@@ -15899,7 +16218,7 @@
       </p:sp>
       <p:sp>
         <p:nvSpPr>
-          <p:cNvPr id="368" name="Line 7"/>
+          <p:cNvPr id="370" name="Line 7"/>
           <p:cNvSpPr/>
           <p:nvPr/>
         </p:nvSpPr>
@@ -15979,7 +16298,7 @@
       </p:grpSpPr>
       <p:pic>
         <p:nvPicPr>
-          <p:cNvPr id="369" name="" descr=""/>
+          <p:cNvPr id="371" name="" descr=""/>
           <p:cNvPicPr/>
           <p:nvPr/>
         </p:nvPicPr>
@@ -15990,7 +16309,7 @@
         <p:spPr>
           <a:xfrm>
             <a:off x="822960" y="1280160"/>
-            <a:ext cx="3523320" cy="2474280"/>
+            <a:ext cx="3522960" cy="2473920"/>
           </a:xfrm>
           <a:prstGeom prst="rect">
             <a:avLst/>
@@ -16007,14 +16326,14 @@
       </p:pic>
       <p:sp>
         <p:nvSpPr>
-          <p:cNvPr id="370" name="CustomShape 1"/>
+          <p:cNvPr id="372" name="CustomShape 1"/>
           <p:cNvSpPr/>
           <p:nvPr/>
         </p:nvSpPr>
         <p:spPr>
           <a:xfrm>
             <a:off x="260280" y="126360"/>
-            <a:ext cx="8517240" cy="604440"/>
+            <a:ext cx="8516880" cy="604080"/>
           </a:xfrm>
           <a:prstGeom prst="rect">
             <a:avLst/>
@@ -16069,7 +16388,7 @@
       </p:sp>
       <p:pic>
         <p:nvPicPr>
-          <p:cNvPr id="371" name="" descr=""/>
+          <p:cNvPr id="373" name="" descr=""/>
           <p:cNvPicPr/>
           <p:nvPr/>
         </p:nvPicPr>
@@ -16080,7 +16399,7 @@
         <p:spPr>
           <a:xfrm>
             <a:off x="5760720" y="1188720"/>
-            <a:ext cx="2628360" cy="2923560"/>
+            <a:ext cx="2628000" cy="2923200"/>
           </a:xfrm>
           <a:prstGeom prst="rect">
             <a:avLst/>
@@ -16097,14 +16416,14 @@
       </p:pic>
       <p:sp>
         <p:nvSpPr>
-          <p:cNvPr id="372" name="CustomShape 2"/>
+          <p:cNvPr id="374" name="CustomShape 2"/>
           <p:cNvSpPr/>
           <p:nvPr/>
         </p:nvSpPr>
         <p:spPr>
           <a:xfrm>
             <a:off x="1645920" y="2743200"/>
-            <a:ext cx="1554120" cy="914040"/>
+            <a:ext cx="1553760" cy="913680"/>
           </a:xfrm>
           <a:prstGeom prst="ellipse">
             <a:avLst/>
@@ -16126,14 +16445,14 @@
       </p:sp>
       <p:sp>
         <p:nvSpPr>
-          <p:cNvPr id="373" name="CustomShape 3"/>
+          <p:cNvPr id="375" name="CustomShape 3"/>
           <p:cNvSpPr/>
           <p:nvPr/>
         </p:nvSpPr>
         <p:spPr>
           <a:xfrm>
             <a:off x="6949440" y="1737360"/>
-            <a:ext cx="1554120" cy="273960"/>
+            <a:ext cx="1553760" cy="273600"/>
           </a:xfrm>
           <a:prstGeom prst="ellipse">
             <a:avLst/>
@@ -16155,7 +16474,7 @@
       </p:sp>
       <p:sp>
         <p:nvSpPr>
-          <p:cNvPr id="374" name="Line 4"/>
+          <p:cNvPr id="376" name="Line 4"/>
           <p:cNvSpPr/>
           <p:nvPr/>
         </p:nvSpPr>
@@ -16183,14 +16502,14 @@
       </p:sp>
       <p:sp>
         <p:nvSpPr>
-          <p:cNvPr id="375" name="CustomShape 5"/>
+          <p:cNvPr id="377" name="CustomShape 5"/>
           <p:cNvSpPr/>
           <p:nvPr/>
         </p:nvSpPr>
         <p:spPr>
           <a:xfrm>
             <a:off x="5394960" y="823320"/>
-            <a:ext cx="3474720" cy="3840120"/>
+            <a:ext cx="3474360" cy="3839760"/>
           </a:xfrm>
           <a:prstGeom prst="ellipse">
             <a:avLst/>
@@ -16264,7 +16583,7 @@
       </p:grpSpPr>
       <p:pic>
         <p:nvPicPr>
-          <p:cNvPr id="376" name="" descr=""/>
+          <p:cNvPr id="378" name="" descr=""/>
           <p:cNvPicPr/>
           <p:nvPr/>
         </p:nvPicPr>
@@ -16275,7 +16594,7 @@
         <p:spPr>
           <a:xfrm>
             <a:off x="4389120" y="2932200"/>
-            <a:ext cx="3733200" cy="1456560"/>
+            <a:ext cx="3732840" cy="1456200"/>
           </a:xfrm>
           <a:prstGeom prst="rect">
             <a:avLst/>
@@ -16292,7 +16611,7 @@
       </p:pic>
       <p:pic>
         <p:nvPicPr>
-          <p:cNvPr id="377" name="" descr=""/>
+          <p:cNvPr id="379" name="" descr=""/>
           <p:cNvPicPr/>
           <p:nvPr/>
         </p:nvPicPr>
@@ -16303,7 +16622,7 @@
         <p:spPr>
           <a:xfrm>
             <a:off x="682560" y="731520"/>
-            <a:ext cx="3523320" cy="2474280"/>
+            <a:ext cx="3522960" cy="2473920"/>
           </a:xfrm>
           <a:prstGeom prst="rect">
             <a:avLst/>
@@ -16320,14 +16639,14 @@
       </p:pic>
       <p:sp>
         <p:nvSpPr>
-          <p:cNvPr id="378" name="CustomShape 1"/>
+          <p:cNvPr id="380" name="CustomShape 1"/>
           <p:cNvSpPr/>
           <p:nvPr/>
         </p:nvSpPr>
         <p:spPr>
           <a:xfrm>
             <a:off x="260280" y="126360"/>
-            <a:ext cx="8517240" cy="604440"/>
+            <a:ext cx="8516880" cy="604080"/>
           </a:xfrm>
           <a:prstGeom prst="rect">
             <a:avLst/>
@@ -16382,14 +16701,14 @@
       </p:sp>
       <p:sp>
         <p:nvSpPr>
-          <p:cNvPr id="379" name="CustomShape 2"/>
+          <p:cNvPr id="381" name="CustomShape 2"/>
           <p:cNvSpPr/>
           <p:nvPr/>
         </p:nvSpPr>
         <p:spPr>
           <a:xfrm>
             <a:off x="1281240" y="3600000"/>
-            <a:ext cx="2010240" cy="331560"/>
+            <a:ext cx="2009880" cy="331200"/>
           </a:xfrm>
           <a:prstGeom prst="rect">
             <a:avLst/>
@@ -16480,7 +16799,7 @@
       </p:sp>
       <p:sp>
         <p:nvSpPr>
-          <p:cNvPr id="380" name="Line 3"/>
+          <p:cNvPr id="382" name="Line 3"/>
           <p:cNvSpPr/>
           <p:nvPr/>
         </p:nvSpPr>
@@ -16508,7 +16827,7 @@
       </p:sp>
       <p:sp>
         <p:nvSpPr>
-          <p:cNvPr id="381" name="Line 4"/>
+          <p:cNvPr id="383" name="Line 4"/>
           <p:cNvSpPr/>
           <p:nvPr/>
         </p:nvSpPr>
@@ -16588,7 +16907,7 @@
       </p:grpSpPr>
       <p:pic>
         <p:nvPicPr>
-          <p:cNvPr id="382" name="" descr=""/>
+          <p:cNvPr id="384" name="" descr=""/>
           <p:cNvPicPr/>
           <p:nvPr/>
         </p:nvPicPr>
@@ -16599,7 +16918,7 @@
         <p:spPr>
           <a:xfrm>
             <a:off x="4389120" y="2932200"/>
-            <a:ext cx="3733200" cy="1456560"/>
+            <a:ext cx="3732840" cy="1456200"/>
           </a:xfrm>
           <a:prstGeom prst="rect">
             <a:avLst/>
@@ -16616,7 +16935,7 @@
       </p:pic>
       <p:pic>
         <p:nvPicPr>
-          <p:cNvPr id="383" name="" descr=""/>
+          <p:cNvPr id="385" name="" descr=""/>
           <p:cNvPicPr/>
           <p:nvPr/>
         </p:nvPicPr>
@@ -16627,7 +16946,7 @@
         <p:spPr>
           <a:xfrm>
             <a:off x="682560" y="731520"/>
-            <a:ext cx="3523320" cy="2474280"/>
+            <a:ext cx="3522960" cy="2473920"/>
           </a:xfrm>
           <a:prstGeom prst="rect">
             <a:avLst/>
@@ -16644,14 +16963,14 @@
       </p:pic>
       <p:sp>
         <p:nvSpPr>
-          <p:cNvPr id="384" name="CustomShape 1"/>
+          <p:cNvPr id="386" name="CustomShape 1"/>
           <p:cNvSpPr/>
           <p:nvPr/>
         </p:nvSpPr>
         <p:spPr>
           <a:xfrm>
             <a:off x="260280" y="126360"/>
-            <a:ext cx="8517240" cy="604440"/>
+            <a:ext cx="8516880" cy="604080"/>
           </a:xfrm>
           <a:prstGeom prst="rect">
             <a:avLst/>
@@ -16706,14 +17025,14 @@
       </p:sp>
       <p:sp>
         <p:nvSpPr>
-          <p:cNvPr id="385" name="CustomShape 2"/>
+          <p:cNvPr id="387" name="CustomShape 2"/>
           <p:cNvSpPr/>
           <p:nvPr/>
         </p:nvSpPr>
         <p:spPr>
           <a:xfrm>
             <a:off x="1281240" y="3600000"/>
-            <a:ext cx="2010240" cy="331560"/>
+            <a:ext cx="2009880" cy="331200"/>
           </a:xfrm>
           <a:prstGeom prst="rect">
             <a:avLst/>
@@ -16804,7 +17123,7 @@
       </p:sp>
       <p:sp>
         <p:nvSpPr>
-          <p:cNvPr id="386" name="Line 3"/>
+          <p:cNvPr id="388" name="Line 3"/>
           <p:cNvSpPr/>
           <p:nvPr/>
         </p:nvSpPr>
@@ -16832,7 +17151,7 @@
       </p:sp>
       <p:sp>
         <p:nvSpPr>
-          <p:cNvPr id="387" name="Line 4"/>
+          <p:cNvPr id="389" name="Line 4"/>
           <p:cNvSpPr/>
           <p:nvPr/>
         </p:nvSpPr>
@@ -16912,14 +17231,14 @@
       </p:grpSpPr>
       <p:sp>
         <p:nvSpPr>
-          <p:cNvPr id="388" name="CustomShape 1"/>
+          <p:cNvPr id="390" name="CustomShape 1"/>
           <p:cNvSpPr/>
           <p:nvPr/>
         </p:nvSpPr>
         <p:spPr>
           <a:xfrm>
             <a:off x="260280" y="126360"/>
-            <a:ext cx="8517240" cy="604440"/>
+            <a:ext cx="8516880" cy="604080"/>
           </a:xfrm>
           <a:prstGeom prst="rect">
             <a:avLst/>
@@ -16974,7 +17293,7 @@
       </p:sp>
       <p:pic>
         <p:nvPicPr>
-          <p:cNvPr id="389" name="" descr=""/>
+          <p:cNvPr id="391" name="" descr=""/>
           <p:cNvPicPr/>
           <p:nvPr/>
         </p:nvPicPr>
@@ -16985,7 +17304,7 @@
         <p:spPr>
           <a:xfrm>
             <a:off x="640080" y="730800"/>
-            <a:ext cx="2377080" cy="1658160"/>
+            <a:ext cx="2376720" cy="1657800"/>
           </a:xfrm>
           <a:prstGeom prst="rect">
             <a:avLst/>
@@ -17002,14 +17321,14 @@
       </p:pic>
       <p:sp>
         <p:nvSpPr>
-          <p:cNvPr id="390" name="CustomShape 2"/>
+          <p:cNvPr id="392" name="CustomShape 2"/>
           <p:cNvSpPr/>
           <p:nvPr/>
         </p:nvSpPr>
         <p:spPr>
           <a:xfrm>
             <a:off x="1280160" y="1697040"/>
-            <a:ext cx="1096560" cy="639720"/>
+            <a:ext cx="1096200" cy="639360"/>
           </a:xfrm>
           <a:prstGeom prst="ellipse">
             <a:avLst/>
@@ -17031,7 +17350,7 @@
       </p:sp>
       <p:sp>
         <p:nvSpPr>
-          <p:cNvPr id="391" name="Line 3"/>
+          <p:cNvPr id="393" name="Line 3"/>
           <p:cNvSpPr/>
           <p:nvPr/>
         </p:nvSpPr>
@@ -17059,7 +17378,7 @@
       </p:sp>
       <p:pic>
         <p:nvPicPr>
-          <p:cNvPr id="392" name="" descr=""/>
+          <p:cNvPr id="394" name="" descr=""/>
           <p:cNvPicPr/>
           <p:nvPr/>
         </p:nvPicPr>
@@ -17070,7 +17389,7 @@
         <p:spPr>
           <a:xfrm>
             <a:off x="3291840" y="639360"/>
-            <a:ext cx="2970360" cy="2103840"/>
+            <a:ext cx="2970000" cy="2103480"/>
           </a:xfrm>
           <a:prstGeom prst="rect">
             <a:avLst/>
@@ -17087,14 +17406,14 @@
       </p:pic>
       <p:sp>
         <p:nvSpPr>
-          <p:cNvPr id="393" name="CustomShape 4"/>
+          <p:cNvPr id="395" name="CustomShape 4"/>
           <p:cNvSpPr/>
           <p:nvPr/>
         </p:nvSpPr>
         <p:spPr>
           <a:xfrm>
             <a:off x="822960" y="2468880"/>
-            <a:ext cx="2377080" cy="331560"/>
+            <a:ext cx="2376720" cy="331200"/>
           </a:xfrm>
           <a:prstGeom prst="rect">
             <a:avLst/>
@@ -17144,14 +17463,14 @@
       </p:sp>
       <p:sp>
         <p:nvSpPr>
-          <p:cNvPr id="394" name="CustomShape 5"/>
+          <p:cNvPr id="396" name="CustomShape 5"/>
           <p:cNvSpPr/>
           <p:nvPr/>
         </p:nvSpPr>
         <p:spPr>
           <a:xfrm>
             <a:off x="3931920" y="2835000"/>
-            <a:ext cx="1187280" cy="273960"/>
+            <a:ext cx="1186920" cy="273600"/>
           </a:xfrm>
           <a:prstGeom prst="rect">
             <a:avLst/>
@@ -17201,7 +17520,7 @@
       </p:sp>
       <p:pic>
         <p:nvPicPr>
-          <p:cNvPr id="395" name="" descr=""/>
+          <p:cNvPr id="397" name="" descr=""/>
           <p:cNvPicPr/>
           <p:nvPr/>
         </p:nvPicPr>
@@ -17212,7 +17531,7 @@
         <p:spPr>
           <a:xfrm>
             <a:off x="583200" y="3383280"/>
-            <a:ext cx="7554600" cy="813960"/>
+            <a:ext cx="7554240" cy="813600"/>
           </a:xfrm>
           <a:prstGeom prst="rect">
             <a:avLst/>
@@ -17229,14 +17548,14 @@
       </p:pic>
       <p:sp>
         <p:nvSpPr>
-          <p:cNvPr id="396" name="CustomShape 6"/>
+          <p:cNvPr id="398" name="CustomShape 6"/>
           <p:cNvSpPr/>
           <p:nvPr/>
         </p:nvSpPr>
         <p:spPr>
           <a:xfrm>
             <a:off x="3474720" y="4322880"/>
-            <a:ext cx="1737000" cy="331560"/>
+            <a:ext cx="1736640" cy="331200"/>
           </a:xfrm>
           <a:prstGeom prst="rect">
             <a:avLst/>
@@ -17286,14 +17605,14 @@
       </p:sp>
       <p:sp>
         <p:nvSpPr>
-          <p:cNvPr id="397" name="CustomShape 7"/>
+          <p:cNvPr id="399" name="CustomShape 7"/>
           <p:cNvSpPr/>
           <p:nvPr/>
         </p:nvSpPr>
         <p:spPr>
           <a:xfrm>
             <a:off x="3749400" y="3200760"/>
-            <a:ext cx="547920" cy="548280"/>
+            <a:ext cx="547560" cy="547920"/>
           </a:xfrm>
           <a:prstGeom prst="ellipse">
             <a:avLst/>
@@ -17315,7 +17634,7 @@
       </p:sp>
       <p:pic>
         <p:nvPicPr>
-          <p:cNvPr id="398" name="" descr=""/>
+          <p:cNvPr id="400" name="" descr=""/>
           <p:cNvPicPr/>
           <p:nvPr/>
         </p:nvPicPr>
@@ -17326,7 +17645,7 @@
         <p:spPr>
           <a:xfrm>
             <a:off x="6492240" y="746280"/>
-            <a:ext cx="2194560" cy="1631160"/>
+            <a:ext cx="2194200" cy="1630800"/>
           </a:xfrm>
           <a:prstGeom prst="rect">
             <a:avLst/>
@@ -17335,7 +17654,7 @@
             <a:noFill/>
           </a:ln>
           <a:effectLst>
-            <a:outerShdw dist="101823" dir="2700000">
+            <a:outerShdw dir="2700000" dist="101823">
               <a:srgbClr val="808080"/>
             </a:outerShdw>
           </a:effectLst>
@@ -17395,14 +17714,14 @@
       </p:grpSpPr>
       <p:sp>
         <p:nvSpPr>
-          <p:cNvPr id="399" name="CustomShape 1"/>
+          <p:cNvPr id="401" name="CustomShape 1"/>
           <p:cNvSpPr/>
           <p:nvPr/>
         </p:nvSpPr>
         <p:spPr>
           <a:xfrm>
             <a:off x="457200" y="0"/>
-            <a:ext cx="8227440" cy="615960"/>
+            <a:ext cx="8227080" cy="615600"/>
           </a:xfrm>
           <a:prstGeom prst="rect">
             <a:avLst/>
@@ -17457,7 +17776,7 @@
       </p:sp>
       <p:pic>
         <p:nvPicPr>
-          <p:cNvPr id="400" name="" descr=""/>
+          <p:cNvPr id="402" name="" descr=""/>
           <p:cNvPicPr/>
           <p:nvPr/>
         </p:nvPicPr>
@@ -17468,7 +17787,7 @@
         <p:spPr>
           <a:xfrm>
             <a:off x="640080" y="970920"/>
-            <a:ext cx="1675080" cy="2961000"/>
+            <a:ext cx="1674720" cy="2960640"/>
           </a:xfrm>
           <a:prstGeom prst="rect">
             <a:avLst/>
@@ -17485,14 +17804,14 @@
       </p:pic>
       <p:sp>
         <p:nvSpPr>
-          <p:cNvPr id="401" name="TextShape 2"/>
-          <p:cNvSpPr txBox="1"/>
+          <p:cNvPr id="403" name="CustomShape 2"/>
+          <p:cNvSpPr/>
           <p:nvPr/>
         </p:nvSpPr>
         <p:spPr>
           <a:xfrm>
             <a:off x="2834640" y="1005840"/>
-            <a:ext cx="5486400" cy="2076840"/>
+            <a:ext cx="5486040" cy="2076480"/>
           </a:xfrm>
           <a:prstGeom prst="rect">
             <a:avLst/>
@@ -17502,6 +17821,12 @@
             <a:noFill/>
           </a:ln>
         </p:spPr>
+        <p:style>
+          <a:lnRef idx="0"/>
+          <a:fillRef idx="0"/>
+          <a:effectRef idx="0"/>
+          <a:fontRef idx="minor"/>
+        </p:style>
         <p:txBody>
           <a:bodyPr lIns="90000" rIns="90000" tIns="45000" bIns="45000"/>
           <a:p>
@@ -17559,36 +17884,32 @@
               </a:rPr>
               <a:t>Official and third-party effects can be added. You also can create you own effects if you had ability in programming.</a:t>
             </a:r>
-            <a:r>
-              <a:rPr lang="en-US" sz="1300" spc="-1" strike="noStrike">
-                <a:solidFill>
-                  <a:srgbClr val="000000"/>
-                </a:solidFill>
-                <a:uFill>
-                  <a:solidFill>
-                    <a:srgbClr val="ffffff"/>
-                  </a:solidFill>
-                </a:uFill>
-                <a:latin typeface="Arial"/>
-              </a:rPr>
-              <a:t>
-</a:t>
-            </a:r>
-            <a:r>
-              <a:rPr lang="en-US" sz="1300" spc="-1" strike="noStrike">
-                <a:solidFill>
-                  <a:srgbClr val="000000"/>
-                </a:solidFill>
-                <a:uFill>
-                  <a:solidFill>
-                    <a:srgbClr val="ffffff"/>
-                  </a:solidFill>
-                </a:uFill>
-                <a:latin typeface="Arial"/>
-              </a:rPr>
-              <a:t>
-</a:t>
-            </a:r>
+            <a:endParaRPr lang="en-US" sz="1800" spc="-1" strike="noStrike">
+              <a:solidFill>
+                <a:srgbClr val="000000"/>
+              </a:solidFill>
+              <a:uFill>
+                <a:solidFill>
+                  <a:srgbClr val="ffffff"/>
+                </a:solidFill>
+              </a:uFill>
+              <a:latin typeface="Arial"/>
+            </a:endParaRPr>
+          </a:p>
+          <a:p>
+            <a:endParaRPr lang="en-US" sz="1800" spc="-1" strike="noStrike">
+              <a:solidFill>
+                <a:srgbClr val="000000"/>
+              </a:solidFill>
+              <a:uFill>
+                <a:solidFill>
+                  <a:srgbClr val="ffffff"/>
+                </a:solidFill>
+              </a:uFill>
+              <a:latin typeface="Arial"/>
+            </a:endParaRPr>
+          </a:p>
+          <a:p>
             <a:r>
               <a:rPr lang="en-US" sz="1300" spc="-1" strike="noStrike">
                 <a:solidFill>
@@ -17739,14 +18060,14 @@
       </p:grpSpPr>
       <p:sp>
         <p:nvSpPr>
-          <p:cNvPr id="402" name="TextShape 1"/>
-          <p:cNvSpPr txBox="1"/>
+          <p:cNvPr id="404" name="CustomShape 1"/>
+          <p:cNvSpPr/>
           <p:nvPr/>
         </p:nvSpPr>
         <p:spPr>
           <a:xfrm>
             <a:off x="1280160" y="822960"/>
-            <a:ext cx="2058120" cy="346320"/>
+            <a:ext cx="2057760" cy="345960"/>
           </a:xfrm>
           <a:prstGeom prst="rect">
             <a:avLst/>
@@ -17756,6 +18077,12 @@
             <a:noFill/>
           </a:ln>
         </p:spPr>
+        <p:style>
+          <a:lnRef idx="0"/>
+          <a:fillRef idx="0"/>
+          <a:effectRef idx="0"/>
+          <a:fontRef idx="minor"/>
+        </p:style>
         <p:txBody>
           <a:bodyPr lIns="90000" rIns="90000" tIns="45000" bIns="45000"/>
           <a:p>
@@ -17789,14 +18116,14 @@
       </p:sp>
       <p:sp>
         <p:nvSpPr>
-          <p:cNvPr id="403" name="TextShape 2"/>
-          <p:cNvSpPr txBox="1"/>
+          <p:cNvPr id="405" name="CustomShape 2"/>
+          <p:cNvSpPr/>
           <p:nvPr/>
         </p:nvSpPr>
         <p:spPr>
           <a:xfrm>
             <a:off x="1371600" y="2011680"/>
-            <a:ext cx="5040720" cy="346680"/>
+            <a:ext cx="5040360" cy="346320"/>
           </a:xfrm>
           <a:prstGeom prst="rect">
             <a:avLst/>
@@ -17806,13 +18133,19 @@
             <a:noFill/>
           </a:ln>
         </p:spPr>
+        <p:style>
+          <a:lnRef idx="0"/>
+          <a:fillRef idx="0"/>
+          <a:effectRef idx="0"/>
+          <a:fontRef idx="minor"/>
+        </p:style>
         <p:txBody>
           <a:bodyPr lIns="90000" rIns="90000" tIns="45000" bIns="45000"/>
           <a:p>
             <a:r>
-              <a:rPr lang="en-US" sz="1800" spc="-1" strike="noStrike">
-                <a:solidFill>
-                  <a:srgbClr val="000000"/>
+              <a:rPr lang="en-US" sz="1800" spc="-1" strike="noStrike" u="sng">
+                <a:solidFill>
+                  <a:srgbClr val="0000ff"/>
                 </a:solidFill>
                 <a:uFill>
                   <a:solidFill>
@@ -17840,14 +18173,14 @@
       </p:sp>
       <p:sp>
         <p:nvSpPr>
-          <p:cNvPr id="404" name="TextShape 3"/>
-          <p:cNvSpPr txBox="1"/>
+          <p:cNvPr id="406" name="CustomShape 3"/>
+          <p:cNvSpPr/>
           <p:nvPr/>
         </p:nvSpPr>
         <p:spPr>
           <a:xfrm>
             <a:off x="822960" y="4368600"/>
-            <a:ext cx="7040880" cy="386280"/>
+            <a:ext cx="7040520" cy="385920"/>
           </a:xfrm>
           <a:prstGeom prst="rect">
             <a:avLst/>
@@ -17857,6 +18190,12 @@
             <a:noFill/>
           </a:ln>
         </p:spPr>
+        <p:style>
+          <a:lnRef idx="0"/>
+          <a:fillRef idx="0"/>
+          <a:effectRef idx="0"/>
+          <a:fontRef idx="minor"/>
+        </p:style>
         <p:txBody>
           <a:bodyPr lIns="90000" rIns="90000" tIns="45000" bIns="45000"/>
           <a:p>
@@ -17874,7 +18213,7 @@
               </a:rPr>
               <a:t>Blender, Unity, Visual Studio and C#, Donkey Kong Country, NES / SNES, Nintendo, Sega Master System and Sega Genesis are trademark of their respective owners.</a:t>
             </a:r>
-            <a:endParaRPr i="1" lang="en-US" sz="1050" spc="-1" strike="noStrike">
+            <a:endParaRPr lang="en-US" sz="1800" spc="-1" strike="noStrike">
               <a:solidFill>
                 <a:srgbClr val="000000"/>
               </a:solidFill>
@@ -17942,14 +18281,14 @@
       </p:grpSpPr>
       <p:sp>
         <p:nvSpPr>
-          <p:cNvPr id="217" name="CustomShape 1"/>
+          <p:cNvPr id="219" name="CustomShape 1"/>
           <p:cNvSpPr/>
           <p:nvPr/>
         </p:nvSpPr>
         <p:spPr>
           <a:xfrm>
             <a:off x="311760" y="410040"/>
-            <a:ext cx="8517240" cy="604440"/>
+            <a:ext cx="8516880" cy="604080"/>
           </a:xfrm>
           <a:prstGeom prst="rect">
             <a:avLst/>
@@ -18004,14 +18343,14 @@
       </p:sp>
       <p:sp>
         <p:nvSpPr>
-          <p:cNvPr id="218" name="CustomShape 2"/>
+          <p:cNvPr id="220" name="CustomShape 2"/>
           <p:cNvSpPr/>
           <p:nvPr/>
         </p:nvSpPr>
         <p:spPr>
           <a:xfrm>
             <a:off x="311760" y="1229760"/>
-            <a:ext cx="8517240" cy="3335760"/>
+            <a:ext cx="8516880" cy="3335400"/>
           </a:xfrm>
           <a:prstGeom prst="rect">
             <a:avLst/>
@@ -18212,14 +18551,14 @@
       </p:grpSpPr>
       <p:sp>
         <p:nvSpPr>
-          <p:cNvPr id="219" name="CustomShape 1"/>
+          <p:cNvPr id="221" name="CustomShape 1"/>
           <p:cNvSpPr/>
           <p:nvPr/>
         </p:nvSpPr>
         <p:spPr>
           <a:xfrm>
             <a:off x="311760" y="410040"/>
-            <a:ext cx="8517240" cy="604440"/>
+            <a:ext cx="8516880" cy="604080"/>
           </a:xfrm>
           <a:prstGeom prst="rect">
             <a:avLst/>
@@ -18256,7 +18595,7 @@
                 <a:latin typeface="Roboto"/>
                 <a:ea typeface="Roboto"/>
               </a:rPr>
-              <a:t>Instalation</a:t>
+              <a:t>Installation</a:t>
             </a:r>
             <a:endParaRPr lang="en-US" sz="1800" spc="-1" strike="noStrike">
               <a:solidFill>
@@ -18274,14 +18613,14 @@
       </p:sp>
       <p:sp>
         <p:nvSpPr>
-          <p:cNvPr id="220" name="CustomShape 2"/>
+          <p:cNvPr id="222" name="CustomShape 2"/>
           <p:cNvSpPr/>
           <p:nvPr/>
         </p:nvSpPr>
         <p:spPr>
           <a:xfrm>
             <a:off x="311760" y="1229760"/>
-            <a:ext cx="8517240" cy="3335760"/>
+            <a:ext cx="8516880" cy="3335400"/>
           </a:xfrm>
           <a:prstGeom prst="rect">
             <a:avLst/>
@@ -18363,7 +18702,7 @@
             </a:endParaRPr>
           </a:p>
           <a:p>
-            <a:pPr marL="457200" indent="-225360">
+            <a:pPr marL="457200" indent="-225000">
               <a:lnSpc>
                 <a:spcPct val="100000"/>
               </a:lnSpc>
@@ -18401,7 +18740,7 @@
             </a:endParaRPr>
           </a:p>
           <a:p>
-            <a:pPr marL="457200" indent="-225360">
+            <a:pPr marL="457200" indent="-225000">
               <a:lnSpc>
                 <a:spcPct val="100000"/>
               </a:lnSpc>
@@ -18444,6 +18783,24 @@
                 <a:spcPct val="100000"/>
               </a:lnSpc>
             </a:pPr>
+            <a:endParaRPr lang="en-US" sz="1800" spc="-1" strike="noStrike">
+              <a:solidFill>
+                <a:srgbClr val="000000"/>
+              </a:solidFill>
+              <a:uFill>
+                <a:solidFill>
+                  <a:srgbClr val="ffffff"/>
+                </a:solidFill>
+              </a:uFill>
+              <a:latin typeface="Arial"/>
+            </a:endParaRPr>
+          </a:p>
+          <a:p>
+            <a:pPr>
+              <a:lnSpc>
+                <a:spcPct val="100000"/>
+              </a:lnSpc>
+            </a:pPr>
             <a:r>
               <a:rPr lang="en-US" sz="1800" spc="-1" strike="noStrike">
                 <a:solidFill>
@@ -18457,7 +18814,67 @@
                 <a:latin typeface="Roboto"/>
                 <a:ea typeface="Roboto"/>
               </a:rPr>
-              <a:t>Create a folder to save your projects and another to save the generated files to use in your games.</a:t>
+              <a:t>Unzip </a:t>
+            </a:r>
+            <a:r>
+              <a:rPr b="1" lang="en-US" sz="1800" spc="-1" strike="noStrike">
+                <a:solidFill>
+                  <a:srgbClr val="434343"/>
+                </a:solidFill>
+                <a:uFill>
+                  <a:solidFill>
+                    <a:srgbClr val="ffffff"/>
+                  </a:solidFill>
+                </a:uFill>
+                <a:latin typeface="Roboto"/>
+                <a:ea typeface="Roboto"/>
+              </a:rPr>
+              <a:t>smartSpriteFX.zip</a:t>
+            </a:r>
+            <a:r>
+              <a:rPr lang="en-US" sz="1800" spc="-1" strike="noStrike">
+                <a:solidFill>
+                  <a:srgbClr val="434343"/>
+                </a:solidFill>
+                <a:uFill>
+                  <a:solidFill>
+                    <a:srgbClr val="ffffff"/>
+                  </a:solidFill>
+                </a:uFill>
+                <a:latin typeface="Roboto"/>
+                <a:ea typeface="Roboto"/>
+              </a:rPr>
+              <a:t> in some folder. You are going to see several files. Just execute “</a:t>
+            </a:r>
+            <a:r>
+              <a:rPr b="1" lang="en-US" sz="1800" spc="-1" strike="noStrike">
+                <a:solidFill>
+                  <a:srgbClr val="434343"/>
+                </a:solidFill>
+                <a:uFill>
+                  <a:solidFill>
+                    <a:srgbClr val="ffffff"/>
+                  </a:solidFill>
+                </a:uFill>
+                <a:latin typeface="Roboto"/>
+                <a:ea typeface="Roboto"/>
+              </a:rPr>
+              <a:t>smartSpriteFX.exe</a:t>
+            </a:r>
+            <a:r>
+              <a:rPr lang="en-US" sz="1800" spc="-1" strike="noStrike">
+                <a:solidFill>
+                  <a:srgbClr val="434343"/>
+                </a:solidFill>
+                <a:uFill>
+                  <a:solidFill>
+                    <a:srgbClr val="ffffff"/>
+                  </a:solidFill>
+                </a:uFill>
+                <a:latin typeface="Roboto"/>
+                <a:ea typeface="Roboto"/>
+              </a:rPr>
+              <a:t>”.</a:t>
             </a:r>
             <a:endParaRPr lang="en-US" sz="1800" spc="-1" strike="noStrike">
               <a:solidFill>
@@ -18527,14 +18944,14 @@
       </p:grpSpPr>
       <p:sp>
         <p:nvSpPr>
-          <p:cNvPr id="221" name="CustomShape 1"/>
+          <p:cNvPr id="223" name="CustomShape 1"/>
           <p:cNvSpPr/>
           <p:nvPr/>
         </p:nvSpPr>
         <p:spPr>
           <a:xfrm>
             <a:off x="2194560" y="365760"/>
-            <a:ext cx="4295880" cy="371520"/>
+            <a:ext cx="4295520" cy="371160"/>
           </a:xfrm>
           <a:prstGeom prst="rect">
             <a:avLst/>
@@ -18584,7 +19001,7 @@
       </p:sp>
       <p:pic>
         <p:nvPicPr>
-          <p:cNvPr id="222" name="" descr=""/>
+          <p:cNvPr id="224" name="" descr=""/>
           <p:cNvPicPr/>
           <p:nvPr/>
         </p:nvPicPr>
@@ -18595,7 +19012,7 @@
         <p:spPr>
           <a:xfrm>
             <a:off x="3108960" y="2011680"/>
-            <a:ext cx="5071320" cy="2261520"/>
+            <a:ext cx="5070960" cy="2261160"/>
           </a:xfrm>
           <a:prstGeom prst="rect">
             <a:avLst/>
@@ -18612,14 +19029,14 @@
       </p:pic>
       <p:sp>
         <p:nvSpPr>
-          <p:cNvPr id="223" name="CustomShape 2"/>
+          <p:cNvPr id="225" name="CustomShape 2"/>
           <p:cNvSpPr/>
           <p:nvPr/>
         </p:nvSpPr>
         <p:spPr>
           <a:xfrm>
             <a:off x="91440" y="1280520"/>
-            <a:ext cx="3017520" cy="3032280"/>
+            <a:ext cx="3017160" cy="3031920"/>
           </a:xfrm>
           <a:prstGeom prst="rect">
             <a:avLst/>
@@ -18696,7 +19113,11 @@
             </a:endParaRPr>
           </a:p>
           <a:p>
-            <a:pPr marL="216000" indent="-216000"/>
+            <a:pPr marL="216000" indent="-215640">
+              <a:lnSpc>
+                <a:spcPct val="100000"/>
+              </a:lnSpc>
+            </a:pPr>
             <a:r>
               <a:rPr lang="en-US" sz="1800" spc="-1" strike="noStrike">
                 <a:solidFill>
@@ -18725,7 +19146,7 @@
             </a:endParaRPr>
           </a:p>
           <a:p>
-            <a:pPr>
+            <a:pPr marL="216000" indent="-215640">
               <a:lnSpc>
                 <a:spcPct val="100000"/>
               </a:lnSpc>
@@ -18758,7 +19179,7 @@
             </a:endParaRPr>
           </a:p>
           <a:p>
-            <a:pPr>
+            <a:pPr marL="216000" indent="-215640">
               <a:lnSpc>
                 <a:spcPct val="100000"/>
               </a:lnSpc>
@@ -18776,7 +19197,7 @@
             </a:endParaRPr>
           </a:p>
           <a:p>
-            <a:pPr>
+            <a:pPr marL="216000" indent="-215640">
               <a:lnSpc>
                 <a:spcPct val="100000"/>
               </a:lnSpc>
@@ -18827,14 +19248,14 @@
       </p:sp>
       <p:sp>
         <p:nvSpPr>
-          <p:cNvPr id="224" name="CustomShape 3"/>
+          <p:cNvPr id="226" name="CustomShape 3"/>
           <p:cNvSpPr/>
           <p:nvPr/>
         </p:nvSpPr>
         <p:spPr>
           <a:xfrm>
             <a:off x="6400800" y="1920240"/>
-            <a:ext cx="1918080" cy="546480"/>
+            <a:ext cx="1917720" cy="546120"/>
           </a:xfrm>
           <a:prstGeom prst="ellipse">
             <a:avLst/>
@@ -18856,14 +19277,14 @@
       </p:sp>
       <p:sp>
         <p:nvSpPr>
-          <p:cNvPr id="225" name="CustomShape 4"/>
+          <p:cNvPr id="227" name="CustomShape 4"/>
           <p:cNvSpPr/>
           <p:nvPr/>
         </p:nvSpPr>
         <p:spPr>
           <a:xfrm>
             <a:off x="3474720" y="914400"/>
-            <a:ext cx="3929760" cy="455040"/>
+            <a:ext cx="3929400" cy="454680"/>
           </a:xfrm>
           <a:prstGeom prst="rect">
             <a:avLst/>
@@ -18913,14 +19334,14 @@
       </p:sp>
       <p:sp>
         <p:nvSpPr>
-          <p:cNvPr id="226" name="CustomShape 5"/>
+          <p:cNvPr id="228" name="CustomShape 5"/>
           <p:cNvSpPr/>
           <p:nvPr/>
         </p:nvSpPr>
         <p:spPr>
           <a:xfrm>
             <a:off x="6319800" y="1243800"/>
-            <a:ext cx="1039320" cy="674640"/>
+            <a:ext cx="1038960" cy="674280"/>
           </a:xfrm>
           <a:custGeom>
             <a:avLst/>
@@ -19007,7 +19428,7 @@
       </p:grpSpPr>
       <p:pic>
         <p:nvPicPr>
-          <p:cNvPr id="227" name="" descr=""/>
+          <p:cNvPr id="229" name="" descr=""/>
           <p:cNvPicPr/>
           <p:nvPr/>
         </p:nvPicPr>
@@ -19018,7 +19439,7 @@
         <p:spPr>
           <a:xfrm>
             <a:off x="6918480" y="1463040"/>
-            <a:ext cx="1949040" cy="1095120"/>
+            <a:ext cx="1948680" cy="1094760"/>
           </a:xfrm>
           <a:prstGeom prst="rect">
             <a:avLst/>
@@ -19030,7 +19451,7 @@
       </p:pic>
       <p:pic>
         <p:nvPicPr>
-          <p:cNvPr id="228" name="" descr=""/>
+          <p:cNvPr id="230" name="" descr=""/>
           <p:cNvPicPr/>
           <p:nvPr/>
         </p:nvPicPr>
@@ -19041,7 +19462,7 @@
         <p:spPr>
           <a:xfrm>
             <a:off x="6949440" y="1463040"/>
-            <a:ext cx="3198240" cy="1797840"/>
+            <a:ext cx="3197880" cy="1797480"/>
           </a:xfrm>
           <a:prstGeom prst="rect">
             <a:avLst/>
@@ -19053,7 +19474,7 @@
       </p:pic>
       <p:pic>
         <p:nvPicPr>
-          <p:cNvPr id="229" name="" descr=""/>
+          <p:cNvPr id="231" name="" descr=""/>
           <p:cNvPicPr/>
           <p:nvPr/>
         </p:nvPicPr>
@@ -19064,7 +19485,7 @@
         <p:spPr>
           <a:xfrm>
             <a:off x="7955280" y="3477240"/>
-            <a:ext cx="673560" cy="635400"/>
+            <a:ext cx="673200" cy="635040"/>
           </a:xfrm>
           <a:prstGeom prst="rect">
             <a:avLst/>
@@ -19076,7 +19497,7 @@
       </p:pic>
       <p:pic>
         <p:nvPicPr>
-          <p:cNvPr id="230" name="" descr=""/>
+          <p:cNvPr id="232" name="" descr=""/>
           <p:cNvPicPr/>
           <p:nvPr/>
         </p:nvPicPr>
@@ -19087,7 +19508,7 @@
         <p:spPr>
           <a:xfrm>
             <a:off x="7955280" y="3843000"/>
-            <a:ext cx="673560" cy="635400"/>
+            <a:ext cx="673200" cy="635040"/>
           </a:xfrm>
           <a:prstGeom prst="rect">
             <a:avLst/>
@@ -19099,7 +19520,7 @@
       </p:pic>
       <p:pic>
         <p:nvPicPr>
-          <p:cNvPr id="231" name="" descr=""/>
+          <p:cNvPr id="233" name="" descr=""/>
           <p:cNvPicPr/>
           <p:nvPr/>
         </p:nvPicPr>
@@ -19110,7 +19531,7 @@
         <p:spPr>
           <a:xfrm>
             <a:off x="8376480" y="3843000"/>
-            <a:ext cx="673560" cy="635400"/>
+            <a:ext cx="673200" cy="635040"/>
           </a:xfrm>
           <a:prstGeom prst="rect">
             <a:avLst/>
@@ -19122,7 +19543,7 @@
       </p:pic>
       <p:pic>
         <p:nvPicPr>
-          <p:cNvPr id="232" name="" descr=""/>
+          <p:cNvPr id="234" name="" descr=""/>
           <p:cNvPicPr/>
           <p:nvPr/>
         </p:nvPicPr>
@@ -19133,7 +19554,7 @@
         <p:spPr>
           <a:xfrm>
             <a:off x="8376480" y="4208760"/>
-            <a:ext cx="673560" cy="635400"/>
+            <a:ext cx="673200" cy="635040"/>
           </a:xfrm>
           <a:prstGeom prst="rect">
             <a:avLst/>
@@ -19145,7 +19566,7 @@
       </p:pic>
       <p:pic>
         <p:nvPicPr>
-          <p:cNvPr id="233" name="Shape 87" descr=""/>
+          <p:cNvPr id="235" name="Shape 87" descr=""/>
           <p:cNvPicPr/>
           <p:nvPr/>
         </p:nvPicPr>
@@ -19156,7 +19577,7 @@
         <p:spPr>
           <a:xfrm>
             <a:off x="5870880" y="274320"/>
-            <a:ext cx="2365560" cy="1278000"/>
+            <a:ext cx="2365200" cy="1277640"/>
           </a:xfrm>
           <a:prstGeom prst="rect">
             <a:avLst/>
@@ -19168,14 +19589,14 @@
       </p:pic>
       <p:sp>
         <p:nvSpPr>
-          <p:cNvPr id="234" name="CustomShape 1"/>
+          <p:cNvPr id="236" name="CustomShape 1"/>
           <p:cNvSpPr/>
           <p:nvPr/>
         </p:nvSpPr>
         <p:spPr>
           <a:xfrm>
             <a:off x="548640" y="376920"/>
-            <a:ext cx="7861680" cy="4558680"/>
+            <a:ext cx="7861320" cy="4558320"/>
           </a:xfrm>
           <a:prstGeom prst="rect">
             <a:avLst/>
@@ -19194,7 +19615,7 @@
         <p:txBody>
           <a:bodyPr lIns="90000" rIns="90000" tIns="45000" bIns="45000"/>
           <a:p>
-            <a:pPr marL="216000" indent="-213840">
+            <a:pPr marL="216000" indent="-213480">
               <a:lnSpc>
                 <a:spcPct val="100000"/>
               </a:lnSpc>
@@ -19221,9 +19642,9 @@
               <a:t>Landscape “Piece-oriented” mode (</a:t>
             </a:r>
             <a:r>
-              <a:rPr b="1" lang="en-US" sz="1400" spc="-1" strike="noStrike">
-                <a:solidFill>
-                  <a:srgbClr val="000000"/>
+              <a:rPr b="1" lang="en-US" sz="1400" spc="-1" strike="noStrike" u="sng">
+                <a:solidFill>
+                  <a:srgbClr val="0000ff"/>
                 </a:solidFill>
                 <a:uFill>
                   <a:solidFill>
@@ -19264,7 +19685,7 @@
             </a:endParaRPr>
           </a:p>
           <a:p>
-            <a:pPr marL="448200" indent="-213840">
+            <a:pPr marL="448200" indent="-213480">
               <a:lnSpc>
                 <a:spcPct val="100000"/>
               </a:lnSpc>
@@ -19303,7 +19724,7 @@
             </a:endParaRPr>
           </a:p>
           <a:p>
-            <a:pPr marL="448200" indent="-213840">
+            <a:pPr marL="448200" indent="-213480">
               <a:lnSpc>
                 <a:spcPct val="100000"/>
               </a:lnSpc>
@@ -19342,7 +19763,7 @@
             </a:endParaRPr>
           </a:p>
           <a:p>
-            <a:pPr marL="216000" indent="-213840">
+            <a:pPr marL="216000" indent="-213480">
               <a:lnSpc>
                 <a:spcPct val="100000"/>
               </a:lnSpc>
@@ -19381,7 +19802,7 @@
             </a:endParaRPr>
           </a:p>
           <a:p>
-            <a:pPr marL="216000" indent="-213840">
+            <a:pPr marL="216000" indent="-213480">
               <a:lnSpc>
                 <a:spcPct val="100000"/>
               </a:lnSpc>
@@ -19408,9 +19829,9 @@
               <a:t>Effect “Animation-oriented” mode (</a:t>
             </a:r>
             <a:r>
-              <a:rPr b="1" lang="en-US" sz="1400" spc="-1" strike="noStrike">
-                <a:solidFill>
-                  <a:srgbClr val="000000"/>
+              <a:rPr b="1" lang="en-US" sz="1400" spc="-1" strike="noStrike" u="sng">
+                <a:solidFill>
+                  <a:srgbClr val="0000ff"/>
                 </a:solidFill>
                 <a:uFill>
                   <a:solidFill>
@@ -19451,7 +19872,7 @@
             </a:endParaRPr>
           </a:p>
           <a:p>
-            <a:pPr lvl="1" marL="432000" indent="-213840">
+            <a:pPr lvl="1" marL="432000" indent="-213480">
               <a:lnSpc>
                 <a:spcPct val="100000"/>
               </a:lnSpc>
@@ -19490,7 +19911,7 @@
             </a:endParaRPr>
           </a:p>
           <a:p>
-            <a:pPr lvl="2" marL="648000" indent="-213840">
+            <a:pPr lvl="2" marL="648000" indent="-213480">
               <a:lnSpc>
                 <a:spcPct val="100000"/>
               </a:lnSpc>
@@ -19529,7 +19950,7 @@
             </a:endParaRPr>
           </a:p>
           <a:p>
-            <a:pPr lvl="2" marL="648000" indent="-213840">
+            <a:pPr lvl="2" marL="648000" indent="-213480">
               <a:lnSpc>
                 <a:spcPct val="100000"/>
               </a:lnSpc>
@@ -19568,7 +19989,7 @@
             </a:endParaRPr>
           </a:p>
           <a:p>
-            <a:pPr lvl="1" marL="432000" indent="-213840">
+            <a:pPr lvl="1" marL="432000" indent="-213480">
               <a:lnSpc>
                 <a:spcPct val="100000"/>
               </a:lnSpc>
@@ -19662,14 +20083,14 @@
       </p:grpSpPr>
       <p:sp>
         <p:nvSpPr>
-          <p:cNvPr id="235" name="CustomShape 1"/>
+          <p:cNvPr id="237" name="CustomShape 1"/>
           <p:cNvSpPr/>
           <p:nvPr/>
         </p:nvSpPr>
         <p:spPr>
           <a:xfrm>
             <a:off x="366840" y="0"/>
-            <a:ext cx="8227080" cy="615960"/>
+            <a:ext cx="8226720" cy="615600"/>
           </a:xfrm>
           <a:prstGeom prst="rect">
             <a:avLst/>
@@ -19724,7 +20145,7 @@
       </p:sp>
       <p:pic>
         <p:nvPicPr>
-          <p:cNvPr id="236" name="" descr=""/>
+          <p:cNvPr id="238" name="" descr=""/>
           <p:cNvPicPr/>
           <p:nvPr/>
         </p:nvPicPr>
@@ -19735,7 +20156,7 @@
         <p:spPr>
           <a:xfrm>
             <a:off x="2194560" y="1325880"/>
-            <a:ext cx="4479120" cy="2055960"/>
+            <a:ext cx="4478760" cy="2055600"/>
           </a:xfrm>
           <a:prstGeom prst="rect">
             <a:avLst/>
@@ -19752,14 +20173,14 @@
       </p:pic>
       <p:sp>
         <p:nvSpPr>
-          <p:cNvPr id="237" name="CustomShape 2"/>
+          <p:cNvPr id="239" name="CustomShape 2"/>
           <p:cNvSpPr/>
           <p:nvPr/>
         </p:nvSpPr>
         <p:spPr>
           <a:xfrm>
             <a:off x="457200" y="822960"/>
-            <a:ext cx="1278720" cy="372600"/>
+            <a:ext cx="1278360" cy="372240"/>
           </a:xfrm>
           <a:prstGeom prst="rect">
             <a:avLst/>
@@ -19809,14 +20230,14 @@
       </p:sp>
       <p:sp>
         <p:nvSpPr>
-          <p:cNvPr id="238" name="CustomShape 3"/>
+          <p:cNvPr id="240" name="CustomShape 3"/>
           <p:cNvSpPr/>
           <p:nvPr/>
         </p:nvSpPr>
         <p:spPr>
           <a:xfrm>
             <a:off x="457200" y="2593440"/>
-            <a:ext cx="1370160" cy="372600"/>
+            <a:ext cx="1369800" cy="372240"/>
           </a:xfrm>
           <a:prstGeom prst="rect">
             <a:avLst/>
@@ -19866,14 +20287,14 @@
       </p:sp>
       <p:sp>
         <p:nvSpPr>
-          <p:cNvPr id="239" name="CustomShape 4"/>
+          <p:cNvPr id="241" name="CustomShape 4"/>
           <p:cNvSpPr/>
           <p:nvPr/>
         </p:nvSpPr>
         <p:spPr>
           <a:xfrm>
             <a:off x="7315200" y="2419560"/>
-            <a:ext cx="1370160" cy="230760"/>
+            <a:ext cx="1369800" cy="230400"/>
           </a:xfrm>
           <a:prstGeom prst="rect">
             <a:avLst/>
@@ -19923,14 +20344,14 @@
       </p:sp>
       <p:sp>
         <p:nvSpPr>
-          <p:cNvPr id="240" name="CustomShape 5"/>
+          <p:cNvPr id="242" name="CustomShape 5"/>
           <p:cNvSpPr/>
           <p:nvPr/>
         </p:nvSpPr>
         <p:spPr>
           <a:xfrm>
             <a:off x="7498080" y="872280"/>
-            <a:ext cx="1095840" cy="230760"/>
+            <a:ext cx="1095480" cy="230400"/>
           </a:xfrm>
           <a:prstGeom prst="rect">
             <a:avLst/>
@@ -19980,14 +20401,14 @@
       </p:sp>
       <p:sp>
         <p:nvSpPr>
-          <p:cNvPr id="241" name="CustomShape 6"/>
+          <p:cNvPr id="243" name="CustomShape 6"/>
           <p:cNvSpPr/>
           <p:nvPr/>
         </p:nvSpPr>
         <p:spPr>
           <a:xfrm>
             <a:off x="7406640" y="3474720"/>
-            <a:ext cx="1095840" cy="230760"/>
+            <a:ext cx="1095480" cy="230400"/>
           </a:xfrm>
           <a:prstGeom prst="rect">
             <a:avLst/>
@@ -20037,14 +20458,14 @@
       </p:sp>
       <p:sp>
         <p:nvSpPr>
-          <p:cNvPr id="242" name="CustomShape 7"/>
+          <p:cNvPr id="244" name="CustomShape 7"/>
           <p:cNvSpPr/>
           <p:nvPr/>
         </p:nvSpPr>
         <p:spPr>
           <a:xfrm>
             <a:off x="5669280" y="2926080"/>
-            <a:ext cx="1004400" cy="364320"/>
+            <a:ext cx="1004040" cy="363960"/>
           </a:xfrm>
           <a:prstGeom prst="ellipse">
             <a:avLst/>
@@ -20066,14 +20487,14 @@
       </p:sp>
       <p:sp>
         <p:nvSpPr>
-          <p:cNvPr id="243" name="CustomShape 8"/>
+          <p:cNvPr id="245" name="CustomShape 8"/>
           <p:cNvSpPr/>
           <p:nvPr/>
         </p:nvSpPr>
         <p:spPr>
           <a:xfrm>
             <a:off x="2103120" y="2194560"/>
-            <a:ext cx="1004400" cy="364320"/>
+            <a:ext cx="1004040" cy="363960"/>
           </a:xfrm>
           <a:prstGeom prst="ellipse">
             <a:avLst/>
@@ -20095,14 +20516,14 @@
       </p:sp>
       <p:sp>
         <p:nvSpPr>
-          <p:cNvPr id="244" name="CustomShape 9"/>
+          <p:cNvPr id="246" name="CustomShape 9"/>
           <p:cNvSpPr/>
           <p:nvPr/>
         </p:nvSpPr>
         <p:spPr>
           <a:xfrm>
             <a:off x="5852160" y="1188720"/>
-            <a:ext cx="1004400" cy="455760"/>
+            <a:ext cx="1004040" cy="455400"/>
           </a:xfrm>
           <a:prstGeom prst="ellipse">
             <a:avLst/>
@@ -20124,14 +20545,14 @@
       </p:sp>
       <p:sp>
         <p:nvSpPr>
-          <p:cNvPr id="245" name="CustomShape 10"/>
+          <p:cNvPr id="247" name="CustomShape 10"/>
           <p:cNvSpPr/>
           <p:nvPr/>
         </p:nvSpPr>
         <p:spPr>
           <a:xfrm>
             <a:off x="5577840" y="1737360"/>
-            <a:ext cx="1095840" cy="1095840"/>
+            <a:ext cx="1095480" cy="1095480"/>
           </a:xfrm>
           <a:prstGeom prst="ellipse">
             <a:avLst/>
@@ -20153,14 +20574,14 @@
       </p:sp>
       <p:sp>
         <p:nvSpPr>
-          <p:cNvPr id="246" name="CustomShape 11"/>
+          <p:cNvPr id="248" name="CustomShape 11"/>
           <p:cNvSpPr/>
           <p:nvPr/>
         </p:nvSpPr>
         <p:spPr>
           <a:xfrm>
             <a:off x="2926080" y="1463040"/>
-            <a:ext cx="272880" cy="272880"/>
+            <a:ext cx="272520" cy="272520"/>
           </a:xfrm>
           <a:prstGeom prst="ellipse">
             <a:avLst/>
@@ -20182,7 +20603,7 @@
       </p:sp>
       <p:sp>
         <p:nvSpPr>
-          <p:cNvPr id="247" name="Line 12"/>
+          <p:cNvPr id="249" name="Line 12"/>
           <p:cNvSpPr/>
           <p:nvPr/>
         </p:nvSpPr>
@@ -20210,7 +20631,7 @@
       </p:sp>
       <p:sp>
         <p:nvSpPr>
-          <p:cNvPr id="248" name="Line 13"/>
+          <p:cNvPr id="250" name="Line 13"/>
           <p:cNvSpPr/>
           <p:nvPr/>
         </p:nvSpPr>
@@ -20238,7 +20659,7 @@
       </p:sp>
       <p:sp>
         <p:nvSpPr>
-          <p:cNvPr id="249" name="Line 14"/>
+          <p:cNvPr id="251" name="Line 14"/>
           <p:cNvSpPr/>
           <p:nvPr/>
         </p:nvSpPr>
@@ -20266,7 +20687,7 @@
       </p:sp>
       <p:sp>
         <p:nvSpPr>
-          <p:cNvPr id="250" name="Line 15"/>
+          <p:cNvPr id="252" name="Line 15"/>
           <p:cNvSpPr/>
           <p:nvPr/>
         </p:nvSpPr>
@@ -20294,7 +20715,7 @@
       </p:sp>
       <p:sp>
         <p:nvSpPr>
-          <p:cNvPr id="251" name="Line 16"/>
+          <p:cNvPr id="253" name="Line 16"/>
           <p:cNvSpPr/>
           <p:nvPr/>
         </p:nvSpPr>
@@ -20322,14 +20743,14 @@
       </p:sp>
       <p:sp>
         <p:nvSpPr>
-          <p:cNvPr id="252" name="CustomShape 17"/>
+          <p:cNvPr id="254" name="CustomShape 17"/>
           <p:cNvSpPr/>
           <p:nvPr/>
         </p:nvSpPr>
         <p:spPr>
           <a:xfrm>
             <a:off x="3291840" y="1645920"/>
-            <a:ext cx="2376000" cy="1644480"/>
+            <a:ext cx="2375640" cy="1644120"/>
           </a:xfrm>
           <a:prstGeom prst="ellipse">
             <a:avLst/>
@@ -20351,14 +20772,14 @@
       </p:sp>
       <p:sp>
         <p:nvSpPr>
-          <p:cNvPr id="253" name="CustomShape 18"/>
+          <p:cNvPr id="255" name="CustomShape 18"/>
           <p:cNvSpPr/>
           <p:nvPr/>
         </p:nvSpPr>
         <p:spPr>
           <a:xfrm>
             <a:off x="4297680" y="3965040"/>
-            <a:ext cx="547200" cy="239760"/>
+            <a:ext cx="546840" cy="239400"/>
           </a:xfrm>
           <a:prstGeom prst="rect">
             <a:avLst/>
@@ -20408,7 +20829,7 @@
       </p:sp>
       <p:sp>
         <p:nvSpPr>
-          <p:cNvPr id="254" name="Line 19"/>
+          <p:cNvPr id="256" name="Line 19"/>
           <p:cNvSpPr/>
           <p:nvPr/>
         </p:nvSpPr>
@@ -20436,14 +20857,14 @@
       </p:sp>
       <p:sp>
         <p:nvSpPr>
-          <p:cNvPr id="255" name="CustomShape 20"/>
+          <p:cNvPr id="257" name="CustomShape 20"/>
           <p:cNvSpPr/>
           <p:nvPr/>
         </p:nvSpPr>
         <p:spPr>
           <a:xfrm>
             <a:off x="2103120" y="1737360"/>
-            <a:ext cx="1004400" cy="364320"/>
+            <a:ext cx="1004040" cy="363960"/>
           </a:xfrm>
           <a:prstGeom prst="ellipse">
             <a:avLst/>
@@ -20465,14 +20886,14 @@
       </p:sp>
       <p:sp>
         <p:nvSpPr>
-          <p:cNvPr id="256" name="CustomShape 21"/>
+          <p:cNvPr id="258" name="CustomShape 21"/>
           <p:cNvSpPr/>
           <p:nvPr/>
         </p:nvSpPr>
         <p:spPr>
           <a:xfrm>
             <a:off x="3474720" y="682200"/>
-            <a:ext cx="1095840" cy="230760"/>
+            <a:ext cx="1095480" cy="230400"/>
           </a:xfrm>
           <a:prstGeom prst="rect">
             <a:avLst/>
@@ -20522,7 +20943,7 @@
       </p:sp>
       <p:sp>
         <p:nvSpPr>
-          <p:cNvPr id="257" name="Line 22"/>
+          <p:cNvPr id="259" name="Line 22"/>
           <p:cNvSpPr/>
           <p:nvPr/>
         </p:nvSpPr>
@@ -20602,14 +21023,14 @@
       </p:grpSpPr>
       <p:sp>
         <p:nvSpPr>
-          <p:cNvPr id="258" name="CustomShape 1"/>
+          <p:cNvPr id="260" name="CustomShape 1"/>
           <p:cNvSpPr/>
           <p:nvPr/>
         </p:nvSpPr>
         <p:spPr>
           <a:xfrm>
             <a:off x="311760" y="410040"/>
-            <a:ext cx="8517240" cy="604440"/>
+            <a:ext cx="8516880" cy="604080"/>
           </a:xfrm>
           <a:prstGeom prst="rect">
             <a:avLst/>
@@ -20628,7 +21049,7 @@
         <p:txBody>
           <a:bodyPr lIns="90000" rIns="90000" tIns="91440" bIns="91440"/>
           <a:p>
-            <a:pPr marL="457200" indent="-225360">
+            <a:pPr marL="457200" indent="-225000">
               <a:lnSpc>
                 <a:spcPct val="100000"/>
               </a:lnSpc>
@@ -20669,14 +21090,14 @@
       </p:sp>
       <p:sp>
         <p:nvSpPr>
-          <p:cNvPr id="259" name="CustomShape 2"/>
+          <p:cNvPr id="261" name="CustomShape 2"/>
           <p:cNvSpPr/>
           <p:nvPr/>
         </p:nvSpPr>
         <p:spPr>
           <a:xfrm>
             <a:off x="311760" y="1229760"/>
-            <a:ext cx="3871800" cy="3471480"/>
+            <a:ext cx="3871440" cy="3471120"/>
           </a:xfrm>
           <a:prstGeom prst="rect">
             <a:avLst/>
@@ -20749,7 +21170,7 @@
       </p:sp>
       <p:pic>
         <p:nvPicPr>
-          <p:cNvPr id="260" name="Shape 112" descr=""/>
+          <p:cNvPr id="262" name="Shape 112" descr=""/>
           <p:cNvPicPr/>
           <p:nvPr/>
         </p:nvPicPr>
@@ -20760,7 +21181,7 @@
         <p:spPr>
           <a:xfrm>
             <a:off x="4302000" y="1631880"/>
-            <a:ext cx="4623120" cy="2480760"/>
+            <a:ext cx="4622760" cy="2480400"/>
           </a:xfrm>
           <a:prstGeom prst="rect">
             <a:avLst/>
@@ -20824,14 +21245,14 @@
       </p:grpSpPr>
       <p:sp>
         <p:nvSpPr>
-          <p:cNvPr id="261" name="CustomShape 1"/>
+          <p:cNvPr id="263" name="CustomShape 1"/>
           <p:cNvSpPr/>
           <p:nvPr/>
         </p:nvSpPr>
         <p:spPr>
           <a:xfrm>
             <a:off x="311760" y="410040"/>
-            <a:ext cx="8517240" cy="604440"/>
+            <a:ext cx="8516880" cy="604080"/>
           </a:xfrm>
           <a:prstGeom prst="rect">
             <a:avLst/>
@@ -20886,14 +21307,14 @@
       </p:sp>
       <p:sp>
         <p:nvSpPr>
-          <p:cNvPr id="262" name="CustomShape 2"/>
+          <p:cNvPr id="264" name="CustomShape 2"/>
           <p:cNvSpPr/>
           <p:nvPr/>
         </p:nvSpPr>
         <p:spPr>
           <a:xfrm>
             <a:off x="311760" y="1229760"/>
-            <a:ext cx="4378320" cy="3335760"/>
+            <a:ext cx="4377960" cy="3335400"/>
           </a:xfrm>
           <a:prstGeom prst="rect">
             <a:avLst/>
@@ -20912,7 +21333,7 @@
         <p:txBody>
           <a:bodyPr lIns="90000" rIns="90000" tIns="91440" bIns="91440"/>
           <a:p>
-            <a:pPr marL="457200" indent="-225360">
+            <a:pPr marL="457200" indent="-225000">
               <a:lnSpc>
                 <a:spcPct val="100000"/>
               </a:lnSpc>
@@ -20980,7 +21401,7 @@
             </a:endParaRPr>
           </a:p>
           <a:p>
-            <a:pPr marL="457200" indent="-225360">
+            <a:pPr marL="457200" indent="-225000">
               <a:lnSpc>
                 <a:spcPct val="100000"/>
               </a:lnSpc>
@@ -21033,7 +21454,7 @@
             </a:endParaRPr>
           </a:p>
           <a:p>
-            <a:pPr marL="457200" indent="-225360">
+            <a:pPr marL="457200" indent="-225000">
               <a:lnSpc>
                 <a:spcPct val="100000"/>
               </a:lnSpc>
@@ -21086,7 +21507,7 @@
             </a:endParaRPr>
           </a:p>
           <a:p>
-            <a:pPr marL="457200" indent="-225360">
+            <a:pPr marL="457200" indent="-225000">
               <a:lnSpc>
                 <a:spcPct val="100000"/>
               </a:lnSpc>
@@ -21157,7 +21578,7 @@
       </p:sp>
       <p:pic>
         <p:nvPicPr>
-          <p:cNvPr id="263" name="Shape 119" descr=""/>
+          <p:cNvPr id="265" name="Shape 119" descr=""/>
           <p:cNvPicPr/>
           <p:nvPr/>
         </p:nvPicPr>
@@ -21168,7 +21589,7 @@
         <p:spPr>
           <a:xfrm>
             <a:off x="4862160" y="299880"/>
-            <a:ext cx="1730160" cy="2492280"/>
+            <a:ext cx="1729800" cy="2491920"/>
           </a:xfrm>
           <a:prstGeom prst="rect">
             <a:avLst/>
@@ -21185,7 +21606,7 @@
       </p:pic>
       <p:pic>
         <p:nvPicPr>
-          <p:cNvPr id="264" name="Shape 120" descr=""/>
+          <p:cNvPr id="266" name="Shape 120" descr=""/>
           <p:cNvPicPr/>
           <p:nvPr/>
         </p:nvPicPr>
@@ -21196,7 +21617,7 @@
         <p:spPr>
           <a:xfrm>
             <a:off x="6595560" y="3371040"/>
-            <a:ext cx="2111400" cy="853920"/>
+            <a:ext cx="2111040" cy="853560"/>
           </a:xfrm>
           <a:prstGeom prst="rect">
             <a:avLst/>

</xml_diff>